<commit_message>
Updated figure of navstack overview
</commit_message>
<xml_diff>
--- a/Paper/Metadata/Navstack.pptx
+++ b/Paper/Metadata/Navstack.pptx
@@ -2969,49 +2969,224 @@
           <a:chExt cx="0" cy="0"/>
         </a:xfrm>
       </p:grpSpPr>
-      <p:sp>
-        <p:nvSpPr>
-          <p:cNvPr id="4" name="Rectangle 3"/>
-          <p:cNvSpPr/>
+      <p:cxnSp>
+        <p:nvCxnSpPr>
+          <p:cNvPr id="23" name="Straight Connector 22"/>
+          <p:cNvCxnSpPr/>
           <p:nvPr/>
-        </p:nvSpPr>
+        </p:nvCxnSpPr>
         <p:spPr>
           <a:xfrm>
-            <a:off x="4694548" y="1602557"/>
-            <a:ext cx="2243580" cy="2587658"/>
+            <a:off x="4574687" y="2532257"/>
+            <a:ext cx="844883" cy="0"/>
           </a:xfrm>
-          <a:prstGeom prst="rect">
+          <a:prstGeom prst="line">
             <a:avLst/>
           </a:prstGeom>
-          <a:ln/>
+          <a:ln w="12700">
+            <a:solidFill>
+              <a:schemeClr val="tx1"/>
+            </a:solidFill>
+            <a:tailEnd type="triangle"/>
+          </a:ln>
         </p:spPr>
         <p:style>
-          <a:lnRef idx="3">
-            <a:schemeClr val="lt1"/>
+          <a:lnRef idx="1">
+            <a:schemeClr val="accent1"/>
           </a:lnRef>
-          <a:fillRef idx="1">
-            <a:schemeClr val="accent3"/>
+          <a:fillRef idx="0">
+            <a:schemeClr val="accent1"/>
           </a:fillRef>
-          <a:effectRef idx="1">
-            <a:schemeClr val="accent3"/>
+          <a:effectRef idx="0">
+            <a:schemeClr val="accent1"/>
           </a:effectRef>
           <a:fontRef idx="minor">
-            <a:schemeClr val="lt1"/>
+            <a:schemeClr val="tx1"/>
           </a:fontRef>
         </p:style>
-        <p:txBody>
-          <a:bodyPr rtlCol="0" anchor="ctr"/>
-          <a:lstStyle/>
-          <a:p>
-            <a:pPr algn="ctr"/>
-            <a:r>
-              <a:rPr lang="en-US" sz="2400" dirty="0" err="1" smtClean="0"/>
-              <a:t>move_base</a:t>
-            </a:r>
-            <a:endParaRPr lang="en-US" sz="2400" dirty="0"/>
-          </a:p>
-        </p:txBody>
-      </p:sp>
+      </p:cxnSp>
+      <p:cxnSp>
+        <p:nvCxnSpPr>
+          <p:cNvPr id="20" name="Straight Connector 19"/>
+          <p:cNvCxnSpPr>
+            <a:endCxn id="19" idx="1"/>
+          </p:cNvCxnSpPr>
+          <p:nvPr/>
+        </p:nvCxnSpPr>
+        <p:spPr>
+          <a:xfrm>
+            <a:off x="8249558" y="3199478"/>
+            <a:ext cx="888809" cy="1"/>
+          </a:xfrm>
+          <a:prstGeom prst="line">
+            <a:avLst/>
+          </a:prstGeom>
+          <a:ln w="12700">
+            <a:solidFill>
+              <a:schemeClr val="tx1"/>
+            </a:solidFill>
+            <a:tailEnd type="triangle"/>
+          </a:ln>
+        </p:spPr>
+        <p:style>
+          <a:lnRef idx="1">
+            <a:schemeClr val="accent1"/>
+          </a:lnRef>
+          <a:fillRef idx="0">
+            <a:schemeClr val="accent1"/>
+          </a:fillRef>
+          <a:effectRef idx="0">
+            <a:schemeClr val="accent1"/>
+          </a:effectRef>
+          <a:fontRef idx="minor">
+            <a:schemeClr val="tx1"/>
+          </a:fontRef>
+        </p:style>
+      </p:cxnSp>
+      <p:cxnSp>
+        <p:nvCxnSpPr>
+          <p:cNvPr id="18" name="Straight Connector 17"/>
+          <p:cNvCxnSpPr/>
+          <p:nvPr/>
+        </p:nvCxnSpPr>
+        <p:spPr>
+          <a:xfrm>
+            <a:off x="4528609" y="4541018"/>
+            <a:ext cx="890961" cy="0"/>
+          </a:xfrm>
+          <a:prstGeom prst="line">
+            <a:avLst/>
+          </a:prstGeom>
+          <a:ln w="12700">
+            <a:solidFill>
+              <a:schemeClr val="tx1"/>
+            </a:solidFill>
+            <a:tailEnd type="triangle"/>
+          </a:ln>
+        </p:spPr>
+        <p:style>
+          <a:lnRef idx="1">
+            <a:schemeClr val="accent1"/>
+          </a:lnRef>
+          <a:fillRef idx="0">
+            <a:schemeClr val="accent1"/>
+          </a:fillRef>
+          <a:effectRef idx="0">
+            <a:schemeClr val="accent1"/>
+          </a:effectRef>
+          <a:fontRef idx="minor">
+            <a:schemeClr val="tx1"/>
+          </a:fontRef>
+        </p:style>
+      </p:cxnSp>
+      <p:cxnSp>
+        <p:nvCxnSpPr>
+          <p:cNvPr id="17" name="Straight Connector 16"/>
+          <p:cNvCxnSpPr/>
+          <p:nvPr/>
+        </p:nvCxnSpPr>
+        <p:spPr>
+          <a:xfrm>
+            <a:off x="4528609" y="3873005"/>
+            <a:ext cx="890961" cy="0"/>
+          </a:xfrm>
+          <a:prstGeom prst="line">
+            <a:avLst/>
+          </a:prstGeom>
+          <a:ln w="12700">
+            <a:solidFill>
+              <a:schemeClr val="tx1"/>
+            </a:solidFill>
+            <a:tailEnd type="triangle"/>
+          </a:ln>
+        </p:spPr>
+        <p:style>
+          <a:lnRef idx="1">
+            <a:schemeClr val="accent1"/>
+          </a:lnRef>
+          <a:fillRef idx="0">
+            <a:schemeClr val="accent1"/>
+          </a:fillRef>
+          <a:effectRef idx="0">
+            <a:schemeClr val="accent1"/>
+          </a:effectRef>
+          <a:fontRef idx="minor">
+            <a:schemeClr val="tx1"/>
+          </a:fontRef>
+        </p:style>
+      </p:cxnSp>
+      <p:cxnSp>
+        <p:nvCxnSpPr>
+          <p:cNvPr id="16" name="Straight Connector 15"/>
+          <p:cNvCxnSpPr/>
+          <p:nvPr/>
+        </p:nvCxnSpPr>
+        <p:spPr>
+          <a:xfrm>
+            <a:off x="4528609" y="3202631"/>
+            <a:ext cx="890961" cy="0"/>
+          </a:xfrm>
+          <a:prstGeom prst="line">
+            <a:avLst/>
+          </a:prstGeom>
+          <a:ln w="12700">
+            <a:solidFill>
+              <a:schemeClr val="tx1"/>
+            </a:solidFill>
+            <a:tailEnd type="triangle"/>
+          </a:ln>
+        </p:spPr>
+        <p:style>
+          <a:lnRef idx="1">
+            <a:schemeClr val="accent1"/>
+          </a:lnRef>
+          <a:fillRef idx="0">
+            <a:schemeClr val="accent1"/>
+          </a:fillRef>
+          <a:effectRef idx="0">
+            <a:schemeClr val="accent1"/>
+          </a:effectRef>
+          <a:fontRef idx="minor">
+            <a:schemeClr val="tx1"/>
+          </a:fontRef>
+        </p:style>
+      </p:cxnSp>
+      <p:cxnSp>
+        <p:nvCxnSpPr>
+          <p:cNvPr id="15" name="Straight Connector 14"/>
+          <p:cNvCxnSpPr/>
+          <p:nvPr/>
+        </p:nvCxnSpPr>
+        <p:spPr>
+          <a:xfrm>
+            <a:off x="4528609" y="1861883"/>
+            <a:ext cx="890961" cy="0"/>
+          </a:xfrm>
+          <a:prstGeom prst="line">
+            <a:avLst/>
+          </a:prstGeom>
+          <a:ln w="12700">
+            <a:solidFill>
+              <a:schemeClr val="tx1"/>
+            </a:solidFill>
+            <a:tailEnd type="triangle"/>
+          </a:ln>
+        </p:spPr>
+        <p:style>
+          <a:lnRef idx="1">
+            <a:schemeClr val="accent1"/>
+          </a:lnRef>
+          <a:fillRef idx="0">
+            <a:schemeClr val="accent1"/>
+          </a:fillRef>
+          <a:effectRef idx="0">
+            <a:schemeClr val="accent1"/>
+          </a:effectRef>
+          <a:fontRef idx="minor">
+            <a:schemeClr val="tx1"/>
+          </a:fontRef>
+        </p:style>
+      </p:cxnSp>
       <p:sp>
         <p:nvSpPr>
           <p:cNvPr id="5" name="Rectangle 4"/>
@@ -3020,8 +3195,8 @@
         </p:nvSpPr>
         <p:spPr>
           <a:xfrm>
-            <a:off x="2733771" y="1602557"/>
-            <a:ext cx="1489437" cy="565608"/>
+            <a:off x="2630471" y="1602557"/>
+            <a:ext cx="2143475" cy="518653"/>
           </a:xfrm>
           <a:prstGeom prst="rect">
             <a:avLst/>
@@ -3057,17 +3232,76 @@
           <a:p>
             <a:pPr algn="ctr"/>
             <a:r>
-              <a:rPr lang="en-US" smtClean="0">
+              <a:rPr lang="en-US" sz="2400" smtClean="0">
                 <a:solidFill>
                   <a:sysClr val="windowText" lastClr="000000"/>
                 </a:solidFill>
+                <a:latin typeface="Baskerville" charset="0"/>
+                <a:ea typeface="Baskerville" charset="0"/>
+                <a:cs typeface="Baskerville" charset="0"/>
               </a:rPr>
               <a:t>Odometry</a:t>
             </a:r>
-            <a:endParaRPr lang="en-US" dirty="0">
+            <a:endParaRPr lang="en-US" sz="2400" dirty="0">
               <a:solidFill>
                 <a:sysClr val="windowText" lastClr="000000"/>
               </a:solidFill>
+              <a:latin typeface="Baskerville" charset="0"/>
+              <a:ea typeface="Baskerville" charset="0"/>
+              <a:cs typeface="Baskerville" charset="0"/>
+            </a:endParaRPr>
+          </a:p>
+        </p:txBody>
+      </p:sp>
+      <p:sp>
+        <p:nvSpPr>
+          <p:cNvPr id="4" name="Rectangle 3"/>
+          <p:cNvSpPr/>
+          <p:nvPr/>
+        </p:nvSpPr>
+        <p:spPr>
+          <a:xfrm>
+            <a:off x="5419570" y="1602557"/>
+            <a:ext cx="3073173" cy="3193844"/>
+          </a:xfrm>
+          <a:prstGeom prst="rect">
+            <a:avLst/>
+          </a:prstGeom>
+          <a:ln>
+            <a:noFill/>
+          </a:ln>
+        </p:spPr>
+        <p:style>
+          <a:lnRef idx="3">
+            <a:schemeClr val="lt1"/>
+          </a:lnRef>
+          <a:fillRef idx="1">
+            <a:schemeClr val="accent3"/>
+          </a:fillRef>
+          <a:effectRef idx="1">
+            <a:schemeClr val="accent3"/>
+          </a:effectRef>
+          <a:fontRef idx="minor">
+            <a:schemeClr val="lt1"/>
+          </a:fontRef>
+        </p:style>
+        <p:txBody>
+          <a:bodyPr rtlCol="0" anchor="ctr"/>
+          <a:lstStyle/>
+          <a:p>
+            <a:pPr algn="ctr"/>
+            <a:r>
+              <a:rPr lang="en-US" sz="3200" dirty="0" err="1" smtClean="0">
+                <a:latin typeface="Baskerville" charset="0"/>
+                <a:ea typeface="Baskerville" charset="0"/>
+                <a:cs typeface="Baskerville" charset="0"/>
+              </a:rPr>
+              <a:t>move_base</a:t>
+            </a:r>
+            <a:endParaRPr lang="en-US" sz="3200" dirty="0">
+              <a:latin typeface="Baskerville" charset="0"/>
+              <a:ea typeface="Baskerville" charset="0"/>
+              <a:cs typeface="Baskerville" charset="0"/>
             </a:endParaRPr>
           </a:p>
         </p:txBody>
@@ -3080,8 +3314,8 @@
         </p:nvSpPr>
         <p:spPr>
           <a:xfrm>
-            <a:off x="2733770" y="2276573"/>
-            <a:ext cx="1489438" cy="565608"/>
+            <a:off x="2630471" y="2272931"/>
+            <a:ext cx="2143475" cy="518653"/>
           </a:xfrm>
           <a:prstGeom prst="rect">
             <a:avLst/>
@@ -3117,17 +3351,23 @@
           <a:p>
             <a:pPr algn="ctr"/>
             <a:r>
-              <a:rPr lang="en-US" dirty="0" err="1" smtClean="0">
+              <a:rPr lang="en-US" sz="2400" dirty="0" err="1" smtClean="0">
                 <a:solidFill>
                   <a:sysClr val="windowText" lastClr="000000"/>
                 </a:solidFill>
+                <a:latin typeface="Baskerville" charset="0"/>
+                <a:ea typeface="Baskerville" charset="0"/>
+                <a:cs typeface="Baskerville" charset="0"/>
               </a:rPr>
               <a:t>Localisation</a:t>
             </a:r>
-            <a:endParaRPr lang="en-US" dirty="0">
+            <a:endParaRPr lang="en-US" sz="2400" dirty="0">
               <a:solidFill>
                 <a:sysClr val="windowText" lastClr="000000"/>
               </a:solidFill>
+              <a:latin typeface="Baskerville" charset="0"/>
+              <a:ea typeface="Baskerville" charset="0"/>
+              <a:cs typeface="Baskerville" charset="0"/>
             </a:endParaRPr>
           </a:p>
         </p:txBody>
@@ -3140,8 +3380,8 @@
         </p:nvSpPr>
         <p:spPr>
           <a:xfrm>
-            <a:off x="2733770" y="2950590"/>
-            <a:ext cx="1489438" cy="565608"/>
+            <a:off x="2630471" y="2943305"/>
+            <a:ext cx="2143475" cy="518653"/>
           </a:xfrm>
           <a:prstGeom prst="rect">
             <a:avLst/>
@@ -3172,22 +3412,28 @@
           </a:fontRef>
         </p:style>
         <p:txBody>
-          <a:bodyPr rtlCol="0" anchor="ctr"/>
+          <a:bodyPr lIns="36000" rIns="36000" rtlCol="0" anchor="ctr"/>
           <a:lstStyle/>
           <a:p>
             <a:pPr algn="ctr"/>
             <a:r>
-              <a:rPr lang="en-US" sz="1400" dirty="0" smtClean="0">
+              <a:rPr lang="en-US" sz="2400" dirty="0" smtClean="0">
                 <a:solidFill>
                   <a:sysClr val="windowText" lastClr="000000"/>
                 </a:solidFill>
+                <a:latin typeface="Baskerville" charset="0"/>
+                <a:ea typeface="Baskerville" charset="0"/>
+                <a:cs typeface="Baskerville" charset="0"/>
               </a:rPr>
               <a:t>Transformations</a:t>
             </a:r>
-            <a:endParaRPr lang="en-US" sz="1400" dirty="0">
+            <a:endParaRPr lang="en-US" sz="2400" dirty="0">
               <a:solidFill>
                 <a:sysClr val="windowText" lastClr="000000"/>
               </a:solidFill>
+              <a:latin typeface="Baskerville" charset="0"/>
+              <a:ea typeface="Baskerville" charset="0"/>
+              <a:cs typeface="Baskerville" charset="0"/>
             </a:endParaRPr>
           </a:p>
         </p:txBody>
@@ -3200,8 +3446,8 @@
         </p:nvSpPr>
         <p:spPr>
           <a:xfrm>
-            <a:off x="2733770" y="3624607"/>
-            <a:ext cx="1489438" cy="565608"/>
+            <a:off x="2630471" y="3613679"/>
+            <a:ext cx="2143475" cy="518653"/>
           </a:xfrm>
           <a:prstGeom prst="rect">
             <a:avLst/>
@@ -3237,35 +3483,49 @@
           <a:p>
             <a:pPr algn="ctr"/>
             <a:r>
-              <a:rPr lang="en-US" sz="1400" dirty="0" smtClean="0">
+              <a:rPr lang="en-US" sz="2400" dirty="0" smtClean="0">
                 <a:solidFill>
                   <a:sysClr val="windowText" lastClr="000000"/>
                 </a:solidFill>
+                <a:latin typeface="Baskerville" charset="0"/>
+                <a:ea typeface="Baskerville" charset="0"/>
+                <a:cs typeface="Baskerville" charset="0"/>
               </a:rPr>
               <a:t>Sensor data</a:t>
             </a:r>
-            <a:endParaRPr lang="en-US" sz="1400" dirty="0">
+            <a:endParaRPr lang="en-US" sz="2400" dirty="0">
               <a:solidFill>
                 <a:sysClr val="windowText" lastClr="000000"/>
               </a:solidFill>
+              <a:latin typeface="Baskerville" charset="0"/>
+              <a:ea typeface="Baskerville" charset="0"/>
+              <a:cs typeface="Baskerville" charset="0"/>
             </a:endParaRPr>
           </a:p>
         </p:txBody>
       </p:sp>
       <p:sp>
         <p:nvSpPr>
-          <p:cNvPr id="9" name="Rectangle 8"/>
+          <p:cNvPr id="19" name="Rectangle 18"/>
           <p:cNvSpPr/>
           <p:nvPr/>
         </p:nvSpPr>
         <p:spPr>
           <a:xfrm>
-            <a:off x="8512404" y="2842181"/>
-            <a:ext cx="914400" cy="914400"/>
+            <a:off x="9138367" y="2812104"/>
+            <a:ext cx="2142000" cy="774749"/>
           </a:xfrm>
           <a:prstGeom prst="rect">
             <a:avLst/>
           </a:prstGeom>
+          <a:solidFill>
+            <a:schemeClr val="bg1"/>
+          </a:solidFill>
+          <a:ln>
+            <a:solidFill>
+              <a:schemeClr val="tx1"/>
+            </a:solidFill>
+          </a:ln>
         </p:spPr>
         <p:style>
           <a:lnRef idx="2">
@@ -3288,7 +3548,112 @@
           <a:lstStyle/>
           <a:p>
             <a:pPr algn="ctr"/>
-            <a:endParaRPr lang="en-US"/>
+            <a:r>
+              <a:rPr lang="en-US" sz="2400" dirty="0" smtClean="0">
+                <a:solidFill>
+                  <a:sysClr val="windowText" lastClr="000000"/>
+                </a:solidFill>
+                <a:latin typeface="Baskerville" charset="0"/>
+                <a:ea typeface="Baskerville" charset="0"/>
+                <a:cs typeface="Baskerville" charset="0"/>
+              </a:rPr>
+              <a:t>Velocity</a:t>
+            </a:r>
+            <a:br>
+              <a:rPr lang="en-US" sz="2400" dirty="0" smtClean="0">
+                <a:solidFill>
+                  <a:sysClr val="windowText" lastClr="000000"/>
+                </a:solidFill>
+                <a:latin typeface="Baskerville" charset="0"/>
+                <a:ea typeface="Baskerville" charset="0"/>
+                <a:cs typeface="Baskerville" charset="0"/>
+              </a:rPr>
+            </a:br>
+            <a:r>
+              <a:rPr lang="en-US" sz="2400" dirty="0" smtClean="0">
+                <a:solidFill>
+                  <a:sysClr val="windowText" lastClr="000000"/>
+                </a:solidFill>
+                <a:latin typeface="Baskerville" charset="0"/>
+                <a:ea typeface="Baskerville" charset="0"/>
+                <a:cs typeface="Baskerville" charset="0"/>
+              </a:rPr>
+              <a:t>commands</a:t>
+            </a:r>
+            <a:endParaRPr lang="en-US" sz="2400" dirty="0">
+              <a:solidFill>
+                <a:sysClr val="windowText" lastClr="000000"/>
+              </a:solidFill>
+              <a:latin typeface="Baskerville" charset="0"/>
+              <a:ea typeface="Baskerville" charset="0"/>
+              <a:cs typeface="Baskerville" charset="0"/>
+            </a:endParaRPr>
+          </a:p>
+        </p:txBody>
+      </p:sp>
+      <p:sp>
+        <p:nvSpPr>
+          <p:cNvPr id="22" name="Rectangle 21"/>
+          <p:cNvSpPr/>
+          <p:nvPr/>
+        </p:nvSpPr>
+        <p:spPr>
+          <a:xfrm>
+            <a:off x="2630472" y="4277748"/>
+            <a:ext cx="2143474" cy="518653"/>
+          </a:xfrm>
+          <a:prstGeom prst="rect">
+            <a:avLst/>
+          </a:prstGeom>
+          <a:solidFill>
+            <a:schemeClr val="bg1"/>
+          </a:solidFill>
+          <a:ln>
+            <a:solidFill>
+              <a:schemeClr val="tx1"/>
+            </a:solidFill>
+          </a:ln>
+        </p:spPr>
+        <p:style>
+          <a:lnRef idx="2">
+            <a:schemeClr val="accent1">
+              <a:shade val="50000"/>
+            </a:schemeClr>
+          </a:lnRef>
+          <a:fillRef idx="1">
+            <a:schemeClr val="accent1"/>
+          </a:fillRef>
+          <a:effectRef idx="0">
+            <a:schemeClr val="accent1"/>
+          </a:effectRef>
+          <a:fontRef idx="minor">
+            <a:schemeClr val="lt1"/>
+          </a:fontRef>
+        </p:style>
+        <p:txBody>
+          <a:bodyPr rtlCol="0" anchor="ctr"/>
+          <a:lstStyle/>
+          <a:p>
+            <a:pPr algn="ctr"/>
+            <a:r>
+              <a:rPr lang="en-US" sz="2400" dirty="0" smtClean="0">
+                <a:solidFill>
+                  <a:sysClr val="windowText" lastClr="000000"/>
+                </a:solidFill>
+                <a:latin typeface="Baskerville" charset="0"/>
+                <a:ea typeface="Baskerville" charset="0"/>
+                <a:cs typeface="Baskerville" charset="0"/>
+              </a:rPr>
+              <a:t>Map</a:t>
+            </a:r>
+            <a:endParaRPr lang="en-US" sz="2400" dirty="0">
+              <a:solidFill>
+                <a:sysClr val="windowText" lastClr="000000"/>
+              </a:solidFill>
+              <a:latin typeface="Baskerville" charset="0"/>
+              <a:ea typeface="Baskerville" charset="0"/>
+              <a:cs typeface="Baskerville" charset="0"/>
+            </a:endParaRPr>
           </a:p>
         </p:txBody>
       </p:sp>

</xml_diff>

<commit_message>
Updated & added figures + added text about global navstack
</commit_message>
<xml_diff>
--- a/Paper/Metadata/Navstack.pptx
+++ b/Paper/Metadata/Navstack.pptx
@@ -6,6 +6,8 @@
   </p:sldMasterIdLst>
   <p:sldIdLst>
     <p:sldId id="262" r:id="rId2"/>
+    <p:sldId id="264" r:id="rId3"/>
+    <p:sldId id="263" r:id="rId4"/>
   </p:sldIdLst>
   <p:sldSz cx="12192000" cy="6858000"/>
   <p:notesSz cx="6858000" cy="9144000"/>
@@ -2969,6 +2971,739 @@
           <a:chExt cx="0" cy="0"/>
         </a:xfrm>
       </p:grpSpPr>
+      <p:grpSp>
+        <p:nvGrpSpPr>
+          <p:cNvPr id="30" name="Group 29"/>
+          <p:cNvGrpSpPr/>
+          <p:nvPr/>
+        </p:nvGrpSpPr>
+        <p:grpSpPr>
+          <a:xfrm>
+            <a:off x="2630471" y="1602557"/>
+            <a:ext cx="8649896" cy="3193844"/>
+            <a:chOff x="2630471" y="1602557"/>
+            <a:chExt cx="8649896" cy="3193844"/>
+          </a:xfrm>
+        </p:grpSpPr>
+        <p:cxnSp>
+          <p:nvCxnSpPr>
+            <p:cNvPr id="23" name="Straight Connector 22"/>
+            <p:cNvCxnSpPr/>
+            <p:nvPr/>
+          </p:nvCxnSpPr>
+          <p:spPr>
+            <a:xfrm>
+              <a:off x="4574687" y="2532257"/>
+              <a:ext cx="844883" cy="0"/>
+            </a:xfrm>
+            <a:prstGeom prst="line">
+              <a:avLst/>
+            </a:prstGeom>
+            <a:ln w="12700">
+              <a:solidFill>
+                <a:schemeClr val="tx1"/>
+              </a:solidFill>
+              <a:tailEnd type="triangle"/>
+            </a:ln>
+          </p:spPr>
+          <p:style>
+            <a:lnRef idx="1">
+              <a:schemeClr val="accent1"/>
+            </a:lnRef>
+            <a:fillRef idx="0">
+              <a:schemeClr val="accent1"/>
+            </a:fillRef>
+            <a:effectRef idx="0">
+              <a:schemeClr val="accent1"/>
+            </a:effectRef>
+            <a:fontRef idx="minor">
+              <a:schemeClr val="tx1"/>
+            </a:fontRef>
+          </p:style>
+        </p:cxnSp>
+        <p:cxnSp>
+          <p:nvCxnSpPr>
+            <p:cNvPr id="20" name="Straight Connector 19"/>
+            <p:cNvCxnSpPr>
+              <a:endCxn id="19" idx="1"/>
+            </p:cNvCxnSpPr>
+            <p:nvPr/>
+          </p:nvCxnSpPr>
+          <p:spPr>
+            <a:xfrm>
+              <a:off x="8249558" y="3199478"/>
+              <a:ext cx="888809" cy="1"/>
+            </a:xfrm>
+            <a:prstGeom prst="line">
+              <a:avLst/>
+            </a:prstGeom>
+            <a:ln w="12700">
+              <a:solidFill>
+                <a:schemeClr val="tx1"/>
+              </a:solidFill>
+              <a:tailEnd type="triangle"/>
+            </a:ln>
+          </p:spPr>
+          <p:style>
+            <a:lnRef idx="1">
+              <a:schemeClr val="accent1"/>
+            </a:lnRef>
+            <a:fillRef idx="0">
+              <a:schemeClr val="accent1"/>
+            </a:fillRef>
+            <a:effectRef idx="0">
+              <a:schemeClr val="accent1"/>
+            </a:effectRef>
+            <a:fontRef idx="minor">
+              <a:schemeClr val="tx1"/>
+            </a:fontRef>
+          </p:style>
+        </p:cxnSp>
+        <p:cxnSp>
+          <p:nvCxnSpPr>
+            <p:cNvPr id="18" name="Straight Connector 17"/>
+            <p:cNvCxnSpPr/>
+            <p:nvPr/>
+          </p:nvCxnSpPr>
+          <p:spPr>
+            <a:xfrm>
+              <a:off x="4528609" y="4541018"/>
+              <a:ext cx="890961" cy="0"/>
+            </a:xfrm>
+            <a:prstGeom prst="line">
+              <a:avLst/>
+            </a:prstGeom>
+            <a:ln w="12700">
+              <a:solidFill>
+                <a:schemeClr val="tx1"/>
+              </a:solidFill>
+              <a:tailEnd type="triangle"/>
+            </a:ln>
+          </p:spPr>
+          <p:style>
+            <a:lnRef idx="1">
+              <a:schemeClr val="accent1"/>
+            </a:lnRef>
+            <a:fillRef idx="0">
+              <a:schemeClr val="accent1"/>
+            </a:fillRef>
+            <a:effectRef idx="0">
+              <a:schemeClr val="accent1"/>
+            </a:effectRef>
+            <a:fontRef idx="minor">
+              <a:schemeClr val="tx1"/>
+            </a:fontRef>
+          </p:style>
+        </p:cxnSp>
+        <p:cxnSp>
+          <p:nvCxnSpPr>
+            <p:cNvPr id="17" name="Straight Connector 16"/>
+            <p:cNvCxnSpPr/>
+            <p:nvPr/>
+          </p:nvCxnSpPr>
+          <p:spPr>
+            <a:xfrm>
+              <a:off x="4528609" y="3873005"/>
+              <a:ext cx="890961" cy="0"/>
+            </a:xfrm>
+            <a:prstGeom prst="line">
+              <a:avLst/>
+            </a:prstGeom>
+            <a:ln w="12700">
+              <a:solidFill>
+                <a:schemeClr val="tx1"/>
+              </a:solidFill>
+              <a:tailEnd type="triangle"/>
+            </a:ln>
+          </p:spPr>
+          <p:style>
+            <a:lnRef idx="1">
+              <a:schemeClr val="accent1"/>
+            </a:lnRef>
+            <a:fillRef idx="0">
+              <a:schemeClr val="accent1"/>
+            </a:fillRef>
+            <a:effectRef idx="0">
+              <a:schemeClr val="accent1"/>
+            </a:effectRef>
+            <a:fontRef idx="minor">
+              <a:schemeClr val="tx1"/>
+            </a:fontRef>
+          </p:style>
+        </p:cxnSp>
+        <p:cxnSp>
+          <p:nvCxnSpPr>
+            <p:cNvPr id="16" name="Straight Connector 15"/>
+            <p:cNvCxnSpPr/>
+            <p:nvPr/>
+          </p:nvCxnSpPr>
+          <p:spPr>
+            <a:xfrm>
+              <a:off x="4528609" y="3202631"/>
+              <a:ext cx="890961" cy="0"/>
+            </a:xfrm>
+            <a:prstGeom prst="line">
+              <a:avLst/>
+            </a:prstGeom>
+            <a:ln w="12700">
+              <a:solidFill>
+                <a:schemeClr val="tx1"/>
+              </a:solidFill>
+              <a:tailEnd type="triangle"/>
+            </a:ln>
+          </p:spPr>
+          <p:style>
+            <a:lnRef idx="1">
+              <a:schemeClr val="accent1"/>
+            </a:lnRef>
+            <a:fillRef idx="0">
+              <a:schemeClr val="accent1"/>
+            </a:fillRef>
+            <a:effectRef idx="0">
+              <a:schemeClr val="accent1"/>
+            </a:effectRef>
+            <a:fontRef idx="minor">
+              <a:schemeClr val="tx1"/>
+            </a:fontRef>
+          </p:style>
+        </p:cxnSp>
+        <p:cxnSp>
+          <p:nvCxnSpPr>
+            <p:cNvPr id="15" name="Straight Connector 14"/>
+            <p:cNvCxnSpPr/>
+            <p:nvPr/>
+          </p:nvCxnSpPr>
+          <p:spPr>
+            <a:xfrm>
+              <a:off x="4528609" y="1861883"/>
+              <a:ext cx="890961" cy="0"/>
+            </a:xfrm>
+            <a:prstGeom prst="line">
+              <a:avLst/>
+            </a:prstGeom>
+            <a:ln w="12700">
+              <a:solidFill>
+                <a:schemeClr val="tx1"/>
+              </a:solidFill>
+              <a:tailEnd type="triangle"/>
+            </a:ln>
+          </p:spPr>
+          <p:style>
+            <a:lnRef idx="1">
+              <a:schemeClr val="accent1"/>
+            </a:lnRef>
+            <a:fillRef idx="0">
+              <a:schemeClr val="accent1"/>
+            </a:fillRef>
+            <a:effectRef idx="0">
+              <a:schemeClr val="accent1"/>
+            </a:effectRef>
+            <a:fontRef idx="minor">
+              <a:schemeClr val="tx1"/>
+            </a:fontRef>
+          </p:style>
+        </p:cxnSp>
+        <p:sp>
+          <p:nvSpPr>
+            <p:cNvPr id="5" name="Rectangle 4"/>
+            <p:cNvSpPr/>
+            <p:nvPr/>
+          </p:nvSpPr>
+          <p:spPr>
+            <a:xfrm>
+              <a:off x="2630471" y="1602557"/>
+              <a:ext cx="2143475" cy="518653"/>
+            </a:xfrm>
+            <a:prstGeom prst="rect">
+              <a:avLst/>
+            </a:prstGeom>
+            <a:solidFill>
+              <a:schemeClr val="bg1"/>
+            </a:solidFill>
+            <a:ln>
+              <a:solidFill>
+                <a:schemeClr val="tx1"/>
+              </a:solidFill>
+            </a:ln>
+          </p:spPr>
+          <p:style>
+            <a:lnRef idx="2">
+              <a:schemeClr val="accent1">
+                <a:shade val="50000"/>
+              </a:schemeClr>
+            </a:lnRef>
+            <a:fillRef idx="1">
+              <a:schemeClr val="accent1"/>
+            </a:fillRef>
+            <a:effectRef idx="0">
+              <a:schemeClr val="accent1"/>
+            </a:effectRef>
+            <a:fontRef idx="minor">
+              <a:schemeClr val="lt1"/>
+            </a:fontRef>
+          </p:style>
+          <p:txBody>
+            <a:bodyPr rtlCol="0" anchor="ctr"/>
+            <a:lstStyle/>
+            <a:p>
+              <a:pPr algn="ctr"/>
+              <a:r>
+                <a:rPr lang="en-US" sz="2400" smtClean="0">
+                  <a:solidFill>
+                    <a:sysClr val="windowText" lastClr="000000"/>
+                  </a:solidFill>
+                  <a:latin typeface="Baskerville" charset="0"/>
+                  <a:ea typeface="Baskerville" charset="0"/>
+                  <a:cs typeface="Baskerville" charset="0"/>
+                </a:rPr>
+                <a:t>Odometry</a:t>
+              </a:r>
+              <a:endParaRPr lang="en-US" sz="2400" dirty="0">
+                <a:solidFill>
+                  <a:sysClr val="windowText" lastClr="000000"/>
+                </a:solidFill>
+                <a:latin typeface="Baskerville" charset="0"/>
+                <a:ea typeface="Baskerville" charset="0"/>
+                <a:cs typeface="Baskerville" charset="0"/>
+              </a:endParaRPr>
+            </a:p>
+          </p:txBody>
+        </p:sp>
+        <p:sp>
+          <p:nvSpPr>
+            <p:cNvPr id="4" name="Rectangle 3"/>
+            <p:cNvSpPr/>
+            <p:nvPr/>
+          </p:nvSpPr>
+          <p:spPr>
+            <a:xfrm>
+              <a:off x="5419570" y="1602557"/>
+              <a:ext cx="3073173" cy="3193844"/>
+            </a:xfrm>
+            <a:prstGeom prst="rect">
+              <a:avLst/>
+            </a:prstGeom>
+            <a:ln>
+              <a:noFill/>
+            </a:ln>
+          </p:spPr>
+          <p:style>
+            <a:lnRef idx="3">
+              <a:schemeClr val="lt1"/>
+            </a:lnRef>
+            <a:fillRef idx="1">
+              <a:schemeClr val="accent3"/>
+            </a:fillRef>
+            <a:effectRef idx="1">
+              <a:schemeClr val="accent3"/>
+            </a:effectRef>
+            <a:fontRef idx="minor">
+              <a:schemeClr val="lt1"/>
+            </a:fontRef>
+          </p:style>
+          <p:txBody>
+            <a:bodyPr rtlCol="0" anchor="ctr"/>
+            <a:lstStyle/>
+            <a:p>
+              <a:pPr algn="ctr"/>
+              <a:r>
+                <a:rPr lang="en-US" sz="3200" dirty="0" err="1" smtClean="0">
+                  <a:latin typeface="Baskerville" charset="0"/>
+                  <a:ea typeface="Baskerville" charset="0"/>
+                  <a:cs typeface="Baskerville" charset="0"/>
+                </a:rPr>
+                <a:t>move_base</a:t>
+              </a:r>
+              <a:endParaRPr lang="en-US" sz="3200" dirty="0">
+                <a:latin typeface="Baskerville" charset="0"/>
+                <a:ea typeface="Baskerville" charset="0"/>
+                <a:cs typeface="Baskerville" charset="0"/>
+              </a:endParaRPr>
+            </a:p>
+          </p:txBody>
+        </p:sp>
+        <p:sp>
+          <p:nvSpPr>
+            <p:cNvPr id="6" name="Rectangle 5"/>
+            <p:cNvSpPr/>
+            <p:nvPr/>
+          </p:nvSpPr>
+          <p:spPr>
+            <a:xfrm>
+              <a:off x="2630471" y="2272931"/>
+              <a:ext cx="2143475" cy="518653"/>
+            </a:xfrm>
+            <a:prstGeom prst="rect">
+              <a:avLst/>
+            </a:prstGeom>
+            <a:solidFill>
+              <a:schemeClr val="bg1"/>
+            </a:solidFill>
+            <a:ln>
+              <a:solidFill>
+                <a:schemeClr val="tx1"/>
+              </a:solidFill>
+            </a:ln>
+          </p:spPr>
+          <p:style>
+            <a:lnRef idx="2">
+              <a:schemeClr val="accent1">
+                <a:shade val="50000"/>
+              </a:schemeClr>
+            </a:lnRef>
+            <a:fillRef idx="1">
+              <a:schemeClr val="accent1"/>
+            </a:fillRef>
+            <a:effectRef idx="0">
+              <a:schemeClr val="accent1"/>
+            </a:effectRef>
+            <a:fontRef idx="minor">
+              <a:schemeClr val="lt1"/>
+            </a:fontRef>
+          </p:style>
+          <p:txBody>
+            <a:bodyPr rtlCol="0" anchor="ctr"/>
+            <a:lstStyle/>
+            <a:p>
+              <a:pPr algn="ctr"/>
+              <a:r>
+                <a:rPr lang="en-US" sz="2400" dirty="0" err="1" smtClean="0">
+                  <a:solidFill>
+                    <a:sysClr val="windowText" lastClr="000000"/>
+                  </a:solidFill>
+                  <a:latin typeface="Baskerville" charset="0"/>
+                  <a:ea typeface="Baskerville" charset="0"/>
+                  <a:cs typeface="Baskerville" charset="0"/>
+                </a:rPr>
+                <a:t>Localisation</a:t>
+              </a:r>
+              <a:endParaRPr lang="en-US" sz="2400" dirty="0">
+                <a:solidFill>
+                  <a:sysClr val="windowText" lastClr="000000"/>
+                </a:solidFill>
+                <a:latin typeface="Baskerville" charset="0"/>
+                <a:ea typeface="Baskerville" charset="0"/>
+                <a:cs typeface="Baskerville" charset="0"/>
+              </a:endParaRPr>
+            </a:p>
+          </p:txBody>
+        </p:sp>
+        <p:sp>
+          <p:nvSpPr>
+            <p:cNvPr id="7" name="Rectangle 6"/>
+            <p:cNvSpPr/>
+            <p:nvPr/>
+          </p:nvSpPr>
+          <p:spPr>
+            <a:xfrm>
+              <a:off x="2630471" y="2943305"/>
+              <a:ext cx="2143475" cy="518653"/>
+            </a:xfrm>
+            <a:prstGeom prst="rect">
+              <a:avLst/>
+            </a:prstGeom>
+            <a:solidFill>
+              <a:schemeClr val="bg1"/>
+            </a:solidFill>
+            <a:ln>
+              <a:solidFill>
+                <a:schemeClr val="tx1"/>
+              </a:solidFill>
+            </a:ln>
+          </p:spPr>
+          <p:style>
+            <a:lnRef idx="2">
+              <a:schemeClr val="accent1">
+                <a:shade val="50000"/>
+              </a:schemeClr>
+            </a:lnRef>
+            <a:fillRef idx="1">
+              <a:schemeClr val="accent1"/>
+            </a:fillRef>
+            <a:effectRef idx="0">
+              <a:schemeClr val="accent1"/>
+            </a:effectRef>
+            <a:fontRef idx="minor">
+              <a:schemeClr val="lt1"/>
+            </a:fontRef>
+          </p:style>
+          <p:txBody>
+            <a:bodyPr lIns="36000" rIns="36000" rtlCol="0" anchor="ctr"/>
+            <a:lstStyle/>
+            <a:p>
+              <a:pPr algn="ctr"/>
+              <a:r>
+                <a:rPr lang="en-US" sz="2400" dirty="0" smtClean="0">
+                  <a:solidFill>
+                    <a:sysClr val="windowText" lastClr="000000"/>
+                  </a:solidFill>
+                  <a:latin typeface="Baskerville" charset="0"/>
+                  <a:ea typeface="Baskerville" charset="0"/>
+                  <a:cs typeface="Baskerville" charset="0"/>
+                </a:rPr>
+                <a:t>Transformations</a:t>
+              </a:r>
+              <a:endParaRPr lang="en-US" sz="2400" dirty="0">
+                <a:solidFill>
+                  <a:sysClr val="windowText" lastClr="000000"/>
+                </a:solidFill>
+                <a:latin typeface="Baskerville" charset="0"/>
+                <a:ea typeface="Baskerville" charset="0"/>
+                <a:cs typeface="Baskerville" charset="0"/>
+              </a:endParaRPr>
+            </a:p>
+          </p:txBody>
+        </p:sp>
+        <p:sp>
+          <p:nvSpPr>
+            <p:cNvPr id="8" name="Rectangle 7"/>
+            <p:cNvSpPr/>
+            <p:nvPr/>
+          </p:nvSpPr>
+          <p:spPr>
+            <a:xfrm>
+              <a:off x="2630471" y="3613679"/>
+              <a:ext cx="2143475" cy="518653"/>
+            </a:xfrm>
+            <a:prstGeom prst="rect">
+              <a:avLst/>
+            </a:prstGeom>
+            <a:solidFill>
+              <a:schemeClr val="bg1"/>
+            </a:solidFill>
+            <a:ln>
+              <a:solidFill>
+                <a:schemeClr val="tx1"/>
+              </a:solidFill>
+            </a:ln>
+          </p:spPr>
+          <p:style>
+            <a:lnRef idx="2">
+              <a:schemeClr val="accent1">
+                <a:shade val="50000"/>
+              </a:schemeClr>
+            </a:lnRef>
+            <a:fillRef idx="1">
+              <a:schemeClr val="accent1"/>
+            </a:fillRef>
+            <a:effectRef idx="0">
+              <a:schemeClr val="accent1"/>
+            </a:effectRef>
+            <a:fontRef idx="minor">
+              <a:schemeClr val="lt1"/>
+            </a:fontRef>
+          </p:style>
+          <p:txBody>
+            <a:bodyPr rtlCol="0" anchor="ctr"/>
+            <a:lstStyle/>
+            <a:p>
+              <a:pPr algn="ctr"/>
+              <a:r>
+                <a:rPr lang="en-US" sz="2400" dirty="0" smtClean="0">
+                  <a:solidFill>
+                    <a:sysClr val="windowText" lastClr="000000"/>
+                  </a:solidFill>
+                  <a:latin typeface="Baskerville" charset="0"/>
+                  <a:ea typeface="Baskerville" charset="0"/>
+                  <a:cs typeface="Baskerville" charset="0"/>
+                </a:rPr>
+                <a:t>Sensor data</a:t>
+              </a:r>
+              <a:endParaRPr lang="en-US" sz="2400" dirty="0">
+                <a:solidFill>
+                  <a:sysClr val="windowText" lastClr="000000"/>
+                </a:solidFill>
+                <a:latin typeface="Baskerville" charset="0"/>
+                <a:ea typeface="Baskerville" charset="0"/>
+                <a:cs typeface="Baskerville" charset="0"/>
+              </a:endParaRPr>
+            </a:p>
+          </p:txBody>
+        </p:sp>
+        <p:sp>
+          <p:nvSpPr>
+            <p:cNvPr id="19" name="Rectangle 18"/>
+            <p:cNvSpPr/>
+            <p:nvPr/>
+          </p:nvSpPr>
+          <p:spPr>
+            <a:xfrm>
+              <a:off x="9138367" y="2812104"/>
+              <a:ext cx="2142000" cy="774749"/>
+            </a:xfrm>
+            <a:prstGeom prst="rect">
+              <a:avLst/>
+            </a:prstGeom>
+            <a:solidFill>
+              <a:schemeClr val="bg1"/>
+            </a:solidFill>
+            <a:ln>
+              <a:solidFill>
+                <a:schemeClr val="tx1"/>
+              </a:solidFill>
+            </a:ln>
+          </p:spPr>
+          <p:style>
+            <a:lnRef idx="2">
+              <a:schemeClr val="accent1">
+                <a:shade val="50000"/>
+              </a:schemeClr>
+            </a:lnRef>
+            <a:fillRef idx="1">
+              <a:schemeClr val="accent1"/>
+            </a:fillRef>
+            <a:effectRef idx="0">
+              <a:schemeClr val="accent1"/>
+            </a:effectRef>
+            <a:fontRef idx="minor">
+              <a:schemeClr val="lt1"/>
+            </a:fontRef>
+          </p:style>
+          <p:txBody>
+            <a:bodyPr rtlCol="0" anchor="ctr"/>
+            <a:lstStyle/>
+            <a:p>
+              <a:pPr algn="ctr"/>
+              <a:r>
+                <a:rPr lang="en-US" sz="2400" dirty="0" smtClean="0">
+                  <a:solidFill>
+                    <a:sysClr val="windowText" lastClr="000000"/>
+                  </a:solidFill>
+                  <a:latin typeface="Baskerville" charset="0"/>
+                  <a:ea typeface="Baskerville" charset="0"/>
+                  <a:cs typeface="Baskerville" charset="0"/>
+                </a:rPr>
+                <a:t>Velocity</a:t>
+              </a:r>
+              <a:br>
+                <a:rPr lang="en-US" sz="2400" dirty="0" smtClean="0">
+                  <a:solidFill>
+                    <a:sysClr val="windowText" lastClr="000000"/>
+                  </a:solidFill>
+                  <a:latin typeface="Baskerville" charset="0"/>
+                  <a:ea typeface="Baskerville" charset="0"/>
+                  <a:cs typeface="Baskerville" charset="0"/>
+                </a:rPr>
+              </a:br>
+              <a:r>
+                <a:rPr lang="en-US" sz="2400" dirty="0" smtClean="0">
+                  <a:solidFill>
+                    <a:sysClr val="windowText" lastClr="000000"/>
+                  </a:solidFill>
+                  <a:latin typeface="Baskerville" charset="0"/>
+                  <a:ea typeface="Baskerville" charset="0"/>
+                  <a:cs typeface="Baskerville" charset="0"/>
+                </a:rPr>
+                <a:t>commands</a:t>
+              </a:r>
+              <a:endParaRPr lang="en-US" sz="2400" dirty="0">
+                <a:solidFill>
+                  <a:sysClr val="windowText" lastClr="000000"/>
+                </a:solidFill>
+                <a:latin typeface="Baskerville" charset="0"/>
+                <a:ea typeface="Baskerville" charset="0"/>
+                <a:cs typeface="Baskerville" charset="0"/>
+              </a:endParaRPr>
+            </a:p>
+          </p:txBody>
+        </p:sp>
+        <p:sp>
+          <p:nvSpPr>
+            <p:cNvPr id="22" name="Rectangle 21"/>
+            <p:cNvSpPr/>
+            <p:nvPr/>
+          </p:nvSpPr>
+          <p:spPr>
+            <a:xfrm>
+              <a:off x="2630472" y="4277748"/>
+              <a:ext cx="2143474" cy="518653"/>
+            </a:xfrm>
+            <a:prstGeom prst="rect">
+              <a:avLst/>
+            </a:prstGeom>
+            <a:solidFill>
+              <a:schemeClr val="bg1"/>
+            </a:solidFill>
+            <a:ln>
+              <a:solidFill>
+                <a:schemeClr val="tx1"/>
+              </a:solidFill>
+            </a:ln>
+          </p:spPr>
+          <p:style>
+            <a:lnRef idx="2">
+              <a:schemeClr val="accent1">
+                <a:shade val="50000"/>
+              </a:schemeClr>
+            </a:lnRef>
+            <a:fillRef idx="1">
+              <a:schemeClr val="accent1"/>
+            </a:fillRef>
+            <a:effectRef idx="0">
+              <a:schemeClr val="accent1"/>
+            </a:effectRef>
+            <a:fontRef idx="minor">
+              <a:schemeClr val="lt1"/>
+            </a:fontRef>
+          </p:style>
+          <p:txBody>
+            <a:bodyPr rtlCol="0" anchor="ctr"/>
+            <a:lstStyle/>
+            <a:p>
+              <a:pPr algn="ctr"/>
+              <a:r>
+                <a:rPr lang="en-US" sz="2400" dirty="0" smtClean="0">
+                  <a:solidFill>
+                    <a:sysClr val="windowText" lastClr="000000"/>
+                  </a:solidFill>
+                  <a:latin typeface="Baskerville" charset="0"/>
+                  <a:ea typeface="Baskerville" charset="0"/>
+                  <a:cs typeface="Baskerville" charset="0"/>
+                </a:rPr>
+                <a:t>Map</a:t>
+              </a:r>
+              <a:endParaRPr lang="en-US" sz="2400" dirty="0">
+                <a:solidFill>
+                  <a:sysClr val="windowText" lastClr="000000"/>
+                </a:solidFill>
+                <a:latin typeface="Baskerville" charset="0"/>
+                <a:ea typeface="Baskerville" charset="0"/>
+                <a:cs typeface="Baskerville" charset="0"/>
+              </a:endParaRPr>
+            </a:p>
+          </p:txBody>
+        </p:sp>
+      </p:grpSp>
+    </p:spTree>
+    <p:extLst>
+      <p:ext uri="{BB962C8B-B14F-4D97-AF65-F5344CB8AC3E}">
+        <p14:creationId xmlns:p14="http://schemas.microsoft.com/office/powerpoint/2010/main" val="831674277"/>
+      </p:ext>
+    </p:extLst>
+  </p:cSld>
+  <p:clrMapOvr>
+    <a:masterClrMapping/>
+  </p:clrMapOvr>
+</p:sld>
+</file>
+
+<file path=ppt/slides/slide2.xml><?xml version="1.0" encoding="utf-8"?>
+<p:sld xmlns:a="http://schemas.openxmlformats.org/drawingml/2006/main" xmlns:r="http://schemas.openxmlformats.org/officeDocument/2006/relationships" xmlns:p="http://schemas.openxmlformats.org/presentationml/2006/main">
+  <p:cSld>
+    <p:spTree>
+      <p:nvGrpSpPr>
+        <p:cNvPr id="1" name=""/>
+        <p:cNvGrpSpPr/>
+        <p:nvPr/>
+      </p:nvGrpSpPr>
+      <p:grpSpPr>
+        <a:xfrm>
+          <a:off x="0" y="0"/>
+          <a:ext cx="0" cy="0"/>
+          <a:chOff x="0" y="0"/>
+          <a:chExt cx="0" cy="0"/>
+        </a:xfrm>
+      </p:grpSpPr>
       <p:cxnSp>
         <p:nvCxnSpPr>
           <p:cNvPr id="23" name="Straight Connector 22"/>
@@ -2978,7 +3713,7 @@
         <p:spPr>
           <a:xfrm>
             <a:off x="4574687" y="2532257"/>
-            <a:ext cx="844883" cy="0"/>
+            <a:ext cx="1895644" cy="657358"/>
           </a:xfrm>
           <a:prstGeom prst="line">
             <a:avLst/>
@@ -2987,7 +3722,7 @@
             <a:solidFill>
               <a:schemeClr val="tx1"/>
             </a:solidFill>
-            <a:tailEnd type="triangle"/>
+            <a:tailEnd type="oval"/>
           </a:ln>
         </p:spPr>
         <p:style>
@@ -3009,14 +3744,15 @@
         <p:nvCxnSpPr>
           <p:cNvPr id="20" name="Straight Connector 19"/>
           <p:cNvCxnSpPr>
+            <a:stCxn id="27" idx="3"/>
             <a:endCxn id="19" idx="1"/>
           </p:cNvCxnSpPr>
           <p:nvPr/>
         </p:nvCxnSpPr>
         <p:spPr>
           <a:xfrm>
-            <a:off x="8249558" y="3199478"/>
-            <a:ext cx="888809" cy="1"/>
+            <a:off x="9027484" y="4277748"/>
+            <a:ext cx="905540" cy="0"/>
           </a:xfrm>
           <a:prstGeom prst="line">
             <a:avLst/>
@@ -3046,13 +3782,15 @@
       <p:cxnSp>
         <p:nvCxnSpPr>
           <p:cNvPr id="18" name="Straight Connector 17"/>
-          <p:cNvCxnSpPr/>
+          <p:cNvCxnSpPr>
+            <a:endCxn id="25" idx="1"/>
+          </p:cNvCxnSpPr>
           <p:nvPr/>
         </p:nvCxnSpPr>
         <p:spPr>
-          <a:xfrm>
-            <a:off x="4528609" y="4541018"/>
-            <a:ext cx="890961" cy="0"/>
+          <a:xfrm flipV="1">
+            <a:off x="4528609" y="4277748"/>
+            <a:ext cx="1175978" cy="263270"/>
           </a:xfrm>
           <a:prstGeom prst="line">
             <a:avLst/>
@@ -3086,9 +3824,9 @@
           <p:nvPr/>
         </p:nvCxnSpPr>
         <p:spPr>
-          <a:xfrm>
-            <a:off x="4528609" y="3873005"/>
-            <a:ext cx="890961" cy="0"/>
+          <a:xfrm flipV="1">
+            <a:off x="4528609" y="3199479"/>
+            <a:ext cx="1941722" cy="673526"/>
           </a:xfrm>
           <a:prstGeom prst="line">
             <a:avLst/>
@@ -3097,7 +3835,7 @@
             <a:solidFill>
               <a:schemeClr val="tx1"/>
             </a:solidFill>
-            <a:tailEnd type="triangle"/>
+            <a:tailEnd type="oval"/>
           </a:ln>
         </p:spPr>
         <p:style>
@@ -3124,7 +3862,7 @@
         <p:spPr>
           <a:xfrm>
             <a:off x="4528609" y="3202631"/>
-            <a:ext cx="890961" cy="0"/>
+            <a:ext cx="1941722" cy="0"/>
           </a:xfrm>
           <a:prstGeom prst="line">
             <a:avLst/>
@@ -3133,7 +3871,7 @@
             <a:solidFill>
               <a:schemeClr val="tx1"/>
             </a:solidFill>
-            <a:tailEnd type="triangle"/>
+            <a:tailEnd type="oval"/>
           </a:ln>
         </p:spPr>
         <p:style>
@@ -3154,13 +3892,15 @@
       <p:cxnSp>
         <p:nvCxnSpPr>
           <p:cNvPr id="15" name="Straight Connector 14"/>
-          <p:cNvCxnSpPr/>
+          <p:cNvCxnSpPr>
+            <a:endCxn id="24" idx="1"/>
+          </p:cNvCxnSpPr>
           <p:nvPr/>
         </p:nvCxnSpPr>
         <p:spPr>
           <a:xfrm>
             <a:off x="4528609" y="1861883"/>
-            <a:ext cx="890961" cy="0"/>
+            <a:ext cx="1175977" cy="239599"/>
           </a:xfrm>
           <a:prstGeom prst="line">
             <a:avLst/>
@@ -3232,7 +3972,7 @@
           <a:p>
             <a:pPr algn="ctr"/>
             <a:r>
-              <a:rPr lang="en-US" sz="2400" smtClean="0">
+              <a:rPr lang="en-US" sz="2400" dirty="0" smtClean="0">
                 <a:solidFill>
                   <a:sysClr val="windowText" lastClr="000000"/>
                 </a:solidFill>
@@ -3240,7 +3980,7 @@
                 <a:ea typeface="Baskerville" charset="0"/>
                 <a:cs typeface="Baskerville" charset="0"/>
               </a:rPr>
-              <a:t>Odometry</a:t>
+              <a:t>Map</a:t>
             </a:r>
             <a:endParaRPr lang="en-US" sz="2400" dirty="0">
               <a:solidFill>
@@ -3262,13 +4002,18 @@
         <p:spPr>
           <a:xfrm>
             <a:off x="5419570" y="1602557"/>
-            <a:ext cx="3073173" cy="3193844"/>
+            <a:ext cx="3867830" cy="3193844"/>
           </a:xfrm>
           <a:prstGeom prst="rect">
             <a:avLst/>
           </a:prstGeom>
-          <a:ln>
-            <a:noFill/>
+          <a:noFill/>
+          <a:ln w="57150">
+            <a:solidFill>
+              <a:schemeClr val="bg1">
+                <a:lumMod val="65000"/>
+              </a:schemeClr>
+            </a:solidFill>
           </a:ln>
         </p:spPr>
         <p:style>
@@ -3290,14 +4035,6 @@
           <a:lstStyle/>
           <a:p>
             <a:pPr algn="ctr"/>
-            <a:r>
-              <a:rPr lang="en-US" sz="3200" dirty="0" err="1" smtClean="0">
-                <a:latin typeface="Baskerville" charset="0"/>
-                <a:ea typeface="Baskerville" charset="0"/>
-                <a:cs typeface="Baskerville" charset="0"/>
-              </a:rPr>
-              <a:t>move_base</a:t>
-            </a:r>
             <a:endParaRPr lang="en-US" sz="3200" dirty="0">
               <a:latin typeface="Baskerville" charset="0"/>
               <a:ea typeface="Baskerville" charset="0"/>
@@ -3425,7 +4162,7 @@
                 <a:ea typeface="Baskerville" charset="0"/>
                 <a:cs typeface="Baskerville" charset="0"/>
               </a:rPr>
-              <a:t>Transformations</a:t>
+              <a:t>Sensor data</a:t>
             </a:r>
             <a:endParaRPr lang="en-US" sz="2400" dirty="0">
               <a:solidFill>
@@ -3478,12 +4215,12 @@
           </a:fontRef>
         </p:style>
         <p:txBody>
-          <a:bodyPr rtlCol="0" anchor="ctr"/>
+          <a:bodyPr lIns="36000" rIns="36000" rtlCol="0" anchor="ctr"/>
           <a:lstStyle/>
           <a:p>
             <a:pPr algn="ctr"/>
             <a:r>
-              <a:rPr lang="en-US" sz="2400" dirty="0" smtClean="0">
+              <a:rPr lang="en-US" sz="2400" smtClean="0">
                 <a:solidFill>
                   <a:sysClr val="windowText" lastClr="000000"/>
                 </a:solidFill>
@@ -3491,7 +4228,7 @@
                 <a:ea typeface="Baskerville" charset="0"/>
                 <a:cs typeface="Baskerville" charset="0"/>
               </a:rPr>
-              <a:t>Sensor data</a:t>
+              <a:t>Transformations</a:t>
             </a:r>
             <a:endParaRPr lang="en-US" sz="2400" dirty="0">
               <a:solidFill>
@@ -3512,7 +4249,7 @@
         </p:nvSpPr>
         <p:spPr>
           <a:xfrm>
-            <a:off x="9138367" y="2812104"/>
+            <a:off x="9933024" y="3890373"/>
             <a:ext cx="2142000" cy="774749"/>
           </a:xfrm>
           <a:prstGeom prst="rect">
@@ -3636,7 +4373,7 @@
           <a:p>
             <a:pPr algn="ctr"/>
             <a:r>
-              <a:rPr lang="en-US" sz="2400" dirty="0" smtClean="0">
+              <a:rPr lang="en-US" sz="2400" dirty="0" err="1" smtClean="0">
                 <a:solidFill>
                   <a:sysClr val="windowText" lastClr="000000"/>
                 </a:solidFill>
@@ -3644,7 +4381,7 @@
                 <a:ea typeface="Baskerville" charset="0"/>
                 <a:cs typeface="Baskerville" charset="0"/>
               </a:rPr>
-              <a:t>Map</a:t>
+              <a:t>Odometry</a:t>
             </a:r>
             <a:endParaRPr lang="en-US" sz="2400" dirty="0">
               <a:solidFill>
@@ -3657,10 +4394,1528 @@
           </a:p>
         </p:txBody>
       </p:sp>
+      <p:sp>
+        <p:nvSpPr>
+          <p:cNvPr id="21" name="Rectangle 20"/>
+          <p:cNvSpPr/>
+          <p:nvPr/>
+        </p:nvSpPr>
+        <p:spPr>
+          <a:xfrm>
+            <a:off x="5419570" y="1320878"/>
+            <a:ext cx="1348033" cy="226243"/>
+          </a:xfrm>
+          <a:prstGeom prst="rect">
+            <a:avLst/>
+          </a:prstGeom>
+          <a:solidFill>
+            <a:schemeClr val="bg1">
+              <a:lumMod val="65000"/>
+            </a:schemeClr>
+          </a:solidFill>
+          <a:ln w="57150">
+            <a:solidFill>
+              <a:schemeClr val="bg1">
+                <a:lumMod val="65000"/>
+              </a:schemeClr>
+            </a:solidFill>
+          </a:ln>
+        </p:spPr>
+        <p:style>
+          <a:lnRef idx="2">
+            <a:schemeClr val="accent1">
+              <a:shade val="50000"/>
+            </a:schemeClr>
+          </a:lnRef>
+          <a:fillRef idx="1">
+            <a:schemeClr val="accent1"/>
+          </a:fillRef>
+          <a:effectRef idx="0">
+            <a:schemeClr val="accent1"/>
+          </a:effectRef>
+          <a:fontRef idx="minor">
+            <a:schemeClr val="lt1"/>
+          </a:fontRef>
+        </p:style>
+        <p:txBody>
+          <a:bodyPr rtlCol="0" anchor="ctr"/>
+          <a:lstStyle/>
+          <a:p>
+            <a:pPr algn="ctr"/>
+            <a:r>
+              <a:rPr lang="en-US" dirty="0" err="1" smtClean="0">
+                <a:latin typeface="Baskerville" charset="0"/>
+                <a:ea typeface="Baskerville" charset="0"/>
+                <a:cs typeface="Baskerville" charset="0"/>
+              </a:rPr>
+              <a:t>move_base</a:t>
+            </a:r>
+            <a:endParaRPr lang="en-US" dirty="0">
+              <a:latin typeface="Baskerville" charset="0"/>
+              <a:ea typeface="Baskerville" charset="0"/>
+              <a:cs typeface="Baskerville" charset="0"/>
+            </a:endParaRPr>
+          </a:p>
+        </p:txBody>
+      </p:sp>
+      <p:sp>
+        <p:nvSpPr>
+          <p:cNvPr id="24" name="Rectangle 23"/>
+          <p:cNvSpPr/>
+          <p:nvPr/>
+        </p:nvSpPr>
+        <p:spPr>
+          <a:xfrm>
+            <a:off x="5704586" y="1861771"/>
+            <a:ext cx="1531491" cy="479422"/>
+          </a:xfrm>
+          <a:prstGeom prst="rect">
+            <a:avLst/>
+          </a:prstGeom>
+          <a:noFill/>
+          <a:ln>
+            <a:solidFill>
+              <a:schemeClr val="tx1"/>
+            </a:solidFill>
+          </a:ln>
+        </p:spPr>
+        <p:style>
+          <a:lnRef idx="2">
+            <a:schemeClr val="accent1">
+              <a:shade val="50000"/>
+            </a:schemeClr>
+          </a:lnRef>
+          <a:fillRef idx="1">
+            <a:schemeClr val="accent1"/>
+          </a:fillRef>
+          <a:effectRef idx="0">
+            <a:schemeClr val="accent1"/>
+          </a:effectRef>
+          <a:fontRef idx="minor">
+            <a:schemeClr val="lt1"/>
+          </a:fontRef>
+        </p:style>
+        <p:txBody>
+          <a:bodyPr lIns="36000" rIns="36000" rtlCol="0" anchor="ctr"/>
+          <a:lstStyle/>
+          <a:p>
+            <a:pPr algn="ctr"/>
+            <a:r>
+              <a:rPr lang="en-US" sz="1600" dirty="0" smtClean="0">
+                <a:solidFill>
+                  <a:schemeClr val="tx1"/>
+                </a:solidFill>
+                <a:latin typeface="Baskerville" charset="0"/>
+                <a:ea typeface="Baskerville" charset="0"/>
+                <a:cs typeface="Baskerville" charset="0"/>
+              </a:rPr>
+              <a:t>Global </a:t>
+            </a:r>
+            <a:r>
+              <a:rPr lang="en-US" sz="1600" dirty="0" err="1" smtClean="0">
+                <a:solidFill>
+                  <a:schemeClr val="tx1"/>
+                </a:solidFill>
+                <a:latin typeface="Baskerville" charset="0"/>
+                <a:ea typeface="Baskerville" charset="0"/>
+                <a:cs typeface="Baskerville" charset="0"/>
+              </a:rPr>
+              <a:t>Costmap</a:t>
+            </a:r>
+            <a:endParaRPr lang="en-US" dirty="0">
+              <a:solidFill>
+                <a:schemeClr val="tx1"/>
+              </a:solidFill>
+              <a:latin typeface="Baskerville" charset="0"/>
+              <a:ea typeface="Baskerville" charset="0"/>
+              <a:cs typeface="Baskerville" charset="0"/>
+            </a:endParaRPr>
+          </a:p>
+        </p:txBody>
+      </p:sp>
+      <p:sp>
+        <p:nvSpPr>
+          <p:cNvPr id="25" name="Rectangle 24"/>
+          <p:cNvSpPr/>
+          <p:nvPr/>
+        </p:nvSpPr>
+        <p:spPr>
+          <a:xfrm>
+            <a:off x="5704587" y="4038037"/>
+            <a:ext cx="1531491" cy="479422"/>
+          </a:xfrm>
+          <a:prstGeom prst="rect">
+            <a:avLst/>
+          </a:prstGeom>
+          <a:noFill/>
+          <a:ln>
+            <a:solidFill>
+              <a:schemeClr val="tx1"/>
+            </a:solidFill>
+          </a:ln>
+        </p:spPr>
+        <p:style>
+          <a:lnRef idx="2">
+            <a:schemeClr val="accent1">
+              <a:shade val="50000"/>
+            </a:schemeClr>
+          </a:lnRef>
+          <a:fillRef idx="1">
+            <a:schemeClr val="accent1"/>
+          </a:fillRef>
+          <a:effectRef idx="0">
+            <a:schemeClr val="accent1"/>
+          </a:effectRef>
+          <a:fontRef idx="minor">
+            <a:schemeClr val="lt1"/>
+          </a:fontRef>
+        </p:style>
+        <p:txBody>
+          <a:bodyPr lIns="36000" rIns="36000" rtlCol="0" anchor="ctr"/>
+          <a:lstStyle/>
+          <a:p>
+            <a:pPr algn="ctr"/>
+            <a:r>
+              <a:rPr lang="en-US" sz="1600">
+                <a:solidFill>
+                  <a:schemeClr val="tx1"/>
+                </a:solidFill>
+                <a:latin typeface="Baskerville" charset="0"/>
+                <a:ea typeface="Baskerville" charset="0"/>
+                <a:cs typeface="Baskerville" charset="0"/>
+              </a:rPr>
+              <a:t>L</a:t>
+            </a:r>
+            <a:r>
+              <a:rPr lang="en-US" sz="1600" smtClean="0">
+                <a:solidFill>
+                  <a:schemeClr val="tx1"/>
+                </a:solidFill>
+                <a:latin typeface="Baskerville" charset="0"/>
+                <a:ea typeface="Baskerville" charset="0"/>
+                <a:cs typeface="Baskerville" charset="0"/>
+              </a:rPr>
+              <a:t>ocal </a:t>
+            </a:r>
+            <a:r>
+              <a:rPr lang="en-US" sz="1600" dirty="0" err="1" smtClean="0">
+                <a:solidFill>
+                  <a:schemeClr val="tx1"/>
+                </a:solidFill>
+                <a:latin typeface="Baskerville" charset="0"/>
+                <a:ea typeface="Baskerville" charset="0"/>
+                <a:cs typeface="Baskerville" charset="0"/>
+              </a:rPr>
+              <a:t>Costmap</a:t>
+            </a:r>
+            <a:endParaRPr lang="en-US" sz="1600" dirty="0">
+              <a:solidFill>
+                <a:schemeClr val="tx1"/>
+              </a:solidFill>
+              <a:latin typeface="Baskerville" charset="0"/>
+              <a:ea typeface="Baskerville" charset="0"/>
+              <a:cs typeface="Baskerville" charset="0"/>
+            </a:endParaRPr>
+          </a:p>
+        </p:txBody>
+      </p:sp>
+      <p:sp>
+        <p:nvSpPr>
+          <p:cNvPr id="26" name="Rectangle 25"/>
+          <p:cNvSpPr/>
+          <p:nvPr/>
+        </p:nvSpPr>
+        <p:spPr>
+          <a:xfrm>
+            <a:off x="7495992" y="1861771"/>
+            <a:ext cx="1531491" cy="479422"/>
+          </a:xfrm>
+          <a:prstGeom prst="rect">
+            <a:avLst/>
+          </a:prstGeom>
+          <a:noFill/>
+          <a:ln>
+            <a:solidFill>
+              <a:schemeClr val="tx1"/>
+            </a:solidFill>
+          </a:ln>
+        </p:spPr>
+        <p:style>
+          <a:lnRef idx="2">
+            <a:schemeClr val="accent1">
+              <a:shade val="50000"/>
+            </a:schemeClr>
+          </a:lnRef>
+          <a:fillRef idx="1">
+            <a:schemeClr val="accent1"/>
+          </a:fillRef>
+          <a:effectRef idx="0">
+            <a:schemeClr val="accent1"/>
+          </a:effectRef>
+          <a:fontRef idx="minor">
+            <a:schemeClr val="lt1"/>
+          </a:fontRef>
+        </p:style>
+        <p:txBody>
+          <a:bodyPr lIns="36000" rIns="36000" rtlCol="0" anchor="ctr"/>
+          <a:lstStyle/>
+          <a:p>
+            <a:pPr algn="ctr"/>
+            <a:r>
+              <a:rPr lang="en-US" sz="1600" dirty="0">
+                <a:solidFill>
+                  <a:schemeClr val="tx1"/>
+                </a:solidFill>
+                <a:latin typeface="Baskerville" charset="0"/>
+                <a:ea typeface="Baskerville" charset="0"/>
+                <a:cs typeface="Baskerville" charset="0"/>
+              </a:rPr>
+              <a:t>G</a:t>
+            </a:r>
+            <a:r>
+              <a:rPr lang="en-US" sz="1600" dirty="0" smtClean="0">
+                <a:solidFill>
+                  <a:schemeClr val="tx1"/>
+                </a:solidFill>
+                <a:latin typeface="Baskerville" charset="0"/>
+                <a:ea typeface="Baskerville" charset="0"/>
+                <a:cs typeface="Baskerville" charset="0"/>
+              </a:rPr>
+              <a:t>lobal Planner</a:t>
+            </a:r>
+            <a:endParaRPr lang="en-US" dirty="0">
+              <a:solidFill>
+                <a:schemeClr val="tx1"/>
+              </a:solidFill>
+              <a:latin typeface="Baskerville" charset="0"/>
+              <a:ea typeface="Baskerville" charset="0"/>
+              <a:cs typeface="Baskerville" charset="0"/>
+            </a:endParaRPr>
+          </a:p>
+        </p:txBody>
+      </p:sp>
+      <p:sp>
+        <p:nvSpPr>
+          <p:cNvPr id="27" name="Rectangle 26"/>
+          <p:cNvSpPr/>
+          <p:nvPr/>
+        </p:nvSpPr>
+        <p:spPr>
+          <a:xfrm>
+            <a:off x="7495993" y="4038037"/>
+            <a:ext cx="1531491" cy="479422"/>
+          </a:xfrm>
+          <a:prstGeom prst="rect">
+            <a:avLst/>
+          </a:prstGeom>
+          <a:noFill/>
+          <a:ln>
+            <a:solidFill>
+              <a:schemeClr val="tx1"/>
+            </a:solidFill>
+          </a:ln>
+        </p:spPr>
+        <p:style>
+          <a:lnRef idx="2">
+            <a:schemeClr val="accent1">
+              <a:shade val="50000"/>
+            </a:schemeClr>
+          </a:lnRef>
+          <a:fillRef idx="1">
+            <a:schemeClr val="accent1"/>
+          </a:fillRef>
+          <a:effectRef idx="0">
+            <a:schemeClr val="accent1"/>
+          </a:effectRef>
+          <a:fontRef idx="minor">
+            <a:schemeClr val="lt1"/>
+          </a:fontRef>
+        </p:style>
+        <p:txBody>
+          <a:bodyPr lIns="36000" rIns="36000" rtlCol="0" anchor="ctr"/>
+          <a:lstStyle/>
+          <a:p>
+            <a:pPr algn="ctr"/>
+            <a:r>
+              <a:rPr lang="en-US" sz="1600" dirty="0" smtClean="0">
+                <a:solidFill>
+                  <a:schemeClr val="tx1"/>
+                </a:solidFill>
+                <a:latin typeface="Baskerville" charset="0"/>
+                <a:ea typeface="Baskerville" charset="0"/>
+                <a:cs typeface="Baskerville" charset="0"/>
+              </a:rPr>
+              <a:t>Local Planner</a:t>
+            </a:r>
+            <a:endParaRPr lang="en-US" dirty="0">
+              <a:solidFill>
+                <a:schemeClr val="tx1"/>
+              </a:solidFill>
+              <a:latin typeface="Baskerville" charset="0"/>
+              <a:ea typeface="Baskerville" charset="0"/>
+              <a:cs typeface="Baskerville" charset="0"/>
+            </a:endParaRPr>
+          </a:p>
+        </p:txBody>
+      </p:sp>
+      <p:sp>
+        <p:nvSpPr>
+          <p:cNvPr id="31" name="Rectangle 30"/>
+          <p:cNvSpPr/>
+          <p:nvPr/>
+        </p:nvSpPr>
+        <p:spPr>
+          <a:xfrm>
+            <a:off x="6741720" y="2865812"/>
+            <a:ext cx="1249975" cy="647606"/>
+          </a:xfrm>
+          <a:prstGeom prst="rect">
+            <a:avLst/>
+          </a:prstGeom>
+          <a:noFill/>
+          <a:ln>
+            <a:solidFill>
+              <a:schemeClr val="tx1"/>
+            </a:solidFill>
+          </a:ln>
+        </p:spPr>
+        <p:style>
+          <a:lnRef idx="2">
+            <a:schemeClr val="accent1">
+              <a:shade val="50000"/>
+            </a:schemeClr>
+          </a:lnRef>
+          <a:fillRef idx="1">
+            <a:schemeClr val="accent1"/>
+          </a:fillRef>
+          <a:effectRef idx="0">
+            <a:schemeClr val="accent1"/>
+          </a:effectRef>
+          <a:fontRef idx="minor">
+            <a:schemeClr val="lt1"/>
+          </a:fontRef>
+        </p:style>
+        <p:txBody>
+          <a:bodyPr lIns="36000" tIns="0" rIns="36000" rtlCol="0" anchor="ctr"/>
+          <a:lstStyle/>
+          <a:p>
+            <a:pPr algn="ctr"/>
+            <a:r>
+              <a:rPr lang="en-US" dirty="0">
+                <a:solidFill>
+                  <a:schemeClr val="tx1"/>
+                </a:solidFill>
+                <a:latin typeface="Baskerville" charset="0"/>
+                <a:ea typeface="Baskerville" charset="0"/>
+                <a:cs typeface="Baskerville" charset="0"/>
+              </a:rPr>
+              <a:t>R</a:t>
+            </a:r>
+            <a:r>
+              <a:rPr lang="en-US" dirty="0" smtClean="0">
+                <a:solidFill>
+                  <a:schemeClr val="tx1"/>
+                </a:solidFill>
+                <a:latin typeface="Baskerville" charset="0"/>
+                <a:ea typeface="Baskerville" charset="0"/>
+                <a:cs typeface="Baskerville" charset="0"/>
+              </a:rPr>
+              <a:t>ecovery</a:t>
+            </a:r>
+            <a:br>
+              <a:rPr lang="en-US" dirty="0" smtClean="0">
+                <a:solidFill>
+                  <a:schemeClr val="tx1"/>
+                </a:solidFill>
+                <a:latin typeface="Baskerville" charset="0"/>
+                <a:ea typeface="Baskerville" charset="0"/>
+                <a:cs typeface="Baskerville" charset="0"/>
+              </a:rPr>
+            </a:br>
+            <a:r>
+              <a:rPr lang="en-US" dirty="0" smtClean="0">
+                <a:solidFill>
+                  <a:schemeClr val="tx1"/>
+                </a:solidFill>
+                <a:latin typeface="Baskerville" charset="0"/>
+                <a:ea typeface="Baskerville" charset="0"/>
+                <a:cs typeface="Baskerville" charset="0"/>
+              </a:rPr>
+              <a:t>Behaviour</a:t>
+            </a:r>
+            <a:endParaRPr lang="en-US" sz="2000" dirty="0">
+              <a:solidFill>
+                <a:schemeClr val="tx1"/>
+              </a:solidFill>
+              <a:latin typeface="Baskerville" charset="0"/>
+              <a:ea typeface="Baskerville" charset="0"/>
+              <a:cs typeface="Baskerville" charset="0"/>
+            </a:endParaRPr>
+          </a:p>
+        </p:txBody>
+      </p:sp>
+      <p:cxnSp>
+        <p:nvCxnSpPr>
+          <p:cNvPr id="32" name="Straight Arrow Connector 31"/>
+          <p:cNvCxnSpPr>
+            <a:stCxn id="24" idx="2"/>
+            <a:endCxn id="31" idx="0"/>
+          </p:cNvCxnSpPr>
+          <p:nvPr/>
+        </p:nvCxnSpPr>
+        <p:spPr>
+          <a:xfrm>
+            <a:off x="6470332" y="2341193"/>
+            <a:ext cx="896376" cy="524619"/>
+          </a:xfrm>
+          <a:prstGeom prst="straightConnector1">
+            <a:avLst/>
+          </a:prstGeom>
+          <a:ln>
+            <a:solidFill>
+              <a:schemeClr val="tx1"/>
+            </a:solidFill>
+            <a:tailEnd type="triangle"/>
+          </a:ln>
+        </p:spPr>
+        <p:style>
+          <a:lnRef idx="1">
+            <a:schemeClr val="accent1"/>
+          </a:lnRef>
+          <a:fillRef idx="0">
+            <a:schemeClr val="accent1"/>
+          </a:fillRef>
+          <a:effectRef idx="0">
+            <a:schemeClr val="accent1"/>
+          </a:effectRef>
+          <a:fontRef idx="minor">
+            <a:schemeClr val="tx1"/>
+          </a:fontRef>
+        </p:style>
+      </p:cxnSp>
+      <p:cxnSp>
+        <p:nvCxnSpPr>
+          <p:cNvPr id="34" name="Straight Arrow Connector 33"/>
+          <p:cNvCxnSpPr>
+            <a:stCxn id="25" idx="0"/>
+            <a:endCxn id="31" idx="2"/>
+          </p:cNvCxnSpPr>
+          <p:nvPr/>
+        </p:nvCxnSpPr>
+        <p:spPr>
+          <a:xfrm flipV="1">
+            <a:off x="6470333" y="3513418"/>
+            <a:ext cx="896375" cy="524619"/>
+          </a:xfrm>
+          <a:prstGeom prst="straightConnector1">
+            <a:avLst/>
+          </a:prstGeom>
+          <a:ln>
+            <a:solidFill>
+              <a:schemeClr val="tx1"/>
+            </a:solidFill>
+            <a:tailEnd type="triangle"/>
+          </a:ln>
+        </p:spPr>
+        <p:style>
+          <a:lnRef idx="1">
+            <a:schemeClr val="accent1"/>
+          </a:lnRef>
+          <a:fillRef idx="0">
+            <a:schemeClr val="accent1"/>
+          </a:fillRef>
+          <a:effectRef idx="0">
+            <a:schemeClr val="accent1"/>
+          </a:effectRef>
+          <a:fontRef idx="minor">
+            <a:schemeClr val="tx1"/>
+          </a:fontRef>
+        </p:style>
+      </p:cxnSp>
+      <p:cxnSp>
+        <p:nvCxnSpPr>
+          <p:cNvPr id="36" name="Straight Arrow Connector 35"/>
+          <p:cNvCxnSpPr>
+            <a:stCxn id="24" idx="2"/>
+            <a:endCxn id="25" idx="0"/>
+          </p:cNvCxnSpPr>
+          <p:nvPr/>
+        </p:nvCxnSpPr>
+        <p:spPr>
+          <a:xfrm>
+            <a:off x="6470332" y="2341193"/>
+            <a:ext cx="1" cy="1696844"/>
+          </a:xfrm>
+          <a:prstGeom prst="straightConnector1">
+            <a:avLst/>
+          </a:prstGeom>
+          <a:ln>
+            <a:solidFill>
+              <a:schemeClr val="tx1"/>
+            </a:solidFill>
+            <a:headEnd type="triangle"/>
+            <a:tailEnd type="triangle"/>
+          </a:ln>
+        </p:spPr>
+        <p:style>
+          <a:lnRef idx="1">
+            <a:schemeClr val="accent1"/>
+          </a:lnRef>
+          <a:fillRef idx="0">
+            <a:schemeClr val="accent1"/>
+          </a:fillRef>
+          <a:effectRef idx="0">
+            <a:schemeClr val="accent1"/>
+          </a:effectRef>
+          <a:fontRef idx="minor">
+            <a:schemeClr val="tx1"/>
+          </a:fontRef>
+        </p:style>
+      </p:cxnSp>
+      <p:cxnSp>
+        <p:nvCxnSpPr>
+          <p:cNvPr id="38" name="Straight Arrow Connector 37"/>
+          <p:cNvCxnSpPr>
+            <a:stCxn id="24" idx="3"/>
+            <a:endCxn id="26" idx="1"/>
+          </p:cNvCxnSpPr>
+          <p:nvPr/>
+        </p:nvCxnSpPr>
+        <p:spPr>
+          <a:xfrm>
+            <a:off x="7236077" y="2101482"/>
+            <a:ext cx="259915" cy="0"/>
+          </a:xfrm>
+          <a:prstGeom prst="straightConnector1">
+            <a:avLst/>
+          </a:prstGeom>
+          <a:ln>
+            <a:solidFill>
+              <a:schemeClr val="tx1"/>
+            </a:solidFill>
+            <a:tailEnd type="triangle"/>
+          </a:ln>
+        </p:spPr>
+        <p:style>
+          <a:lnRef idx="1">
+            <a:schemeClr val="accent1"/>
+          </a:lnRef>
+          <a:fillRef idx="0">
+            <a:schemeClr val="accent1"/>
+          </a:fillRef>
+          <a:effectRef idx="0">
+            <a:schemeClr val="accent1"/>
+          </a:effectRef>
+          <a:fontRef idx="minor">
+            <a:schemeClr val="tx1"/>
+          </a:fontRef>
+        </p:style>
+      </p:cxnSp>
+      <p:cxnSp>
+        <p:nvCxnSpPr>
+          <p:cNvPr id="40" name="Straight Arrow Connector 39"/>
+          <p:cNvCxnSpPr>
+            <a:stCxn id="25" idx="3"/>
+            <a:endCxn id="27" idx="1"/>
+          </p:cNvCxnSpPr>
+          <p:nvPr/>
+        </p:nvCxnSpPr>
+        <p:spPr>
+          <a:xfrm>
+            <a:off x="7236078" y="4277748"/>
+            <a:ext cx="259915" cy="0"/>
+          </a:xfrm>
+          <a:prstGeom prst="straightConnector1">
+            <a:avLst/>
+          </a:prstGeom>
+          <a:ln>
+            <a:solidFill>
+              <a:schemeClr val="tx1"/>
+            </a:solidFill>
+            <a:tailEnd type="triangle"/>
+          </a:ln>
+        </p:spPr>
+        <p:style>
+          <a:lnRef idx="1">
+            <a:schemeClr val="accent1"/>
+          </a:lnRef>
+          <a:fillRef idx="0">
+            <a:schemeClr val="accent1"/>
+          </a:fillRef>
+          <a:effectRef idx="0">
+            <a:schemeClr val="accent1"/>
+          </a:effectRef>
+          <a:fontRef idx="minor">
+            <a:schemeClr val="tx1"/>
+          </a:fontRef>
+        </p:style>
+      </p:cxnSp>
+      <p:cxnSp>
+        <p:nvCxnSpPr>
+          <p:cNvPr id="42" name="Straight Arrow Connector 41"/>
+          <p:cNvCxnSpPr>
+            <a:stCxn id="26" idx="2"/>
+            <a:endCxn id="27" idx="0"/>
+          </p:cNvCxnSpPr>
+          <p:nvPr/>
+        </p:nvCxnSpPr>
+        <p:spPr>
+          <a:xfrm>
+            <a:off x="8261738" y="2341193"/>
+            <a:ext cx="1" cy="1696844"/>
+          </a:xfrm>
+          <a:prstGeom prst="straightConnector1">
+            <a:avLst/>
+          </a:prstGeom>
+          <a:ln>
+            <a:solidFill>
+              <a:schemeClr val="tx1"/>
+            </a:solidFill>
+            <a:tailEnd type="triangle"/>
+          </a:ln>
+        </p:spPr>
+        <p:style>
+          <a:lnRef idx="1">
+            <a:schemeClr val="accent1"/>
+          </a:lnRef>
+          <a:fillRef idx="0">
+            <a:schemeClr val="accent1"/>
+          </a:fillRef>
+          <a:effectRef idx="0">
+            <a:schemeClr val="accent1"/>
+          </a:effectRef>
+          <a:fontRef idx="minor">
+            <a:schemeClr val="tx1"/>
+          </a:fontRef>
+        </p:style>
+      </p:cxnSp>
     </p:spTree>
     <p:extLst>
       <p:ext uri="{BB962C8B-B14F-4D97-AF65-F5344CB8AC3E}">
-        <p14:creationId xmlns:p14="http://schemas.microsoft.com/office/powerpoint/2010/main" val="831674277"/>
+        <p14:creationId xmlns:p14="http://schemas.microsoft.com/office/powerpoint/2010/main" val="2092181851"/>
+      </p:ext>
+    </p:extLst>
+  </p:cSld>
+  <p:clrMapOvr>
+    <a:masterClrMapping/>
+  </p:clrMapOvr>
+</p:sld>
+</file>
+
+<file path=ppt/slides/slide3.xml><?xml version="1.0" encoding="utf-8"?>
+<p:sld xmlns:a="http://schemas.openxmlformats.org/drawingml/2006/main" xmlns:r="http://schemas.openxmlformats.org/officeDocument/2006/relationships" xmlns:p="http://schemas.openxmlformats.org/presentationml/2006/main">
+  <p:cSld>
+    <p:spTree>
+      <p:nvGrpSpPr>
+        <p:cNvPr id="1" name=""/>
+        <p:cNvGrpSpPr/>
+        <p:nvPr/>
+      </p:nvGrpSpPr>
+      <p:grpSpPr>
+        <a:xfrm>
+          <a:off x="0" y="0"/>
+          <a:ext cx="0" cy="0"/>
+          <a:chOff x="0" y="0"/>
+          <a:chExt cx="0" cy="0"/>
+        </a:xfrm>
+      </p:grpSpPr>
+      <p:sp>
+        <p:nvSpPr>
+          <p:cNvPr id="4" name="Rectangle 3"/>
+          <p:cNvSpPr/>
+          <p:nvPr/>
+        </p:nvSpPr>
+        <p:spPr>
+          <a:xfrm>
+            <a:off x="2038827" y="1649916"/>
+            <a:ext cx="4780231" cy="4213782"/>
+          </a:xfrm>
+          <a:prstGeom prst="rect">
+            <a:avLst/>
+          </a:prstGeom>
+          <a:noFill/>
+          <a:ln w="57150">
+            <a:solidFill>
+              <a:schemeClr val="bg1">
+                <a:lumMod val="65000"/>
+              </a:schemeClr>
+            </a:solidFill>
+          </a:ln>
+        </p:spPr>
+        <p:style>
+          <a:lnRef idx="3">
+            <a:schemeClr val="lt1"/>
+          </a:lnRef>
+          <a:fillRef idx="1">
+            <a:schemeClr val="accent3"/>
+          </a:fillRef>
+          <a:effectRef idx="1">
+            <a:schemeClr val="accent3"/>
+          </a:effectRef>
+          <a:fontRef idx="minor">
+            <a:schemeClr val="lt1"/>
+          </a:fontRef>
+        </p:style>
+        <p:txBody>
+          <a:bodyPr rtlCol="0" anchor="ctr"/>
+          <a:lstStyle/>
+          <a:p>
+            <a:pPr algn="ctr"/>
+            <a:endParaRPr lang="en-US" sz="3200" dirty="0">
+              <a:latin typeface="Baskerville" charset="0"/>
+              <a:ea typeface="Baskerville" charset="0"/>
+              <a:cs typeface="Baskerville" charset="0"/>
+            </a:endParaRPr>
+          </a:p>
+        </p:txBody>
+      </p:sp>
+      <p:sp>
+        <p:nvSpPr>
+          <p:cNvPr id="21" name="Rectangle 20"/>
+          <p:cNvSpPr/>
+          <p:nvPr/>
+        </p:nvSpPr>
+        <p:spPr>
+          <a:xfrm>
+            <a:off x="2298379" y="2036414"/>
+            <a:ext cx="1786906" cy="772998"/>
+          </a:xfrm>
+          <a:prstGeom prst="rect">
+            <a:avLst/>
+          </a:prstGeom>
+          <a:noFill/>
+          <a:ln>
+            <a:solidFill>
+              <a:schemeClr val="tx1"/>
+            </a:solidFill>
+          </a:ln>
+        </p:spPr>
+        <p:style>
+          <a:lnRef idx="2">
+            <a:schemeClr val="accent1">
+              <a:shade val="50000"/>
+            </a:schemeClr>
+          </a:lnRef>
+          <a:fillRef idx="1">
+            <a:schemeClr val="accent1"/>
+          </a:fillRef>
+          <a:effectRef idx="0">
+            <a:schemeClr val="accent1"/>
+          </a:effectRef>
+          <a:fontRef idx="minor">
+            <a:schemeClr val="lt1"/>
+          </a:fontRef>
+        </p:style>
+        <p:txBody>
+          <a:bodyPr rtlCol="0" anchor="ctr"/>
+          <a:lstStyle/>
+          <a:p>
+            <a:pPr algn="ctr"/>
+            <a:r>
+              <a:rPr lang="en-US" sz="2000" dirty="0" err="1" smtClean="0">
+                <a:solidFill>
+                  <a:schemeClr val="tx1"/>
+                </a:solidFill>
+                <a:latin typeface="Baskerville" charset="0"/>
+                <a:ea typeface="Baskerville" charset="0"/>
+                <a:cs typeface="Baskerville" charset="0"/>
+              </a:rPr>
+              <a:t>global_planner</a:t>
+            </a:r>
+            <a:endParaRPr lang="en-US" sz="2000" dirty="0">
+              <a:solidFill>
+                <a:schemeClr val="tx1"/>
+              </a:solidFill>
+              <a:latin typeface="Baskerville" charset="0"/>
+              <a:ea typeface="Baskerville" charset="0"/>
+              <a:cs typeface="Baskerville" charset="0"/>
+            </a:endParaRPr>
+          </a:p>
+        </p:txBody>
+      </p:sp>
+      <p:sp>
+        <p:nvSpPr>
+          <p:cNvPr id="24" name="Rectangle 23"/>
+          <p:cNvSpPr/>
+          <p:nvPr/>
+        </p:nvSpPr>
+        <p:spPr>
+          <a:xfrm>
+            <a:off x="4703786" y="2036414"/>
+            <a:ext cx="1786906" cy="772998"/>
+          </a:xfrm>
+          <a:prstGeom prst="rect">
+            <a:avLst/>
+          </a:prstGeom>
+          <a:noFill/>
+          <a:ln>
+            <a:solidFill>
+              <a:schemeClr val="tx1"/>
+            </a:solidFill>
+          </a:ln>
+        </p:spPr>
+        <p:style>
+          <a:lnRef idx="2">
+            <a:schemeClr val="accent1">
+              <a:shade val="50000"/>
+            </a:schemeClr>
+          </a:lnRef>
+          <a:fillRef idx="1">
+            <a:schemeClr val="accent1"/>
+          </a:fillRef>
+          <a:effectRef idx="0">
+            <a:schemeClr val="accent1"/>
+          </a:effectRef>
+          <a:fontRef idx="minor">
+            <a:schemeClr val="lt1"/>
+          </a:fontRef>
+        </p:style>
+        <p:txBody>
+          <a:bodyPr rtlCol="0" anchor="ctr"/>
+          <a:lstStyle/>
+          <a:p>
+            <a:pPr algn="ctr"/>
+            <a:r>
+              <a:rPr lang="en-US" sz="2000" dirty="0" err="1" smtClean="0">
+                <a:solidFill>
+                  <a:schemeClr val="tx1"/>
+                </a:solidFill>
+                <a:latin typeface="Baskerville" charset="0"/>
+                <a:ea typeface="Baskerville" charset="0"/>
+                <a:cs typeface="Baskerville" charset="0"/>
+              </a:rPr>
+              <a:t>global_costmap</a:t>
+            </a:r>
+            <a:endParaRPr lang="en-US" sz="2000" dirty="0">
+              <a:solidFill>
+                <a:schemeClr val="tx1"/>
+              </a:solidFill>
+              <a:latin typeface="Baskerville" charset="0"/>
+              <a:ea typeface="Baskerville" charset="0"/>
+              <a:cs typeface="Baskerville" charset="0"/>
+            </a:endParaRPr>
+          </a:p>
+        </p:txBody>
+      </p:sp>
+      <p:sp>
+        <p:nvSpPr>
+          <p:cNvPr id="25" name="Rectangle 24"/>
+          <p:cNvSpPr/>
+          <p:nvPr/>
+        </p:nvSpPr>
+        <p:spPr>
+          <a:xfrm>
+            <a:off x="2298379" y="4690062"/>
+            <a:ext cx="1786906" cy="772998"/>
+          </a:xfrm>
+          <a:prstGeom prst="rect">
+            <a:avLst/>
+          </a:prstGeom>
+          <a:noFill/>
+          <a:ln>
+            <a:solidFill>
+              <a:schemeClr val="tx1"/>
+            </a:solidFill>
+          </a:ln>
+        </p:spPr>
+        <p:style>
+          <a:lnRef idx="2">
+            <a:schemeClr val="accent1">
+              <a:shade val="50000"/>
+            </a:schemeClr>
+          </a:lnRef>
+          <a:fillRef idx="1">
+            <a:schemeClr val="accent1"/>
+          </a:fillRef>
+          <a:effectRef idx="0">
+            <a:schemeClr val="accent1"/>
+          </a:effectRef>
+          <a:fontRef idx="minor">
+            <a:schemeClr val="lt1"/>
+          </a:fontRef>
+        </p:style>
+        <p:txBody>
+          <a:bodyPr rtlCol="0" anchor="ctr"/>
+          <a:lstStyle/>
+          <a:p>
+            <a:pPr algn="ctr"/>
+            <a:r>
+              <a:rPr lang="en-US" sz="2000" dirty="0" err="1" smtClean="0">
+                <a:solidFill>
+                  <a:schemeClr val="tx1"/>
+                </a:solidFill>
+                <a:latin typeface="Baskerville" charset="0"/>
+                <a:ea typeface="Baskerville" charset="0"/>
+                <a:cs typeface="Baskerville" charset="0"/>
+              </a:rPr>
+              <a:t>local_planner</a:t>
+            </a:r>
+            <a:endParaRPr lang="en-US" sz="2000" dirty="0">
+              <a:solidFill>
+                <a:schemeClr val="tx1"/>
+              </a:solidFill>
+              <a:latin typeface="Baskerville" charset="0"/>
+              <a:ea typeface="Baskerville" charset="0"/>
+              <a:cs typeface="Baskerville" charset="0"/>
+            </a:endParaRPr>
+          </a:p>
+        </p:txBody>
+      </p:sp>
+      <p:sp>
+        <p:nvSpPr>
+          <p:cNvPr id="26" name="Rectangle 25"/>
+          <p:cNvSpPr/>
+          <p:nvPr/>
+        </p:nvSpPr>
+        <p:spPr>
+          <a:xfrm>
+            <a:off x="4703786" y="4690062"/>
+            <a:ext cx="1786906" cy="772998"/>
+          </a:xfrm>
+          <a:prstGeom prst="rect">
+            <a:avLst/>
+          </a:prstGeom>
+          <a:noFill/>
+          <a:ln>
+            <a:solidFill>
+              <a:schemeClr val="tx1"/>
+            </a:solidFill>
+          </a:ln>
+        </p:spPr>
+        <p:style>
+          <a:lnRef idx="2">
+            <a:schemeClr val="accent1">
+              <a:shade val="50000"/>
+            </a:schemeClr>
+          </a:lnRef>
+          <a:fillRef idx="1">
+            <a:schemeClr val="accent1"/>
+          </a:fillRef>
+          <a:effectRef idx="0">
+            <a:schemeClr val="accent1"/>
+          </a:effectRef>
+          <a:fontRef idx="minor">
+            <a:schemeClr val="lt1"/>
+          </a:fontRef>
+        </p:style>
+        <p:txBody>
+          <a:bodyPr rtlCol="0" anchor="ctr"/>
+          <a:lstStyle/>
+          <a:p>
+            <a:pPr algn="ctr"/>
+            <a:r>
+              <a:rPr lang="en-US" sz="2000" dirty="0" err="1" smtClean="0">
+                <a:solidFill>
+                  <a:schemeClr val="tx1"/>
+                </a:solidFill>
+                <a:latin typeface="Baskerville" charset="0"/>
+                <a:ea typeface="Baskerville" charset="0"/>
+                <a:cs typeface="Baskerville" charset="0"/>
+              </a:rPr>
+              <a:t>local</a:t>
+            </a:r>
+            <a:r>
+              <a:rPr lang="en-US" sz="2000" dirty="0" err="1">
+                <a:solidFill>
+                  <a:schemeClr val="tx1"/>
+                </a:solidFill>
+                <a:latin typeface="Baskerville" charset="0"/>
+                <a:ea typeface="Baskerville" charset="0"/>
+                <a:cs typeface="Baskerville" charset="0"/>
+              </a:rPr>
+              <a:t>_</a:t>
+            </a:r>
+            <a:r>
+              <a:rPr lang="en-US" sz="2000" dirty="0" err="1" smtClean="0">
+                <a:solidFill>
+                  <a:schemeClr val="tx1"/>
+                </a:solidFill>
+                <a:latin typeface="Baskerville" charset="0"/>
+                <a:ea typeface="Baskerville" charset="0"/>
+                <a:cs typeface="Baskerville" charset="0"/>
+              </a:rPr>
+              <a:t>costmap</a:t>
+            </a:r>
+            <a:endParaRPr lang="en-US" sz="2000" dirty="0">
+              <a:solidFill>
+                <a:schemeClr val="tx1"/>
+              </a:solidFill>
+              <a:latin typeface="Baskerville" charset="0"/>
+              <a:ea typeface="Baskerville" charset="0"/>
+              <a:cs typeface="Baskerville" charset="0"/>
+            </a:endParaRPr>
+          </a:p>
+        </p:txBody>
+      </p:sp>
+      <p:sp>
+        <p:nvSpPr>
+          <p:cNvPr id="27" name="Rectangle 26"/>
+          <p:cNvSpPr/>
+          <p:nvPr/>
+        </p:nvSpPr>
+        <p:spPr>
+          <a:xfrm>
+            <a:off x="3535489" y="3370308"/>
+            <a:ext cx="1786906" cy="772998"/>
+          </a:xfrm>
+          <a:prstGeom prst="rect">
+            <a:avLst/>
+          </a:prstGeom>
+          <a:noFill/>
+          <a:ln>
+            <a:solidFill>
+              <a:schemeClr val="tx1"/>
+            </a:solidFill>
+          </a:ln>
+        </p:spPr>
+        <p:style>
+          <a:lnRef idx="2">
+            <a:schemeClr val="accent1">
+              <a:shade val="50000"/>
+            </a:schemeClr>
+          </a:lnRef>
+          <a:fillRef idx="1">
+            <a:schemeClr val="accent1"/>
+          </a:fillRef>
+          <a:effectRef idx="0">
+            <a:schemeClr val="accent1"/>
+          </a:effectRef>
+          <a:fontRef idx="minor">
+            <a:schemeClr val="lt1"/>
+          </a:fontRef>
+        </p:style>
+        <p:txBody>
+          <a:bodyPr rtlCol="0" anchor="ctr"/>
+          <a:lstStyle/>
+          <a:p>
+            <a:pPr algn="ctr"/>
+            <a:r>
+              <a:rPr lang="en-US" sz="2000" dirty="0" smtClean="0">
+                <a:solidFill>
+                  <a:schemeClr val="tx1"/>
+                </a:solidFill>
+                <a:latin typeface="Baskerville" charset="0"/>
+                <a:ea typeface="Baskerville" charset="0"/>
+                <a:cs typeface="Baskerville" charset="0"/>
+              </a:rPr>
+              <a:t>recovery_</a:t>
+            </a:r>
+          </a:p>
+          <a:p>
+            <a:pPr algn="ctr"/>
+            <a:r>
+              <a:rPr lang="en-US" sz="2000" dirty="0" smtClean="0">
+                <a:solidFill>
+                  <a:schemeClr val="tx1"/>
+                </a:solidFill>
+                <a:latin typeface="Baskerville" charset="0"/>
+                <a:ea typeface="Baskerville" charset="0"/>
+                <a:cs typeface="Baskerville" charset="0"/>
+              </a:rPr>
+              <a:t>behaviour</a:t>
+            </a:r>
+            <a:endParaRPr lang="en-US" sz="2000" dirty="0">
+              <a:solidFill>
+                <a:schemeClr val="tx1"/>
+              </a:solidFill>
+              <a:latin typeface="Baskerville" charset="0"/>
+              <a:ea typeface="Baskerville" charset="0"/>
+              <a:cs typeface="Baskerville" charset="0"/>
+            </a:endParaRPr>
+          </a:p>
+        </p:txBody>
+      </p:sp>
+      <p:cxnSp>
+        <p:nvCxnSpPr>
+          <p:cNvPr id="11" name="Straight Arrow Connector 10"/>
+          <p:cNvCxnSpPr>
+            <a:stCxn id="24" idx="1"/>
+            <a:endCxn id="21" idx="3"/>
+          </p:cNvCxnSpPr>
+          <p:nvPr/>
+        </p:nvCxnSpPr>
+        <p:spPr>
+          <a:xfrm flipH="1">
+            <a:off x="4085285" y="2422913"/>
+            <a:ext cx="618501" cy="0"/>
+          </a:xfrm>
+          <a:prstGeom prst="straightConnector1">
+            <a:avLst/>
+          </a:prstGeom>
+          <a:ln>
+            <a:solidFill>
+              <a:schemeClr val="tx1"/>
+            </a:solidFill>
+            <a:tailEnd type="triangle"/>
+          </a:ln>
+        </p:spPr>
+        <p:style>
+          <a:lnRef idx="1">
+            <a:schemeClr val="accent1"/>
+          </a:lnRef>
+          <a:fillRef idx="0">
+            <a:schemeClr val="accent1"/>
+          </a:fillRef>
+          <a:effectRef idx="0">
+            <a:schemeClr val="accent1"/>
+          </a:effectRef>
+          <a:fontRef idx="minor">
+            <a:schemeClr val="tx1"/>
+          </a:fontRef>
+        </p:style>
+      </p:cxnSp>
+      <p:cxnSp>
+        <p:nvCxnSpPr>
+          <p:cNvPr id="13" name="Straight Arrow Connector 12"/>
+          <p:cNvCxnSpPr>
+            <a:stCxn id="24" idx="2"/>
+            <a:endCxn id="27" idx="0"/>
+          </p:cNvCxnSpPr>
+          <p:nvPr/>
+        </p:nvCxnSpPr>
+        <p:spPr>
+          <a:xfrm flipH="1">
+            <a:off x="4428942" y="2809412"/>
+            <a:ext cx="1168297" cy="560896"/>
+          </a:xfrm>
+          <a:prstGeom prst="straightConnector1">
+            <a:avLst/>
+          </a:prstGeom>
+          <a:ln>
+            <a:solidFill>
+              <a:schemeClr val="tx1"/>
+            </a:solidFill>
+            <a:tailEnd type="triangle"/>
+          </a:ln>
+        </p:spPr>
+        <p:style>
+          <a:lnRef idx="1">
+            <a:schemeClr val="accent1"/>
+          </a:lnRef>
+          <a:fillRef idx="0">
+            <a:schemeClr val="accent1"/>
+          </a:fillRef>
+          <a:effectRef idx="0">
+            <a:schemeClr val="accent1"/>
+          </a:effectRef>
+          <a:fontRef idx="minor">
+            <a:schemeClr val="tx1"/>
+          </a:fontRef>
+        </p:style>
+      </p:cxnSp>
+      <p:cxnSp>
+        <p:nvCxnSpPr>
+          <p:cNvPr id="28" name="Straight Arrow Connector 27"/>
+          <p:cNvCxnSpPr>
+            <a:stCxn id="26" idx="0"/>
+            <a:endCxn id="27" idx="2"/>
+          </p:cNvCxnSpPr>
+          <p:nvPr/>
+        </p:nvCxnSpPr>
+        <p:spPr>
+          <a:xfrm flipH="1" flipV="1">
+            <a:off x="4428942" y="4143306"/>
+            <a:ext cx="1168297" cy="546756"/>
+          </a:xfrm>
+          <a:prstGeom prst="straightConnector1">
+            <a:avLst/>
+          </a:prstGeom>
+          <a:ln>
+            <a:solidFill>
+              <a:schemeClr val="tx1"/>
+            </a:solidFill>
+            <a:tailEnd type="triangle"/>
+          </a:ln>
+        </p:spPr>
+        <p:style>
+          <a:lnRef idx="1">
+            <a:schemeClr val="accent1"/>
+          </a:lnRef>
+          <a:fillRef idx="0">
+            <a:schemeClr val="accent1"/>
+          </a:fillRef>
+          <a:effectRef idx="0">
+            <a:schemeClr val="accent1"/>
+          </a:effectRef>
+          <a:fontRef idx="minor">
+            <a:schemeClr val="tx1"/>
+          </a:fontRef>
+        </p:style>
+      </p:cxnSp>
+      <p:cxnSp>
+        <p:nvCxnSpPr>
+          <p:cNvPr id="31" name="Straight Arrow Connector 30"/>
+          <p:cNvCxnSpPr>
+            <a:stCxn id="21" idx="2"/>
+            <a:endCxn id="25" idx="0"/>
+          </p:cNvCxnSpPr>
+          <p:nvPr/>
+        </p:nvCxnSpPr>
+        <p:spPr>
+          <a:xfrm>
+            <a:off x="3191832" y="2809412"/>
+            <a:ext cx="0" cy="1880650"/>
+          </a:xfrm>
+          <a:prstGeom prst="straightConnector1">
+            <a:avLst/>
+          </a:prstGeom>
+          <a:ln>
+            <a:solidFill>
+              <a:schemeClr val="tx1"/>
+            </a:solidFill>
+            <a:tailEnd type="triangle"/>
+          </a:ln>
+        </p:spPr>
+        <p:style>
+          <a:lnRef idx="1">
+            <a:schemeClr val="accent1"/>
+          </a:lnRef>
+          <a:fillRef idx="0">
+            <a:schemeClr val="accent1"/>
+          </a:fillRef>
+          <a:effectRef idx="0">
+            <a:schemeClr val="accent1"/>
+          </a:effectRef>
+          <a:fontRef idx="minor">
+            <a:schemeClr val="tx1"/>
+          </a:fontRef>
+        </p:style>
+      </p:cxnSp>
+      <p:cxnSp>
+        <p:nvCxnSpPr>
+          <p:cNvPr id="33" name="Straight Arrow Connector 32"/>
+          <p:cNvCxnSpPr>
+            <a:stCxn id="26" idx="0"/>
+            <a:endCxn id="24" idx="2"/>
+          </p:cNvCxnSpPr>
+          <p:nvPr/>
+        </p:nvCxnSpPr>
+        <p:spPr>
+          <a:xfrm flipV="1">
+            <a:off x="5597239" y="2809412"/>
+            <a:ext cx="0" cy="1880650"/>
+          </a:xfrm>
+          <a:prstGeom prst="straightConnector1">
+            <a:avLst/>
+          </a:prstGeom>
+          <a:ln>
+            <a:solidFill>
+              <a:schemeClr val="tx1"/>
+            </a:solidFill>
+            <a:headEnd type="triangle"/>
+            <a:tailEnd type="triangle"/>
+          </a:ln>
+        </p:spPr>
+        <p:style>
+          <a:lnRef idx="1">
+            <a:schemeClr val="accent1"/>
+          </a:lnRef>
+          <a:fillRef idx="0">
+            <a:schemeClr val="accent1"/>
+          </a:fillRef>
+          <a:effectRef idx="0">
+            <a:schemeClr val="accent1"/>
+          </a:effectRef>
+          <a:fontRef idx="minor">
+            <a:schemeClr val="tx1"/>
+          </a:fontRef>
+        </p:style>
+      </p:cxnSp>
+      <p:cxnSp>
+        <p:nvCxnSpPr>
+          <p:cNvPr id="36" name="Straight Connector 35"/>
+          <p:cNvCxnSpPr>
+            <a:endCxn id="4" idx="3"/>
+          </p:cNvCxnSpPr>
+          <p:nvPr/>
+        </p:nvCxnSpPr>
+        <p:spPr>
+          <a:xfrm>
+            <a:off x="5597239" y="3756807"/>
+            <a:ext cx="1221819" cy="0"/>
+          </a:xfrm>
+          <a:prstGeom prst="line">
+            <a:avLst/>
+          </a:prstGeom>
+          <a:ln>
+            <a:solidFill>
+              <a:schemeClr val="tx1"/>
+            </a:solidFill>
+            <a:headEnd type="oval"/>
+          </a:ln>
+        </p:spPr>
+        <p:style>
+          <a:lnRef idx="1">
+            <a:schemeClr val="accent1"/>
+          </a:lnRef>
+          <a:fillRef idx="0">
+            <a:schemeClr val="accent1"/>
+          </a:fillRef>
+          <a:effectRef idx="0">
+            <a:schemeClr val="accent1"/>
+          </a:effectRef>
+          <a:fontRef idx="minor">
+            <a:schemeClr val="tx1"/>
+          </a:fontRef>
+        </p:style>
+      </p:cxnSp>
+      <p:sp>
+        <p:nvSpPr>
+          <p:cNvPr id="42" name="Rectangle 41"/>
+          <p:cNvSpPr/>
+          <p:nvPr/>
+        </p:nvSpPr>
+        <p:spPr>
+          <a:xfrm>
+            <a:off x="2038827" y="1376537"/>
+            <a:ext cx="1348033" cy="226243"/>
+          </a:xfrm>
+          <a:prstGeom prst="rect">
+            <a:avLst/>
+          </a:prstGeom>
+          <a:solidFill>
+            <a:schemeClr val="bg1">
+              <a:lumMod val="65000"/>
+            </a:schemeClr>
+          </a:solidFill>
+          <a:ln w="57150">
+            <a:solidFill>
+              <a:schemeClr val="bg1">
+                <a:lumMod val="65000"/>
+              </a:schemeClr>
+            </a:solidFill>
+          </a:ln>
+        </p:spPr>
+        <p:style>
+          <a:lnRef idx="2">
+            <a:schemeClr val="accent1">
+              <a:shade val="50000"/>
+            </a:schemeClr>
+          </a:lnRef>
+          <a:fillRef idx="1">
+            <a:schemeClr val="accent1"/>
+          </a:fillRef>
+          <a:effectRef idx="0">
+            <a:schemeClr val="accent1"/>
+          </a:effectRef>
+          <a:fontRef idx="minor">
+            <a:schemeClr val="lt1"/>
+          </a:fontRef>
+        </p:style>
+        <p:txBody>
+          <a:bodyPr rtlCol="0" anchor="ctr"/>
+          <a:lstStyle/>
+          <a:p>
+            <a:pPr algn="ctr"/>
+            <a:r>
+              <a:rPr lang="en-US" dirty="0" err="1" smtClean="0">
+                <a:latin typeface="Baskerville" charset="0"/>
+                <a:ea typeface="Baskerville" charset="0"/>
+                <a:cs typeface="Baskerville" charset="0"/>
+              </a:rPr>
+              <a:t>move_base</a:t>
+            </a:r>
+            <a:endParaRPr lang="en-US" dirty="0">
+              <a:latin typeface="Baskerville" charset="0"/>
+              <a:ea typeface="Baskerville" charset="0"/>
+              <a:cs typeface="Baskerville" charset="0"/>
+            </a:endParaRPr>
+          </a:p>
+        </p:txBody>
+      </p:sp>
+      <p:sp>
+        <p:nvSpPr>
+          <p:cNvPr id="44" name="TextBox 43"/>
+          <p:cNvSpPr txBox="1"/>
+          <p:nvPr/>
+        </p:nvSpPr>
+        <p:spPr>
+          <a:xfrm>
+            <a:off x="6048624" y="3426571"/>
+            <a:ext cx="811440" cy="646331"/>
+          </a:xfrm>
+          <a:prstGeom prst="rect">
+            <a:avLst/>
+          </a:prstGeom>
+          <a:noFill/>
+        </p:spPr>
+        <p:txBody>
+          <a:bodyPr wrap="none" rtlCol="0">
+            <a:spAutoFit/>
+          </a:bodyPr>
+          <a:lstStyle/>
+          <a:p>
+            <a:pPr algn="r"/>
+            <a:r>
+              <a:rPr lang="en-US" dirty="0" smtClean="0">
+                <a:latin typeface="Baskerville" charset="0"/>
+                <a:ea typeface="Baskerville" charset="0"/>
+                <a:cs typeface="Baskerville" charset="0"/>
+              </a:rPr>
+              <a:t>Sensor</a:t>
+            </a:r>
+          </a:p>
+          <a:p>
+            <a:pPr algn="r"/>
+            <a:r>
+              <a:rPr lang="en-US" dirty="0" smtClean="0">
+                <a:latin typeface="Baskerville" charset="0"/>
+                <a:ea typeface="Baskerville" charset="0"/>
+                <a:cs typeface="Baskerville" charset="0"/>
+              </a:rPr>
+              <a:t>data</a:t>
+            </a:r>
+            <a:endParaRPr lang="en-US" dirty="0">
+              <a:latin typeface="Baskerville" charset="0"/>
+              <a:ea typeface="Baskerville" charset="0"/>
+              <a:cs typeface="Baskerville" charset="0"/>
+            </a:endParaRPr>
+          </a:p>
+        </p:txBody>
+      </p:sp>
+      <p:cxnSp>
+        <p:nvCxnSpPr>
+          <p:cNvPr id="46" name="Straight Arrow Connector 45"/>
+          <p:cNvCxnSpPr>
+            <a:stCxn id="26" idx="1"/>
+            <a:endCxn id="25" idx="3"/>
+          </p:cNvCxnSpPr>
+          <p:nvPr/>
+        </p:nvCxnSpPr>
+        <p:spPr>
+          <a:xfrm flipH="1">
+            <a:off x="4085285" y="5076561"/>
+            <a:ext cx="618501" cy="0"/>
+          </a:xfrm>
+          <a:prstGeom prst="straightConnector1">
+            <a:avLst/>
+          </a:prstGeom>
+          <a:ln>
+            <a:solidFill>
+              <a:schemeClr val="tx1"/>
+            </a:solidFill>
+            <a:tailEnd type="triangle"/>
+          </a:ln>
+        </p:spPr>
+        <p:style>
+          <a:lnRef idx="1">
+            <a:schemeClr val="accent1"/>
+          </a:lnRef>
+          <a:fillRef idx="0">
+            <a:schemeClr val="accent1"/>
+          </a:fillRef>
+          <a:effectRef idx="0">
+            <a:schemeClr val="accent1"/>
+          </a:effectRef>
+          <a:fontRef idx="minor">
+            <a:schemeClr val="tx1"/>
+          </a:fontRef>
+        </p:style>
+      </p:cxnSp>
+    </p:spTree>
+    <p:extLst>
+      <p:ext uri="{BB962C8B-B14F-4D97-AF65-F5344CB8AC3E}">
+        <p14:creationId xmlns:p14="http://schemas.microsoft.com/office/powerpoint/2010/main" val="548257268"/>
       </p:ext>
     </p:extLst>
   </p:cSld>

</xml_diff>

<commit_message>
Updated part of navigation stack
</commit_message>
<xml_diff>
--- a/Paper/Metadata/Navstack.pptx
+++ b/Paper/Metadata/Navstack.pptx
@@ -8,6 +8,7 @@
     <p:sldId id="262" r:id="rId2"/>
     <p:sldId id="264" r:id="rId3"/>
     <p:sldId id="263" r:id="rId4"/>
+    <p:sldId id="265" r:id="rId5"/>
   </p:sldIdLst>
   <p:sldSz cx="12192000" cy="6858000"/>
   <p:notesSz cx="6858000" cy="9144000"/>
@@ -3704,1391 +3705,1366 @@
           <a:chExt cx="0" cy="0"/>
         </a:xfrm>
       </p:grpSpPr>
-      <p:cxnSp>
-        <p:nvCxnSpPr>
-          <p:cNvPr id="23" name="Straight Connector 22"/>
-          <p:cNvCxnSpPr/>
+      <p:grpSp>
+        <p:nvGrpSpPr>
+          <p:cNvPr id="58" name="Group 57"/>
+          <p:cNvGrpSpPr/>
           <p:nvPr/>
-        </p:nvCxnSpPr>
-        <p:spPr>
+        </p:nvGrpSpPr>
+        <p:grpSpPr>
           <a:xfrm>
-            <a:off x="4574687" y="2532257"/>
-            <a:ext cx="1895644" cy="657358"/>
+            <a:off x="2630471" y="1320878"/>
+            <a:ext cx="9444553" cy="3475523"/>
+            <a:chOff x="2630471" y="1320878"/>
+            <a:chExt cx="9444553" cy="3475523"/>
           </a:xfrm>
-          <a:prstGeom prst="line">
-            <a:avLst/>
-          </a:prstGeom>
-          <a:ln w="12700">
+        </p:grpSpPr>
+        <p:cxnSp>
+          <p:nvCxnSpPr>
+            <p:cNvPr id="20" name="Straight Connector 19"/>
+            <p:cNvCxnSpPr>
+              <a:stCxn id="27" idx="3"/>
+              <a:endCxn id="19" idx="1"/>
+            </p:cNvCxnSpPr>
+            <p:nvPr/>
+          </p:nvCxnSpPr>
+          <p:spPr>
+            <a:xfrm>
+              <a:off x="9027484" y="4277748"/>
+              <a:ext cx="905540" cy="0"/>
+            </a:xfrm>
+            <a:prstGeom prst="line">
+              <a:avLst/>
+            </a:prstGeom>
+            <a:ln w="12700">
+              <a:solidFill>
+                <a:schemeClr val="tx1"/>
+              </a:solidFill>
+              <a:tailEnd type="triangle"/>
+            </a:ln>
+          </p:spPr>
+          <p:style>
+            <a:lnRef idx="1">
+              <a:schemeClr val="accent1"/>
+            </a:lnRef>
+            <a:fillRef idx="0">
+              <a:schemeClr val="accent1"/>
+            </a:fillRef>
+            <a:effectRef idx="0">
+              <a:schemeClr val="accent1"/>
+            </a:effectRef>
+            <a:fontRef idx="minor">
+              <a:schemeClr val="tx1"/>
+            </a:fontRef>
+          </p:style>
+        </p:cxnSp>
+        <p:cxnSp>
+          <p:nvCxnSpPr>
+            <p:cNvPr id="18" name="Straight Connector 17"/>
+            <p:cNvCxnSpPr>
+              <a:endCxn id="25" idx="1"/>
+            </p:cNvCxnSpPr>
+            <p:nvPr/>
+          </p:nvCxnSpPr>
+          <p:spPr>
+            <a:xfrm flipV="1">
+              <a:off x="4528609" y="4277748"/>
+              <a:ext cx="1175978" cy="263270"/>
+            </a:xfrm>
+            <a:prstGeom prst="line">
+              <a:avLst/>
+            </a:prstGeom>
+            <a:ln w="12700">
+              <a:solidFill>
+                <a:schemeClr val="tx1"/>
+              </a:solidFill>
+              <a:tailEnd type="triangle"/>
+            </a:ln>
+          </p:spPr>
+          <p:style>
+            <a:lnRef idx="1">
+              <a:schemeClr val="accent1"/>
+            </a:lnRef>
+            <a:fillRef idx="0">
+              <a:schemeClr val="accent1"/>
+            </a:fillRef>
+            <a:effectRef idx="0">
+              <a:schemeClr val="accent1"/>
+            </a:effectRef>
+            <a:fontRef idx="minor">
+              <a:schemeClr val="tx1"/>
+            </a:fontRef>
+          </p:style>
+        </p:cxnSp>
+        <p:cxnSp>
+          <p:nvCxnSpPr>
+            <p:cNvPr id="16" name="Straight Connector 15"/>
+            <p:cNvCxnSpPr/>
+            <p:nvPr/>
+          </p:nvCxnSpPr>
+          <p:spPr>
+            <a:xfrm>
+              <a:off x="4528609" y="3202631"/>
+              <a:ext cx="1941722" cy="0"/>
+            </a:xfrm>
+            <a:prstGeom prst="line">
+              <a:avLst/>
+            </a:prstGeom>
+            <a:ln w="12700">
+              <a:solidFill>
+                <a:schemeClr val="tx1"/>
+              </a:solidFill>
+              <a:tailEnd type="oval"/>
+            </a:ln>
+          </p:spPr>
+          <p:style>
+            <a:lnRef idx="1">
+              <a:schemeClr val="accent1"/>
+            </a:lnRef>
+            <a:fillRef idx="0">
+              <a:schemeClr val="accent1"/>
+            </a:fillRef>
+            <a:effectRef idx="0">
+              <a:schemeClr val="accent1"/>
+            </a:effectRef>
+            <a:fontRef idx="minor">
+              <a:schemeClr val="tx1"/>
+            </a:fontRef>
+          </p:style>
+        </p:cxnSp>
+        <p:cxnSp>
+          <p:nvCxnSpPr>
+            <p:cNvPr id="15" name="Straight Connector 14"/>
+            <p:cNvCxnSpPr>
+              <a:endCxn id="24" idx="1"/>
+            </p:cNvCxnSpPr>
+            <p:nvPr/>
+          </p:nvCxnSpPr>
+          <p:spPr>
+            <a:xfrm>
+              <a:off x="4528609" y="1861883"/>
+              <a:ext cx="1175977" cy="239599"/>
+            </a:xfrm>
+            <a:prstGeom prst="line">
+              <a:avLst/>
+            </a:prstGeom>
+            <a:ln w="12700">
+              <a:solidFill>
+                <a:schemeClr val="tx1"/>
+              </a:solidFill>
+              <a:tailEnd type="triangle"/>
+            </a:ln>
+          </p:spPr>
+          <p:style>
+            <a:lnRef idx="1">
+              <a:schemeClr val="accent1"/>
+            </a:lnRef>
+            <a:fillRef idx="0">
+              <a:schemeClr val="accent1"/>
+            </a:fillRef>
+            <a:effectRef idx="0">
+              <a:schemeClr val="accent1"/>
+            </a:effectRef>
+            <a:fontRef idx="minor">
+              <a:schemeClr val="tx1"/>
+            </a:fontRef>
+          </p:style>
+        </p:cxnSp>
+        <p:sp>
+          <p:nvSpPr>
+            <p:cNvPr id="5" name="Rectangle 4"/>
+            <p:cNvSpPr/>
+            <p:nvPr/>
+          </p:nvSpPr>
+          <p:spPr>
+            <a:xfrm>
+              <a:off x="2630471" y="1602557"/>
+              <a:ext cx="2143475" cy="518653"/>
+            </a:xfrm>
+            <a:prstGeom prst="rect">
+              <a:avLst/>
+            </a:prstGeom>
             <a:solidFill>
-              <a:schemeClr val="tx1"/>
+              <a:schemeClr val="bg1"/>
             </a:solidFill>
-            <a:tailEnd type="oval"/>
-          </a:ln>
-        </p:spPr>
-        <p:style>
-          <a:lnRef idx="1">
-            <a:schemeClr val="accent1"/>
-          </a:lnRef>
-          <a:fillRef idx="0">
-            <a:schemeClr val="accent1"/>
-          </a:fillRef>
-          <a:effectRef idx="0">
-            <a:schemeClr val="accent1"/>
-          </a:effectRef>
-          <a:fontRef idx="minor">
-            <a:schemeClr val="tx1"/>
-          </a:fontRef>
-        </p:style>
-      </p:cxnSp>
-      <p:cxnSp>
-        <p:nvCxnSpPr>
-          <p:cNvPr id="20" name="Straight Connector 19"/>
-          <p:cNvCxnSpPr>
-            <a:stCxn id="27" idx="3"/>
-            <a:endCxn id="19" idx="1"/>
-          </p:cNvCxnSpPr>
-          <p:nvPr/>
-        </p:nvCxnSpPr>
-        <p:spPr>
-          <a:xfrm>
-            <a:off x="9027484" y="4277748"/>
-            <a:ext cx="905540" cy="0"/>
-          </a:xfrm>
-          <a:prstGeom prst="line">
-            <a:avLst/>
-          </a:prstGeom>
-          <a:ln w="12700">
-            <a:solidFill>
-              <a:schemeClr val="tx1"/>
-            </a:solidFill>
-            <a:tailEnd type="triangle"/>
-          </a:ln>
-        </p:spPr>
-        <p:style>
-          <a:lnRef idx="1">
-            <a:schemeClr val="accent1"/>
-          </a:lnRef>
-          <a:fillRef idx="0">
-            <a:schemeClr val="accent1"/>
-          </a:fillRef>
-          <a:effectRef idx="0">
-            <a:schemeClr val="accent1"/>
-          </a:effectRef>
-          <a:fontRef idx="minor">
-            <a:schemeClr val="tx1"/>
-          </a:fontRef>
-        </p:style>
-      </p:cxnSp>
-      <p:cxnSp>
-        <p:nvCxnSpPr>
-          <p:cNvPr id="18" name="Straight Connector 17"/>
-          <p:cNvCxnSpPr>
-            <a:endCxn id="25" idx="1"/>
-          </p:cNvCxnSpPr>
-          <p:nvPr/>
-        </p:nvCxnSpPr>
-        <p:spPr>
-          <a:xfrm flipV="1">
-            <a:off x="4528609" y="4277748"/>
-            <a:ext cx="1175978" cy="263270"/>
-          </a:xfrm>
-          <a:prstGeom prst="line">
-            <a:avLst/>
-          </a:prstGeom>
-          <a:ln w="12700">
-            <a:solidFill>
-              <a:schemeClr val="tx1"/>
-            </a:solidFill>
-            <a:tailEnd type="triangle"/>
-          </a:ln>
-        </p:spPr>
-        <p:style>
-          <a:lnRef idx="1">
-            <a:schemeClr val="accent1"/>
-          </a:lnRef>
-          <a:fillRef idx="0">
-            <a:schemeClr val="accent1"/>
-          </a:fillRef>
-          <a:effectRef idx="0">
-            <a:schemeClr val="accent1"/>
-          </a:effectRef>
-          <a:fontRef idx="minor">
-            <a:schemeClr val="tx1"/>
-          </a:fontRef>
-        </p:style>
-      </p:cxnSp>
-      <p:cxnSp>
-        <p:nvCxnSpPr>
-          <p:cNvPr id="17" name="Straight Connector 16"/>
-          <p:cNvCxnSpPr/>
-          <p:nvPr/>
-        </p:nvCxnSpPr>
-        <p:spPr>
-          <a:xfrm flipV="1">
-            <a:off x="4528609" y="3199479"/>
-            <a:ext cx="1941722" cy="673526"/>
-          </a:xfrm>
-          <a:prstGeom prst="line">
-            <a:avLst/>
-          </a:prstGeom>
-          <a:ln w="12700">
-            <a:solidFill>
-              <a:schemeClr val="tx1"/>
-            </a:solidFill>
-            <a:tailEnd type="oval"/>
-          </a:ln>
-        </p:spPr>
-        <p:style>
-          <a:lnRef idx="1">
-            <a:schemeClr val="accent1"/>
-          </a:lnRef>
-          <a:fillRef idx="0">
-            <a:schemeClr val="accent1"/>
-          </a:fillRef>
-          <a:effectRef idx="0">
-            <a:schemeClr val="accent1"/>
-          </a:effectRef>
-          <a:fontRef idx="minor">
-            <a:schemeClr val="tx1"/>
-          </a:fontRef>
-        </p:style>
-      </p:cxnSp>
-      <p:cxnSp>
-        <p:nvCxnSpPr>
-          <p:cNvPr id="16" name="Straight Connector 15"/>
-          <p:cNvCxnSpPr/>
-          <p:nvPr/>
-        </p:nvCxnSpPr>
-        <p:spPr>
-          <a:xfrm>
-            <a:off x="4528609" y="3202631"/>
-            <a:ext cx="1941722" cy="0"/>
-          </a:xfrm>
-          <a:prstGeom prst="line">
-            <a:avLst/>
-          </a:prstGeom>
-          <a:ln w="12700">
-            <a:solidFill>
-              <a:schemeClr val="tx1"/>
-            </a:solidFill>
-            <a:tailEnd type="oval"/>
-          </a:ln>
-        </p:spPr>
-        <p:style>
-          <a:lnRef idx="1">
-            <a:schemeClr val="accent1"/>
-          </a:lnRef>
-          <a:fillRef idx="0">
-            <a:schemeClr val="accent1"/>
-          </a:fillRef>
-          <a:effectRef idx="0">
-            <a:schemeClr val="accent1"/>
-          </a:effectRef>
-          <a:fontRef idx="minor">
-            <a:schemeClr val="tx1"/>
-          </a:fontRef>
-        </p:style>
-      </p:cxnSp>
-      <p:cxnSp>
-        <p:nvCxnSpPr>
-          <p:cNvPr id="15" name="Straight Connector 14"/>
-          <p:cNvCxnSpPr>
-            <a:endCxn id="24" idx="1"/>
-          </p:cNvCxnSpPr>
-          <p:nvPr/>
-        </p:nvCxnSpPr>
-        <p:spPr>
-          <a:xfrm>
-            <a:off x="4528609" y="1861883"/>
-            <a:ext cx="1175977" cy="239599"/>
-          </a:xfrm>
-          <a:prstGeom prst="line">
-            <a:avLst/>
-          </a:prstGeom>
-          <a:ln w="12700">
-            <a:solidFill>
-              <a:schemeClr val="tx1"/>
-            </a:solidFill>
-            <a:tailEnd type="triangle"/>
-          </a:ln>
-        </p:spPr>
-        <p:style>
-          <a:lnRef idx="1">
-            <a:schemeClr val="accent1"/>
-          </a:lnRef>
-          <a:fillRef idx="0">
-            <a:schemeClr val="accent1"/>
-          </a:fillRef>
-          <a:effectRef idx="0">
-            <a:schemeClr val="accent1"/>
-          </a:effectRef>
-          <a:fontRef idx="minor">
-            <a:schemeClr val="tx1"/>
-          </a:fontRef>
-        </p:style>
-      </p:cxnSp>
-      <p:sp>
-        <p:nvSpPr>
-          <p:cNvPr id="5" name="Rectangle 4"/>
-          <p:cNvSpPr/>
-          <p:nvPr/>
-        </p:nvSpPr>
-        <p:spPr>
-          <a:xfrm>
-            <a:off x="2630471" y="1602557"/>
-            <a:ext cx="2143475" cy="518653"/>
-          </a:xfrm>
-          <a:prstGeom prst="rect">
-            <a:avLst/>
-          </a:prstGeom>
-          <a:solidFill>
-            <a:schemeClr val="bg1"/>
-          </a:solidFill>
-          <a:ln>
-            <a:solidFill>
-              <a:schemeClr val="tx1"/>
-            </a:solidFill>
-          </a:ln>
-        </p:spPr>
-        <p:style>
-          <a:lnRef idx="2">
-            <a:schemeClr val="accent1">
-              <a:shade val="50000"/>
-            </a:schemeClr>
-          </a:lnRef>
-          <a:fillRef idx="1">
-            <a:schemeClr val="accent1"/>
-          </a:fillRef>
-          <a:effectRef idx="0">
-            <a:schemeClr val="accent1"/>
-          </a:effectRef>
-          <a:fontRef idx="minor">
-            <a:schemeClr val="lt1"/>
-          </a:fontRef>
-        </p:style>
-        <p:txBody>
-          <a:bodyPr rtlCol="0" anchor="ctr"/>
-          <a:lstStyle/>
-          <a:p>
-            <a:pPr algn="ctr"/>
-            <a:r>
-              <a:rPr lang="en-US" sz="2400" dirty="0" smtClean="0">
+            <a:ln>
+              <a:solidFill>
+                <a:schemeClr val="tx1"/>
+              </a:solidFill>
+            </a:ln>
+          </p:spPr>
+          <p:style>
+            <a:lnRef idx="2">
+              <a:schemeClr val="accent1">
+                <a:shade val="50000"/>
+              </a:schemeClr>
+            </a:lnRef>
+            <a:fillRef idx="1">
+              <a:schemeClr val="accent1"/>
+            </a:fillRef>
+            <a:effectRef idx="0">
+              <a:schemeClr val="accent1"/>
+            </a:effectRef>
+            <a:fontRef idx="minor">
+              <a:schemeClr val="lt1"/>
+            </a:fontRef>
+          </p:style>
+          <p:txBody>
+            <a:bodyPr rtlCol="0" anchor="ctr"/>
+            <a:lstStyle/>
+            <a:p>
+              <a:pPr algn="ctr"/>
+              <a:r>
+                <a:rPr lang="en-US" sz="2400" dirty="0" smtClean="0">
+                  <a:solidFill>
+                    <a:sysClr val="windowText" lastClr="000000"/>
+                  </a:solidFill>
+                  <a:latin typeface="Baskerville" charset="0"/>
+                  <a:ea typeface="Baskerville" charset="0"/>
+                  <a:cs typeface="Baskerville" charset="0"/>
+                </a:rPr>
+                <a:t>Map</a:t>
+              </a:r>
+              <a:endParaRPr lang="en-US" sz="2400" dirty="0">
                 <a:solidFill>
                   <a:sysClr val="windowText" lastClr="000000"/>
                 </a:solidFill>
                 <a:latin typeface="Baskerville" charset="0"/>
                 <a:ea typeface="Baskerville" charset="0"/>
                 <a:cs typeface="Baskerville" charset="0"/>
-              </a:rPr>
-              <a:t>Map</a:t>
-            </a:r>
-            <a:endParaRPr lang="en-US" sz="2400" dirty="0">
+              </a:endParaRPr>
+            </a:p>
+          </p:txBody>
+        </p:sp>
+        <p:sp>
+          <p:nvSpPr>
+            <p:cNvPr id="4" name="Rectangle 3"/>
+            <p:cNvSpPr/>
+            <p:nvPr/>
+          </p:nvSpPr>
+          <p:spPr>
+            <a:xfrm>
+              <a:off x="5419570" y="1602557"/>
+              <a:ext cx="3867830" cy="3193844"/>
+            </a:xfrm>
+            <a:prstGeom prst="rect">
+              <a:avLst/>
+            </a:prstGeom>
+            <a:noFill/>
+            <a:ln w="57150">
               <a:solidFill>
-                <a:sysClr val="windowText" lastClr="000000"/>
+                <a:schemeClr val="bg1">
+                  <a:lumMod val="65000"/>
+                </a:schemeClr>
               </a:solidFill>
-              <a:latin typeface="Baskerville" charset="0"/>
-              <a:ea typeface="Baskerville" charset="0"/>
-              <a:cs typeface="Baskerville" charset="0"/>
-            </a:endParaRPr>
-          </a:p>
-        </p:txBody>
-      </p:sp>
-      <p:sp>
-        <p:nvSpPr>
-          <p:cNvPr id="4" name="Rectangle 3"/>
-          <p:cNvSpPr/>
-          <p:nvPr/>
-        </p:nvSpPr>
-        <p:spPr>
-          <a:xfrm>
-            <a:off x="5419570" y="1602557"/>
-            <a:ext cx="3867830" cy="3193844"/>
-          </a:xfrm>
-          <a:prstGeom prst="rect">
-            <a:avLst/>
-          </a:prstGeom>
-          <a:noFill/>
-          <a:ln w="57150">
+            </a:ln>
+          </p:spPr>
+          <p:style>
+            <a:lnRef idx="3">
+              <a:schemeClr val="lt1"/>
+            </a:lnRef>
+            <a:fillRef idx="1">
+              <a:schemeClr val="accent3"/>
+            </a:fillRef>
+            <a:effectRef idx="1">
+              <a:schemeClr val="accent3"/>
+            </a:effectRef>
+            <a:fontRef idx="minor">
+              <a:schemeClr val="lt1"/>
+            </a:fontRef>
+          </p:style>
+          <p:txBody>
+            <a:bodyPr rtlCol="0" anchor="ctr"/>
+            <a:lstStyle/>
+            <a:p>
+              <a:pPr algn="ctr"/>
+              <a:endParaRPr lang="en-US" sz="3200" dirty="0">
+                <a:latin typeface="Baskerville" charset="0"/>
+                <a:ea typeface="Baskerville" charset="0"/>
+                <a:cs typeface="Baskerville" charset="0"/>
+              </a:endParaRPr>
+            </a:p>
+          </p:txBody>
+        </p:sp>
+        <p:sp>
+          <p:nvSpPr>
+            <p:cNvPr id="6" name="Rectangle 5"/>
+            <p:cNvSpPr/>
+            <p:nvPr/>
+          </p:nvSpPr>
+          <p:spPr>
+            <a:xfrm>
+              <a:off x="2630471" y="2272931"/>
+              <a:ext cx="2143475" cy="518653"/>
+            </a:xfrm>
+            <a:prstGeom prst="rect">
+              <a:avLst/>
+            </a:prstGeom>
             <a:solidFill>
-              <a:schemeClr val="bg1">
-                <a:lumMod val="65000"/>
+              <a:schemeClr val="bg1"/>
+            </a:solidFill>
+            <a:ln>
+              <a:solidFill>
+                <a:schemeClr val="tx1"/>
+              </a:solidFill>
+            </a:ln>
+          </p:spPr>
+          <p:style>
+            <a:lnRef idx="2">
+              <a:schemeClr val="accent1">
+                <a:shade val="50000"/>
               </a:schemeClr>
-            </a:solidFill>
-          </a:ln>
-        </p:spPr>
-        <p:style>
-          <a:lnRef idx="3">
-            <a:schemeClr val="lt1"/>
-          </a:lnRef>
-          <a:fillRef idx="1">
-            <a:schemeClr val="accent3"/>
-          </a:fillRef>
-          <a:effectRef idx="1">
-            <a:schemeClr val="accent3"/>
-          </a:effectRef>
-          <a:fontRef idx="minor">
-            <a:schemeClr val="lt1"/>
-          </a:fontRef>
-        </p:style>
-        <p:txBody>
-          <a:bodyPr rtlCol="0" anchor="ctr"/>
-          <a:lstStyle/>
-          <a:p>
-            <a:pPr algn="ctr"/>
-            <a:endParaRPr lang="en-US" sz="3200" dirty="0">
-              <a:latin typeface="Baskerville" charset="0"/>
-              <a:ea typeface="Baskerville" charset="0"/>
-              <a:cs typeface="Baskerville" charset="0"/>
-            </a:endParaRPr>
-          </a:p>
-        </p:txBody>
-      </p:sp>
-      <p:sp>
-        <p:nvSpPr>
-          <p:cNvPr id="6" name="Rectangle 5"/>
-          <p:cNvSpPr/>
-          <p:nvPr/>
-        </p:nvSpPr>
-        <p:spPr>
-          <a:xfrm>
-            <a:off x="2630471" y="2272931"/>
-            <a:ext cx="2143475" cy="518653"/>
-          </a:xfrm>
-          <a:prstGeom prst="rect">
-            <a:avLst/>
-          </a:prstGeom>
-          <a:solidFill>
-            <a:schemeClr val="bg1"/>
-          </a:solidFill>
-          <a:ln>
-            <a:solidFill>
-              <a:schemeClr val="tx1"/>
-            </a:solidFill>
-          </a:ln>
-        </p:spPr>
-        <p:style>
-          <a:lnRef idx="2">
-            <a:schemeClr val="accent1">
-              <a:shade val="50000"/>
-            </a:schemeClr>
-          </a:lnRef>
-          <a:fillRef idx="1">
-            <a:schemeClr val="accent1"/>
-          </a:fillRef>
-          <a:effectRef idx="0">
-            <a:schemeClr val="accent1"/>
-          </a:effectRef>
-          <a:fontRef idx="minor">
-            <a:schemeClr val="lt1"/>
-          </a:fontRef>
-        </p:style>
-        <p:txBody>
-          <a:bodyPr rtlCol="0" anchor="ctr"/>
-          <a:lstStyle/>
-          <a:p>
-            <a:pPr algn="ctr"/>
-            <a:r>
-              <a:rPr lang="en-US" sz="2400" dirty="0" err="1" smtClean="0">
+            </a:lnRef>
+            <a:fillRef idx="1">
+              <a:schemeClr val="accent1"/>
+            </a:fillRef>
+            <a:effectRef idx="0">
+              <a:schemeClr val="accent1"/>
+            </a:effectRef>
+            <a:fontRef idx="minor">
+              <a:schemeClr val="lt1"/>
+            </a:fontRef>
+          </p:style>
+          <p:txBody>
+            <a:bodyPr rtlCol="0" anchor="ctr"/>
+            <a:lstStyle/>
+            <a:p>
+              <a:pPr algn="ctr"/>
+              <a:r>
+                <a:rPr lang="en-US" sz="2400" dirty="0" err="1" smtClean="0">
+                  <a:solidFill>
+                    <a:sysClr val="windowText" lastClr="000000"/>
+                  </a:solidFill>
+                  <a:latin typeface="Baskerville" charset="0"/>
+                  <a:ea typeface="Baskerville" charset="0"/>
+                  <a:cs typeface="Baskerville" charset="0"/>
+                </a:rPr>
+                <a:t>Localisation</a:t>
+              </a:r>
+              <a:endParaRPr lang="en-US" sz="2400" dirty="0">
                 <a:solidFill>
                   <a:sysClr val="windowText" lastClr="000000"/>
                 </a:solidFill>
                 <a:latin typeface="Baskerville" charset="0"/>
                 <a:ea typeface="Baskerville" charset="0"/>
                 <a:cs typeface="Baskerville" charset="0"/>
-              </a:rPr>
-              <a:t>Localisation</a:t>
-            </a:r>
-            <a:endParaRPr lang="en-US" sz="2400" dirty="0">
+              </a:endParaRPr>
+            </a:p>
+          </p:txBody>
+        </p:sp>
+        <p:sp>
+          <p:nvSpPr>
+            <p:cNvPr id="7" name="Rectangle 6"/>
+            <p:cNvSpPr/>
+            <p:nvPr/>
+          </p:nvSpPr>
+          <p:spPr>
+            <a:xfrm>
+              <a:off x="2630471" y="2943305"/>
+              <a:ext cx="2143475" cy="518653"/>
+            </a:xfrm>
+            <a:prstGeom prst="rect">
+              <a:avLst/>
+            </a:prstGeom>
+            <a:solidFill>
+              <a:schemeClr val="bg1"/>
+            </a:solidFill>
+            <a:ln>
               <a:solidFill>
-                <a:sysClr val="windowText" lastClr="000000"/>
+                <a:schemeClr val="tx1"/>
               </a:solidFill>
-              <a:latin typeface="Baskerville" charset="0"/>
-              <a:ea typeface="Baskerville" charset="0"/>
-              <a:cs typeface="Baskerville" charset="0"/>
-            </a:endParaRPr>
-          </a:p>
-        </p:txBody>
-      </p:sp>
-      <p:sp>
-        <p:nvSpPr>
-          <p:cNvPr id="7" name="Rectangle 6"/>
-          <p:cNvSpPr/>
-          <p:nvPr/>
-        </p:nvSpPr>
-        <p:spPr>
-          <a:xfrm>
-            <a:off x="2630471" y="2943305"/>
-            <a:ext cx="2143475" cy="518653"/>
-          </a:xfrm>
-          <a:prstGeom prst="rect">
-            <a:avLst/>
-          </a:prstGeom>
-          <a:solidFill>
-            <a:schemeClr val="bg1"/>
-          </a:solidFill>
-          <a:ln>
-            <a:solidFill>
-              <a:schemeClr val="tx1"/>
-            </a:solidFill>
-          </a:ln>
-        </p:spPr>
-        <p:style>
-          <a:lnRef idx="2">
-            <a:schemeClr val="accent1">
-              <a:shade val="50000"/>
-            </a:schemeClr>
-          </a:lnRef>
-          <a:fillRef idx="1">
-            <a:schemeClr val="accent1"/>
-          </a:fillRef>
-          <a:effectRef idx="0">
-            <a:schemeClr val="accent1"/>
-          </a:effectRef>
-          <a:fontRef idx="minor">
-            <a:schemeClr val="lt1"/>
-          </a:fontRef>
-        </p:style>
-        <p:txBody>
-          <a:bodyPr lIns="36000" rIns="36000" rtlCol="0" anchor="ctr"/>
-          <a:lstStyle/>
-          <a:p>
-            <a:pPr algn="ctr"/>
-            <a:r>
-              <a:rPr lang="en-US" sz="2400" dirty="0" smtClean="0">
+            </a:ln>
+          </p:spPr>
+          <p:style>
+            <a:lnRef idx="2">
+              <a:schemeClr val="accent1">
+                <a:shade val="50000"/>
+              </a:schemeClr>
+            </a:lnRef>
+            <a:fillRef idx="1">
+              <a:schemeClr val="accent1"/>
+            </a:fillRef>
+            <a:effectRef idx="0">
+              <a:schemeClr val="accent1"/>
+            </a:effectRef>
+            <a:fontRef idx="minor">
+              <a:schemeClr val="lt1"/>
+            </a:fontRef>
+          </p:style>
+          <p:txBody>
+            <a:bodyPr lIns="36000" rIns="36000" rtlCol="0" anchor="ctr"/>
+            <a:lstStyle/>
+            <a:p>
+              <a:pPr algn="ctr"/>
+              <a:r>
+                <a:rPr lang="en-US" sz="2400" dirty="0" smtClean="0">
+                  <a:solidFill>
+                    <a:sysClr val="windowText" lastClr="000000"/>
+                  </a:solidFill>
+                  <a:latin typeface="Baskerville" charset="0"/>
+                  <a:ea typeface="Baskerville" charset="0"/>
+                  <a:cs typeface="Baskerville" charset="0"/>
+                </a:rPr>
+                <a:t>Sensor data</a:t>
+              </a:r>
+              <a:endParaRPr lang="en-US" sz="2400" dirty="0">
                 <a:solidFill>
                   <a:sysClr val="windowText" lastClr="000000"/>
                 </a:solidFill>
                 <a:latin typeface="Baskerville" charset="0"/>
                 <a:ea typeface="Baskerville" charset="0"/>
                 <a:cs typeface="Baskerville" charset="0"/>
-              </a:rPr>
-              <a:t>Sensor data</a:t>
-            </a:r>
-            <a:endParaRPr lang="en-US" sz="2400" dirty="0">
+              </a:endParaRPr>
+            </a:p>
+          </p:txBody>
+        </p:sp>
+        <p:sp>
+          <p:nvSpPr>
+            <p:cNvPr id="8" name="Rectangle 7"/>
+            <p:cNvSpPr/>
+            <p:nvPr/>
+          </p:nvSpPr>
+          <p:spPr>
+            <a:xfrm>
+              <a:off x="2630471" y="3613679"/>
+              <a:ext cx="2143475" cy="518653"/>
+            </a:xfrm>
+            <a:prstGeom prst="rect">
+              <a:avLst/>
+            </a:prstGeom>
+            <a:solidFill>
+              <a:schemeClr val="bg1"/>
+            </a:solidFill>
+            <a:ln>
               <a:solidFill>
-                <a:sysClr val="windowText" lastClr="000000"/>
+                <a:schemeClr val="tx1"/>
               </a:solidFill>
-              <a:latin typeface="Baskerville" charset="0"/>
-              <a:ea typeface="Baskerville" charset="0"/>
-              <a:cs typeface="Baskerville" charset="0"/>
-            </a:endParaRPr>
-          </a:p>
-        </p:txBody>
-      </p:sp>
-      <p:sp>
-        <p:nvSpPr>
-          <p:cNvPr id="8" name="Rectangle 7"/>
-          <p:cNvSpPr/>
-          <p:nvPr/>
-        </p:nvSpPr>
-        <p:spPr>
-          <a:xfrm>
-            <a:off x="2630471" y="3613679"/>
-            <a:ext cx="2143475" cy="518653"/>
-          </a:xfrm>
-          <a:prstGeom prst="rect">
-            <a:avLst/>
-          </a:prstGeom>
-          <a:solidFill>
-            <a:schemeClr val="bg1"/>
-          </a:solidFill>
-          <a:ln>
-            <a:solidFill>
-              <a:schemeClr val="tx1"/>
-            </a:solidFill>
-          </a:ln>
-        </p:spPr>
-        <p:style>
-          <a:lnRef idx="2">
-            <a:schemeClr val="accent1">
-              <a:shade val="50000"/>
-            </a:schemeClr>
-          </a:lnRef>
-          <a:fillRef idx="1">
-            <a:schemeClr val="accent1"/>
-          </a:fillRef>
-          <a:effectRef idx="0">
-            <a:schemeClr val="accent1"/>
-          </a:effectRef>
-          <a:fontRef idx="minor">
-            <a:schemeClr val="lt1"/>
-          </a:fontRef>
-        </p:style>
-        <p:txBody>
-          <a:bodyPr lIns="36000" rIns="36000" rtlCol="0" anchor="ctr"/>
-          <a:lstStyle/>
-          <a:p>
-            <a:pPr algn="ctr"/>
-            <a:r>
-              <a:rPr lang="en-US" sz="2400" smtClean="0">
+            </a:ln>
+          </p:spPr>
+          <p:style>
+            <a:lnRef idx="2">
+              <a:schemeClr val="accent1">
+                <a:shade val="50000"/>
+              </a:schemeClr>
+            </a:lnRef>
+            <a:fillRef idx="1">
+              <a:schemeClr val="accent1"/>
+            </a:fillRef>
+            <a:effectRef idx="0">
+              <a:schemeClr val="accent1"/>
+            </a:effectRef>
+            <a:fontRef idx="minor">
+              <a:schemeClr val="lt1"/>
+            </a:fontRef>
+          </p:style>
+          <p:txBody>
+            <a:bodyPr lIns="36000" rIns="36000" rtlCol="0" anchor="ctr"/>
+            <a:lstStyle/>
+            <a:p>
+              <a:pPr algn="ctr"/>
+              <a:r>
+                <a:rPr lang="en-US" sz="2400" smtClean="0">
+                  <a:solidFill>
+                    <a:sysClr val="windowText" lastClr="000000"/>
+                  </a:solidFill>
+                  <a:latin typeface="Baskerville" charset="0"/>
+                  <a:ea typeface="Baskerville" charset="0"/>
+                  <a:cs typeface="Baskerville" charset="0"/>
+                </a:rPr>
+                <a:t>Transformations</a:t>
+              </a:r>
+              <a:endParaRPr lang="en-US" sz="2400" dirty="0">
                 <a:solidFill>
                   <a:sysClr val="windowText" lastClr="000000"/>
                 </a:solidFill>
                 <a:latin typeface="Baskerville" charset="0"/>
                 <a:ea typeface="Baskerville" charset="0"/>
                 <a:cs typeface="Baskerville" charset="0"/>
-              </a:rPr>
-              <a:t>Transformations</a:t>
-            </a:r>
-            <a:endParaRPr lang="en-US" sz="2400" dirty="0">
+              </a:endParaRPr>
+            </a:p>
+          </p:txBody>
+        </p:sp>
+        <p:sp>
+          <p:nvSpPr>
+            <p:cNvPr id="19" name="Rectangle 18"/>
+            <p:cNvSpPr/>
+            <p:nvPr/>
+          </p:nvSpPr>
+          <p:spPr>
+            <a:xfrm>
+              <a:off x="9933024" y="3890373"/>
+              <a:ext cx="2142000" cy="774749"/>
+            </a:xfrm>
+            <a:prstGeom prst="rect">
+              <a:avLst/>
+            </a:prstGeom>
+            <a:solidFill>
+              <a:schemeClr val="bg1"/>
+            </a:solidFill>
+            <a:ln>
               <a:solidFill>
-                <a:sysClr val="windowText" lastClr="000000"/>
+                <a:schemeClr val="tx1"/>
               </a:solidFill>
-              <a:latin typeface="Baskerville" charset="0"/>
-              <a:ea typeface="Baskerville" charset="0"/>
-              <a:cs typeface="Baskerville" charset="0"/>
-            </a:endParaRPr>
-          </a:p>
-        </p:txBody>
-      </p:sp>
-      <p:sp>
-        <p:nvSpPr>
-          <p:cNvPr id="19" name="Rectangle 18"/>
-          <p:cNvSpPr/>
-          <p:nvPr/>
-        </p:nvSpPr>
-        <p:spPr>
-          <a:xfrm>
-            <a:off x="9933024" y="3890373"/>
-            <a:ext cx="2142000" cy="774749"/>
-          </a:xfrm>
-          <a:prstGeom prst="rect">
-            <a:avLst/>
-          </a:prstGeom>
-          <a:solidFill>
-            <a:schemeClr val="bg1"/>
-          </a:solidFill>
-          <a:ln>
-            <a:solidFill>
-              <a:schemeClr val="tx1"/>
-            </a:solidFill>
-          </a:ln>
-        </p:spPr>
-        <p:style>
-          <a:lnRef idx="2">
-            <a:schemeClr val="accent1">
-              <a:shade val="50000"/>
-            </a:schemeClr>
-          </a:lnRef>
-          <a:fillRef idx="1">
-            <a:schemeClr val="accent1"/>
-          </a:fillRef>
-          <a:effectRef idx="0">
-            <a:schemeClr val="accent1"/>
-          </a:effectRef>
-          <a:fontRef idx="minor">
-            <a:schemeClr val="lt1"/>
-          </a:fontRef>
-        </p:style>
-        <p:txBody>
-          <a:bodyPr rtlCol="0" anchor="ctr"/>
-          <a:lstStyle/>
-          <a:p>
-            <a:pPr algn="ctr"/>
-            <a:r>
-              <a:rPr lang="en-US" sz="2400" dirty="0" smtClean="0">
+            </a:ln>
+          </p:spPr>
+          <p:style>
+            <a:lnRef idx="2">
+              <a:schemeClr val="accent1">
+                <a:shade val="50000"/>
+              </a:schemeClr>
+            </a:lnRef>
+            <a:fillRef idx="1">
+              <a:schemeClr val="accent1"/>
+            </a:fillRef>
+            <a:effectRef idx="0">
+              <a:schemeClr val="accent1"/>
+            </a:effectRef>
+            <a:fontRef idx="minor">
+              <a:schemeClr val="lt1"/>
+            </a:fontRef>
+          </p:style>
+          <p:txBody>
+            <a:bodyPr rtlCol="0" anchor="ctr"/>
+            <a:lstStyle/>
+            <a:p>
+              <a:pPr algn="ctr"/>
+              <a:r>
+                <a:rPr lang="en-US" sz="2400" dirty="0" smtClean="0">
+                  <a:solidFill>
+                    <a:sysClr val="windowText" lastClr="000000"/>
+                  </a:solidFill>
+                  <a:latin typeface="Baskerville" charset="0"/>
+                  <a:ea typeface="Baskerville" charset="0"/>
+                  <a:cs typeface="Baskerville" charset="0"/>
+                </a:rPr>
+                <a:t>Velocity</a:t>
+              </a:r>
+              <a:br>
+                <a:rPr lang="en-US" sz="2400" dirty="0" smtClean="0">
+                  <a:solidFill>
+                    <a:sysClr val="windowText" lastClr="000000"/>
+                  </a:solidFill>
+                  <a:latin typeface="Baskerville" charset="0"/>
+                  <a:ea typeface="Baskerville" charset="0"/>
+                  <a:cs typeface="Baskerville" charset="0"/>
+                </a:rPr>
+              </a:br>
+              <a:r>
+                <a:rPr lang="en-US" sz="2400" dirty="0" smtClean="0">
+                  <a:solidFill>
+                    <a:sysClr val="windowText" lastClr="000000"/>
+                  </a:solidFill>
+                  <a:latin typeface="Baskerville" charset="0"/>
+                  <a:ea typeface="Baskerville" charset="0"/>
+                  <a:cs typeface="Baskerville" charset="0"/>
+                </a:rPr>
+                <a:t>commands</a:t>
+              </a:r>
+              <a:endParaRPr lang="en-US" sz="2400" dirty="0">
                 <a:solidFill>
                   <a:sysClr val="windowText" lastClr="000000"/>
                 </a:solidFill>
                 <a:latin typeface="Baskerville" charset="0"/>
                 <a:ea typeface="Baskerville" charset="0"/>
                 <a:cs typeface="Baskerville" charset="0"/>
-              </a:rPr>
-              <a:t>Velocity</a:t>
-            </a:r>
-            <a:br>
-              <a:rPr lang="en-US" sz="2400" dirty="0" smtClean="0">
+              </a:endParaRPr>
+            </a:p>
+          </p:txBody>
+        </p:sp>
+        <p:sp>
+          <p:nvSpPr>
+            <p:cNvPr id="22" name="Rectangle 21"/>
+            <p:cNvSpPr/>
+            <p:nvPr/>
+          </p:nvSpPr>
+          <p:spPr>
+            <a:xfrm>
+              <a:off x="2630472" y="4277748"/>
+              <a:ext cx="2143474" cy="518653"/>
+            </a:xfrm>
+            <a:prstGeom prst="rect">
+              <a:avLst/>
+            </a:prstGeom>
+            <a:solidFill>
+              <a:schemeClr val="bg1"/>
+            </a:solidFill>
+            <a:ln>
+              <a:solidFill>
+                <a:schemeClr val="tx1"/>
+              </a:solidFill>
+            </a:ln>
+          </p:spPr>
+          <p:style>
+            <a:lnRef idx="2">
+              <a:schemeClr val="accent1">
+                <a:shade val="50000"/>
+              </a:schemeClr>
+            </a:lnRef>
+            <a:fillRef idx="1">
+              <a:schemeClr val="accent1"/>
+            </a:fillRef>
+            <a:effectRef idx="0">
+              <a:schemeClr val="accent1"/>
+            </a:effectRef>
+            <a:fontRef idx="minor">
+              <a:schemeClr val="lt1"/>
+            </a:fontRef>
+          </p:style>
+          <p:txBody>
+            <a:bodyPr rtlCol="0" anchor="ctr"/>
+            <a:lstStyle/>
+            <a:p>
+              <a:pPr algn="ctr"/>
+              <a:r>
+                <a:rPr lang="en-US" sz="2400" dirty="0" err="1" smtClean="0">
+                  <a:solidFill>
+                    <a:sysClr val="windowText" lastClr="000000"/>
+                  </a:solidFill>
+                  <a:latin typeface="Baskerville" charset="0"/>
+                  <a:ea typeface="Baskerville" charset="0"/>
+                  <a:cs typeface="Baskerville" charset="0"/>
+                </a:rPr>
+                <a:t>Odometry</a:t>
+              </a:r>
+              <a:endParaRPr lang="en-US" sz="2400" dirty="0">
                 <a:solidFill>
                   <a:sysClr val="windowText" lastClr="000000"/>
                 </a:solidFill>
                 <a:latin typeface="Baskerville" charset="0"/>
                 <a:ea typeface="Baskerville" charset="0"/>
                 <a:cs typeface="Baskerville" charset="0"/>
-              </a:rPr>
-            </a:br>
-            <a:r>
-              <a:rPr lang="en-US" sz="2400" dirty="0" smtClean="0">
-                <a:solidFill>
-                  <a:sysClr val="windowText" lastClr="000000"/>
-                </a:solidFill>
-                <a:latin typeface="Baskerville" charset="0"/>
-                <a:ea typeface="Baskerville" charset="0"/>
-                <a:cs typeface="Baskerville" charset="0"/>
-              </a:rPr>
-              <a:t>commands</a:t>
-            </a:r>
-            <a:endParaRPr lang="en-US" sz="2400" dirty="0">
-              <a:solidFill>
-                <a:sysClr val="windowText" lastClr="000000"/>
-              </a:solidFill>
-              <a:latin typeface="Baskerville" charset="0"/>
-              <a:ea typeface="Baskerville" charset="0"/>
-              <a:cs typeface="Baskerville" charset="0"/>
-            </a:endParaRPr>
-          </a:p>
-        </p:txBody>
-      </p:sp>
-      <p:sp>
-        <p:nvSpPr>
-          <p:cNvPr id="22" name="Rectangle 21"/>
-          <p:cNvSpPr/>
-          <p:nvPr/>
-        </p:nvSpPr>
-        <p:spPr>
-          <a:xfrm>
-            <a:off x="2630472" y="4277748"/>
-            <a:ext cx="2143474" cy="518653"/>
-          </a:xfrm>
-          <a:prstGeom prst="rect">
-            <a:avLst/>
-          </a:prstGeom>
-          <a:solidFill>
-            <a:schemeClr val="bg1"/>
-          </a:solidFill>
-          <a:ln>
-            <a:solidFill>
-              <a:schemeClr val="tx1"/>
-            </a:solidFill>
-          </a:ln>
-        </p:spPr>
-        <p:style>
-          <a:lnRef idx="2">
-            <a:schemeClr val="accent1">
-              <a:shade val="50000"/>
-            </a:schemeClr>
-          </a:lnRef>
-          <a:fillRef idx="1">
-            <a:schemeClr val="accent1"/>
-          </a:fillRef>
-          <a:effectRef idx="0">
-            <a:schemeClr val="accent1"/>
-          </a:effectRef>
-          <a:fontRef idx="minor">
-            <a:schemeClr val="lt1"/>
-          </a:fontRef>
-        </p:style>
-        <p:txBody>
-          <a:bodyPr rtlCol="0" anchor="ctr"/>
-          <a:lstStyle/>
-          <a:p>
-            <a:pPr algn="ctr"/>
-            <a:r>
-              <a:rPr lang="en-US" sz="2400" dirty="0" err="1" smtClean="0">
-                <a:solidFill>
-                  <a:sysClr val="windowText" lastClr="000000"/>
-                </a:solidFill>
-                <a:latin typeface="Baskerville" charset="0"/>
-                <a:ea typeface="Baskerville" charset="0"/>
-                <a:cs typeface="Baskerville" charset="0"/>
-              </a:rPr>
-              <a:t>Odometry</a:t>
-            </a:r>
-            <a:endParaRPr lang="en-US" sz="2400" dirty="0">
-              <a:solidFill>
-                <a:sysClr val="windowText" lastClr="000000"/>
-              </a:solidFill>
-              <a:latin typeface="Baskerville" charset="0"/>
-              <a:ea typeface="Baskerville" charset="0"/>
-              <a:cs typeface="Baskerville" charset="0"/>
-            </a:endParaRPr>
-          </a:p>
-        </p:txBody>
-      </p:sp>
-      <p:sp>
-        <p:nvSpPr>
-          <p:cNvPr id="21" name="Rectangle 20"/>
-          <p:cNvSpPr/>
-          <p:nvPr/>
-        </p:nvSpPr>
-        <p:spPr>
-          <a:xfrm>
-            <a:off x="5419570" y="1320878"/>
-            <a:ext cx="1348033" cy="226243"/>
-          </a:xfrm>
-          <a:prstGeom prst="rect">
-            <a:avLst/>
-          </a:prstGeom>
-          <a:solidFill>
-            <a:schemeClr val="bg1">
-              <a:lumMod val="65000"/>
-            </a:schemeClr>
-          </a:solidFill>
-          <a:ln w="57150">
+              </a:endParaRPr>
+            </a:p>
+          </p:txBody>
+        </p:sp>
+        <p:sp>
+          <p:nvSpPr>
+            <p:cNvPr id="21" name="Rectangle 20"/>
+            <p:cNvSpPr/>
+            <p:nvPr/>
+          </p:nvSpPr>
+          <p:spPr>
+            <a:xfrm>
+              <a:off x="5419570" y="1320878"/>
+              <a:ext cx="1348033" cy="226243"/>
+            </a:xfrm>
+            <a:prstGeom prst="rect">
+              <a:avLst/>
+            </a:prstGeom>
             <a:solidFill>
               <a:schemeClr val="bg1">
                 <a:lumMod val="65000"/>
               </a:schemeClr>
             </a:solidFill>
-          </a:ln>
-        </p:spPr>
-        <p:style>
-          <a:lnRef idx="2">
-            <a:schemeClr val="accent1">
-              <a:shade val="50000"/>
-            </a:schemeClr>
-          </a:lnRef>
-          <a:fillRef idx="1">
-            <a:schemeClr val="accent1"/>
-          </a:fillRef>
-          <a:effectRef idx="0">
-            <a:schemeClr val="accent1"/>
-          </a:effectRef>
-          <a:fontRef idx="minor">
-            <a:schemeClr val="lt1"/>
-          </a:fontRef>
-        </p:style>
-        <p:txBody>
-          <a:bodyPr rtlCol="0" anchor="ctr"/>
-          <a:lstStyle/>
-          <a:p>
-            <a:pPr algn="ctr"/>
-            <a:r>
-              <a:rPr lang="en-US" dirty="0" err="1" smtClean="0">
+            <a:ln w="57150">
+              <a:solidFill>
+                <a:schemeClr val="bg1">
+                  <a:lumMod val="65000"/>
+                </a:schemeClr>
+              </a:solidFill>
+            </a:ln>
+          </p:spPr>
+          <p:style>
+            <a:lnRef idx="2">
+              <a:schemeClr val="accent1">
+                <a:shade val="50000"/>
+              </a:schemeClr>
+            </a:lnRef>
+            <a:fillRef idx="1">
+              <a:schemeClr val="accent1"/>
+            </a:fillRef>
+            <a:effectRef idx="0">
+              <a:schemeClr val="accent1"/>
+            </a:effectRef>
+            <a:fontRef idx="minor">
+              <a:schemeClr val="lt1"/>
+            </a:fontRef>
+          </p:style>
+          <p:txBody>
+            <a:bodyPr rtlCol="0" anchor="ctr"/>
+            <a:lstStyle/>
+            <a:p>
+              <a:pPr algn="ctr"/>
+              <a:r>
+                <a:rPr lang="en-US" sz="2000" dirty="0" err="1" smtClean="0">
+                  <a:latin typeface="Baskerville" charset="0"/>
+                  <a:ea typeface="Baskerville" charset="0"/>
+                  <a:cs typeface="Baskerville" charset="0"/>
+                </a:rPr>
+                <a:t>move_base</a:t>
+              </a:r>
+              <a:endParaRPr lang="en-US" sz="2000" dirty="0">
                 <a:latin typeface="Baskerville" charset="0"/>
                 <a:ea typeface="Baskerville" charset="0"/>
                 <a:cs typeface="Baskerville" charset="0"/>
-              </a:rPr>
-              <a:t>move_base</a:t>
-            </a:r>
-            <a:endParaRPr lang="en-US" dirty="0">
-              <a:latin typeface="Baskerville" charset="0"/>
-              <a:ea typeface="Baskerville" charset="0"/>
-              <a:cs typeface="Baskerville" charset="0"/>
-            </a:endParaRPr>
-          </a:p>
-        </p:txBody>
-      </p:sp>
-      <p:sp>
-        <p:nvSpPr>
-          <p:cNvPr id="24" name="Rectangle 23"/>
-          <p:cNvSpPr/>
-          <p:nvPr/>
-        </p:nvSpPr>
-        <p:spPr>
-          <a:xfrm>
-            <a:off x="5704586" y="1861771"/>
-            <a:ext cx="1531491" cy="479422"/>
-          </a:xfrm>
-          <a:prstGeom prst="rect">
-            <a:avLst/>
-          </a:prstGeom>
-          <a:noFill/>
-          <a:ln>
-            <a:solidFill>
-              <a:schemeClr val="tx1"/>
-            </a:solidFill>
-          </a:ln>
-        </p:spPr>
-        <p:style>
-          <a:lnRef idx="2">
-            <a:schemeClr val="accent1">
-              <a:shade val="50000"/>
-            </a:schemeClr>
-          </a:lnRef>
-          <a:fillRef idx="1">
-            <a:schemeClr val="accent1"/>
-          </a:fillRef>
-          <a:effectRef idx="0">
-            <a:schemeClr val="accent1"/>
-          </a:effectRef>
-          <a:fontRef idx="minor">
-            <a:schemeClr val="lt1"/>
-          </a:fontRef>
-        </p:style>
-        <p:txBody>
-          <a:bodyPr lIns="36000" rIns="36000" rtlCol="0" anchor="ctr"/>
-          <a:lstStyle/>
-          <a:p>
-            <a:pPr algn="ctr"/>
-            <a:r>
-              <a:rPr lang="en-US" sz="1600" dirty="0" smtClean="0">
+              </a:endParaRPr>
+            </a:p>
+          </p:txBody>
+        </p:sp>
+        <p:sp>
+          <p:nvSpPr>
+            <p:cNvPr id="24" name="Rectangle 23"/>
+            <p:cNvSpPr/>
+            <p:nvPr/>
+          </p:nvSpPr>
+          <p:spPr>
+            <a:xfrm>
+              <a:off x="5704586" y="1861771"/>
+              <a:ext cx="1531491" cy="479422"/>
+            </a:xfrm>
+            <a:prstGeom prst="rect">
+              <a:avLst/>
+            </a:prstGeom>
+            <a:noFill/>
+            <a:ln>
+              <a:solidFill>
+                <a:schemeClr val="tx1"/>
+              </a:solidFill>
+            </a:ln>
+          </p:spPr>
+          <p:style>
+            <a:lnRef idx="2">
+              <a:schemeClr val="accent1">
+                <a:shade val="50000"/>
+              </a:schemeClr>
+            </a:lnRef>
+            <a:fillRef idx="1">
+              <a:schemeClr val="accent1"/>
+            </a:fillRef>
+            <a:effectRef idx="0">
+              <a:schemeClr val="accent1"/>
+            </a:effectRef>
+            <a:fontRef idx="minor">
+              <a:schemeClr val="lt1"/>
+            </a:fontRef>
+          </p:style>
+          <p:txBody>
+            <a:bodyPr lIns="36000" rIns="36000" rtlCol="0" anchor="ctr"/>
+            <a:lstStyle/>
+            <a:p>
+              <a:pPr algn="ctr"/>
+              <a:r>
+                <a:rPr lang="en-US" dirty="0" err="1">
+                  <a:solidFill>
+                    <a:schemeClr val="tx1"/>
+                  </a:solidFill>
+                  <a:latin typeface="Baskerville" charset="0"/>
+                  <a:ea typeface="Baskerville" charset="0"/>
+                  <a:cs typeface="Baskerville" charset="0"/>
+                </a:rPr>
+                <a:t>g</a:t>
+              </a:r>
+              <a:r>
+                <a:rPr lang="en-US" dirty="0" err="1" smtClean="0">
+                  <a:solidFill>
+                    <a:schemeClr val="tx1"/>
+                  </a:solidFill>
+                  <a:latin typeface="Baskerville" charset="0"/>
+                  <a:ea typeface="Baskerville" charset="0"/>
+                  <a:cs typeface="Baskerville" charset="0"/>
+                </a:rPr>
+                <a:t>lobal_costmap</a:t>
+              </a:r>
+              <a:endParaRPr lang="en-US" dirty="0">
                 <a:solidFill>
                   <a:schemeClr val="tx1"/>
                 </a:solidFill>
                 <a:latin typeface="Baskerville" charset="0"/>
                 <a:ea typeface="Baskerville" charset="0"/>
                 <a:cs typeface="Baskerville" charset="0"/>
-              </a:rPr>
-              <a:t>Global </a:t>
-            </a:r>
-            <a:r>
-              <a:rPr lang="en-US" sz="1600" dirty="0" err="1" smtClean="0">
+              </a:endParaRPr>
+            </a:p>
+          </p:txBody>
+        </p:sp>
+        <p:sp>
+          <p:nvSpPr>
+            <p:cNvPr id="25" name="Rectangle 24"/>
+            <p:cNvSpPr/>
+            <p:nvPr/>
+          </p:nvSpPr>
+          <p:spPr>
+            <a:xfrm>
+              <a:off x="5704587" y="4038037"/>
+              <a:ext cx="1531491" cy="479422"/>
+            </a:xfrm>
+            <a:prstGeom prst="rect">
+              <a:avLst/>
+            </a:prstGeom>
+            <a:noFill/>
+            <a:ln>
+              <a:solidFill>
+                <a:schemeClr val="tx1"/>
+              </a:solidFill>
+            </a:ln>
+          </p:spPr>
+          <p:style>
+            <a:lnRef idx="2">
+              <a:schemeClr val="accent1">
+                <a:shade val="50000"/>
+              </a:schemeClr>
+            </a:lnRef>
+            <a:fillRef idx="1">
+              <a:schemeClr val="accent1"/>
+            </a:fillRef>
+            <a:effectRef idx="0">
+              <a:schemeClr val="accent1"/>
+            </a:effectRef>
+            <a:fontRef idx="minor">
+              <a:schemeClr val="lt1"/>
+            </a:fontRef>
+          </p:style>
+          <p:txBody>
+            <a:bodyPr lIns="36000" rIns="36000" rtlCol="0" anchor="ctr"/>
+            <a:lstStyle/>
+            <a:p>
+              <a:pPr algn="ctr"/>
+              <a:r>
+                <a:rPr lang="en-US" dirty="0" err="1" smtClean="0">
+                  <a:solidFill>
+                    <a:schemeClr val="tx1"/>
+                  </a:solidFill>
+                  <a:latin typeface="Baskerville" charset="0"/>
+                  <a:ea typeface="Baskerville" charset="0"/>
+                  <a:cs typeface="Baskerville" charset="0"/>
+                </a:rPr>
+                <a:t>local_costmap</a:t>
+              </a:r>
+              <a:endParaRPr lang="en-US" dirty="0">
                 <a:solidFill>
                   <a:schemeClr val="tx1"/>
                 </a:solidFill>
                 <a:latin typeface="Baskerville" charset="0"/>
                 <a:ea typeface="Baskerville" charset="0"/>
                 <a:cs typeface="Baskerville" charset="0"/>
-              </a:rPr>
-              <a:t>Costmap</a:t>
-            </a:r>
-            <a:endParaRPr lang="en-US" dirty="0">
+              </a:endParaRPr>
+            </a:p>
+          </p:txBody>
+        </p:sp>
+        <p:sp>
+          <p:nvSpPr>
+            <p:cNvPr id="26" name="Rectangle 25"/>
+            <p:cNvSpPr/>
+            <p:nvPr/>
+          </p:nvSpPr>
+          <p:spPr>
+            <a:xfrm>
+              <a:off x="7495992" y="1861771"/>
+              <a:ext cx="1531491" cy="479422"/>
+            </a:xfrm>
+            <a:prstGeom prst="rect">
+              <a:avLst/>
+            </a:prstGeom>
+            <a:noFill/>
+            <a:ln>
               <a:solidFill>
                 <a:schemeClr val="tx1"/>
               </a:solidFill>
-              <a:latin typeface="Baskerville" charset="0"/>
-              <a:ea typeface="Baskerville" charset="0"/>
-              <a:cs typeface="Baskerville" charset="0"/>
-            </a:endParaRPr>
-          </a:p>
-        </p:txBody>
-      </p:sp>
-      <p:sp>
-        <p:nvSpPr>
-          <p:cNvPr id="25" name="Rectangle 24"/>
-          <p:cNvSpPr/>
-          <p:nvPr/>
-        </p:nvSpPr>
-        <p:spPr>
-          <a:xfrm>
-            <a:off x="5704587" y="4038037"/>
-            <a:ext cx="1531491" cy="479422"/>
-          </a:xfrm>
-          <a:prstGeom prst="rect">
-            <a:avLst/>
-          </a:prstGeom>
-          <a:noFill/>
-          <a:ln>
-            <a:solidFill>
-              <a:schemeClr val="tx1"/>
-            </a:solidFill>
-          </a:ln>
-        </p:spPr>
-        <p:style>
-          <a:lnRef idx="2">
-            <a:schemeClr val="accent1">
-              <a:shade val="50000"/>
-            </a:schemeClr>
-          </a:lnRef>
-          <a:fillRef idx="1">
-            <a:schemeClr val="accent1"/>
-          </a:fillRef>
-          <a:effectRef idx="0">
-            <a:schemeClr val="accent1"/>
-          </a:effectRef>
-          <a:fontRef idx="minor">
-            <a:schemeClr val="lt1"/>
-          </a:fontRef>
-        </p:style>
-        <p:txBody>
-          <a:bodyPr lIns="36000" rIns="36000" rtlCol="0" anchor="ctr"/>
-          <a:lstStyle/>
-          <a:p>
-            <a:pPr algn="ctr"/>
-            <a:r>
-              <a:rPr lang="en-US" sz="1600">
+            </a:ln>
+          </p:spPr>
+          <p:style>
+            <a:lnRef idx="2">
+              <a:schemeClr val="accent1">
+                <a:shade val="50000"/>
+              </a:schemeClr>
+            </a:lnRef>
+            <a:fillRef idx="1">
+              <a:schemeClr val="accent1"/>
+            </a:fillRef>
+            <a:effectRef idx="0">
+              <a:schemeClr val="accent1"/>
+            </a:effectRef>
+            <a:fontRef idx="minor">
+              <a:schemeClr val="lt1"/>
+            </a:fontRef>
+          </p:style>
+          <p:txBody>
+            <a:bodyPr lIns="36000" rIns="36000" rtlCol="0" anchor="ctr"/>
+            <a:lstStyle/>
+            <a:p>
+              <a:pPr algn="ctr"/>
+              <a:r>
+                <a:rPr lang="en-US" dirty="0" err="1" smtClean="0">
+                  <a:solidFill>
+                    <a:schemeClr val="tx1"/>
+                  </a:solidFill>
+                  <a:latin typeface="Baskerville" charset="0"/>
+                  <a:ea typeface="Baskerville" charset="0"/>
+                  <a:cs typeface="Baskerville" charset="0"/>
+                </a:rPr>
+                <a:t>global_planner</a:t>
+              </a:r>
+              <a:endParaRPr lang="en-US" dirty="0">
                 <a:solidFill>
                   <a:schemeClr val="tx1"/>
                 </a:solidFill>
                 <a:latin typeface="Baskerville" charset="0"/>
                 <a:ea typeface="Baskerville" charset="0"/>
                 <a:cs typeface="Baskerville" charset="0"/>
-              </a:rPr>
-              <a:t>L</a:t>
-            </a:r>
-            <a:r>
-              <a:rPr lang="en-US" sz="1600" smtClean="0">
+              </a:endParaRPr>
+            </a:p>
+          </p:txBody>
+        </p:sp>
+        <p:sp>
+          <p:nvSpPr>
+            <p:cNvPr id="27" name="Rectangle 26"/>
+            <p:cNvSpPr/>
+            <p:nvPr/>
+          </p:nvSpPr>
+          <p:spPr>
+            <a:xfrm>
+              <a:off x="7495993" y="4038037"/>
+              <a:ext cx="1531491" cy="479422"/>
+            </a:xfrm>
+            <a:prstGeom prst="rect">
+              <a:avLst/>
+            </a:prstGeom>
+            <a:noFill/>
+            <a:ln>
+              <a:solidFill>
+                <a:schemeClr val="tx1"/>
+              </a:solidFill>
+            </a:ln>
+          </p:spPr>
+          <p:style>
+            <a:lnRef idx="2">
+              <a:schemeClr val="accent1">
+                <a:shade val="50000"/>
+              </a:schemeClr>
+            </a:lnRef>
+            <a:fillRef idx="1">
+              <a:schemeClr val="accent1"/>
+            </a:fillRef>
+            <a:effectRef idx="0">
+              <a:schemeClr val="accent1"/>
+            </a:effectRef>
+            <a:fontRef idx="minor">
+              <a:schemeClr val="lt1"/>
+            </a:fontRef>
+          </p:style>
+          <p:txBody>
+            <a:bodyPr lIns="36000" rIns="36000" rtlCol="0" anchor="ctr"/>
+            <a:lstStyle/>
+            <a:p>
+              <a:pPr algn="ctr"/>
+              <a:r>
+                <a:rPr lang="en-US" dirty="0" err="1" smtClean="0">
+                  <a:solidFill>
+                    <a:schemeClr val="tx1"/>
+                  </a:solidFill>
+                  <a:latin typeface="Baskerville" charset="0"/>
+                  <a:ea typeface="Baskerville" charset="0"/>
+                  <a:cs typeface="Baskerville" charset="0"/>
+                </a:rPr>
+                <a:t>local_planner</a:t>
+              </a:r>
+              <a:endParaRPr lang="en-US" dirty="0">
                 <a:solidFill>
                   <a:schemeClr val="tx1"/>
                 </a:solidFill>
                 <a:latin typeface="Baskerville" charset="0"/>
                 <a:ea typeface="Baskerville" charset="0"/>
                 <a:cs typeface="Baskerville" charset="0"/>
-              </a:rPr>
-              <a:t>ocal </a:t>
-            </a:r>
-            <a:r>
-              <a:rPr lang="en-US" sz="1600" dirty="0" err="1" smtClean="0">
+              </a:endParaRPr>
+            </a:p>
+          </p:txBody>
+        </p:sp>
+        <p:sp>
+          <p:nvSpPr>
+            <p:cNvPr id="31" name="Rectangle 30"/>
+            <p:cNvSpPr/>
+            <p:nvPr/>
+          </p:nvSpPr>
+          <p:spPr>
+            <a:xfrm>
+              <a:off x="6741720" y="2865812"/>
+              <a:ext cx="1249975" cy="647606"/>
+            </a:xfrm>
+            <a:prstGeom prst="rect">
+              <a:avLst/>
+            </a:prstGeom>
+            <a:noFill/>
+            <a:ln>
+              <a:solidFill>
+                <a:schemeClr val="tx1"/>
+              </a:solidFill>
+            </a:ln>
+          </p:spPr>
+          <p:style>
+            <a:lnRef idx="2">
+              <a:schemeClr val="accent1">
+                <a:shade val="50000"/>
+              </a:schemeClr>
+            </a:lnRef>
+            <a:fillRef idx="1">
+              <a:schemeClr val="accent1"/>
+            </a:fillRef>
+            <a:effectRef idx="0">
+              <a:schemeClr val="accent1"/>
+            </a:effectRef>
+            <a:fontRef idx="minor">
+              <a:schemeClr val="lt1"/>
+            </a:fontRef>
+          </p:style>
+          <p:txBody>
+            <a:bodyPr lIns="36000" tIns="0" rIns="36000" rtlCol="0" anchor="ctr"/>
+            <a:lstStyle/>
+            <a:p>
+              <a:pPr algn="ctr"/>
+              <a:r>
+                <a:rPr lang="en-US" dirty="0" smtClean="0">
+                  <a:solidFill>
+                    <a:schemeClr val="tx1"/>
+                  </a:solidFill>
+                  <a:latin typeface="Baskerville" charset="0"/>
+                  <a:ea typeface="Baskerville" charset="0"/>
+                  <a:cs typeface="Baskerville" charset="0"/>
+                </a:rPr>
+                <a:t>recovery_</a:t>
+              </a:r>
+              <a:br>
+                <a:rPr lang="en-US" dirty="0" smtClean="0">
+                  <a:solidFill>
+                    <a:schemeClr val="tx1"/>
+                  </a:solidFill>
+                  <a:latin typeface="Baskerville" charset="0"/>
+                  <a:ea typeface="Baskerville" charset="0"/>
+                  <a:cs typeface="Baskerville" charset="0"/>
+                </a:rPr>
+              </a:br>
+              <a:r>
+                <a:rPr lang="en-US" dirty="0" smtClean="0">
+                  <a:solidFill>
+                    <a:schemeClr val="tx1"/>
+                  </a:solidFill>
+                  <a:latin typeface="Baskerville" charset="0"/>
+                  <a:ea typeface="Baskerville" charset="0"/>
+                  <a:cs typeface="Baskerville" charset="0"/>
+                </a:rPr>
+                <a:t>behaviour</a:t>
+              </a:r>
+              <a:endParaRPr lang="en-US" sz="2000" dirty="0">
                 <a:solidFill>
                   <a:schemeClr val="tx1"/>
                 </a:solidFill>
                 <a:latin typeface="Baskerville" charset="0"/>
                 <a:ea typeface="Baskerville" charset="0"/>
                 <a:cs typeface="Baskerville" charset="0"/>
-              </a:rPr>
-              <a:t>Costmap</a:t>
-            </a:r>
-            <a:endParaRPr lang="en-US" sz="1600" dirty="0">
+              </a:endParaRPr>
+            </a:p>
+          </p:txBody>
+        </p:sp>
+        <p:cxnSp>
+          <p:nvCxnSpPr>
+            <p:cNvPr id="32" name="Straight Arrow Connector 31"/>
+            <p:cNvCxnSpPr>
+              <a:stCxn id="24" idx="2"/>
+              <a:endCxn id="31" idx="0"/>
+            </p:cNvCxnSpPr>
+            <p:nvPr/>
+          </p:nvCxnSpPr>
+          <p:spPr>
+            <a:xfrm>
+              <a:off x="6470332" y="2341193"/>
+              <a:ext cx="896376" cy="524619"/>
+            </a:xfrm>
+            <a:prstGeom prst="straightConnector1">
+              <a:avLst/>
+            </a:prstGeom>
+            <a:ln w="12700">
               <a:solidFill>
                 <a:schemeClr val="tx1"/>
               </a:solidFill>
-              <a:latin typeface="Baskerville" charset="0"/>
-              <a:ea typeface="Baskerville" charset="0"/>
-              <a:cs typeface="Baskerville" charset="0"/>
-            </a:endParaRPr>
-          </a:p>
-        </p:txBody>
-      </p:sp>
-      <p:sp>
-        <p:nvSpPr>
-          <p:cNvPr id="26" name="Rectangle 25"/>
-          <p:cNvSpPr/>
-          <p:nvPr/>
-        </p:nvSpPr>
-        <p:spPr>
-          <a:xfrm>
-            <a:off x="7495992" y="1861771"/>
-            <a:ext cx="1531491" cy="479422"/>
-          </a:xfrm>
-          <a:prstGeom prst="rect">
-            <a:avLst/>
-          </a:prstGeom>
-          <a:noFill/>
-          <a:ln>
-            <a:solidFill>
+              <a:tailEnd type="triangle"/>
+            </a:ln>
+          </p:spPr>
+          <p:style>
+            <a:lnRef idx="1">
+              <a:schemeClr val="accent1"/>
+            </a:lnRef>
+            <a:fillRef idx="0">
+              <a:schemeClr val="accent1"/>
+            </a:fillRef>
+            <a:effectRef idx="0">
+              <a:schemeClr val="accent1"/>
+            </a:effectRef>
+            <a:fontRef idx="minor">
               <a:schemeClr val="tx1"/>
-            </a:solidFill>
-          </a:ln>
-        </p:spPr>
-        <p:style>
-          <a:lnRef idx="2">
-            <a:schemeClr val="accent1">
-              <a:shade val="50000"/>
-            </a:schemeClr>
-          </a:lnRef>
-          <a:fillRef idx="1">
-            <a:schemeClr val="accent1"/>
-          </a:fillRef>
-          <a:effectRef idx="0">
-            <a:schemeClr val="accent1"/>
-          </a:effectRef>
-          <a:fontRef idx="minor">
-            <a:schemeClr val="lt1"/>
-          </a:fontRef>
-        </p:style>
-        <p:txBody>
-          <a:bodyPr lIns="36000" rIns="36000" rtlCol="0" anchor="ctr"/>
-          <a:lstStyle/>
-          <a:p>
-            <a:pPr algn="ctr"/>
-            <a:r>
-              <a:rPr lang="en-US" sz="1600" dirty="0">
-                <a:solidFill>
-                  <a:schemeClr val="tx1"/>
-                </a:solidFill>
-                <a:latin typeface="Baskerville" charset="0"/>
-                <a:ea typeface="Baskerville" charset="0"/>
-                <a:cs typeface="Baskerville" charset="0"/>
-              </a:rPr>
-              <a:t>G</a:t>
-            </a:r>
-            <a:r>
-              <a:rPr lang="en-US" sz="1600" dirty="0" smtClean="0">
-                <a:solidFill>
-                  <a:schemeClr val="tx1"/>
-                </a:solidFill>
-                <a:latin typeface="Baskerville" charset="0"/>
-                <a:ea typeface="Baskerville" charset="0"/>
-                <a:cs typeface="Baskerville" charset="0"/>
-              </a:rPr>
-              <a:t>lobal Planner</a:t>
-            </a:r>
-            <a:endParaRPr lang="en-US" dirty="0">
+            </a:fontRef>
+          </p:style>
+        </p:cxnSp>
+        <p:cxnSp>
+          <p:nvCxnSpPr>
+            <p:cNvPr id="34" name="Straight Arrow Connector 33"/>
+            <p:cNvCxnSpPr>
+              <a:stCxn id="25" idx="0"/>
+              <a:endCxn id="31" idx="2"/>
+            </p:cNvCxnSpPr>
+            <p:nvPr/>
+          </p:nvCxnSpPr>
+          <p:spPr>
+            <a:xfrm flipV="1">
+              <a:off x="6470333" y="3513418"/>
+              <a:ext cx="896375" cy="524619"/>
+            </a:xfrm>
+            <a:prstGeom prst="straightConnector1">
+              <a:avLst/>
+            </a:prstGeom>
+            <a:ln w="12700">
               <a:solidFill>
                 <a:schemeClr val="tx1"/>
               </a:solidFill>
-              <a:latin typeface="Baskerville" charset="0"/>
-              <a:ea typeface="Baskerville" charset="0"/>
-              <a:cs typeface="Baskerville" charset="0"/>
-            </a:endParaRPr>
-          </a:p>
-        </p:txBody>
-      </p:sp>
-      <p:sp>
-        <p:nvSpPr>
-          <p:cNvPr id="27" name="Rectangle 26"/>
-          <p:cNvSpPr/>
-          <p:nvPr/>
-        </p:nvSpPr>
-        <p:spPr>
-          <a:xfrm>
-            <a:off x="7495993" y="4038037"/>
-            <a:ext cx="1531491" cy="479422"/>
-          </a:xfrm>
-          <a:prstGeom prst="rect">
-            <a:avLst/>
-          </a:prstGeom>
-          <a:noFill/>
-          <a:ln>
-            <a:solidFill>
+              <a:tailEnd type="triangle"/>
+            </a:ln>
+          </p:spPr>
+          <p:style>
+            <a:lnRef idx="1">
+              <a:schemeClr val="accent1"/>
+            </a:lnRef>
+            <a:fillRef idx="0">
+              <a:schemeClr val="accent1"/>
+            </a:fillRef>
+            <a:effectRef idx="0">
+              <a:schemeClr val="accent1"/>
+            </a:effectRef>
+            <a:fontRef idx="minor">
               <a:schemeClr val="tx1"/>
-            </a:solidFill>
-          </a:ln>
-        </p:spPr>
-        <p:style>
-          <a:lnRef idx="2">
-            <a:schemeClr val="accent1">
-              <a:shade val="50000"/>
-            </a:schemeClr>
-          </a:lnRef>
-          <a:fillRef idx="1">
-            <a:schemeClr val="accent1"/>
-          </a:fillRef>
-          <a:effectRef idx="0">
-            <a:schemeClr val="accent1"/>
-          </a:effectRef>
-          <a:fontRef idx="minor">
-            <a:schemeClr val="lt1"/>
-          </a:fontRef>
-        </p:style>
-        <p:txBody>
-          <a:bodyPr lIns="36000" rIns="36000" rtlCol="0" anchor="ctr"/>
-          <a:lstStyle/>
-          <a:p>
-            <a:pPr algn="ctr"/>
-            <a:r>
-              <a:rPr lang="en-US" sz="1600" dirty="0" smtClean="0">
-                <a:solidFill>
-                  <a:schemeClr val="tx1"/>
-                </a:solidFill>
-                <a:latin typeface="Baskerville" charset="0"/>
-                <a:ea typeface="Baskerville" charset="0"/>
-                <a:cs typeface="Baskerville" charset="0"/>
-              </a:rPr>
-              <a:t>Local Planner</a:t>
-            </a:r>
-            <a:endParaRPr lang="en-US" dirty="0">
+            </a:fontRef>
+          </p:style>
+        </p:cxnSp>
+        <p:cxnSp>
+          <p:nvCxnSpPr>
+            <p:cNvPr id="36" name="Straight Arrow Connector 35"/>
+            <p:cNvCxnSpPr>
+              <a:stCxn id="24" idx="2"/>
+              <a:endCxn id="25" idx="0"/>
+            </p:cNvCxnSpPr>
+            <p:nvPr/>
+          </p:nvCxnSpPr>
+          <p:spPr>
+            <a:xfrm>
+              <a:off x="6470332" y="2341193"/>
+              <a:ext cx="1" cy="1696844"/>
+            </a:xfrm>
+            <a:prstGeom prst="straightConnector1">
+              <a:avLst/>
+            </a:prstGeom>
+            <a:ln w="12700">
               <a:solidFill>
                 <a:schemeClr val="tx1"/>
               </a:solidFill>
-              <a:latin typeface="Baskerville" charset="0"/>
-              <a:ea typeface="Baskerville" charset="0"/>
-              <a:cs typeface="Baskerville" charset="0"/>
-            </a:endParaRPr>
-          </a:p>
-        </p:txBody>
-      </p:sp>
-      <p:sp>
-        <p:nvSpPr>
-          <p:cNvPr id="31" name="Rectangle 30"/>
-          <p:cNvSpPr/>
-          <p:nvPr/>
-        </p:nvSpPr>
-        <p:spPr>
-          <a:xfrm>
-            <a:off x="6741720" y="2865812"/>
-            <a:ext cx="1249975" cy="647606"/>
-          </a:xfrm>
-          <a:prstGeom prst="rect">
-            <a:avLst/>
-          </a:prstGeom>
-          <a:noFill/>
-          <a:ln>
-            <a:solidFill>
+              <a:headEnd type="triangle"/>
+              <a:tailEnd type="triangle"/>
+            </a:ln>
+          </p:spPr>
+          <p:style>
+            <a:lnRef idx="1">
+              <a:schemeClr val="accent1"/>
+            </a:lnRef>
+            <a:fillRef idx="0">
+              <a:schemeClr val="accent1"/>
+            </a:fillRef>
+            <a:effectRef idx="0">
+              <a:schemeClr val="accent1"/>
+            </a:effectRef>
+            <a:fontRef idx="minor">
               <a:schemeClr val="tx1"/>
-            </a:solidFill>
-          </a:ln>
-        </p:spPr>
-        <p:style>
-          <a:lnRef idx="2">
-            <a:schemeClr val="accent1">
-              <a:shade val="50000"/>
-            </a:schemeClr>
-          </a:lnRef>
-          <a:fillRef idx="1">
-            <a:schemeClr val="accent1"/>
-          </a:fillRef>
-          <a:effectRef idx="0">
-            <a:schemeClr val="accent1"/>
-          </a:effectRef>
-          <a:fontRef idx="minor">
-            <a:schemeClr val="lt1"/>
-          </a:fontRef>
-        </p:style>
-        <p:txBody>
-          <a:bodyPr lIns="36000" tIns="0" rIns="36000" rtlCol="0" anchor="ctr"/>
-          <a:lstStyle/>
-          <a:p>
-            <a:pPr algn="ctr"/>
-            <a:r>
-              <a:rPr lang="en-US" dirty="0">
-                <a:solidFill>
-                  <a:schemeClr val="tx1"/>
-                </a:solidFill>
-                <a:latin typeface="Baskerville" charset="0"/>
-                <a:ea typeface="Baskerville" charset="0"/>
-                <a:cs typeface="Baskerville" charset="0"/>
-              </a:rPr>
-              <a:t>R</a:t>
-            </a:r>
-            <a:r>
-              <a:rPr lang="en-US" dirty="0" smtClean="0">
-                <a:solidFill>
-                  <a:schemeClr val="tx1"/>
-                </a:solidFill>
-                <a:latin typeface="Baskerville" charset="0"/>
-                <a:ea typeface="Baskerville" charset="0"/>
-                <a:cs typeface="Baskerville" charset="0"/>
-              </a:rPr>
-              <a:t>ecovery</a:t>
-            </a:r>
-            <a:br>
-              <a:rPr lang="en-US" dirty="0" smtClean="0">
-                <a:solidFill>
-                  <a:schemeClr val="tx1"/>
-                </a:solidFill>
-                <a:latin typeface="Baskerville" charset="0"/>
-                <a:ea typeface="Baskerville" charset="0"/>
-                <a:cs typeface="Baskerville" charset="0"/>
-              </a:rPr>
-            </a:br>
-            <a:r>
-              <a:rPr lang="en-US" dirty="0" smtClean="0">
-                <a:solidFill>
-                  <a:schemeClr val="tx1"/>
-                </a:solidFill>
-                <a:latin typeface="Baskerville" charset="0"/>
-                <a:ea typeface="Baskerville" charset="0"/>
-                <a:cs typeface="Baskerville" charset="0"/>
-              </a:rPr>
-              <a:t>Behaviour</a:t>
-            </a:r>
-            <a:endParaRPr lang="en-US" sz="2000" dirty="0">
+            </a:fontRef>
+          </p:style>
+        </p:cxnSp>
+        <p:cxnSp>
+          <p:nvCxnSpPr>
+            <p:cNvPr id="38" name="Straight Arrow Connector 37"/>
+            <p:cNvCxnSpPr>
+              <a:stCxn id="24" idx="3"/>
+              <a:endCxn id="26" idx="1"/>
+            </p:cNvCxnSpPr>
+            <p:nvPr/>
+          </p:nvCxnSpPr>
+          <p:spPr>
+            <a:xfrm>
+              <a:off x="7236077" y="2101482"/>
+              <a:ext cx="259915" cy="0"/>
+            </a:xfrm>
+            <a:prstGeom prst="straightConnector1">
+              <a:avLst/>
+            </a:prstGeom>
+            <a:ln w="12700">
               <a:solidFill>
                 <a:schemeClr val="tx1"/>
               </a:solidFill>
-              <a:latin typeface="Baskerville" charset="0"/>
-              <a:ea typeface="Baskerville" charset="0"/>
-              <a:cs typeface="Baskerville" charset="0"/>
-            </a:endParaRPr>
-          </a:p>
-        </p:txBody>
-      </p:sp>
-      <p:cxnSp>
-        <p:nvCxnSpPr>
-          <p:cNvPr id="32" name="Straight Arrow Connector 31"/>
-          <p:cNvCxnSpPr>
-            <a:stCxn id="24" idx="2"/>
-            <a:endCxn id="31" idx="0"/>
-          </p:cNvCxnSpPr>
-          <p:nvPr/>
-        </p:nvCxnSpPr>
-        <p:spPr>
-          <a:xfrm>
-            <a:off x="6470332" y="2341193"/>
-            <a:ext cx="896376" cy="524619"/>
-          </a:xfrm>
-          <a:prstGeom prst="straightConnector1">
-            <a:avLst/>
-          </a:prstGeom>
-          <a:ln>
-            <a:solidFill>
+              <a:tailEnd type="triangle"/>
+            </a:ln>
+          </p:spPr>
+          <p:style>
+            <a:lnRef idx="1">
+              <a:schemeClr val="accent1"/>
+            </a:lnRef>
+            <a:fillRef idx="0">
+              <a:schemeClr val="accent1"/>
+            </a:fillRef>
+            <a:effectRef idx="0">
+              <a:schemeClr val="accent1"/>
+            </a:effectRef>
+            <a:fontRef idx="minor">
               <a:schemeClr val="tx1"/>
-            </a:solidFill>
-            <a:tailEnd type="triangle"/>
-          </a:ln>
-        </p:spPr>
-        <p:style>
-          <a:lnRef idx="1">
-            <a:schemeClr val="accent1"/>
-          </a:lnRef>
-          <a:fillRef idx="0">
-            <a:schemeClr val="accent1"/>
-          </a:fillRef>
-          <a:effectRef idx="0">
-            <a:schemeClr val="accent1"/>
-          </a:effectRef>
-          <a:fontRef idx="minor">
-            <a:schemeClr val="tx1"/>
-          </a:fontRef>
-        </p:style>
-      </p:cxnSp>
-      <p:cxnSp>
-        <p:nvCxnSpPr>
-          <p:cNvPr id="34" name="Straight Arrow Connector 33"/>
-          <p:cNvCxnSpPr>
-            <a:stCxn id="25" idx="0"/>
-            <a:endCxn id="31" idx="2"/>
-          </p:cNvCxnSpPr>
-          <p:nvPr/>
-        </p:nvCxnSpPr>
-        <p:spPr>
-          <a:xfrm flipV="1">
-            <a:off x="6470333" y="3513418"/>
-            <a:ext cx="896375" cy="524619"/>
-          </a:xfrm>
-          <a:prstGeom prst="straightConnector1">
-            <a:avLst/>
-          </a:prstGeom>
-          <a:ln>
-            <a:solidFill>
+            </a:fontRef>
+          </p:style>
+        </p:cxnSp>
+        <p:cxnSp>
+          <p:nvCxnSpPr>
+            <p:cNvPr id="40" name="Straight Arrow Connector 39"/>
+            <p:cNvCxnSpPr>
+              <a:stCxn id="25" idx="3"/>
+              <a:endCxn id="27" idx="1"/>
+            </p:cNvCxnSpPr>
+            <p:nvPr/>
+          </p:nvCxnSpPr>
+          <p:spPr>
+            <a:xfrm>
+              <a:off x="7236078" y="4277748"/>
+              <a:ext cx="259915" cy="0"/>
+            </a:xfrm>
+            <a:prstGeom prst="straightConnector1">
+              <a:avLst/>
+            </a:prstGeom>
+            <a:ln w="12700">
+              <a:solidFill>
+                <a:schemeClr val="tx1"/>
+              </a:solidFill>
+              <a:tailEnd type="triangle"/>
+            </a:ln>
+          </p:spPr>
+          <p:style>
+            <a:lnRef idx="1">
+              <a:schemeClr val="accent1"/>
+            </a:lnRef>
+            <a:fillRef idx="0">
+              <a:schemeClr val="accent1"/>
+            </a:fillRef>
+            <a:effectRef idx="0">
+              <a:schemeClr val="accent1"/>
+            </a:effectRef>
+            <a:fontRef idx="minor">
               <a:schemeClr val="tx1"/>
-            </a:solidFill>
-            <a:tailEnd type="triangle"/>
-          </a:ln>
-        </p:spPr>
-        <p:style>
-          <a:lnRef idx="1">
-            <a:schemeClr val="accent1"/>
-          </a:lnRef>
-          <a:fillRef idx="0">
-            <a:schemeClr val="accent1"/>
-          </a:fillRef>
-          <a:effectRef idx="0">
-            <a:schemeClr val="accent1"/>
-          </a:effectRef>
-          <a:fontRef idx="minor">
-            <a:schemeClr val="tx1"/>
-          </a:fontRef>
-        </p:style>
-      </p:cxnSp>
-      <p:cxnSp>
-        <p:nvCxnSpPr>
-          <p:cNvPr id="36" name="Straight Arrow Connector 35"/>
-          <p:cNvCxnSpPr>
-            <a:stCxn id="24" idx="2"/>
-            <a:endCxn id="25" idx="0"/>
-          </p:cNvCxnSpPr>
-          <p:nvPr/>
-        </p:nvCxnSpPr>
-        <p:spPr>
-          <a:xfrm>
-            <a:off x="6470332" y="2341193"/>
-            <a:ext cx="1" cy="1696844"/>
-          </a:xfrm>
-          <a:prstGeom prst="straightConnector1">
-            <a:avLst/>
-          </a:prstGeom>
-          <a:ln>
-            <a:solidFill>
+            </a:fontRef>
+          </p:style>
+        </p:cxnSp>
+        <p:cxnSp>
+          <p:nvCxnSpPr>
+            <p:cNvPr id="42" name="Straight Arrow Connector 41"/>
+            <p:cNvCxnSpPr>
+              <a:stCxn id="26" idx="2"/>
+              <a:endCxn id="27" idx="0"/>
+            </p:cNvCxnSpPr>
+            <p:nvPr/>
+          </p:nvCxnSpPr>
+          <p:spPr>
+            <a:xfrm>
+              <a:off x="8261738" y="2341193"/>
+              <a:ext cx="1" cy="1696844"/>
+            </a:xfrm>
+            <a:prstGeom prst="straightConnector1">
+              <a:avLst/>
+            </a:prstGeom>
+            <a:ln w="12700">
+              <a:solidFill>
+                <a:schemeClr val="tx1"/>
+              </a:solidFill>
+              <a:tailEnd type="triangle"/>
+            </a:ln>
+          </p:spPr>
+          <p:style>
+            <a:lnRef idx="1">
+              <a:schemeClr val="accent1"/>
+            </a:lnRef>
+            <a:fillRef idx="0">
+              <a:schemeClr val="accent1"/>
+            </a:fillRef>
+            <a:effectRef idx="0">
+              <a:schemeClr val="accent1"/>
+            </a:effectRef>
+            <a:fontRef idx="minor">
               <a:schemeClr val="tx1"/>
-            </a:solidFill>
-            <a:headEnd type="triangle"/>
-            <a:tailEnd type="triangle"/>
-          </a:ln>
-        </p:spPr>
-        <p:style>
-          <a:lnRef idx="1">
-            <a:schemeClr val="accent1"/>
-          </a:lnRef>
-          <a:fillRef idx="0">
-            <a:schemeClr val="accent1"/>
-          </a:fillRef>
-          <a:effectRef idx="0">
-            <a:schemeClr val="accent1"/>
-          </a:effectRef>
-          <a:fontRef idx="minor">
-            <a:schemeClr val="tx1"/>
-          </a:fontRef>
-        </p:style>
-      </p:cxnSp>
-      <p:cxnSp>
-        <p:nvCxnSpPr>
-          <p:cNvPr id="38" name="Straight Arrow Connector 37"/>
-          <p:cNvCxnSpPr>
-            <a:stCxn id="24" idx="3"/>
-            <a:endCxn id="26" idx="1"/>
-          </p:cNvCxnSpPr>
-          <p:nvPr/>
-        </p:nvCxnSpPr>
-        <p:spPr>
-          <a:xfrm>
-            <a:off x="7236077" y="2101482"/>
-            <a:ext cx="259915" cy="0"/>
-          </a:xfrm>
-          <a:prstGeom prst="straightConnector1">
-            <a:avLst/>
-          </a:prstGeom>
-          <a:ln>
-            <a:solidFill>
+            </a:fontRef>
+          </p:style>
+        </p:cxnSp>
+        <p:cxnSp>
+          <p:nvCxnSpPr>
+            <p:cNvPr id="55" name="Straight Arrow Connector 54"/>
+            <p:cNvCxnSpPr>
+              <a:stCxn id="6" idx="3"/>
+            </p:cNvCxnSpPr>
+            <p:nvPr/>
+          </p:nvCxnSpPr>
+          <p:spPr>
+            <a:xfrm flipV="1">
+              <a:off x="4773946" y="2532257"/>
+              <a:ext cx="645624" cy="1"/>
+            </a:xfrm>
+            <a:prstGeom prst="straightConnector1">
+              <a:avLst/>
+            </a:prstGeom>
+            <a:ln w="12700">
+              <a:solidFill>
+                <a:schemeClr val="tx1"/>
+              </a:solidFill>
+              <a:tailEnd type="triangle"/>
+            </a:ln>
+          </p:spPr>
+          <p:style>
+            <a:lnRef idx="1">
+              <a:schemeClr val="accent1"/>
+            </a:lnRef>
+            <a:fillRef idx="0">
+              <a:schemeClr val="accent1"/>
+            </a:fillRef>
+            <a:effectRef idx="0">
+              <a:schemeClr val="accent1"/>
+            </a:effectRef>
+            <a:fontRef idx="minor">
               <a:schemeClr val="tx1"/>
-            </a:solidFill>
-            <a:tailEnd type="triangle"/>
-          </a:ln>
-        </p:spPr>
-        <p:style>
-          <a:lnRef idx="1">
-            <a:schemeClr val="accent1"/>
-          </a:lnRef>
-          <a:fillRef idx="0">
-            <a:schemeClr val="accent1"/>
-          </a:fillRef>
-          <a:effectRef idx="0">
-            <a:schemeClr val="accent1"/>
-          </a:effectRef>
-          <a:fontRef idx="minor">
-            <a:schemeClr val="tx1"/>
-          </a:fontRef>
-        </p:style>
-      </p:cxnSp>
-      <p:cxnSp>
-        <p:nvCxnSpPr>
-          <p:cNvPr id="40" name="Straight Arrow Connector 39"/>
-          <p:cNvCxnSpPr>
-            <a:stCxn id="25" idx="3"/>
-            <a:endCxn id="27" idx="1"/>
-          </p:cNvCxnSpPr>
-          <p:nvPr/>
-        </p:nvCxnSpPr>
-        <p:spPr>
-          <a:xfrm>
-            <a:off x="7236078" y="4277748"/>
-            <a:ext cx="259915" cy="0"/>
-          </a:xfrm>
-          <a:prstGeom prst="straightConnector1">
-            <a:avLst/>
-          </a:prstGeom>
-          <a:ln>
-            <a:solidFill>
+            </a:fontRef>
+          </p:style>
+        </p:cxnSp>
+        <p:cxnSp>
+          <p:nvCxnSpPr>
+            <p:cNvPr id="57" name="Straight Arrow Connector 56"/>
+            <p:cNvCxnSpPr>
+              <a:stCxn id="8" idx="3"/>
+            </p:cNvCxnSpPr>
+            <p:nvPr/>
+          </p:nvCxnSpPr>
+          <p:spPr>
+            <a:xfrm flipV="1">
+              <a:off x="4773946" y="3873005"/>
+              <a:ext cx="645624" cy="1"/>
+            </a:xfrm>
+            <a:prstGeom prst="straightConnector1">
+              <a:avLst/>
+            </a:prstGeom>
+            <a:ln w="12700">
+              <a:solidFill>
+                <a:schemeClr val="tx1"/>
+              </a:solidFill>
+              <a:tailEnd type="triangle"/>
+            </a:ln>
+          </p:spPr>
+          <p:style>
+            <a:lnRef idx="1">
+              <a:schemeClr val="accent1"/>
+            </a:lnRef>
+            <a:fillRef idx="0">
+              <a:schemeClr val="accent1"/>
+            </a:fillRef>
+            <a:effectRef idx="0">
+              <a:schemeClr val="accent1"/>
+            </a:effectRef>
+            <a:fontRef idx="minor">
               <a:schemeClr val="tx1"/>
-            </a:solidFill>
-            <a:tailEnd type="triangle"/>
-          </a:ln>
-        </p:spPr>
-        <p:style>
-          <a:lnRef idx="1">
-            <a:schemeClr val="accent1"/>
-          </a:lnRef>
-          <a:fillRef idx="0">
-            <a:schemeClr val="accent1"/>
-          </a:fillRef>
-          <a:effectRef idx="0">
-            <a:schemeClr val="accent1"/>
-          </a:effectRef>
-          <a:fontRef idx="minor">
-            <a:schemeClr val="tx1"/>
-          </a:fontRef>
-        </p:style>
-      </p:cxnSp>
-      <p:cxnSp>
-        <p:nvCxnSpPr>
-          <p:cNvPr id="42" name="Straight Arrow Connector 41"/>
-          <p:cNvCxnSpPr>
-            <a:stCxn id="26" idx="2"/>
-            <a:endCxn id="27" idx="0"/>
-          </p:cNvCxnSpPr>
-          <p:nvPr/>
-        </p:nvCxnSpPr>
-        <p:spPr>
-          <a:xfrm>
-            <a:off x="8261738" y="2341193"/>
-            <a:ext cx="1" cy="1696844"/>
-          </a:xfrm>
-          <a:prstGeom prst="straightConnector1">
-            <a:avLst/>
-          </a:prstGeom>
-          <a:ln>
-            <a:solidFill>
-              <a:schemeClr val="tx1"/>
-            </a:solidFill>
-            <a:tailEnd type="triangle"/>
-          </a:ln>
-        </p:spPr>
-        <p:style>
-          <a:lnRef idx="1">
-            <a:schemeClr val="accent1"/>
-          </a:lnRef>
-          <a:fillRef idx="0">
-            <a:schemeClr val="accent1"/>
-          </a:fillRef>
-          <a:effectRef idx="0">
-            <a:schemeClr val="accent1"/>
-          </a:effectRef>
-          <a:fontRef idx="minor">
-            <a:schemeClr val="tx1"/>
-          </a:fontRef>
-        </p:style>
-      </p:cxnSp>
+            </a:fontRef>
+          </p:style>
+        </p:cxnSp>
+      </p:grpSp>
     </p:spTree>
     <p:extLst>
       <p:ext uri="{BB962C8B-B14F-4D97-AF65-F5344CB8AC3E}">
@@ -5916,6 +5892,891 @@
     <p:extLst>
       <p:ext uri="{BB962C8B-B14F-4D97-AF65-F5344CB8AC3E}">
         <p14:creationId xmlns:p14="http://schemas.microsoft.com/office/powerpoint/2010/main" val="548257268"/>
+      </p:ext>
+    </p:extLst>
+  </p:cSld>
+  <p:clrMapOvr>
+    <a:masterClrMapping/>
+  </p:clrMapOvr>
+</p:sld>
+</file>
+
+<file path=ppt/slides/slide4.xml><?xml version="1.0" encoding="utf-8"?>
+<p:sld xmlns:a="http://schemas.openxmlformats.org/drawingml/2006/main" xmlns:r="http://schemas.openxmlformats.org/officeDocument/2006/relationships" xmlns:p="http://schemas.openxmlformats.org/presentationml/2006/main">
+  <p:cSld>
+    <p:spTree>
+      <p:nvGrpSpPr>
+        <p:cNvPr id="1" name=""/>
+        <p:cNvGrpSpPr/>
+        <p:nvPr/>
+      </p:nvGrpSpPr>
+      <p:grpSpPr>
+        <a:xfrm>
+          <a:off x="0" y="0"/>
+          <a:ext cx="0" cy="0"/>
+          <a:chOff x="0" y="0"/>
+          <a:chExt cx="0" cy="0"/>
+        </a:xfrm>
+      </p:grpSpPr>
+      <p:grpSp>
+        <p:nvGrpSpPr>
+          <p:cNvPr id="6" name="Group 5"/>
+          <p:cNvGrpSpPr/>
+          <p:nvPr/>
+        </p:nvGrpSpPr>
+        <p:grpSpPr>
+          <a:xfrm>
+            <a:off x="2603615" y="536156"/>
+            <a:ext cx="1449882" cy="5897301"/>
+            <a:chOff x="4421529" y="960698"/>
+            <a:chExt cx="1449882" cy="5897301"/>
+          </a:xfrm>
+        </p:grpSpPr>
+        <p:pic>
+          <p:nvPicPr>
+            <p:cNvPr id="3" name="Picture 2"/>
+            <p:cNvPicPr>
+              <a:picLocks noChangeAspect="1"/>
+            </p:cNvPicPr>
+            <p:nvPr/>
+          </p:nvPicPr>
+          <p:blipFill rotWithShape="1">
+            <a:blip r:embed="rId2">
+              <a:extLst>
+                <a:ext uri="{28A0092B-C50C-407E-A947-70E740481C1C}">
+                  <a14:useLocalDpi xmlns:a14="http://schemas.microsoft.com/office/drawing/2010/main" val="0"/>
+                </a:ext>
+              </a:extLst>
+            </a:blip>
+            <a:srcRect l="12361" t="14008" r="57613"/>
+            <a:stretch/>
+          </p:blipFill>
+          <p:spPr>
+            <a:xfrm>
+              <a:off x="4421529" y="960698"/>
+              <a:ext cx="1331090" cy="5897301"/>
+            </a:xfrm>
+            <a:prstGeom prst="rect">
+              <a:avLst/>
+            </a:prstGeom>
+          </p:spPr>
+        </p:pic>
+        <p:sp>
+          <p:nvSpPr>
+            <p:cNvPr id="5" name="Rectangle 4"/>
+            <p:cNvSpPr/>
+            <p:nvPr/>
+          </p:nvSpPr>
+          <p:spPr>
+            <a:xfrm>
+              <a:off x="5087639" y="1828800"/>
+              <a:ext cx="783772" cy="371260"/>
+            </a:xfrm>
+            <a:prstGeom prst="rect">
+              <a:avLst/>
+            </a:prstGeom>
+            <a:solidFill>
+              <a:schemeClr val="bg1"/>
+            </a:solidFill>
+            <a:ln>
+              <a:noFill/>
+            </a:ln>
+          </p:spPr>
+          <p:style>
+            <a:lnRef idx="2">
+              <a:schemeClr val="accent1">
+                <a:shade val="50000"/>
+              </a:schemeClr>
+            </a:lnRef>
+            <a:fillRef idx="1">
+              <a:schemeClr val="accent1"/>
+            </a:fillRef>
+            <a:effectRef idx="0">
+              <a:schemeClr val="accent1"/>
+            </a:effectRef>
+            <a:fontRef idx="minor">
+              <a:schemeClr val="lt1"/>
+            </a:fontRef>
+          </p:style>
+          <p:txBody>
+            <a:bodyPr rtlCol="0" anchor="ctr"/>
+            <a:lstStyle/>
+            <a:p>
+              <a:pPr algn="ctr"/>
+              <a:endParaRPr lang="en-US"/>
+            </a:p>
+          </p:txBody>
+        </p:sp>
+        <p:sp>
+          <p:nvSpPr>
+            <p:cNvPr id="20" name="Rectangle 19"/>
+            <p:cNvSpPr/>
+            <p:nvPr/>
+          </p:nvSpPr>
+          <p:spPr>
+            <a:xfrm>
+              <a:off x="5087639" y="3068162"/>
+              <a:ext cx="783772" cy="371260"/>
+            </a:xfrm>
+            <a:prstGeom prst="rect">
+              <a:avLst/>
+            </a:prstGeom>
+            <a:solidFill>
+              <a:schemeClr val="bg1"/>
+            </a:solidFill>
+            <a:ln>
+              <a:noFill/>
+            </a:ln>
+          </p:spPr>
+          <p:style>
+            <a:lnRef idx="2">
+              <a:schemeClr val="accent1">
+                <a:shade val="50000"/>
+              </a:schemeClr>
+            </a:lnRef>
+            <a:fillRef idx="1">
+              <a:schemeClr val="accent1"/>
+            </a:fillRef>
+            <a:effectRef idx="0">
+              <a:schemeClr val="accent1"/>
+            </a:effectRef>
+            <a:fontRef idx="minor">
+              <a:schemeClr val="lt1"/>
+            </a:fontRef>
+          </p:style>
+          <p:txBody>
+            <a:bodyPr rtlCol="0" anchor="ctr"/>
+            <a:lstStyle/>
+            <a:p>
+              <a:pPr algn="ctr"/>
+              <a:endParaRPr lang="en-US"/>
+            </a:p>
+          </p:txBody>
+        </p:sp>
+        <p:sp>
+          <p:nvSpPr>
+            <p:cNvPr id="22" name="Rectangle 21"/>
+            <p:cNvSpPr/>
+            <p:nvPr/>
+          </p:nvSpPr>
+          <p:spPr>
+            <a:xfrm>
+              <a:off x="5087639" y="4307524"/>
+              <a:ext cx="783772" cy="470732"/>
+            </a:xfrm>
+            <a:prstGeom prst="rect">
+              <a:avLst/>
+            </a:prstGeom>
+            <a:solidFill>
+              <a:schemeClr val="bg1"/>
+            </a:solidFill>
+            <a:ln>
+              <a:noFill/>
+            </a:ln>
+          </p:spPr>
+          <p:style>
+            <a:lnRef idx="2">
+              <a:schemeClr val="accent1">
+                <a:shade val="50000"/>
+              </a:schemeClr>
+            </a:lnRef>
+            <a:fillRef idx="1">
+              <a:schemeClr val="accent1"/>
+            </a:fillRef>
+            <a:effectRef idx="0">
+              <a:schemeClr val="accent1"/>
+            </a:effectRef>
+            <a:fontRef idx="minor">
+              <a:schemeClr val="lt1"/>
+            </a:fontRef>
+          </p:style>
+          <p:txBody>
+            <a:bodyPr rtlCol="0" anchor="ctr"/>
+            <a:lstStyle/>
+            <a:p>
+              <a:pPr algn="ctr"/>
+              <a:endParaRPr lang="en-US"/>
+            </a:p>
+          </p:txBody>
+        </p:sp>
+        <p:sp>
+          <p:nvSpPr>
+            <p:cNvPr id="23" name="Rectangle 22"/>
+            <p:cNvSpPr/>
+            <p:nvPr/>
+          </p:nvSpPr>
+          <p:spPr>
+            <a:xfrm>
+              <a:off x="5087074" y="5913808"/>
+              <a:ext cx="783772" cy="371260"/>
+            </a:xfrm>
+            <a:prstGeom prst="rect">
+              <a:avLst/>
+            </a:prstGeom>
+            <a:solidFill>
+              <a:schemeClr val="bg1"/>
+            </a:solidFill>
+            <a:ln>
+              <a:noFill/>
+            </a:ln>
+          </p:spPr>
+          <p:style>
+            <a:lnRef idx="2">
+              <a:schemeClr val="accent1">
+                <a:shade val="50000"/>
+              </a:schemeClr>
+            </a:lnRef>
+            <a:fillRef idx="1">
+              <a:schemeClr val="accent1"/>
+            </a:fillRef>
+            <a:effectRef idx="0">
+              <a:schemeClr val="accent1"/>
+            </a:effectRef>
+            <a:fontRef idx="minor">
+              <a:schemeClr val="lt1"/>
+            </a:fontRef>
+          </p:style>
+          <p:txBody>
+            <a:bodyPr rtlCol="0" anchor="ctr"/>
+            <a:lstStyle/>
+            <a:p>
+              <a:pPr algn="ctr"/>
+              <a:endParaRPr lang="en-US"/>
+            </a:p>
+          </p:txBody>
+        </p:sp>
+      </p:grpSp>
+      <p:sp>
+        <p:nvSpPr>
+          <p:cNvPr id="7" name="Oval 6"/>
+          <p:cNvSpPr/>
+          <p:nvPr/>
+        </p:nvSpPr>
+        <p:spPr>
+          <a:xfrm>
+            <a:off x="5900056" y="536156"/>
+            <a:ext cx="1524000" cy="500169"/>
+          </a:xfrm>
+          <a:prstGeom prst="ellipse">
+            <a:avLst/>
+          </a:prstGeom>
+          <a:solidFill>
+            <a:schemeClr val="bg1"/>
+          </a:solidFill>
+          <a:ln>
+            <a:solidFill>
+              <a:schemeClr val="tx1"/>
+            </a:solidFill>
+          </a:ln>
+        </p:spPr>
+        <p:style>
+          <a:lnRef idx="2">
+            <a:schemeClr val="accent1">
+              <a:shade val="50000"/>
+            </a:schemeClr>
+          </a:lnRef>
+          <a:fillRef idx="1">
+            <a:schemeClr val="accent1"/>
+          </a:fillRef>
+          <a:effectRef idx="0">
+            <a:schemeClr val="accent1"/>
+          </a:effectRef>
+          <a:fontRef idx="minor">
+            <a:schemeClr val="lt1"/>
+          </a:fontRef>
+        </p:style>
+        <p:txBody>
+          <a:bodyPr rtlCol="0" anchor="ctr"/>
+          <a:lstStyle/>
+          <a:p>
+            <a:pPr algn="ctr"/>
+            <a:r>
+              <a:rPr lang="en-US" dirty="0" smtClean="0">
+                <a:solidFill>
+                  <a:schemeClr val="tx1"/>
+                </a:solidFill>
+                <a:latin typeface="Baskerville" charset="0"/>
+                <a:ea typeface="Baskerville" charset="0"/>
+                <a:cs typeface="Baskerville" charset="0"/>
+              </a:rPr>
+              <a:t>laser</a:t>
+            </a:r>
+            <a:endParaRPr lang="en-US" dirty="0">
+              <a:solidFill>
+                <a:schemeClr val="tx1"/>
+              </a:solidFill>
+              <a:latin typeface="Baskerville" charset="0"/>
+              <a:ea typeface="Baskerville" charset="0"/>
+              <a:cs typeface="Baskerville" charset="0"/>
+            </a:endParaRPr>
+          </a:p>
+        </p:txBody>
+      </p:sp>
+      <p:sp>
+        <p:nvSpPr>
+          <p:cNvPr id="29" name="Oval 28"/>
+          <p:cNvSpPr/>
+          <p:nvPr/>
+        </p:nvSpPr>
+        <p:spPr>
+          <a:xfrm>
+            <a:off x="5900057" y="1404258"/>
+            <a:ext cx="1523999" cy="500169"/>
+          </a:xfrm>
+          <a:prstGeom prst="ellipse">
+            <a:avLst/>
+          </a:prstGeom>
+          <a:solidFill>
+            <a:schemeClr val="bg1"/>
+          </a:solidFill>
+          <a:ln>
+            <a:solidFill>
+              <a:schemeClr val="tx1"/>
+            </a:solidFill>
+          </a:ln>
+        </p:spPr>
+        <p:style>
+          <a:lnRef idx="2">
+            <a:schemeClr val="accent1">
+              <a:shade val="50000"/>
+            </a:schemeClr>
+          </a:lnRef>
+          <a:fillRef idx="1">
+            <a:schemeClr val="accent1"/>
+          </a:fillRef>
+          <a:effectRef idx="0">
+            <a:schemeClr val="accent1"/>
+          </a:effectRef>
+          <a:fontRef idx="minor">
+            <a:schemeClr val="lt1"/>
+          </a:fontRef>
+        </p:style>
+        <p:txBody>
+          <a:bodyPr rtlCol="0" anchor="ctr"/>
+          <a:lstStyle/>
+          <a:p>
+            <a:pPr algn="ctr"/>
+            <a:r>
+              <a:rPr lang="en-US" dirty="0" err="1" smtClean="0">
+                <a:solidFill>
+                  <a:schemeClr val="tx1"/>
+                </a:solidFill>
+                <a:latin typeface="Baskerville" charset="0"/>
+                <a:ea typeface="Baskerville" charset="0"/>
+                <a:cs typeface="Baskerville" charset="0"/>
+              </a:rPr>
+              <a:t>base_link</a:t>
+            </a:r>
+            <a:endParaRPr lang="en-US" dirty="0">
+              <a:solidFill>
+                <a:schemeClr val="tx1"/>
+              </a:solidFill>
+              <a:latin typeface="Baskerville" charset="0"/>
+              <a:ea typeface="Baskerville" charset="0"/>
+              <a:cs typeface="Baskerville" charset="0"/>
+            </a:endParaRPr>
+          </a:p>
+        </p:txBody>
+      </p:sp>
+      <p:sp>
+        <p:nvSpPr>
+          <p:cNvPr id="30" name="Oval 29"/>
+          <p:cNvSpPr/>
+          <p:nvPr/>
+        </p:nvSpPr>
+        <p:spPr>
+          <a:xfrm>
+            <a:off x="5900056" y="2272360"/>
+            <a:ext cx="1524000" cy="500169"/>
+          </a:xfrm>
+          <a:prstGeom prst="ellipse">
+            <a:avLst/>
+          </a:prstGeom>
+          <a:solidFill>
+            <a:schemeClr val="bg1"/>
+          </a:solidFill>
+          <a:ln>
+            <a:solidFill>
+              <a:schemeClr val="tx1"/>
+            </a:solidFill>
+          </a:ln>
+        </p:spPr>
+        <p:style>
+          <a:lnRef idx="2">
+            <a:schemeClr val="accent1">
+              <a:shade val="50000"/>
+            </a:schemeClr>
+          </a:lnRef>
+          <a:fillRef idx="1">
+            <a:schemeClr val="accent1"/>
+          </a:fillRef>
+          <a:effectRef idx="0">
+            <a:schemeClr val="accent1"/>
+          </a:effectRef>
+          <a:fontRef idx="minor">
+            <a:schemeClr val="lt1"/>
+          </a:fontRef>
+        </p:style>
+        <p:txBody>
+          <a:bodyPr lIns="0" rIns="0" rtlCol="0" anchor="ctr"/>
+          <a:lstStyle/>
+          <a:p>
+            <a:pPr algn="ctr"/>
+            <a:r>
+              <a:rPr lang="en-US" dirty="0" err="1" smtClean="0">
+                <a:solidFill>
+                  <a:schemeClr val="tx1"/>
+                </a:solidFill>
+                <a:latin typeface="Baskerville" charset="0"/>
+                <a:ea typeface="Baskerville" charset="0"/>
+                <a:cs typeface="Baskerville" charset="0"/>
+              </a:rPr>
+              <a:t>base_frame</a:t>
+            </a:r>
+            <a:endParaRPr lang="en-US" dirty="0">
+              <a:solidFill>
+                <a:schemeClr val="tx1"/>
+              </a:solidFill>
+              <a:latin typeface="Baskerville" charset="0"/>
+              <a:ea typeface="Baskerville" charset="0"/>
+              <a:cs typeface="Baskerville" charset="0"/>
+            </a:endParaRPr>
+          </a:p>
+        </p:txBody>
+      </p:sp>
+      <p:sp>
+        <p:nvSpPr>
+          <p:cNvPr id="32" name="Oval 31"/>
+          <p:cNvSpPr/>
+          <p:nvPr/>
+        </p:nvSpPr>
+        <p:spPr>
+          <a:xfrm>
+            <a:off x="7990115" y="2272359"/>
+            <a:ext cx="1534884" cy="500169"/>
+          </a:xfrm>
+          <a:prstGeom prst="ellipse">
+            <a:avLst/>
+          </a:prstGeom>
+          <a:solidFill>
+            <a:schemeClr val="bg1"/>
+          </a:solidFill>
+          <a:ln>
+            <a:solidFill>
+              <a:schemeClr val="tx1"/>
+            </a:solidFill>
+          </a:ln>
+        </p:spPr>
+        <p:style>
+          <a:lnRef idx="2">
+            <a:schemeClr val="accent1">
+              <a:shade val="50000"/>
+            </a:schemeClr>
+          </a:lnRef>
+          <a:fillRef idx="1">
+            <a:schemeClr val="accent1"/>
+          </a:fillRef>
+          <a:effectRef idx="0">
+            <a:schemeClr val="accent1"/>
+          </a:effectRef>
+          <a:fontRef idx="minor">
+            <a:schemeClr val="lt1"/>
+          </a:fontRef>
+        </p:style>
+        <p:txBody>
+          <a:bodyPr lIns="0" rIns="0" rtlCol="0" anchor="ctr"/>
+          <a:lstStyle/>
+          <a:p>
+            <a:pPr algn="ctr"/>
+            <a:r>
+              <a:rPr lang="en-US" dirty="0" err="1" smtClean="0">
+                <a:solidFill>
+                  <a:schemeClr val="tx1"/>
+                </a:solidFill>
+                <a:latin typeface="Baskerville" charset="0"/>
+                <a:ea typeface="Baskerville" charset="0"/>
+                <a:cs typeface="Baskerville" charset="0"/>
+              </a:rPr>
+              <a:t>odom</a:t>
+            </a:r>
+            <a:endParaRPr lang="en-US" dirty="0">
+              <a:solidFill>
+                <a:schemeClr val="tx1"/>
+              </a:solidFill>
+              <a:latin typeface="Baskerville" charset="0"/>
+              <a:ea typeface="Baskerville" charset="0"/>
+              <a:cs typeface="Baskerville" charset="0"/>
+            </a:endParaRPr>
+          </a:p>
+        </p:txBody>
+      </p:sp>
+      <p:sp>
+        <p:nvSpPr>
+          <p:cNvPr id="34" name="Oval 33"/>
+          <p:cNvSpPr/>
+          <p:nvPr/>
+        </p:nvSpPr>
+        <p:spPr>
+          <a:xfrm>
+            <a:off x="7990115" y="1404257"/>
+            <a:ext cx="1534884" cy="500169"/>
+          </a:xfrm>
+          <a:prstGeom prst="ellipse">
+            <a:avLst/>
+          </a:prstGeom>
+          <a:solidFill>
+            <a:schemeClr val="bg1"/>
+          </a:solidFill>
+          <a:ln>
+            <a:solidFill>
+              <a:schemeClr val="tx1"/>
+            </a:solidFill>
+          </a:ln>
+        </p:spPr>
+        <p:style>
+          <a:lnRef idx="2">
+            <a:schemeClr val="accent1">
+              <a:shade val="50000"/>
+            </a:schemeClr>
+          </a:lnRef>
+          <a:fillRef idx="1">
+            <a:schemeClr val="accent1"/>
+          </a:fillRef>
+          <a:effectRef idx="0">
+            <a:schemeClr val="accent1"/>
+          </a:effectRef>
+          <a:fontRef idx="minor">
+            <a:schemeClr val="lt1"/>
+          </a:fontRef>
+        </p:style>
+        <p:txBody>
+          <a:bodyPr lIns="0" rIns="0" rtlCol="0" anchor="ctr"/>
+          <a:lstStyle/>
+          <a:p>
+            <a:pPr algn="ctr"/>
+            <a:r>
+              <a:rPr lang="en-US" dirty="0" smtClean="0">
+                <a:solidFill>
+                  <a:schemeClr val="tx1"/>
+                </a:solidFill>
+                <a:latin typeface="Baskerville" charset="0"/>
+                <a:ea typeface="Baskerville" charset="0"/>
+                <a:cs typeface="Baskerville" charset="0"/>
+              </a:rPr>
+              <a:t>map</a:t>
+            </a:r>
+            <a:endParaRPr lang="en-US" dirty="0">
+              <a:solidFill>
+                <a:schemeClr val="tx1"/>
+              </a:solidFill>
+              <a:latin typeface="Baskerville" charset="0"/>
+              <a:ea typeface="Baskerville" charset="0"/>
+              <a:cs typeface="Baskerville" charset="0"/>
+            </a:endParaRPr>
+          </a:p>
+        </p:txBody>
+      </p:sp>
+      <p:cxnSp>
+        <p:nvCxnSpPr>
+          <p:cNvPr id="10" name="Straight Arrow Connector 9"/>
+          <p:cNvCxnSpPr>
+            <a:stCxn id="7" idx="4"/>
+            <a:endCxn id="29" idx="0"/>
+          </p:cNvCxnSpPr>
+          <p:nvPr/>
+        </p:nvCxnSpPr>
+        <p:spPr>
+          <a:xfrm>
+            <a:off x="6662056" y="1036325"/>
+            <a:ext cx="1" cy="367933"/>
+          </a:xfrm>
+          <a:prstGeom prst="straightConnector1">
+            <a:avLst/>
+          </a:prstGeom>
+          <a:ln>
+            <a:tailEnd type="triangle"/>
+          </a:ln>
+        </p:spPr>
+        <p:style>
+          <a:lnRef idx="1">
+            <a:schemeClr val="accent1"/>
+          </a:lnRef>
+          <a:fillRef idx="0">
+            <a:schemeClr val="accent1"/>
+          </a:fillRef>
+          <a:effectRef idx="0">
+            <a:schemeClr val="accent1"/>
+          </a:effectRef>
+          <a:fontRef idx="minor">
+            <a:schemeClr val="tx1"/>
+          </a:fontRef>
+        </p:style>
+      </p:cxnSp>
+      <p:cxnSp>
+        <p:nvCxnSpPr>
+          <p:cNvPr id="14" name="Straight Arrow Connector 13"/>
+          <p:cNvCxnSpPr>
+            <a:stCxn id="29" idx="4"/>
+            <a:endCxn id="30" idx="0"/>
+          </p:cNvCxnSpPr>
+          <p:nvPr/>
+        </p:nvCxnSpPr>
+        <p:spPr>
+          <a:xfrm flipH="1">
+            <a:off x="6662056" y="1904427"/>
+            <a:ext cx="1" cy="367933"/>
+          </a:xfrm>
+          <a:prstGeom prst="straightConnector1">
+            <a:avLst/>
+          </a:prstGeom>
+          <a:ln>
+            <a:tailEnd type="triangle"/>
+          </a:ln>
+        </p:spPr>
+        <p:style>
+          <a:lnRef idx="1">
+            <a:schemeClr val="accent1"/>
+          </a:lnRef>
+          <a:fillRef idx="0">
+            <a:schemeClr val="accent1"/>
+          </a:fillRef>
+          <a:effectRef idx="0">
+            <a:schemeClr val="accent1"/>
+          </a:effectRef>
+          <a:fontRef idx="minor">
+            <a:schemeClr val="tx1"/>
+          </a:fontRef>
+        </p:style>
+      </p:cxnSp>
+      <p:cxnSp>
+        <p:nvCxnSpPr>
+          <p:cNvPr id="16" name="Straight Arrow Connector 15"/>
+          <p:cNvCxnSpPr>
+            <a:stCxn id="30" idx="6"/>
+            <a:endCxn id="32" idx="2"/>
+          </p:cNvCxnSpPr>
+          <p:nvPr/>
+        </p:nvCxnSpPr>
+        <p:spPr>
+          <a:xfrm flipV="1">
+            <a:off x="7424056" y="2522444"/>
+            <a:ext cx="566059" cy="1"/>
+          </a:xfrm>
+          <a:prstGeom prst="straightConnector1">
+            <a:avLst/>
+          </a:prstGeom>
+          <a:ln>
+            <a:tailEnd type="triangle"/>
+          </a:ln>
+        </p:spPr>
+        <p:style>
+          <a:lnRef idx="1">
+            <a:schemeClr val="accent1"/>
+          </a:lnRef>
+          <a:fillRef idx="0">
+            <a:schemeClr val="accent1"/>
+          </a:fillRef>
+          <a:effectRef idx="0">
+            <a:schemeClr val="accent1"/>
+          </a:effectRef>
+          <a:fontRef idx="minor">
+            <a:schemeClr val="tx1"/>
+          </a:fontRef>
+        </p:style>
+      </p:cxnSp>
+      <p:cxnSp>
+        <p:nvCxnSpPr>
+          <p:cNvPr id="18" name="Straight Arrow Connector 17"/>
+          <p:cNvCxnSpPr>
+            <a:stCxn id="32" idx="0"/>
+            <a:endCxn id="34" idx="4"/>
+          </p:cNvCxnSpPr>
+          <p:nvPr/>
+        </p:nvCxnSpPr>
+        <p:spPr>
+          <a:xfrm flipV="1">
+            <a:off x="8757557" y="1904426"/>
+            <a:ext cx="0" cy="367933"/>
+          </a:xfrm>
+          <a:prstGeom prst="straightConnector1">
+            <a:avLst/>
+          </a:prstGeom>
+          <a:ln>
+            <a:tailEnd type="triangle"/>
+          </a:ln>
+        </p:spPr>
+        <p:style>
+          <a:lnRef idx="1">
+            <a:schemeClr val="accent1"/>
+          </a:lnRef>
+          <a:fillRef idx="0">
+            <a:schemeClr val="accent1"/>
+          </a:fillRef>
+          <a:effectRef idx="0">
+            <a:schemeClr val="accent1"/>
+          </a:effectRef>
+          <a:fontRef idx="minor">
+            <a:schemeClr val="tx1"/>
+          </a:fontRef>
+        </p:style>
+      </p:cxnSp>
+      <p:sp>
+        <p:nvSpPr>
+          <p:cNvPr id="39" name="TextBox 38"/>
+          <p:cNvSpPr txBox="1"/>
+          <p:nvPr/>
+        </p:nvSpPr>
+        <p:spPr>
+          <a:xfrm>
+            <a:off x="6662056" y="1034925"/>
+            <a:ext cx="298480" cy="369332"/>
+          </a:xfrm>
+          <a:prstGeom prst="rect">
+            <a:avLst/>
+          </a:prstGeom>
+          <a:noFill/>
+        </p:spPr>
+        <p:txBody>
+          <a:bodyPr wrap="none" rtlCol="0">
+            <a:spAutoFit/>
+          </a:bodyPr>
+          <a:lstStyle/>
+          <a:p>
+            <a:r>
+              <a:rPr lang="en-US" i="1" dirty="0" err="1" smtClean="0">
+                <a:latin typeface="Baskerville" charset="0"/>
+                <a:ea typeface="Baskerville" charset="0"/>
+                <a:cs typeface="Baskerville" charset="0"/>
+              </a:rPr>
+              <a:t>tf</a:t>
+            </a:r>
+            <a:endParaRPr lang="en-US" i="1" dirty="0">
+              <a:latin typeface="Baskerville" charset="0"/>
+              <a:ea typeface="Baskerville" charset="0"/>
+              <a:cs typeface="Baskerville" charset="0"/>
+            </a:endParaRPr>
+          </a:p>
+        </p:txBody>
+      </p:sp>
+      <p:sp>
+        <p:nvSpPr>
+          <p:cNvPr id="43" name="TextBox 42"/>
+          <p:cNvSpPr txBox="1"/>
+          <p:nvPr/>
+        </p:nvSpPr>
+        <p:spPr>
+          <a:xfrm>
+            <a:off x="6662056" y="1903726"/>
+            <a:ext cx="298480" cy="369332"/>
+          </a:xfrm>
+          <a:prstGeom prst="rect">
+            <a:avLst/>
+          </a:prstGeom>
+          <a:noFill/>
+        </p:spPr>
+        <p:txBody>
+          <a:bodyPr wrap="none" rtlCol="0">
+            <a:spAutoFit/>
+          </a:bodyPr>
+          <a:lstStyle/>
+          <a:p>
+            <a:r>
+              <a:rPr lang="en-US" i="1" dirty="0" err="1" smtClean="0">
+                <a:latin typeface="Baskerville" charset="0"/>
+                <a:ea typeface="Baskerville" charset="0"/>
+                <a:cs typeface="Baskerville" charset="0"/>
+              </a:rPr>
+              <a:t>tf</a:t>
+            </a:r>
+            <a:endParaRPr lang="en-US" i="1" dirty="0">
+              <a:latin typeface="Baskerville" charset="0"/>
+              <a:ea typeface="Baskerville" charset="0"/>
+              <a:cs typeface="Baskerville" charset="0"/>
+            </a:endParaRPr>
+          </a:p>
+        </p:txBody>
+      </p:sp>
+      <p:sp>
+        <p:nvSpPr>
+          <p:cNvPr id="45" name="TextBox 44"/>
+          <p:cNvSpPr txBox="1"/>
+          <p:nvPr/>
+        </p:nvSpPr>
+        <p:spPr>
+          <a:xfrm>
+            <a:off x="7126638" y="2630253"/>
+            <a:ext cx="1160895" cy="369332"/>
+          </a:xfrm>
+          <a:prstGeom prst="rect">
+            <a:avLst/>
+          </a:prstGeom>
+          <a:noFill/>
+        </p:spPr>
+        <p:txBody>
+          <a:bodyPr wrap="none" rtlCol="0">
+            <a:spAutoFit/>
+          </a:bodyPr>
+          <a:lstStyle/>
+          <a:p>
+            <a:r>
+              <a:rPr lang="en-US" i="1" dirty="0" err="1" smtClean="0">
+                <a:latin typeface="Baskerville" charset="0"/>
+                <a:ea typeface="Baskerville" charset="0"/>
+                <a:cs typeface="Baskerville" charset="0"/>
+              </a:rPr>
+              <a:t>hector_odom</a:t>
+            </a:r>
+            <a:endParaRPr lang="en-US" i="1" dirty="0">
+              <a:latin typeface="Baskerville" charset="0"/>
+              <a:ea typeface="Baskerville" charset="0"/>
+              <a:cs typeface="Baskerville" charset="0"/>
+            </a:endParaRPr>
+          </a:p>
+        </p:txBody>
+      </p:sp>
+      <p:sp>
+        <p:nvSpPr>
+          <p:cNvPr id="47" name="TextBox 46"/>
+          <p:cNvSpPr txBox="1"/>
+          <p:nvPr/>
+        </p:nvSpPr>
+        <p:spPr>
+          <a:xfrm>
+            <a:off x="8186055" y="1903726"/>
+            <a:ext cx="550087" cy="369332"/>
+          </a:xfrm>
+          <a:prstGeom prst="rect">
+            <a:avLst/>
+          </a:prstGeom>
+          <a:noFill/>
+        </p:spPr>
+        <p:txBody>
+          <a:bodyPr wrap="none" rtlCol="0">
+            <a:spAutoFit/>
+          </a:bodyPr>
+          <a:lstStyle/>
+          <a:p>
+            <a:pPr algn="r"/>
+            <a:r>
+              <a:rPr lang="en-US" i="1" smtClean="0">
+                <a:latin typeface="Baskerville" charset="0"/>
+                <a:ea typeface="Baskerville" charset="0"/>
+                <a:cs typeface="Baskerville" charset="0"/>
+              </a:rPr>
+              <a:t>amcl</a:t>
+            </a:r>
+            <a:endParaRPr lang="en-US" i="1" dirty="0">
+              <a:latin typeface="Baskerville" charset="0"/>
+              <a:ea typeface="Baskerville" charset="0"/>
+              <a:cs typeface="Baskerville" charset="0"/>
+            </a:endParaRPr>
+          </a:p>
+        </p:txBody>
+      </p:sp>
+    </p:spTree>
+    <p:extLst>
+      <p:ext uri="{BB962C8B-B14F-4D97-AF65-F5344CB8AC3E}">
+        <p14:creationId xmlns:p14="http://schemas.microsoft.com/office/powerpoint/2010/main" val="1157013197"/>
       </p:ext>
     </p:extLst>
   </p:cSld>

</xml_diff>

<commit_message>
Updated some language errors
</commit_message>
<xml_diff>
--- a/Paper/Metadata/Navstack.pptx
+++ b/Paper/Metadata/Navstack.pptx
@@ -6146,633 +6146,660 @@
           </p:txBody>
         </p:sp>
       </p:grpSp>
-      <p:sp>
-        <p:nvSpPr>
-          <p:cNvPr id="7" name="Oval 6"/>
-          <p:cNvSpPr/>
+      <p:grpSp>
+        <p:nvGrpSpPr>
+          <p:cNvPr id="40" name="Group 39"/>
+          <p:cNvGrpSpPr/>
           <p:nvPr/>
-        </p:nvSpPr>
-        <p:spPr>
+        </p:nvGrpSpPr>
+        <p:grpSpPr>
           <a:xfrm>
-            <a:off x="5900056" y="536156"/>
-            <a:ext cx="1524000" cy="500169"/>
+            <a:off x="5049139" y="549220"/>
+            <a:ext cx="4889067" cy="3754453"/>
+            <a:chOff x="6114707" y="534756"/>
+            <a:chExt cx="3184632" cy="2355621"/>
           </a:xfrm>
-          <a:prstGeom prst="ellipse">
-            <a:avLst/>
-          </a:prstGeom>
-          <a:solidFill>
-            <a:schemeClr val="bg1"/>
-          </a:solidFill>
-          <a:ln>
+        </p:grpSpPr>
+        <p:sp>
+          <p:nvSpPr>
+            <p:cNvPr id="7" name="Oval 6"/>
+            <p:cNvSpPr/>
+            <p:nvPr/>
+          </p:nvSpPr>
+          <p:spPr>
+            <a:xfrm>
+              <a:off x="6131815" y="534756"/>
+              <a:ext cx="1060479" cy="500169"/>
+            </a:xfrm>
+            <a:prstGeom prst="ellipse">
+              <a:avLst/>
+            </a:prstGeom>
             <a:solidFill>
-              <a:schemeClr val="tx1"/>
+              <a:schemeClr val="bg1"/>
             </a:solidFill>
-          </a:ln>
-        </p:spPr>
-        <p:style>
-          <a:lnRef idx="2">
-            <a:schemeClr val="accent1">
-              <a:shade val="50000"/>
-            </a:schemeClr>
-          </a:lnRef>
-          <a:fillRef idx="1">
-            <a:schemeClr val="accent1"/>
-          </a:fillRef>
-          <a:effectRef idx="0">
-            <a:schemeClr val="accent1"/>
-          </a:effectRef>
-          <a:fontRef idx="minor">
-            <a:schemeClr val="lt1"/>
-          </a:fontRef>
-        </p:style>
-        <p:txBody>
-          <a:bodyPr rtlCol="0" anchor="ctr"/>
-          <a:lstStyle/>
-          <a:p>
-            <a:pPr algn="ctr"/>
-            <a:r>
-              <a:rPr lang="en-US" dirty="0" smtClean="0">
+            <a:ln>
+              <a:solidFill>
+                <a:schemeClr val="tx1"/>
+              </a:solidFill>
+            </a:ln>
+          </p:spPr>
+          <p:style>
+            <a:lnRef idx="2">
+              <a:schemeClr val="accent1">
+                <a:shade val="50000"/>
+              </a:schemeClr>
+            </a:lnRef>
+            <a:fillRef idx="1">
+              <a:schemeClr val="accent1"/>
+            </a:fillRef>
+            <a:effectRef idx="0">
+              <a:schemeClr val="accent1"/>
+            </a:effectRef>
+            <a:fontRef idx="minor">
+              <a:schemeClr val="lt1"/>
+            </a:fontRef>
+          </p:style>
+          <p:txBody>
+            <a:bodyPr rtlCol="0" anchor="ctr"/>
+            <a:lstStyle/>
+            <a:p>
+              <a:pPr algn="ctr"/>
+              <a:r>
+                <a:rPr lang="en-US" dirty="0" smtClean="0">
+                  <a:solidFill>
+                    <a:schemeClr val="tx1"/>
+                  </a:solidFill>
+                  <a:latin typeface="Baskerville" charset="0"/>
+                  <a:ea typeface="Baskerville" charset="0"/>
+                  <a:cs typeface="Baskerville" charset="0"/>
+                </a:rPr>
+                <a:t>laser</a:t>
+              </a:r>
+              <a:endParaRPr lang="en-US" dirty="0">
                 <a:solidFill>
                   <a:schemeClr val="tx1"/>
                 </a:solidFill>
                 <a:latin typeface="Baskerville" charset="0"/>
                 <a:ea typeface="Baskerville" charset="0"/>
                 <a:cs typeface="Baskerville" charset="0"/>
-              </a:rPr>
-              <a:t>laser</a:t>
-            </a:r>
-            <a:endParaRPr lang="en-US" dirty="0">
+              </a:endParaRPr>
+            </a:p>
+          </p:txBody>
+        </p:sp>
+        <p:sp>
+          <p:nvSpPr>
+            <p:cNvPr id="29" name="Oval 28"/>
+            <p:cNvSpPr/>
+            <p:nvPr/>
+          </p:nvSpPr>
+          <p:spPr>
+            <a:xfrm>
+              <a:off x="6131816" y="1404257"/>
+              <a:ext cx="1060478" cy="500169"/>
+            </a:xfrm>
+            <a:prstGeom prst="ellipse">
+              <a:avLst/>
+            </a:prstGeom>
+            <a:solidFill>
+              <a:schemeClr val="bg1"/>
+            </a:solidFill>
+            <a:ln>
               <a:solidFill>
                 <a:schemeClr val="tx1"/>
               </a:solidFill>
-              <a:latin typeface="Baskerville" charset="0"/>
-              <a:ea typeface="Baskerville" charset="0"/>
-              <a:cs typeface="Baskerville" charset="0"/>
-            </a:endParaRPr>
-          </a:p>
-        </p:txBody>
-      </p:sp>
-      <p:sp>
-        <p:nvSpPr>
-          <p:cNvPr id="29" name="Oval 28"/>
-          <p:cNvSpPr/>
-          <p:nvPr/>
-        </p:nvSpPr>
-        <p:spPr>
-          <a:xfrm>
-            <a:off x="5900057" y="1404258"/>
-            <a:ext cx="1523999" cy="500169"/>
-          </a:xfrm>
-          <a:prstGeom prst="ellipse">
-            <a:avLst/>
-          </a:prstGeom>
-          <a:solidFill>
-            <a:schemeClr val="bg1"/>
-          </a:solidFill>
-          <a:ln>
-            <a:solidFill>
-              <a:schemeClr val="tx1"/>
-            </a:solidFill>
-          </a:ln>
-        </p:spPr>
-        <p:style>
-          <a:lnRef idx="2">
-            <a:schemeClr val="accent1">
-              <a:shade val="50000"/>
-            </a:schemeClr>
-          </a:lnRef>
-          <a:fillRef idx="1">
-            <a:schemeClr val="accent1"/>
-          </a:fillRef>
-          <a:effectRef idx="0">
-            <a:schemeClr val="accent1"/>
-          </a:effectRef>
-          <a:fontRef idx="minor">
-            <a:schemeClr val="lt1"/>
-          </a:fontRef>
-        </p:style>
-        <p:txBody>
-          <a:bodyPr rtlCol="0" anchor="ctr"/>
-          <a:lstStyle/>
-          <a:p>
-            <a:pPr algn="ctr"/>
-            <a:r>
-              <a:rPr lang="en-US" dirty="0" err="1" smtClean="0">
+            </a:ln>
+          </p:spPr>
+          <p:style>
+            <a:lnRef idx="2">
+              <a:schemeClr val="accent1">
+                <a:shade val="50000"/>
+              </a:schemeClr>
+            </a:lnRef>
+            <a:fillRef idx="1">
+              <a:schemeClr val="accent1"/>
+            </a:fillRef>
+            <a:effectRef idx="0">
+              <a:schemeClr val="accent1"/>
+            </a:effectRef>
+            <a:fontRef idx="minor">
+              <a:schemeClr val="lt1"/>
+            </a:fontRef>
+          </p:style>
+          <p:txBody>
+            <a:bodyPr rtlCol="0" anchor="ctr"/>
+            <a:lstStyle/>
+            <a:p>
+              <a:pPr algn="ctr"/>
+              <a:r>
+                <a:rPr lang="en-US" dirty="0" err="1" smtClean="0">
+                  <a:solidFill>
+                    <a:schemeClr val="tx1"/>
+                  </a:solidFill>
+                  <a:latin typeface="Baskerville" charset="0"/>
+                  <a:ea typeface="Baskerville" charset="0"/>
+                  <a:cs typeface="Baskerville" charset="0"/>
+                </a:rPr>
+                <a:t>base_link</a:t>
+              </a:r>
+              <a:endParaRPr lang="en-US" dirty="0">
                 <a:solidFill>
                   <a:schemeClr val="tx1"/>
                 </a:solidFill>
                 <a:latin typeface="Baskerville" charset="0"/>
                 <a:ea typeface="Baskerville" charset="0"/>
                 <a:cs typeface="Baskerville" charset="0"/>
-              </a:rPr>
-              <a:t>base_link</a:t>
-            </a:r>
-            <a:endParaRPr lang="en-US" dirty="0">
+              </a:endParaRPr>
+            </a:p>
+          </p:txBody>
+        </p:sp>
+        <p:sp>
+          <p:nvSpPr>
+            <p:cNvPr id="30" name="Oval 29"/>
+            <p:cNvSpPr/>
+            <p:nvPr/>
+          </p:nvSpPr>
+          <p:spPr>
+            <a:xfrm>
+              <a:off x="6114707" y="2272359"/>
+              <a:ext cx="1092777" cy="500169"/>
+            </a:xfrm>
+            <a:prstGeom prst="ellipse">
+              <a:avLst/>
+            </a:prstGeom>
+            <a:solidFill>
+              <a:schemeClr val="bg1"/>
+            </a:solidFill>
+            <a:ln>
               <a:solidFill>
                 <a:schemeClr val="tx1"/>
               </a:solidFill>
-              <a:latin typeface="Baskerville" charset="0"/>
-              <a:ea typeface="Baskerville" charset="0"/>
-              <a:cs typeface="Baskerville" charset="0"/>
-            </a:endParaRPr>
-          </a:p>
-        </p:txBody>
-      </p:sp>
-      <p:sp>
-        <p:nvSpPr>
-          <p:cNvPr id="30" name="Oval 29"/>
-          <p:cNvSpPr/>
-          <p:nvPr/>
-        </p:nvSpPr>
-        <p:spPr>
-          <a:xfrm>
-            <a:off x="5900056" y="2272360"/>
-            <a:ext cx="1524000" cy="500169"/>
-          </a:xfrm>
-          <a:prstGeom prst="ellipse">
-            <a:avLst/>
-          </a:prstGeom>
-          <a:solidFill>
-            <a:schemeClr val="bg1"/>
-          </a:solidFill>
-          <a:ln>
-            <a:solidFill>
-              <a:schemeClr val="tx1"/>
-            </a:solidFill>
-          </a:ln>
-        </p:spPr>
-        <p:style>
-          <a:lnRef idx="2">
-            <a:schemeClr val="accent1">
-              <a:shade val="50000"/>
-            </a:schemeClr>
-          </a:lnRef>
-          <a:fillRef idx="1">
-            <a:schemeClr val="accent1"/>
-          </a:fillRef>
-          <a:effectRef idx="0">
-            <a:schemeClr val="accent1"/>
-          </a:effectRef>
-          <a:fontRef idx="minor">
-            <a:schemeClr val="lt1"/>
-          </a:fontRef>
-        </p:style>
-        <p:txBody>
-          <a:bodyPr lIns="0" rIns="0" rtlCol="0" anchor="ctr"/>
-          <a:lstStyle/>
-          <a:p>
-            <a:pPr algn="ctr"/>
-            <a:r>
-              <a:rPr lang="en-US" dirty="0" err="1" smtClean="0">
+            </a:ln>
+          </p:spPr>
+          <p:style>
+            <a:lnRef idx="2">
+              <a:schemeClr val="accent1">
+                <a:shade val="50000"/>
+              </a:schemeClr>
+            </a:lnRef>
+            <a:fillRef idx="1">
+              <a:schemeClr val="accent1"/>
+            </a:fillRef>
+            <a:effectRef idx="0">
+              <a:schemeClr val="accent1"/>
+            </a:effectRef>
+            <a:fontRef idx="minor">
+              <a:schemeClr val="lt1"/>
+            </a:fontRef>
+          </p:style>
+          <p:txBody>
+            <a:bodyPr lIns="0" rIns="0" rtlCol="0" anchor="ctr"/>
+            <a:lstStyle/>
+            <a:p>
+              <a:pPr algn="ctr"/>
+              <a:r>
+                <a:rPr lang="en-US" dirty="0" err="1" smtClean="0">
+                  <a:solidFill>
+                    <a:schemeClr val="tx1"/>
+                  </a:solidFill>
+                  <a:latin typeface="Baskerville" charset="0"/>
+                  <a:ea typeface="Baskerville" charset="0"/>
+                  <a:cs typeface="Baskerville" charset="0"/>
+                </a:rPr>
+                <a:t>base_frame</a:t>
+              </a:r>
+              <a:endParaRPr lang="en-US" dirty="0">
                 <a:solidFill>
                   <a:schemeClr val="tx1"/>
                 </a:solidFill>
                 <a:latin typeface="Baskerville" charset="0"/>
                 <a:ea typeface="Baskerville" charset="0"/>
                 <a:cs typeface="Baskerville" charset="0"/>
-              </a:rPr>
-              <a:t>base_frame</a:t>
-            </a:r>
-            <a:endParaRPr lang="en-US" dirty="0">
+              </a:endParaRPr>
+            </a:p>
+          </p:txBody>
+        </p:sp>
+        <p:sp>
+          <p:nvSpPr>
+            <p:cNvPr id="32" name="Oval 31"/>
+            <p:cNvSpPr/>
+            <p:nvPr/>
+          </p:nvSpPr>
+          <p:spPr>
+            <a:xfrm>
+              <a:off x="8235731" y="2272359"/>
+              <a:ext cx="1043652" cy="500169"/>
+            </a:xfrm>
+            <a:prstGeom prst="ellipse">
+              <a:avLst/>
+            </a:prstGeom>
+            <a:solidFill>
+              <a:schemeClr val="bg1"/>
+            </a:solidFill>
+            <a:ln>
               <a:solidFill>
                 <a:schemeClr val="tx1"/>
               </a:solidFill>
-              <a:latin typeface="Baskerville" charset="0"/>
-              <a:ea typeface="Baskerville" charset="0"/>
-              <a:cs typeface="Baskerville" charset="0"/>
-            </a:endParaRPr>
-          </a:p>
-        </p:txBody>
-      </p:sp>
-      <p:sp>
-        <p:nvSpPr>
-          <p:cNvPr id="32" name="Oval 31"/>
-          <p:cNvSpPr/>
-          <p:nvPr/>
-        </p:nvSpPr>
-        <p:spPr>
-          <a:xfrm>
-            <a:off x="7990115" y="2272359"/>
-            <a:ext cx="1534884" cy="500169"/>
-          </a:xfrm>
-          <a:prstGeom prst="ellipse">
-            <a:avLst/>
-          </a:prstGeom>
-          <a:solidFill>
-            <a:schemeClr val="bg1"/>
-          </a:solidFill>
-          <a:ln>
-            <a:solidFill>
-              <a:schemeClr val="tx1"/>
-            </a:solidFill>
-          </a:ln>
-        </p:spPr>
-        <p:style>
-          <a:lnRef idx="2">
-            <a:schemeClr val="accent1">
-              <a:shade val="50000"/>
-            </a:schemeClr>
-          </a:lnRef>
-          <a:fillRef idx="1">
-            <a:schemeClr val="accent1"/>
-          </a:fillRef>
-          <a:effectRef idx="0">
-            <a:schemeClr val="accent1"/>
-          </a:effectRef>
-          <a:fontRef idx="minor">
-            <a:schemeClr val="lt1"/>
-          </a:fontRef>
-        </p:style>
-        <p:txBody>
-          <a:bodyPr lIns="0" rIns="0" rtlCol="0" anchor="ctr"/>
-          <a:lstStyle/>
-          <a:p>
-            <a:pPr algn="ctr"/>
-            <a:r>
-              <a:rPr lang="en-US" dirty="0" err="1" smtClean="0">
+            </a:ln>
+          </p:spPr>
+          <p:style>
+            <a:lnRef idx="2">
+              <a:schemeClr val="accent1">
+                <a:shade val="50000"/>
+              </a:schemeClr>
+            </a:lnRef>
+            <a:fillRef idx="1">
+              <a:schemeClr val="accent1"/>
+            </a:fillRef>
+            <a:effectRef idx="0">
+              <a:schemeClr val="accent1"/>
+            </a:effectRef>
+            <a:fontRef idx="minor">
+              <a:schemeClr val="lt1"/>
+            </a:fontRef>
+          </p:style>
+          <p:txBody>
+            <a:bodyPr lIns="0" rIns="0" rtlCol="0" anchor="ctr"/>
+            <a:lstStyle/>
+            <a:p>
+              <a:pPr algn="ctr"/>
+              <a:r>
+                <a:rPr lang="en-US" dirty="0" err="1" smtClean="0">
+                  <a:solidFill>
+                    <a:schemeClr val="tx1"/>
+                  </a:solidFill>
+                  <a:latin typeface="Baskerville" charset="0"/>
+                  <a:ea typeface="Baskerville" charset="0"/>
+                  <a:cs typeface="Baskerville" charset="0"/>
+                </a:rPr>
+                <a:t>odom</a:t>
+              </a:r>
+              <a:endParaRPr lang="en-US" dirty="0">
                 <a:solidFill>
                   <a:schemeClr val="tx1"/>
                 </a:solidFill>
                 <a:latin typeface="Baskerville" charset="0"/>
                 <a:ea typeface="Baskerville" charset="0"/>
                 <a:cs typeface="Baskerville" charset="0"/>
-              </a:rPr>
-              <a:t>odom</a:t>
-            </a:r>
-            <a:endParaRPr lang="en-US" dirty="0">
+              </a:endParaRPr>
+            </a:p>
+          </p:txBody>
+        </p:sp>
+        <p:sp>
+          <p:nvSpPr>
+            <p:cNvPr id="34" name="Oval 33"/>
+            <p:cNvSpPr/>
+            <p:nvPr/>
+          </p:nvSpPr>
+          <p:spPr>
+            <a:xfrm>
+              <a:off x="8215774" y="1404257"/>
+              <a:ext cx="1083565" cy="500169"/>
+            </a:xfrm>
+            <a:prstGeom prst="ellipse">
+              <a:avLst/>
+            </a:prstGeom>
+            <a:solidFill>
+              <a:schemeClr val="bg1"/>
+            </a:solidFill>
+            <a:ln>
               <a:solidFill>
                 <a:schemeClr val="tx1"/>
               </a:solidFill>
-              <a:latin typeface="Baskerville" charset="0"/>
-              <a:ea typeface="Baskerville" charset="0"/>
-              <a:cs typeface="Baskerville" charset="0"/>
-            </a:endParaRPr>
-          </a:p>
-        </p:txBody>
-      </p:sp>
-      <p:sp>
-        <p:nvSpPr>
-          <p:cNvPr id="34" name="Oval 33"/>
-          <p:cNvSpPr/>
-          <p:nvPr/>
-        </p:nvSpPr>
-        <p:spPr>
-          <a:xfrm>
-            <a:off x="7990115" y="1404257"/>
-            <a:ext cx="1534884" cy="500169"/>
-          </a:xfrm>
-          <a:prstGeom prst="ellipse">
-            <a:avLst/>
-          </a:prstGeom>
-          <a:solidFill>
-            <a:schemeClr val="bg1"/>
-          </a:solidFill>
-          <a:ln>
-            <a:solidFill>
-              <a:schemeClr val="tx1"/>
-            </a:solidFill>
-          </a:ln>
-        </p:spPr>
-        <p:style>
-          <a:lnRef idx="2">
-            <a:schemeClr val="accent1">
-              <a:shade val="50000"/>
-            </a:schemeClr>
-          </a:lnRef>
-          <a:fillRef idx="1">
-            <a:schemeClr val="accent1"/>
-          </a:fillRef>
-          <a:effectRef idx="0">
-            <a:schemeClr val="accent1"/>
-          </a:effectRef>
-          <a:fontRef idx="minor">
-            <a:schemeClr val="lt1"/>
-          </a:fontRef>
-        </p:style>
-        <p:txBody>
-          <a:bodyPr lIns="0" rIns="0" rtlCol="0" anchor="ctr"/>
-          <a:lstStyle/>
-          <a:p>
-            <a:pPr algn="ctr"/>
-            <a:r>
-              <a:rPr lang="en-US" dirty="0" smtClean="0">
+            </a:ln>
+          </p:spPr>
+          <p:style>
+            <a:lnRef idx="2">
+              <a:schemeClr val="accent1">
+                <a:shade val="50000"/>
+              </a:schemeClr>
+            </a:lnRef>
+            <a:fillRef idx="1">
+              <a:schemeClr val="accent1"/>
+            </a:fillRef>
+            <a:effectRef idx="0">
+              <a:schemeClr val="accent1"/>
+            </a:effectRef>
+            <a:fontRef idx="minor">
+              <a:schemeClr val="lt1"/>
+            </a:fontRef>
+          </p:style>
+          <p:txBody>
+            <a:bodyPr lIns="0" rIns="0" rtlCol="0" anchor="ctr"/>
+            <a:lstStyle/>
+            <a:p>
+              <a:pPr algn="ctr"/>
+              <a:r>
+                <a:rPr lang="en-US" dirty="0" smtClean="0">
+                  <a:solidFill>
+                    <a:schemeClr val="tx1"/>
+                  </a:solidFill>
+                  <a:latin typeface="Baskerville" charset="0"/>
+                  <a:ea typeface="Baskerville" charset="0"/>
+                  <a:cs typeface="Baskerville" charset="0"/>
+                </a:rPr>
+                <a:t>map</a:t>
+              </a:r>
+              <a:endParaRPr lang="en-US" dirty="0">
                 <a:solidFill>
                   <a:schemeClr val="tx1"/>
                 </a:solidFill>
                 <a:latin typeface="Baskerville" charset="0"/>
                 <a:ea typeface="Baskerville" charset="0"/>
                 <a:cs typeface="Baskerville" charset="0"/>
-              </a:rPr>
-              <a:t>map</a:t>
-            </a:r>
-            <a:endParaRPr lang="en-US" dirty="0">
+              </a:endParaRPr>
+            </a:p>
+          </p:txBody>
+        </p:sp>
+        <p:cxnSp>
+          <p:nvCxnSpPr>
+            <p:cNvPr id="10" name="Straight Arrow Connector 9"/>
+            <p:cNvCxnSpPr>
+              <a:stCxn id="7" idx="4"/>
+              <a:endCxn id="29" idx="0"/>
+            </p:cNvCxnSpPr>
+            <p:nvPr/>
+          </p:nvCxnSpPr>
+          <p:spPr>
+            <a:xfrm>
+              <a:off x="6662054" y="1034925"/>
+              <a:ext cx="1" cy="369332"/>
+            </a:xfrm>
+            <a:prstGeom prst="straightConnector1">
+              <a:avLst/>
+            </a:prstGeom>
+            <a:ln>
               <a:solidFill>
                 <a:schemeClr val="tx1"/>
               </a:solidFill>
-              <a:latin typeface="Baskerville" charset="0"/>
-              <a:ea typeface="Baskerville" charset="0"/>
-              <a:cs typeface="Baskerville" charset="0"/>
-            </a:endParaRPr>
-          </a:p>
-        </p:txBody>
-      </p:sp>
-      <p:cxnSp>
-        <p:nvCxnSpPr>
-          <p:cNvPr id="10" name="Straight Arrow Connector 9"/>
-          <p:cNvCxnSpPr>
-            <a:stCxn id="7" idx="4"/>
-            <a:endCxn id="29" idx="0"/>
-          </p:cNvCxnSpPr>
-          <p:nvPr/>
-        </p:nvCxnSpPr>
-        <p:spPr>
-          <a:xfrm>
-            <a:off x="6662056" y="1036325"/>
-            <a:ext cx="1" cy="367933"/>
-          </a:xfrm>
-          <a:prstGeom prst="straightConnector1">
-            <a:avLst/>
-          </a:prstGeom>
-          <a:ln>
-            <a:tailEnd type="triangle"/>
-          </a:ln>
-        </p:spPr>
-        <p:style>
-          <a:lnRef idx="1">
-            <a:schemeClr val="accent1"/>
-          </a:lnRef>
-          <a:fillRef idx="0">
-            <a:schemeClr val="accent1"/>
-          </a:fillRef>
-          <a:effectRef idx="0">
-            <a:schemeClr val="accent1"/>
-          </a:effectRef>
-          <a:fontRef idx="minor">
-            <a:schemeClr val="tx1"/>
-          </a:fontRef>
-        </p:style>
-      </p:cxnSp>
-      <p:cxnSp>
-        <p:nvCxnSpPr>
-          <p:cNvPr id="14" name="Straight Arrow Connector 13"/>
-          <p:cNvCxnSpPr>
-            <a:stCxn id="29" idx="4"/>
-            <a:endCxn id="30" idx="0"/>
-          </p:cNvCxnSpPr>
-          <p:nvPr/>
-        </p:nvCxnSpPr>
-        <p:spPr>
-          <a:xfrm flipH="1">
-            <a:off x="6662056" y="1904427"/>
-            <a:ext cx="1" cy="367933"/>
-          </a:xfrm>
-          <a:prstGeom prst="straightConnector1">
-            <a:avLst/>
-          </a:prstGeom>
-          <a:ln>
-            <a:tailEnd type="triangle"/>
-          </a:ln>
-        </p:spPr>
-        <p:style>
-          <a:lnRef idx="1">
-            <a:schemeClr val="accent1"/>
-          </a:lnRef>
-          <a:fillRef idx="0">
-            <a:schemeClr val="accent1"/>
-          </a:fillRef>
-          <a:effectRef idx="0">
-            <a:schemeClr val="accent1"/>
-          </a:effectRef>
-          <a:fontRef idx="minor">
-            <a:schemeClr val="tx1"/>
-          </a:fontRef>
-        </p:style>
-      </p:cxnSp>
-      <p:cxnSp>
-        <p:nvCxnSpPr>
-          <p:cNvPr id="16" name="Straight Arrow Connector 15"/>
-          <p:cNvCxnSpPr>
-            <a:stCxn id="30" idx="6"/>
-            <a:endCxn id="32" idx="2"/>
-          </p:cNvCxnSpPr>
-          <p:nvPr/>
-        </p:nvCxnSpPr>
-        <p:spPr>
-          <a:xfrm flipV="1">
-            <a:off x="7424056" y="2522444"/>
-            <a:ext cx="566059" cy="1"/>
-          </a:xfrm>
-          <a:prstGeom prst="straightConnector1">
-            <a:avLst/>
-          </a:prstGeom>
-          <a:ln>
-            <a:tailEnd type="triangle"/>
-          </a:ln>
-        </p:spPr>
-        <p:style>
-          <a:lnRef idx="1">
-            <a:schemeClr val="accent1"/>
-          </a:lnRef>
-          <a:fillRef idx="0">
-            <a:schemeClr val="accent1"/>
-          </a:fillRef>
-          <a:effectRef idx="0">
-            <a:schemeClr val="accent1"/>
-          </a:effectRef>
-          <a:fontRef idx="minor">
-            <a:schemeClr val="tx1"/>
-          </a:fontRef>
-        </p:style>
-      </p:cxnSp>
-      <p:cxnSp>
-        <p:nvCxnSpPr>
-          <p:cNvPr id="18" name="Straight Arrow Connector 17"/>
-          <p:cNvCxnSpPr>
-            <a:stCxn id="32" idx="0"/>
-            <a:endCxn id="34" idx="4"/>
-          </p:cNvCxnSpPr>
-          <p:nvPr/>
-        </p:nvCxnSpPr>
-        <p:spPr>
-          <a:xfrm flipV="1">
-            <a:off x="8757557" y="1904426"/>
-            <a:ext cx="0" cy="367933"/>
-          </a:xfrm>
-          <a:prstGeom prst="straightConnector1">
-            <a:avLst/>
-          </a:prstGeom>
-          <a:ln>
-            <a:tailEnd type="triangle"/>
-          </a:ln>
-        </p:spPr>
-        <p:style>
-          <a:lnRef idx="1">
-            <a:schemeClr val="accent1"/>
-          </a:lnRef>
-          <a:fillRef idx="0">
-            <a:schemeClr val="accent1"/>
-          </a:fillRef>
-          <a:effectRef idx="0">
-            <a:schemeClr val="accent1"/>
-          </a:effectRef>
-          <a:fontRef idx="minor">
-            <a:schemeClr val="tx1"/>
-          </a:fontRef>
-        </p:style>
-      </p:cxnSp>
-      <p:sp>
-        <p:nvSpPr>
-          <p:cNvPr id="39" name="TextBox 38"/>
-          <p:cNvSpPr txBox="1"/>
-          <p:nvPr/>
-        </p:nvSpPr>
-        <p:spPr>
-          <a:xfrm>
-            <a:off x="6662056" y="1034925"/>
-            <a:ext cx="298480" cy="369332"/>
-          </a:xfrm>
-          <a:prstGeom prst="rect">
-            <a:avLst/>
-          </a:prstGeom>
-          <a:noFill/>
-        </p:spPr>
-        <p:txBody>
-          <a:bodyPr wrap="none" rtlCol="0">
-            <a:spAutoFit/>
-          </a:bodyPr>
-          <a:lstStyle/>
-          <a:p>
-            <a:r>
-              <a:rPr lang="en-US" i="1" dirty="0" err="1" smtClean="0">
+              <a:tailEnd type="triangle"/>
+            </a:ln>
+          </p:spPr>
+          <p:style>
+            <a:lnRef idx="1">
+              <a:schemeClr val="accent1"/>
+            </a:lnRef>
+            <a:fillRef idx="0">
+              <a:schemeClr val="accent1"/>
+            </a:fillRef>
+            <a:effectRef idx="0">
+              <a:schemeClr val="accent1"/>
+            </a:effectRef>
+            <a:fontRef idx="minor">
+              <a:schemeClr val="tx1"/>
+            </a:fontRef>
+          </p:style>
+        </p:cxnSp>
+        <p:cxnSp>
+          <p:nvCxnSpPr>
+            <p:cNvPr id="14" name="Straight Arrow Connector 13"/>
+            <p:cNvCxnSpPr>
+              <a:stCxn id="29" idx="4"/>
+              <a:endCxn id="30" idx="0"/>
+            </p:cNvCxnSpPr>
+            <p:nvPr/>
+          </p:nvCxnSpPr>
+          <p:spPr>
+            <a:xfrm flipH="1">
+              <a:off x="6661095" y="1904426"/>
+              <a:ext cx="960" cy="367933"/>
+            </a:xfrm>
+            <a:prstGeom prst="straightConnector1">
+              <a:avLst/>
+            </a:prstGeom>
+            <a:ln>
+              <a:solidFill>
+                <a:schemeClr val="tx1"/>
+              </a:solidFill>
+              <a:tailEnd type="triangle"/>
+            </a:ln>
+          </p:spPr>
+          <p:style>
+            <a:lnRef idx="1">
+              <a:schemeClr val="accent1"/>
+            </a:lnRef>
+            <a:fillRef idx="0">
+              <a:schemeClr val="accent1"/>
+            </a:fillRef>
+            <a:effectRef idx="0">
+              <a:schemeClr val="accent1"/>
+            </a:effectRef>
+            <a:fontRef idx="minor">
+              <a:schemeClr val="tx1"/>
+            </a:fontRef>
+          </p:style>
+        </p:cxnSp>
+        <p:cxnSp>
+          <p:nvCxnSpPr>
+            <p:cNvPr id="16" name="Straight Arrow Connector 15"/>
+            <p:cNvCxnSpPr>
+              <a:stCxn id="30" idx="6"/>
+              <a:endCxn id="32" idx="2"/>
+            </p:cNvCxnSpPr>
+            <p:nvPr/>
+          </p:nvCxnSpPr>
+          <p:spPr>
+            <a:xfrm>
+              <a:off x="7207484" y="2522444"/>
+              <a:ext cx="1028247" cy="0"/>
+            </a:xfrm>
+            <a:prstGeom prst="straightConnector1">
+              <a:avLst/>
+            </a:prstGeom>
+            <a:ln>
+              <a:solidFill>
+                <a:schemeClr val="tx1"/>
+              </a:solidFill>
+              <a:tailEnd type="triangle"/>
+            </a:ln>
+          </p:spPr>
+          <p:style>
+            <a:lnRef idx="1">
+              <a:schemeClr val="accent1"/>
+            </a:lnRef>
+            <a:fillRef idx="0">
+              <a:schemeClr val="accent1"/>
+            </a:fillRef>
+            <a:effectRef idx="0">
+              <a:schemeClr val="accent1"/>
+            </a:effectRef>
+            <a:fontRef idx="minor">
+              <a:schemeClr val="tx1"/>
+            </a:fontRef>
+          </p:style>
+        </p:cxnSp>
+        <p:cxnSp>
+          <p:nvCxnSpPr>
+            <p:cNvPr id="18" name="Straight Arrow Connector 17"/>
+            <p:cNvCxnSpPr>
+              <a:stCxn id="32" idx="0"/>
+              <a:endCxn id="34" idx="4"/>
+            </p:cNvCxnSpPr>
+            <p:nvPr/>
+          </p:nvCxnSpPr>
+          <p:spPr>
+            <a:xfrm flipH="1" flipV="1">
+              <a:off x="8757556" y="1904426"/>
+              <a:ext cx="1" cy="367933"/>
+            </a:xfrm>
+            <a:prstGeom prst="straightConnector1">
+              <a:avLst/>
+            </a:prstGeom>
+            <a:ln>
+              <a:solidFill>
+                <a:schemeClr val="tx1"/>
+              </a:solidFill>
+              <a:tailEnd type="triangle"/>
+            </a:ln>
+          </p:spPr>
+          <p:style>
+            <a:lnRef idx="1">
+              <a:schemeClr val="accent1"/>
+            </a:lnRef>
+            <a:fillRef idx="0">
+              <a:schemeClr val="accent1"/>
+            </a:fillRef>
+            <a:effectRef idx="0">
+              <a:schemeClr val="accent1"/>
+            </a:effectRef>
+            <a:fontRef idx="minor">
+              <a:schemeClr val="tx1"/>
+            </a:fontRef>
+          </p:style>
+        </p:cxnSp>
+        <p:sp>
+          <p:nvSpPr>
+            <p:cNvPr id="39" name="TextBox 38"/>
+            <p:cNvSpPr txBox="1"/>
+            <p:nvPr/>
+          </p:nvSpPr>
+          <p:spPr>
+            <a:xfrm>
+              <a:off x="6662056" y="1098945"/>
+              <a:ext cx="298480" cy="369332"/>
+            </a:xfrm>
+            <a:prstGeom prst="rect">
+              <a:avLst/>
+            </a:prstGeom>
+            <a:noFill/>
+          </p:spPr>
+          <p:txBody>
+            <a:bodyPr wrap="none" rtlCol="0">
+              <a:spAutoFit/>
+            </a:bodyPr>
+            <a:lstStyle/>
+            <a:p>
+              <a:r>
+                <a:rPr lang="en-US" i="1" dirty="0" err="1" smtClean="0">
+                  <a:latin typeface="Baskerville" charset="0"/>
+                  <a:ea typeface="Baskerville" charset="0"/>
+                  <a:cs typeface="Baskerville" charset="0"/>
+                </a:rPr>
+                <a:t>tf</a:t>
+              </a:r>
+              <a:endParaRPr lang="en-US" i="1" dirty="0">
                 <a:latin typeface="Baskerville" charset="0"/>
                 <a:ea typeface="Baskerville" charset="0"/>
                 <a:cs typeface="Baskerville" charset="0"/>
-              </a:rPr>
-              <a:t>tf</a:t>
-            </a:r>
-            <a:endParaRPr lang="en-US" i="1" dirty="0">
-              <a:latin typeface="Baskerville" charset="0"/>
-              <a:ea typeface="Baskerville" charset="0"/>
-              <a:cs typeface="Baskerville" charset="0"/>
-            </a:endParaRPr>
-          </a:p>
-        </p:txBody>
-      </p:sp>
-      <p:sp>
-        <p:nvSpPr>
-          <p:cNvPr id="43" name="TextBox 42"/>
-          <p:cNvSpPr txBox="1"/>
-          <p:nvPr/>
-        </p:nvSpPr>
-        <p:spPr>
-          <a:xfrm>
-            <a:off x="6662056" y="1903726"/>
-            <a:ext cx="298480" cy="369332"/>
-          </a:xfrm>
-          <a:prstGeom prst="rect">
-            <a:avLst/>
-          </a:prstGeom>
-          <a:noFill/>
-        </p:spPr>
-        <p:txBody>
-          <a:bodyPr wrap="none" rtlCol="0">
-            <a:spAutoFit/>
-          </a:bodyPr>
-          <a:lstStyle/>
-          <a:p>
-            <a:r>
-              <a:rPr lang="en-US" i="1" dirty="0" err="1" smtClean="0">
+              </a:endParaRPr>
+            </a:p>
+          </p:txBody>
+        </p:sp>
+        <p:sp>
+          <p:nvSpPr>
+            <p:cNvPr id="43" name="TextBox 42"/>
+            <p:cNvSpPr txBox="1"/>
+            <p:nvPr/>
+          </p:nvSpPr>
+          <p:spPr>
+            <a:xfrm>
+              <a:off x="6662056" y="1968446"/>
+              <a:ext cx="298480" cy="369332"/>
+            </a:xfrm>
+            <a:prstGeom prst="rect">
+              <a:avLst/>
+            </a:prstGeom>
+            <a:noFill/>
+          </p:spPr>
+          <p:txBody>
+            <a:bodyPr wrap="none" rtlCol="0">
+              <a:spAutoFit/>
+            </a:bodyPr>
+            <a:lstStyle/>
+            <a:p>
+              <a:r>
+                <a:rPr lang="en-US" i="1" dirty="0" err="1" smtClean="0">
+                  <a:latin typeface="Baskerville" charset="0"/>
+                  <a:ea typeface="Baskerville" charset="0"/>
+                  <a:cs typeface="Baskerville" charset="0"/>
+                </a:rPr>
+                <a:t>tf</a:t>
+              </a:r>
+              <a:endParaRPr lang="en-US" i="1" dirty="0">
                 <a:latin typeface="Baskerville" charset="0"/>
                 <a:ea typeface="Baskerville" charset="0"/>
                 <a:cs typeface="Baskerville" charset="0"/>
-              </a:rPr>
-              <a:t>tf</a:t>
-            </a:r>
-            <a:endParaRPr lang="en-US" i="1" dirty="0">
-              <a:latin typeface="Baskerville" charset="0"/>
-              <a:ea typeface="Baskerville" charset="0"/>
-              <a:cs typeface="Baskerville" charset="0"/>
-            </a:endParaRPr>
-          </a:p>
-        </p:txBody>
-      </p:sp>
-      <p:sp>
-        <p:nvSpPr>
-          <p:cNvPr id="45" name="TextBox 44"/>
-          <p:cNvSpPr txBox="1"/>
-          <p:nvPr/>
-        </p:nvSpPr>
-        <p:spPr>
-          <a:xfrm>
-            <a:off x="7126638" y="2630253"/>
-            <a:ext cx="1160895" cy="369332"/>
-          </a:xfrm>
-          <a:prstGeom prst="rect">
-            <a:avLst/>
-          </a:prstGeom>
-          <a:noFill/>
-        </p:spPr>
-        <p:txBody>
-          <a:bodyPr wrap="none" rtlCol="0">
-            <a:spAutoFit/>
-          </a:bodyPr>
-          <a:lstStyle/>
-          <a:p>
-            <a:r>
-              <a:rPr lang="en-US" i="1" dirty="0" err="1" smtClean="0">
+              </a:endParaRPr>
+            </a:p>
+          </p:txBody>
+        </p:sp>
+        <p:sp>
+          <p:nvSpPr>
+            <p:cNvPr id="45" name="TextBox 44"/>
+            <p:cNvSpPr txBox="1"/>
+            <p:nvPr/>
+          </p:nvSpPr>
+          <p:spPr>
+            <a:xfrm>
+              <a:off x="7352954" y="2521045"/>
+              <a:ext cx="1160895" cy="369332"/>
+            </a:xfrm>
+            <a:prstGeom prst="rect">
+              <a:avLst/>
+            </a:prstGeom>
+            <a:noFill/>
+          </p:spPr>
+          <p:txBody>
+            <a:bodyPr wrap="none" rtlCol="0">
+              <a:spAutoFit/>
+            </a:bodyPr>
+            <a:lstStyle/>
+            <a:p>
+              <a:r>
+                <a:rPr lang="en-US" i="1" dirty="0" err="1" smtClean="0">
+                  <a:latin typeface="Baskerville" charset="0"/>
+                  <a:ea typeface="Baskerville" charset="0"/>
+                  <a:cs typeface="Baskerville" charset="0"/>
+                </a:rPr>
+                <a:t>hector_odom</a:t>
+              </a:r>
+              <a:endParaRPr lang="en-US" i="1" dirty="0">
                 <a:latin typeface="Baskerville" charset="0"/>
                 <a:ea typeface="Baskerville" charset="0"/>
                 <a:cs typeface="Baskerville" charset="0"/>
-              </a:rPr>
-              <a:t>hector_odom</a:t>
-            </a:r>
-            <a:endParaRPr lang="en-US" i="1" dirty="0">
-              <a:latin typeface="Baskerville" charset="0"/>
-              <a:ea typeface="Baskerville" charset="0"/>
-              <a:cs typeface="Baskerville" charset="0"/>
-            </a:endParaRPr>
-          </a:p>
-        </p:txBody>
-      </p:sp>
-      <p:sp>
-        <p:nvSpPr>
-          <p:cNvPr id="47" name="TextBox 46"/>
-          <p:cNvSpPr txBox="1"/>
-          <p:nvPr/>
-        </p:nvSpPr>
-        <p:spPr>
-          <a:xfrm>
-            <a:off x="8186055" y="1903726"/>
-            <a:ext cx="550087" cy="369332"/>
-          </a:xfrm>
-          <a:prstGeom prst="rect">
-            <a:avLst/>
-          </a:prstGeom>
-          <a:noFill/>
-        </p:spPr>
-        <p:txBody>
-          <a:bodyPr wrap="none" rtlCol="0">
-            <a:spAutoFit/>
-          </a:bodyPr>
-          <a:lstStyle/>
-          <a:p>
-            <a:pPr algn="r"/>
-            <a:r>
-              <a:rPr lang="en-US" i="1" smtClean="0">
+              </a:endParaRPr>
+            </a:p>
+          </p:txBody>
+        </p:sp>
+        <p:sp>
+          <p:nvSpPr>
+            <p:cNvPr id="47" name="TextBox 46"/>
+            <p:cNvSpPr txBox="1"/>
+            <p:nvPr/>
+          </p:nvSpPr>
+          <p:spPr>
+            <a:xfrm>
+              <a:off x="8186055" y="1968446"/>
+              <a:ext cx="550087" cy="369332"/>
+            </a:xfrm>
+            <a:prstGeom prst="rect">
+              <a:avLst/>
+            </a:prstGeom>
+            <a:noFill/>
+          </p:spPr>
+          <p:txBody>
+            <a:bodyPr wrap="none" rtlCol="0">
+              <a:spAutoFit/>
+            </a:bodyPr>
+            <a:lstStyle/>
+            <a:p>
+              <a:pPr algn="r"/>
+              <a:r>
+                <a:rPr lang="en-US" i="1" smtClean="0">
+                  <a:latin typeface="Baskerville" charset="0"/>
+                  <a:ea typeface="Baskerville" charset="0"/>
+                  <a:cs typeface="Baskerville" charset="0"/>
+                </a:rPr>
+                <a:t>amcl</a:t>
+              </a:r>
+              <a:endParaRPr lang="en-US" i="1" dirty="0">
                 <a:latin typeface="Baskerville" charset="0"/>
                 <a:ea typeface="Baskerville" charset="0"/>
                 <a:cs typeface="Baskerville" charset="0"/>
-              </a:rPr>
-              <a:t>amcl</a:t>
-            </a:r>
-            <a:endParaRPr lang="en-US" i="1" dirty="0">
-              <a:latin typeface="Baskerville" charset="0"/>
-              <a:ea typeface="Baskerville" charset="0"/>
-              <a:cs typeface="Baskerville" charset="0"/>
-            </a:endParaRPr>
-          </a:p>
-        </p:txBody>
-      </p:sp>
+              </a:endParaRPr>
+            </a:p>
+          </p:txBody>
+        </p:sp>
+      </p:grpSp>
     </p:spTree>
     <p:extLst>
       <p:ext uri="{BB962C8B-B14F-4D97-AF65-F5344CB8AC3E}">

</xml_diff>

<commit_message>
Added result part of navstack
</commit_message>
<xml_diff>
--- a/Paper/Metadata/Navstack.pptx
+++ b/Paper/Metadata/Navstack.pptx
@@ -9,6 +9,10 @@
     <p:sldId id="264" r:id="rId3"/>
     <p:sldId id="263" r:id="rId4"/>
     <p:sldId id="265" r:id="rId5"/>
+    <p:sldId id="266" r:id="rId6"/>
+    <p:sldId id="268" r:id="rId7"/>
+    <p:sldId id="269" r:id="rId8"/>
+    <p:sldId id="267" r:id="rId9"/>
   </p:sldIdLst>
   <p:sldSz cx="12192000" cy="6858000"/>
   <p:notesSz cx="6858000" cy="9144000"/>
@@ -246,7 +250,7 @@
           <a:p>
             <a:fld id="{B338B4EC-3F41-2042-BB26-6E887D15D32B}" type="datetimeFigureOut">
               <a:rPr lang="en-US" smtClean="0"/>
-              <a:t>5/20/17</a:t>
+              <a:t>5/24/17</a:t>
             </a:fld>
             <a:endParaRPr lang="en-US"/>
           </a:p>
@@ -416,7 +420,7 @@
           <a:p>
             <a:fld id="{B338B4EC-3F41-2042-BB26-6E887D15D32B}" type="datetimeFigureOut">
               <a:rPr lang="en-US" smtClean="0"/>
-              <a:t>5/20/17</a:t>
+              <a:t>5/24/17</a:t>
             </a:fld>
             <a:endParaRPr lang="en-US"/>
           </a:p>
@@ -596,7 +600,7 @@
           <a:p>
             <a:fld id="{B338B4EC-3F41-2042-BB26-6E887D15D32B}" type="datetimeFigureOut">
               <a:rPr lang="en-US" smtClean="0"/>
-              <a:t>5/20/17</a:t>
+              <a:t>5/24/17</a:t>
             </a:fld>
             <a:endParaRPr lang="en-US"/>
           </a:p>
@@ -766,7 +770,7 @@
           <a:p>
             <a:fld id="{B338B4EC-3F41-2042-BB26-6E887D15D32B}" type="datetimeFigureOut">
               <a:rPr lang="en-US" smtClean="0"/>
-              <a:t>5/20/17</a:t>
+              <a:t>5/24/17</a:t>
             </a:fld>
             <a:endParaRPr lang="en-US"/>
           </a:p>
@@ -1012,7 +1016,7 @@
           <a:p>
             <a:fld id="{B338B4EC-3F41-2042-BB26-6E887D15D32B}" type="datetimeFigureOut">
               <a:rPr lang="en-US" smtClean="0"/>
-              <a:t>5/20/17</a:t>
+              <a:t>5/24/17</a:t>
             </a:fld>
             <a:endParaRPr lang="en-US"/>
           </a:p>
@@ -1244,7 +1248,7 @@
           <a:p>
             <a:fld id="{B338B4EC-3F41-2042-BB26-6E887D15D32B}" type="datetimeFigureOut">
               <a:rPr lang="en-US" smtClean="0"/>
-              <a:t>5/20/17</a:t>
+              <a:t>5/24/17</a:t>
             </a:fld>
             <a:endParaRPr lang="en-US"/>
           </a:p>
@@ -1611,7 +1615,7 @@
           <a:p>
             <a:fld id="{B338B4EC-3F41-2042-BB26-6E887D15D32B}" type="datetimeFigureOut">
               <a:rPr lang="en-US" smtClean="0"/>
-              <a:t>5/20/17</a:t>
+              <a:t>5/24/17</a:t>
             </a:fld>
             <a:endParaRPr lang="en-US"/>
           </a:p>
@@ -1729,7 +1733,7 @@
           <a:p>
             <a:fld id="{B338B4EC-3F41-2042-BB26-6E887D15D32B}" type="datetimeFigureOut">
               <a:rPr lang="en-US" smtClean="0"/>
-              <a:t>5/20/17</a:t>
+              <a:t>5/24/17</a:t>
             </a:fld>
             <a:endParaRPr lang="en-US"/>
           </a:p>
@@ -1824,7 +1828,7 @@
           <a:p>
             <a:fld id="{B338B4EC-3F41-2042-BB26-6E887D15D32B}" type="datetimeFigureOut">
               <a:rPr lang="en-US" smtClean="0"/>
-              <a:t>5/20/17</a:t>
+              <a:t>5/24/17</a:t>
             </a:fld>
             <a:endParaRPr lang="en-US"/>
           </a:p>
@@ -2101,7 +2105,7 @@
           <a:p>
             <a:fld id="{B338B4EC-3F41-2042-BB26-6E887D15D32B}" type="datetimeFigureOut">
               <a:rPr lang="en-US" smtClean="0"/>
-              <a:t>5/20/17</a:t>
+              <a:t>5/24/17</a:t>
             </a:fld>
             <a:endParaRPr lang="en-US"/>
           </a:p>
@@ -2354,7 +2358,7 @@
           <a:p>
             <a:fld id="{B338B4EC-3F41-2042-BB26-6E887D15D32B}" type="datetimeFigureOut">
               <a:rPr lang="en-US" smtClean="0"/>
-              <a:t>5/20/17</a:t>
+              <a:t>5/24/17</a:t>
             </a:fld>
             <a:endParaRPr lang="en-US"/>
           </a:p>
@@ -2567,7 +2571,7 @@
           <a:p>
             <a:fld id="{B338B4EC-3F41-2042-BB26-6E887D15D32B}" type="datetimeFigureOut">
               <a:rPr lang="en-US" smtClean="0"/>
-              <a:t>5/20/17</a:t>
+              <a:t>5/24/17</a:t>
             </a:fld>
             <a:endParaRPr lang="en-US"/>
           </a:p>
@@ -6810,6 +6814,1424 @@
   <p:clrMapOvr>
     <a:masterClrMapping/>
   </p:clrMapOvr>
+  <p:timing>
+    <p:tnLst>
+      <p:par>
+        <p:cTn id="1" dur="indefinite" restart="never" nodeType="tmRoot"/>
+      </p:par>
+    </p:tnLst>
+  </p:timing>
+</p:sld>
+</file>
+
+<file path=ppt/slides/slide5.xml><?xml version="1.0" encoding="utf-8"?>
+<p:sld xmlns:a="http://schemas.openxmlformats.org/drawingml/2006/main" xmlns:r="http://schemas.openxmlformats.org/officeDocument/2006/relationships" xmlns:p="http://schemas.openxmlformats.org/presentationml/2006/main">
+  <p:cSld>
+    <p:spTree>
+      <p:nvGrpSpPr>
+        <p:cNvPr id="1" name=""/>
+        <p:cNvGrpSpPr/>
+        <p:nvPr/>
+      </p:nvGrpSpPr>
+      <p:grpSpPr>
+        <a:xfrm>
+          <a:off x="0" y="0"/>
+          <a:ext cx="0" cy="0"/>
+          <a:chOff x="0" y="0"/>
+          <a:chExt cx="0" cy="0"/>
+        </a:xfrm>
+      </p:grpSpPr>
+      <p:grpSp>
+        <p:nvGrpSpPr>
+          <p:cNvPr id="9" name="Group 8"/>
+          <p:cNvGrpSpPr/>
+          <p:nvPr/>
+        </p:nvGrpSpPr>
+        <p:grpSpPr>
+          <a:xfrm>
+            <a:off x="1905253" y="-274937"/>
+            <a:ext cx="7353463" cy="7380941"/>
+            <a:chOff x="1905253" y="-274937"/>
+            <a:chExt cx="7353463" cy="7380941"/>
+          </a:xfrm>
+        </p:grpSpPr>
+        <p:sp>
+          <p:nvSpPr>
+            <p:cNvPr id="8" name="Rectangle 7"/>
+            <p:cNvSpPr/>
+            <p:nvPr/>
+          </p:nvSpPr>
+          <p:spPr>
+            <a:xfrm>
+              <a:off x="3459707" y="2720612"/>
+              <a:ext cx="4681183" cy="1428307"/>
+            </a:xfrm>
+            <a:prstGeom prst="rect">
+              <a:avLst/>
+            </a:prstGeom>
+            <a:solidFill>
+              <a:schemeClr val="tx1"/>
+            </a:solidFill>
+            <a:ln>
+              <a:noFill/>
+            </a:ln>
+          </p:spPr>
+          <p:style>
+            <a:lnRef idx="2">
+              <a:schemeClr val="accent1">
+                <a:shade val="50000"/>
+              </a:schemeClr>
+            </a:lnRef>
+            <a:fillRef idx="1">
+              <a:schemeClr val="accent1"/>
+            </a:fillRef>
+            <a:effectRef idx="0">
+              <a:schemeClr val="accent1"/>
+            </a:effectRef>
+            <a:fontRef idx="minor">
+              <a:schemeClr val="lt1"/>
+            </a:fontRef>
+          </p:style>
+          <p:txBody>
+            <a:bodyPr rtlCol="0" anchor="ctr"/>
+            <a:lstStyle/>
+            <a:p>
+              <a:pPr algn="ctr"/>
+              <a:endParaRPr lang="en-US"/>
+            </a:p>
+          </p:txBody>
+        </p:sp>
+        <p:grpSp>
+          <p:nvGrpSpPr>
+            <p:cNvPr id="7" name="Group 6"/>
+            <p:cNvGrpSpPr/>
+            <p:nvPr/>
+          </p:nvGrpSpPr>
+          <p:grpSpPr>
+            <a:xfrm>
+              <a:off x="1905253" y="-274937"/>
+              <a:ext cx="7353463" cy="7380941"/>
+              <a:chOff x="1905253" y="-274937"/>
+              <a:chExt cx="7353463" cy="7380941"/>
+            </a:xfrm>
+          </p:grpSpPr>
+          <p:grpSp>
+            <p:nvGrpSpPr>
+              <p:cNvPr id="6" name="Group 5"/>
+              <p:cNvGrpSpPr/>
+              <p:nvPr/>
+            </p:nvGrpSpPr>
+            <p:grpSpPr>
+              <a:xfrm>
+                <a:off x="1905253" y="-274937"/>
+                <a:ext cx="7353463" cy="7380941"/>
+                <a:chOff x="1905253" y="-187851"/>
+                <a:chExt cx="7353463" cy="7380941"/>
+              </a:xfrm>
+            </p:grpSpPr>
+            <p:pic>
+              <p:nvPicPr>
+                <p:cNvPr id="2" name="Picture 1"/>
+                <p:cNvPicPr>
+                  <a:picLocks noChangeAspect="1"/>
+                </p:cNvPicPr>
+                <p:nvPr/>
+              </p:nvPicPr>
+              <p:blipFill rotWithShape="1">
+                <a:blip r:embed="rId2">
+                  <a:clrChange>
+                    <a:clrFrom>
+                      <a:srgbClr val="FF4BFF"/>
+                    </a:clrFrom>
+                    <a:clrTo>
+                      <a:srgbClr val="FF4BFF">
+                        <a:alpha val="0"/>
+                      </a:srgbClr>
+                    </a:clrTo>
+                  </a:clrChange>
+                  <a:extLst>
+                    <a:ext uri="{28A0092B-C50C-407E-A947-70E740481C1C}">
+                      <a14:useLocalDpi xmlns:a14="http://schemas.microsoft.com/office/drawing/2010/main" val="0"/>
+                    </a:ext>
+                  </a:extLst>
+                </a:blip>
+                <a:srcRect l="31472" t="20253" r="19044" b="6845"/>
+                <a:stretch/>
+              </p:blipFill>
+              <p:spPr>
+                <a:xfrm rot="18744695">
+                  <a:off x="2867065" y="1002822"/>
+                  <a:ext cx="5429840" cy="4999596"/>
+                </a:xfrm>
+                <a:prstGeom prst="rect">
+                  <a:avLst/>
+                </a:prstGeom>
+              </p:spPr>
+            </p:pic>
+            <p:sp>
+              <p:nvSpPr>
+                <p:cNvPr id="3" name="Rectangle 2"/>
+                <p:cNvSpPr/>
+                <p:nvPr/>
+              </p:nvSpPr>
+              <p:spPr>
+                <a:xfrm>
+                  <a:off x="3148553" y="-187851"/>
+                  <a:ext cx="5743341" cy="2931049"/>
+                </a:xfrm>
+                <a:prstGeom prst="rect">
+                  <a:avLst/>
+                </a:prstGeom>
+                <a:solidFill>
+                  <a:schemeClr val="bg1"/>
+                </a:solidFill>
+                <a:ln>
+                  <a:noFill/>
+                </a:ln>
+              </p:spPr>
+              <p:style>
+                <a:lnRef idx="2">
+                  <a:schemeClr val="accent1">
+                    <a:shade val="50000"/>
+                  </a:schemeClr>
+                </a:lnRef>
+                <a:fillRef idx="1">
+                  <a:schemeClr val="accent1"/>
+                </a:fillRef>
+                <a:effectRef idx="0">
+                  <a:schemeClr val="accent1"/>
+                </a:effectRef>
+                <a:fontRef idx="minor">
+                  <a:schemeClr val="lt1"/>
+                </a:fontRef>
+              </p:style>
+              <p:txBody>
+                <a:bodyPr rtlCol="0" anchor="ctr"/>
+                <a:lstStyle/>
+                <a:p>
+                  <a:pPr algn="ctr"/>
+                  <a:endParaRPr lang="en-US"/>
+                </a:p>
+              </p:txBody>
+            </p:sp>
+            <p:sp>
+              <p:nvSpPr>
+                <p:cNvPr id="19" name="Rectangle 18"/>
+                <p:cNvSpPr/>
+                <p:nvPr/>
+              </p:nvSpPr>
+              <p:spPr>
+                <a:xfrm>
+                  <a:off x="2509101" y="4985975"/>
+                  <a:ext cx="5743341" cy="565607"/>
+                </a:xfrm>
+                <a:prstGeom prst="rect">
+                  <a:avLst/>
+                </a:prstGeom>
+                <a:solidFill>
+                  <a:schemeClr val="bg1"/>
+                </a:solidFill>
+                <a:ln>
+                  <a:noFill/>
+                </a:ln>
+              </p:spPr>
+              <p:style>
+                <a:lnRef idx="2">
+                  <a:schemeClr val="accent1">
+                    <a:shade val="50000"/>
+                  </a:schemeClr>
+                </a:lnRef>
+                <a:fillRef idx="1">
+                  <a:schemeClr val="accent1"/>
+                </a:fillRef>
+                <a:effectRef idx="0">
+                  <a:schemeClr val="accent1"/>
+                </a:effectRef>
+                <a:fontRef idx="minor">
+                  <a:schemeClr val="lt1"/>
+                </a:fontRef>
+              </p:style>
+              <p:txBody>
+                <a:bodyPr rtlCol="0" anchor="ctr"/>
+                <a:lstStyle/>
+                <a:p>
+                  <a:pPr algn="ctr"/>
+                  <a:endParaRPr lang="en-US"/>
+                </a:p>
+              </p:txBody>
+            </p:sp>
+            <p:sp>
+              <p:nvSpPr>
+                <p:cNvPr id="20" name="Rectangle 19"/>
+                <p:cNvSpPr/>
+                <p:nvPr/>
+              </p:nvSpPr>
+              <p:spPr>
+                <a:xfrm>
+                  <a:off x="1905253" y="2243579"/>
+                  <a:ext cx="1280631" cy="3187829"/>
+                </a:xfrm>
+                <a:prstGeom prst="rect">
+                  <a:avLst/>
+                </a:prstGeom>
+                <a:solidFill>
+                  <a:schemeClr val="bg1"/>
+                </a:solidFill>
+                <a:ln>
+                  <a:noFill/>
+                </a:ln>
+              </p:spPr>
+              <p:style>
+                <a:lnRef idx="2">
+                  <a:schemeClr val="accent1">
+                    <a:shade val="50000"/>
+                  </a:schemeClr>
+                </a:lnRef>
+                <a:fillRef idx="1">
+                  <a:schemeClr val="accent1"/>
+                </a:fillRef>
+                <a:effectRef idx="0">
+                  <a:schemeClr val="accent1"/>
+                </a:effectRef>
+                <a:fontRef idx="minor">
+                  <a:schemeClr val="lt1"/>
+                </a:fontRef>
+              </p:style>
+              <p:txBody>
+                <a:bodyPr rtlCol="0" anchor="ctr"/>
+                <a:lstStyle/>
+                <a:p>
+                  <a:pPr algn="ctr"/>
+                  <a:endParaRPr lang="en-US"/>
+                </a:p>
+              </p:txBody>
+            </p:sp>
+            <p:sp>
+              <p:nvSpPr>
+                <p:cNvPr id="22" name="Rectangle 21"/>
+                <p:cNvSpPr/>
+                <p:nvPr/>
+              </p:nvSpPr>
+              <p:spPr>
+                <a:xfrm>
+                  <a:off x="8618512" y="2363753"/>
+                  <a:ext cx="640204" cy="3187829"/>
+                </a:xfrm>
+                <a:prstGeom prst="rect">
+                  <a:avLst/>
+                </a:prstGeom>
+                <a:solidFill>
+                  <a:schemeClr val="bg1"/>
+                </a:solidFill>
+                <a:ln>
+                  <a:noFill/>
+                </a:ln>
+              </p:spPr>
+              <p:style>
+                <a:lnRef idx="2">
+                  <a:schemeClr val="accent1">
+                    <a:shade val="50000"/>
+                  </a:schemeClr>
+                </a:lnRef>
+                <a:fillRef idx="1">
+                  <a:schemeClr val="accent1"/>
+                </a:fillRef>
+                <a:effectRef idx="0">
+                  <a:schemeClr val="accent1"/>
+                </a:effectRef>
+                <a:fontRef idx="minor">
+                  <a:schemeClr val="lt1"/>
+                </a:fontRef>
+              </p:style>
+              <p:txBody>
+                <a:bodyPr rtlCol="0" anchor="ctr"/>
+                <a:lstStyle/>
+                <a:p>
+                  <a:pPr algn="ctr"/>
+                  <a:endParaRPr lang="en-US"/>
+                </a:p>
+              </p:txBody>
+            </p:sp>
+            <p:sp>
+              <p:nvSpPr>
+                <p:cNvPr id="29" name="Rectangle 28"/>
+                <p:cNvSpPr/>
+                <p:nvPr/>
+              </p:nvSpPr>
+              <p:spPr>
+                <a:xfrm>
+                  <a:off x="4722530" y="3277972"/>
+                  <a:ext cx="4036841" cy="3915118"/>
+                </a:xfrm>
+                <a:prstGeom prst="rect">
+                  <a:avLst/>
+                </a:prstGeom>
+                <a:solidFill>
+                  <a:schemeClr val="bg1"/>
+                </a:solidFill>
+                <a:ln>
+                  <a:noFill/>
+                </a:ln>
+              </p:spPr>
+              <p:style>
+                <a:lnRef idx="2">
+                  <a:schemeClr val="accent1">
+                    <a:shade val="50000"/>
+                  </a:schemeClr>
+                </a:lnRef>
+                <a:fillRef idx="1">
+                  <a:schemeClr val="accent1"/>
+                </a:fillRef>
+                <a:effectRef idx="0">
+                  <a:schemeClr val="accent1"/>
+                </a:effectRef>
+                <a:fontRef idx="minor">
+                  <a:schemeClr val="lt1"/>
+                </a:fontRef>
+              </p:style>
+              <p:txBody>
+                <a:bodyPr rtlCol="0" anchor="ctr"/>
+                <a:lstStyle/>
+                <a:p>
+                  <a:pPr algn="ctr"/>
+                  <a:endParaRPr lang="en-US"/>
+                </a:p>
+              </p:txBody>
+            </p:sp>
+            <p:sp>
+              <p:nvSpPr>
+                <p:cNvPr id="30" name="Rectangle 29"/>
+                <p:cNvSpPr/>
+                <p:nvPr/>
+              </p:nvSpPr>
+              <p:spPr>
+                <a:xfrm>
+                  <a:off x="5581985" y="1604195"/>
+                  <a:ext cx="1145403" cy="1203503"/>
+                </a:xfrm>
+                <a:prstGeom prst="rect">
+                  <a:avLst/>
+                </a:prstGeom>
+                <a:solidFill>
+                  <a:schemeClr val="bg1"/>
+                </a:solidFill>
+                <a:ln>
+                  <a:noFill/>
+                </a:ln>
+              </p:spPr>
+              <p:style>
+                <a:lnRef idx="2">
+                  <a:schemeClr val="accent1">
+                    <a:shade val="50000"/>
+                  </a:schemeClr>
+                </a:lnRef>
+                <a:fillRef idx="1">
+                  <a:schemeClr val="accent1"/>
+                </a:fillRef>
+                <a:effectRef idx="0">
+                  <a:schemeClr val="accent1"/>
+                </a:effectRef>
+                <a:fontRef idx="minor">
+                  <a:schemeClr val="lt1"/>
+                </a:fontRef>
+              </p:style>
+              <p:txBody>
+                <a:bodyPr rtlCol="0" anchor="ctr"/>
+                <a:lstStyle/>
+                <a:p>
+                  <a:pPr algn="ctr"/>
+                  <a:endParaRPr lang="en-US"/>
+                </a:p>
+              </p:txBody>
+            </p:sp>
+          </p:grpSp>
+          <p:sp>
+            <p:nvSpPr>
+              <p:cNvPr id="32" name="Rectangle 31"/>
+              <p:cNvSpPr/>
+              <p:nvPr/>
+            </p:nvSpPr>
+            <p:spPr>
+              <a:xfrm>
+                <a:off x="3743619" y="4985975"/>
+                <a:ext cx="1280631" cy="1641508"/>
+              </a:xfrm>
+              <a:prstGeom prst="rect">
+                <a:avLst/>
+              </a:prstGeom>
+              <a:solidFill>
+                <a:schemeClr val="bg1"/>
+              </a:solidFill>
+              <a:ln>
+                <a:noFill/>
+              </a:ln>
+            </p:spPr>
+            <p:style>
+              <a:lnRef idx="2">
+                <a:schemeClr val="accent1">
+                  <a:shade val="50000"/>
+                </a:schemeClr>
+              </a:lnRef>
+              <a:fillRef idx="1">
+                <a:schemeClr val="accent1"/>
+              </a:fillRef>
+              <a:effectRef idx="0">
+                <a:schemeClr val="accent1"/>
+              </a:effectRef>
+              <a:fontRef idx="minor">
+                <a:schemeClr val="lt1"/>
+              </a:fontRef>
+            </p:style>
+            <p:txBody>
+              <a:bodyPr rtlCol="0" anchor="ctr"/>
+              <a:lstStyle/>
+              <a:p>
+                <a:pPr algn="ctr"/>
+                <a:endParaRPr lang="en-US"/>
+              </a:p>
+            </p:txBody>
+          </p:sp>
+        </p:grpSp>
+      </p:grpSp>
+    </p:spTree>
+    <p:extLst>
+      <p:ext uri="{BB962C8B-B14F-4D97-AF65-F5344CB8AC3E}">
+        <p14:creationId xmlns:p14="http://schemas.microsoft.com/office/powerpoint/2010/main" val="515366986"/>
+      </p:ext>
+    </p:extLst>
+  </p:cSld>
+  <p:clrMapOvr>
+    <a:masterClrMapping/>
+  </p:clrMapOvr>
+  <p:timing>
+    <p:tnLst>
+      <p:par>
+        <p:cTn id="1" dur="indefinite" restart="never" nodeType="tmRoot"/>
+      </p:par>
+    </p:tnLst>
+  </p:timing>
+</p:sld>
+</file>
+
+<file path=ppt/slides/slide6.xml><?xml version="1.0" encoding="utf-8"?>
+<p:sld xmlns:a="http://schemas.openxmlformats.org/drawingml/2006/main" xmlns:r="http://schemas.openxmlformats.org/officeDocument/2006/relationships" xmlns:p="http://schemas.openxmlformats.org/presentationml/2006/main">
+  <p:cSld>
+    <p:spTree>
+      <p:nvGrpSpPr>
+        <p:cNvPr id="1" name=""/>
+        <p:cNvGrpSpPr/>
+        <p:nvPr/>
+      </p:nvGrpSpPr>
+      <p:grpSpPr>
+        <a:xfrm>
+          <a:off x="0" y="0"/>
+          <a:ext cx="0" cy="0"/>
+          <a:chOff x="0" y="0"/>
+          <a:chExt cx="0" cy="0"/>
+        </a:xfrm>
+      </p:grpSpPr>
+      <p:grpSp>
+        <p:nvGrpSpPr>
+          <p:cNvPr id="9" name="Group 8"/>
+          <p:cNvGrpSpPr/>
+          <p:nvPr/>
+        </p:nvGrpSpPr>
+        <p:grpSpPr>
+          <a:xfrm>
+            <a:off x="3528546" y="2250008"/>
+            <a:ext cx="5380892" cy="2403231"/>
+            <a:chOff x="3752066" y="2189048"/>
+            <a:chExt cx="5380892" cy="2403231"/>
+          </a:xfrm>
+        </p:grpSpPr>
+        <p:grpSp>
+          <p:nvGrpSpPr>
+            <p:cNvPr id="8" name="Group 7"/>
+            <p:cNvGrpSpPr/>
+            <p:nvPr/>
+          </p:nvGrpSpPr>
+          <p:grpSpPr>
+            <a:xfrm>
+              <a:off x="4407294" y="2464904"/>
+              <a:ext cx="3987012" cy="1218654"/>
+              <a:chOff x="4407294" y="2464904"/>
+              <a:chExt cx="3987012" cy="1218654"/>
+            </a:xfrm>
+          </p:grpSpPr>
+          <p:sp>
+            <p:nvSpPr>
+              <p:cNvPr id="7" name="Rectangle 6"/>
+              <p:cNvSpPr/>
+              <p:nvPr/>
+            </p:nvSpPr>
+            <p:spPr>
+              <a:xfrm>
+                <a:off x="4407294" y="3208919"/>
+                <a:ext cx="221502" cy="474639"/>
+              </a:xfrm>
+              <a:prstGeom prst="rect">
+                <a:avLst/>
+              </a:prstGeom>
+              <a:solidFill>
+                <a:schemeClr val="tx1"/>
+              </a:solidFill>
+              <a:ln>
+                <a:noFill/>
+              </a:ln>
+            </p:spPr>
+            <p:style>
+              <a:lnRef idx="2">
+                <a:schemeClr val="accent1">
+                  <a:shade val="50000"/>
+                </a:schemeClr>
+              </a:lnRef>
+              <a:fillRef idx="1">
+                <a:schemeClr val="accent1"/>
+              </a:fillRef>
+              <a:effectRef idx="0">
+                <a:schemeClr val="accent1"/>
+              </a:effectRef>
+              <a:fontRef idx="minor">
+                <a:schemeClr val="lt1"/>
+              </a:fontRef>
+            </p:style>
+            <p:txBody>
+              <a:bodyPr rtlCol="0" anchor="ctr"/>
+              <a:lstStyle/>
+              <a:p>
+                <a:pPr algn="ctr"/>
+                <a:endParaRPr lang="en-US"/>
+              </a:p>
+            </p:txBody>
+          </p:sp>
+          <p:sp>
+            <p:nvSpPr>
+              <p:cNvPr id="14" name="Rectangle 13"/>
+              <p:cNvSpPr/>
+              <p:nvPr/>
+            </p:nvSpPr>
+            <p:spPr>
+              <a:xfrm>
+                <a:off x="4628796" y="3153344"/>
+                <a:ext cx="221502" cy="328192"/>
+              </a:xfrm>
+              <a:prstGeom prst="rect">
+                <a:avLst/>
+              </a:prstGeom>
+              <a:solidFill>
+                <a:schemeClr val="tx1"/>
+              </a:solidFill>
+              <a:ln>
+                <a:noFill/>
+              </a:ln>
+            </p:spPr>
+            <p:style>
+              <a:lnRef idx="2">
+                <a:schemeClr val="accent1">
+                  <a:shade val="50000"/>
+                </a:schemeClr>
+              </a:lnRef>
+              <a:fillRef idx="1">
+                <a:schemeClr val="accent1"/>
+              </a:fillRef>
+              <a:effectRef idx="0">
+                <a:schemeClr val="accent1"/>
+              </a:effectRef>
+              <a:fontRef idx="minor">
+                <a:schemeClr val="lt1"/>
+              </a:fontRef>
+            </p:style>
+            <p:txBody>
+              <a:bodyPr rtlCol="0" anchor="ctr"/>
+              <a:lstStyle/>
+              <a:p>
+                <a:pPr algn="ctr"/>
+                <a:endParaRPr lang="en-US"/>
+              </a:p>
+            </p:txBody>
+          </p:sp>
+          <p:sp>
+            <p:nvSpPr>
+              <p:cNvPr id="15" name="Rectangle 14"/>
+              <p:cNvSpPr/>
+              <p:nvPr/>
+            </p:nvSpPr>
+            <p:spPr>
+              <a:xfrm>
+                <a:off x="4713044" y="2880727"/>
+                <a:ext cx="221502" cy="328192"/>
+              </a:xfrm>
+              <a:prstGeom prst="rect">
+                <a:avLst/>
+              </a:prstGeom>
+              <a:solidFill>
+                <a:schemeClr val="tx1"/>
+              </a:solidFill>
+              <a:ln>
+                <a:noFill/>
+              </a:ln>
+            </p:spPr>
+            <p:style>
+              <a:lnRef idx="2">
+                <a:schemeClr val="accent1">
+                  <a:shade val="50000"/>
+                </a:schemeClr>
+              </a:lnRef>
+              <a:fillRef idx="1">
+                <a:schemeClr val="accent1"/>
+              </a:fillRef>
+              <a:effectRef idx="0">
+                <a:schemeClr val="accent1"/>
+              </a:effectRef>
+              <a:fontRef idx="minor">
+                <a:schemeClr val="lt1"/>
+              </a:fontRef>
+            </p:style>
+            <p:txBody>
+              <a:bodyPr rtlCol="0" anchor="ctr"/>
+              <a:lstStyle/>
+              <a:p>
+                <a:pPr algn="ctr"/>
+                <a:endParaRPr lang="en-US"/>
+              </a:p>
+            </p:txBody>
+          </p:sp>
+          <p:sp>
+            <p:nvSpPr>
+              <p:cNvPr id="16" name="Rectangle 15"/>
+              <p:cNvSpPr/>
+              <p:nvPr/>
+            </p:nvSpPr>
+            <p:spPr>
+              <a:xfrm>
+                <a:off x="4713044" y="2607500"/>
+                <a:ext cx="221502" cy="328192"/>
+              </a:xfrm>
+              <a:prstGeom prst="rect">
+                <a:avLst/>
+              </a:prstGeom>
+              <a:solidFill>
+                <a:schemeClr val="tx1"/>
+              </a:solidFill>
+              <a:ln>
+                <a:noFill/>
+              </a:ln>
+            </p:spPr>
+            <p:style>
+              <a:lnRef idx="2">
+                <a:schemeClr val="accent1">
+                  <a:shade val="50000"/>
+                </a:schemeClr>
+              </a:lnRef>
+              <a:fillRef idx="1">
+                <a:schemeClr val="accent1"/>
+              </a:fillRef>
+              <a:effectRef idx="0">
+                <a:schemeClr val="accent1"/>
+              </a:effectRef>
+              <a:fontRef idx="minor">
+                <a:schemeClr val="lt1"/>
+              </a:fontRef>
+            </p:style>
+            <p:txBody>
+              <a:bodyPr rtlCol="0" anchor="ctr"/>
+              <a:lstStyle/>
+              <a:p>
+                <a:pPr algn="ctr"/>
+                <a:endParaRPr lang="en-US"/>
+              </a:p>
+            </p:txBody>
+          </p:sp>
+          <p:sp>
+            <p:nvSpPr>
+              <p:cNvPr id="17" name="Rectangle 16"/>
+              <p:cNvSpPr/>
+              <p:nvPr/>
+            </p:nvSpPr>
+            <p:spPr>
+              <a:xfrm>
+                <a:off x="4850298" y="2464904"/>
+                <a:ext cx="3544008" cy="206292"/>
+              </a:xfrm>
+              <a:prstGeom prst="rect">
+                <a:avLst/>
+              </a:prstGeom>
+              <a:solidFill>
+                <a:schemeClr val="tx1"/>
+              </a:solidFill>
+              <a:ln>
+                <a:noFill/>
+              </a:ln>
+            </p:spPr>
+            <p:style>
+              <a:lnRef idx="2">
+                <a:schemeClr val="accent1">
+                  <a:shade val="50000"/>
+                </a:schemeClr>
+              </a:lnRef>
+              <a:fillRef idx="1">
+                <a:schemeClr val="accent1"/>
+              </a:fillRef>
+              <a:effectRef idx="0">
+                <a:schemeClr val="accent1"/>
+              </a:effectRef>
+              <a:fontRef idx="minor">
+                <a:schemeClr val="lt1"/>
+              </a:fontRef>
+            </p:style>
+            <p:txBody>
+              <a:bodyPr rtlCol="0" anchor="ctr"/>
+              <a:lstStyle/>
+              <a:p>
+                <a:pPr algn="ctr"/>
+                <a:endParaRPr lang="en-US"/>
+              </a:p>
+            </p:txBody>
+          </p:sp>
+        </p:grpSp>
+        <p:pic>
+          <p:nvPicPr>
+            <p:cNvPr id="4" name="Picture 3"/>
+            <p:cNvPicPr>
+              <a:picLocks noChangeAspect="1"/>
+            </p:cNvPicPr>
+            <p:nvPr/>
+          </p:nvPicPr>
+          <p:blipFill rotWithShape="1">
+            <a:blip r:embed="rId2">
+              <a:clrChange>
+                <a:clrFrom>
+                  <a:srgbClr val="DC8DDC"/>
+                </a:clrFrom>
+                <a:clrTo>
+                  <a:srgbClr val="DC8DDC">
+                    <a:alpha val="0"/>
+                  </a:srgbClr>
+                </a:clrTo>
+              </a:clrChange>
+              <a:extLst>
+                <a:ext uri="{28A0092B-C50C-407E-A947-70E740481C1C}">
+                  <a14:useLocalDpi xmlns:a14="http://schemas.microsoft.com/office/drawing/2010/main" val="0"/>
+                </a:ext>
+              </a:extLst>
+            </a:blip>
+            <a:srcRect l="13807" t="37778" r="7473" b="27180"/>
+            <a:stretch/>
+          </p:blipFill>
+          <p:spPr>
+            <a:xfrm>
+              <a:off x="3752066" y="2189048"/>
+              <a:ext cx="5380892" cy="2403231"/>
+            </a:xfrm>
+            <a:prstGeom prst="rect">
+              <a:avLst/>
+            </a:prstGeom>
+          </p:spPr>
+        </p:pic>
+      </p:grpSp>
+    </p:spTree>
+    <p:extLst>
+      <p:ext uri="{BB962C8B-B14F-4D97-AF65-F5344CB8AC3E}">
+        <p14:creationId xmlns:p14="http://schemas.microsoft.com/office/powerpoint/2010/main" val="370371112"/>
+      </p:ext>
+    </p:extLst>
+  </p:cSld>
+  <p:clrMapOvr>
+    <a:masterClrMapping/>
+  </p:clrMapOvr>
+  <p:timing>
+    <p:tnLst>
+      <p:par>
+        <p:cTn id="1" dur="indefinite" restart="never" nodeType="tmRoot"/>
+      </p:par>
+    </p:tnLst>
+  </p:timing>
+</p:sld>
+</file>
+
+<file path=ppt/slides/slide7.xml><?xml version="1.0" encoding="utf-8"?>
+<p:sld xmlns:a="http://schemas.openxmlformats.org/drawingml/2006/main" xmlns:r="http://schemas.openxmlformats.org/officeDocument/2006/relationships" xmlns:p="http://schemas.openxmlformats.org/presentationml/2006/main">
+  <p:cSld>
+    <p:spTree>
+      <p:nvGrpSpPr>
+        <p:cNvPr id="1" name=""/>
+        <p:cNvGrpSpPr/>
+        <p:nvPr/>
+      </p:nvGrpSpPr>
+      <p:grpSpPr>
+        <a:xfrm>
+          <a:off x="0" y="0"/>
+          <a:ext cx="0" cy="0"/>
+          <a:chOff x="0" y="0"/>
+          <a:chExt cx="0" cy="0"/>
+        </a:xfrm>
+      </p:grpSpPr>
+      <p:grpSp>
+        <p:nvGrpSpPr>
+          <p:cNvPr id="11" name="Group 10"/>
+          <p:cNvGrpSpPr/>
+          <p:nvPr/>
+        </p:nvGrpSpPr>
+        <p:grpSpPr>
+          <a:xfrm>
+            <a:off x="-106326" y="736234"/>
+            <a:ext cx="12298326" cy="5385531"/>
+            <a:chOff x="-106326" y="736234"/>
+            <a:chExt cx="12298326" cy="5385531"/>
+          </a:xfrm>
+        </p:grpSpPr>
+        <p:pic>
+          <p:nvPicPr>
+            <p:cNvPr id="3" name="Picture 2"/>
+            <p:cNvPicPr>
+              <a:picLocks noChangeAspect="1"/>
+            </p:cNvPicPr>
+            <p:nvPr/>
+          </p:nvPicPr>
+          <p:blipFill>
+            <a:blip r:embed="rId2">
+              <a:clrChange>
+                <a:clrFrom>
+                  <a:srgbClr val="5B6E6C"/>
+                </a:clrFrom>
+                <a:clrTo>
+                  <a:srgbClr val="5B6E6C">
+                    <a:alpha val="0"/>
+                  </a:srgbClr>
+                </a:clrTo>
+              </a:clrChange>
+            </a:blip>
+            <a:stretch>
+              <a:fillRect/>
+            </a:stretch>
+          </p:blipFill>
+          <p:spPr>
+            <a:xfrm>
+              <a:off x="0" y="736234"/>
+              <a:ext cx="12192000" cy="5385531"/>
+            </a:xfrm>
+            <a:prstGeom prst="rect">
+              <a:avLst/>
+            </a:prstGeom>
+          </p:spPr>
+        </p:pic>
+        <p:sp>
+          <p:nvSpPr>
+            <p:cNvPr id="6" name="Rectangle 5"/>
+            <p:cNvSpPr/>
+            <p:nvPr/>
+          </p:nvSpPr>
+          <p:spPr>
+            <a:xfrm>
+              <a:off x="0" y="2094614"/>
+              <a:ext cx="579474" cy="1796902"/>
+            </a:xfrm>
+            <a:prstGeom prst="rect">
+              <a:avLst/>
+            </a:prstGeom>
+            <a:solidFill>
+              <a:schemeClr val="bg1"/>
+            </a:solidFill>
+            <a:ln>
+              <a:noFill/>
+            </a:ln>
+          </p:spPr>
+          <p:style>
+            <a:lnRef idx="2">
+              <a:schemeClr val="accent1">
+                <a:shade val="50000"/>
+              </a:schemeClr>
+            </a:lnRef>
+            <a:fillRef idx="1">
+              <a:schemeClr val="accent1"/>
+            </a:fillRef>
+            <a:effectRef idx="0">
+              <a:schemeClr val="accent1"/>
+            </a:effectRef>
+            <a:fontRef idx="minor">
+              <a:schemeClr val="lt1"/>
+            </a:fontRef>
+          </p:style>
+          <p:txBody>
+            <a:bodyPr rtlCol="0" anchor="ctr"/>
+            <a:lstStyle/>
+            <a:p>
+              <a:pPr algn="ctr"/>
+              <a:endParaRPr lang="en-US"/>
+            </a:p>
+          </p:txBody>
+        </p:sp>
+        <p:sp>
+          <p:nvSpPr>
+            <p:cNvPr id="10" name="Manual Input 9"/>
+            <p:cNvSpPr/>
+            <p:nvPr/>
+          </p:nvSpPr>
+          <p:spPr>
+            <a:xfrm rot="5400000">
+              <a:off x="-195410" y="825318"/>
+              <a:ext cx="1985702" cy="1807534"/>
+            </a:xfrm>
+            <a:prstGeom prst="flowChartManualInput">
+              <a:avLst/>
+            </a:prstGeom>
+            <a:solidFill>
+              <a:schemeClr val="bg1"/>
+            </a:solidFill>
+            <a:ln>
+              <a:noFill/>
+            </a:ln>
+          </p:spPr>
+          <p:style>
+            <a:lnRef idx="2">
+              <a:schemeClr val="accent1">
+                <a:shade val="50000"/>
+              </a:schemeClr>
+            </a:lnRef>
+            <a:fillRef idx="1">
+              <a:schemeClr val="accent1"/>
+            </a:fillRef>
+            <a:effectRef idx="0">
+              <a:schemeClr val="accent1"/>
+            </a:effectRef>
+            <a:fontRef idx="minor">
+              <a:schemeClr val="lt1"/>
+            </a:fontRef>
+          </p:style>
+          <p:txBody>
+            <a:bodyPr rtlCol="0" anchor="ctr"/>
+            <a:lstStyle/>
+            <a:p>
+              <a:pPr algn="ctr"/>
+              <a:endParaRPr lang="en-US"/>
+            </a:p>
+          </p:txBody>
+        </p:sp>
+      </p:grpSp>
+    </p:spTree>
+    <p:extLst>
+      <p:ext uri="{BB962C8B-B14F-4D97-AF65-F5344CB8AC3E}">
+        <p14:creationId xmlns:p14="http://schemas.microsoft.com/office/powerpoint/2010/main" val="1993496320"/>
+      </p:ext>
+    </p:extLst>
+  </p:cSld>
+  <p:clrMapOvr>
+    <a:masterClrMapping/>
+  </p:clrMapOvr>
+  <p:timing>
+    <p:tnLst>
+      <p:par>
+        <p:cTn id="1" dur="indefinite" restart="never" nodeType="tmRoot"/>
+      </p:par>
+    </p:tnLst>
+  </p:timing>
+</p:sld>
+</file>
+
+<file path=ppt/slides/slide8.xml><?xml version="1.0" encoding="utf-8"?>
+<p:sld xmlns:a="http://schemas.openxmlformats.org/drawingml/2006/main" xmlns:r="http://schemas.openxmlformats.org/officeDocument/2006/relationships" xmlns:p="http://schemas.openxmlformats.org/presentationml/2006/main">
+  <p:cSld>
+    <p:spTree>
+      <p:nvGrpSpPr>
+        <p:cNvPr id="1" name=""/>
+        <p:cNvGrpSpPr/>
+        <p:nvPr/>
+      </p:nvGrpSpPr>
+      <p:grpSpPr>
+        <a:xfrm>
+          <a:off x="0" y="0"/>
+          <a:ext cx="0" cy="0"/>
+          <a:chOff x="0" y="0"/>
+          <a:chExt cx="0" cy="0"/>
+        </a:xfrm>
+      </p:grpSpPr>
+      <p:sp>
+        <p:nvSpPr>
+          <p:cNvPr id="23" name="Rectangle 22" hidden="1"/>
+          <p:cNvSpPr/>
+          <p:nvPr/>
+        </p:nvSpPr>
+        <p:spPr>
+          <a:xfrm>
+            <a:off x="4361126" y="2808514"/>
+            <a:ext cx="3839445" cy="616857"/>
+          </a:xfrm>
+          <a:prstGeom prst="rect">
+            <a:avLst/>
+          </a:prstGeom>
+          <a:solidFill>
+            <a:schemeClr val="tx1"/>
+          </a:solidFill>
+        </p:spPr>
+        <p:style>
+          <a:lnRef idx="2">
+            <a:schemeClr val="accent1">
+              <a:shade val="50000"/>
+            </a:schemeClr>
+          </a:lnRef>
+          <a:fillRef idx="1">
+            <a:schemeClr val="accent1"/>
+          </a:fillRef>
+          <a:effectRef idx="0">
+            <a:schemeClr val="accent1"/>
+          </a:effectRef>
+          <a:fontRef idx="minor">
+            <a:schemeClr val="lt1"/>
+          </a:fontRef>
+        </p:style>
+        <p:txBody>
+          <a:bodyPr rtlCol="0" anchor="ctr"/>
+          <a:lstStyle/>
+          <a:p>
+            <a:pPr algn="ctr"/>
+            <a:endParaRPr lang="en-US"/>
+          </a:p>
+        </p:txBody>
+      </p:sp>
+      <p:sp>
+        <p:nvSpPr>
+          <p:cNvPr id="5" name="Rectangle 4" hidden="1"/>
+          <p:cNvSpPr/>
+          <p:nvPr/>
+        </p:nvSpPr>
+        <p:spPr>
+          <a:xfrm>
+            <a:off x="3185885" y="2808514"/>
+            <a:ext cx="1618343" cy="1879600"/>
+          </a:xfrm>
+          <a:prstGeom prst="rect">
+            <a:avLst/>
+          </a:prstGeom>
+          <a:solidFill>
+            <a:schemeClr val="tx1"/>
+          </a:solidFill>
+        </p:spPr>
+        <p:style>
+          <a:lnRef idx="2">
+            <a:schemeClr val="accent1">
+              <a:shade val="50000"/>
+            </a:schemeClr>
+          </a:lnRef>
+          <a:fillRef idx="1">
+            <a:schemeClr val="accent1"/>
+          </a:fillRef>
+          <a:effectRef idx="0">
+            <a:schemeClr val="accent1"/>
+          </a:effectRef>
+          <a:fontRef idx="minor">
+            <a:schemeClr val="lt1"/>
+          </a:fontRef>
+        </p:style>
+        <p:txBody>
+          <a:bodyPr rtlCol="0" anchor="ctr"/>
+          <a:lstStyle/>
+          <a:p>
+            <a:pPr algn="ctr"/>
+            <a:endParaRPr lang="en-US"/>
+          </a:p>
+        </p:txBody>
+      </p:sp>
+      <p:pic>
+        <p:nvPicPr>
+          <p:cNvPr id="2" name="Picture 1"/>
+          <p:cNvPicPr>
+            <a:picLocks noChangeAspect="1"/>
+          </p:cNvPicPr>
+          <p:nvPr/>
+        </p:nvPicPr>
+        <p:blipFill rotWithShape="1">
+          <a:blip r:embed="rId2">
+            <a:clrChange>
+              <a:clrFrom>
+                <a:srgbClr val="C0C0C0"/>
+              </a:clrFrom>
+              <a:clrTo>
+                <a:srgbClr val="C0C0C0">
+                  <a:alpha val="0"/>
+                </a:srgbClr>
+              </a:clrTo>
+            </a:clrChange>
+            <a:extLst>
+              <a:ext uri="{BEBA8EAE-BF5A-486C-A8C5-ECC9F3942E4B}">
+                <a14:imgProps xmlns:a14="http://schemas.microsoft.com/office/drawing/2010/main">
+                  <a14:imgLayer r:embed="rId3">
+                    <a14:imgEffect>
+                      <a14:backgroundRemoval t="19143" b="85810" l="36399" r="78869">
+                        <a14:foregroundMark x1="65119" y1="58286" x2="66488" y2="61286"/>
+                        <a14:foregroundMark x1="58393" y1="46619" x2="58899" y2="48143"/>
+                        <a14:foregroundMark x1="54464" y1="46476" x2="56548" y2="49476"/>
+                        <a14:foregroundMark x1="57589" y1="52095" x2="64464" y2="63238"/>
+                        <a14:backgroundMark x1="41548" y1="36571" x2="43363" y2="40190"/>
+                      </a14:backgroundRemoval>
+                    </a14:imgEffect>
+                  </a14:imgLayer>
+                </a14:imgProps>
+              </a:ext>
+              <a:ext uri="{28A0092B-C50C-407E-A947-70E740481C1C}">
+                <a14:useLocalDpi xmlns:a14="http://schemas.microsoft.com/office/drawing/2010/main" val="0"/>
+              </a:ext>
+            </a:extLst>
+          </a:blip>
+          <a:srcRect l="31472" t="20253" r="19044" b="6845"/>
+          <a:stretch/>
+        </p:blipFill>
+        <p:spPr>
+          <a:xfrm rot="18744695">
+            <a:off x="2867065" y="1002822"/>
+            <a:ext cx="5429840" cy="4999596"/>
+          </a:xfrm>
+          <a:prstGeom prst="rect">
+            <a:avLst/>
+          </a:prstGeom>
+        </p:spPr>
+      </p:pic>
+      <p:sp>
+        <p:nvSpPr>
+          <p:cNvPr id="3" name="Rectangle 2"/>
+          <p:cNvSpPr/>
+          <p:nvPr/>
+        </p:nvSpPr>
+        <p:spPr>
+          <a:xfrm>
+            <a:off x="3148553" y="-329937"/>
+            <a:ext cx="5743341" cy="3073136"/>
+          </a:xfrm>
+          <a:prstGeom prst="rect">
+            <a:avLst/>
+          </a:prstGeom>
+          <a:solidFill>
+            <a:schemeClr val="bg1"/>
+          </a:solidFill>
+          <a:ln>
+            <a:noFill/>
+          </a:ln>
+        </p:spPr>
+        <p:style>
+          <a:lnRef idx="2">
+            <a:schemeClr val="accent1">
+              <a:shade val="50000"/>
+            </a:schemeClr>
+          </a:lnRef>
+          <a:fillRef idx="1">
+            <a:schemeClr val="accent1"/>
+          </a:fillRef>
+          <a:effectRef idx="0">
+            <a:schemeClr val="accent1"/>
+          </a:effectRef>
+          <a:fontRef idx="minor">
+            <a:schemeClr val="lt1"/>
+          </a:fontRef>
+        </p:style>
+        <p:txBody>
+          <a:bodyPr rtlCol="0" anchor="ctr"/>
+          <a:lstStyle/>
+          <a:p>
+            <a:pPr algn="ctr"/>
+            <a:endParaRPr lang="en-US"/>
+          </a:p>
+        </p:txBody>
+      </p:sp>
+      <p:sp>
+        <p:nvSpPr>
+          <p:cNvPr id="19" name="Rectangle 18"/>
+          <p:cNvSpPr/>
+          <p:nvPr/>
+        </p:nvSpPr>
+        <p:spPr>
+          <a:xfrm>
+            <a:off x="2509101" y="4985975"/>
+            <a:ext cx="5743341" cy="2811561"/>
+          </a:xfrm>
+          <a:prstGeom prst="rect">
+            <a:avLst/>
+          </a:prstGeom>
+          <a:solidFill>
+            <a:schemeClr val="bg1"/>
+          </a:solidFill>
+          <a:ln>
+            <a:noFill/>
+          </a:ln>
+        </p:spPr>
+        <p:style>
+          <a:lnRef idx="2">
+            <a:schemeClr val="accent1">
+              <a:shade val="50000"/>
+            </a:schemeClr>
+          </a:lnRef>
+          <a:fillRef idx="1">
+            <a:schemeClr val="accent1"/>
+          </a:fillRef>
+          <a:effectRef idx="0">
+            <a:schemeClr val="accent1"/>
+          </a:effectRef>
+          <a:fontRef idx="minor">
+            <a:schemeClr val="lt1"/>
+          </a:fontRef>
+        </p:style>
+        <p:txBody>
+          <a:bodyPr rtlCol="0" anchor="ctr"/>
+          <a:lstStyle/>
+          <a:p>
+            <a:pPr algn="ctr"/>
+            <a:endParaRPr lang="en-US"/>
+          </a:p>
+        </p:txBody>
+      </p:sp>
+      <p:sp>
+        <p:nvSpPr>
+          <p:cNvPr id="20" name="Rectangle 19"/>
+          <p:cNvSpPr/>
+          <p:nvPr/>
+        </p:nvSpPr>
+        <p:spPr>
+          <a:xfrm>
+            <a:off x="-2594789" y="2243579"/>
+            <a:ext cx="5780674" cy="3187829"/>
+          </a:xfrm>
+          <a:prstGeom prst="rect">
+            <a:avLst/>
+          </a:prstGeom>
+          <a:solidFill>
+            <a:schemeClr val="bg1"/>
+          </a:solidFill>
+          <a:ln>
+            <a:noFill/>
+          </a:ln>
+        </p:spPr>
+        <p:style>
+          <a:lnRef idx="2">
+            <a:schemeClr val="accent1">
+              <a:shade val="50000"/>
+            </a:schemeClr>
+          </a:lnRef>
+          <a:fillRef idx="1">
+            <a:schemeClr val="accent1"/>
+          </a:fillRef>
+          <a:effectRef idx="0">
+            <a:schemeClr val="accent1"/>
+          </a:effectRef>
+          <a:fontRef idx="minor">
+            <a:schemeClr val="lt1"/>
+          </a:fontRef>
+        </p:style>
+        <p:txBody>
+          <a:bodyPr rtlCol="0" anchor="ctr"/>
+          <a:lstStyle/>
+          <a:p>
+            <a:pPr algn="ctr"/>
+            <a:endParaRPr lang="en-US"/>
+          </a:p>
+        </p:txBody>
+      </p:sp>
+      <p:sp>
+        <p:nvSpPr>
+          <p:cNvPr id="22" name="Rectangle 21"/>
+          <p:cNvSpPr/>
+          <p:nvPr/>
+        </p:nvSpPr>
+        <p:spPr>
+          <a:xfrm>
+            <a:off x="8618512" y="2363753"/>
+            <a:ext cx="2103556" cy="3187829"/>
+          </a:xfrm>
+          <a:prstGeom prst="rect">
+            <a:avLst/>
+          </a:prstGeom>
+          <a:solidFill>
+            <a:schemeClr val="bg1"/>
+          </a:solidFill>
+          <a:ln>
+            <a:noFill/>
+          </a:ln>
+        </p:spPr>
+        <p:style>
+          <a:lnRef idx="2">
+            <a:schemeClr val="accent1">
+              <a:shade val="50000"/>
+            </a:schemeClr>
+          </a:lnRef>
+          <a:fillRef idx="1">
+            <a:schemeClr val="accent1"/>
+          </a:fillRef>
+          <a:effectRef idx="0">
+            <a:schemeClr val="accent1"/>
+          </a:effectRef>
+          <a:fontRef idx="minor">
+            <a:schemeClr val="lt1"/>
+          </a:fontRef>
+        </p:style>
+        <p:txBody>
+          <a:bodyPr rtlCol="0" anchor="ctr"/>
+          <a:lstStyle/>
+          <a:p>
+            <a:pPr algn="ctr"/>
+            <a:endParaRPr lang="en-US"/>
+          </a:p>
+        </p:txBody>
+      </p:sp>
+      <p:sp>
+        <p:nvSpPr>
+          <p:cNvPr id="4" name="Rectangle 3"/>
+          <p:cNvSpPr/>
+          <p:nvPr/>
+        </p:nvSpPr>
+        <p:spPr>
+          <a:xfrm>
+            <a:off x="3026229" y="2532743"/>
+            <a:ext cx="602342" cy="732971"/>
+          </a:xfrm>
+          <a:prstGeom prst="rect">
+            <a:avLst/>
+          </a:prstGeom>
+          <a:solidFill>
+            <a:schemeClr val="bg1"/>
+          </a:solidFill>
+          <a:ln>
+            <a:noFill/>
+          </a:ln>
+        </p:spPr>
+        <p:style>
+          <a:lnRef idx="2">
+            <a:schemeClr val="accent1">
+              <a:shade val="50000"/>
+            </a:schemeClr>
+          </a:lnRef>
+          <a:fillRef idx="1">
+            <a:schemeClr val="accent1"/>
+          </a:fillRef>
+          <a:effectRef idx="0">
+            <a:schemeClr val="accent1"/>
+          </a:effectRef>
+          <a:fontRef idx="minor">
+            <a:schemeClr val="lt1"/>
+          </a:fontRef>
+        </p:style>
+        <p:txBody>
+          <a:bodyPr rtlCol="0" anchor="ctr"/>
+          <a:lstStyle/>
+          <a:p>
+            <a:pPr algn="ctr"/>
+            <a:endParaRPr lang="en-US"/>
+          </a:p>
+        </p:txBody>
+      </p:sp>
+    </p:spTree>
+    <p:extLst>
+      <p:ext uri="{BB962C8B-B14F-4D97-AF65-F5344CB8AC3E}">
+        <p14:creationId xmlns:p14="http://schemas.microsoft.com/office/powerpoint/2010/main" val="300054500"/>
+      </p:ext>
+    </p:extLst>
+  </p:cSld>
+  <p:clrMapOvr>
+    <a:masterClrMapping/>
+  </p:clrMapOvr>
+  <p:timing>
+    <p:tnLst>
+      <p:par>
+        <p:cTn id="1" dur="indefinite" restart="never" nodeType="tmRoot"/>
+      </p:par>
+    </p:tnLst>
+  </p:timing>
 </p:sld>
 </file>
 

</xml_diff>

<commit_message>
Navigation stack sort of finished
</commit_message>
<xml_diff>
--- a/Paper/Metadata/Navstack.pptx
+++ b/Paper/Metadata/Navstack.pptx
@@ -7808,6 +7808,165 @@
           </p:txBody>
         </p:sp>
       </p:grpSp>
+      <p:sp>
+        <p:nvSpPr>
+          <p:cNvPr id="12" name="Oval 11"/>
+          <p:cNvSpPr/>
+          <p:nvPr/>
+        </p:nvSpPr>
+        <p:spPr>
+          <a:xfrm>
+            <a:off x="1624118" y="2690037"/>
+            <a:ext cx="510364" cy="510364"/>
+          </a:xfrm>
+          <a:prstGeom prst="ellipse">
+            <a:avLst/>
+          </a:prstGeom>
+          <a:noFill/>
+          <a:ln w="28575">
+            <a:solidFill>
+              <a:schemeClr val="tx2"/>
+            </a:solidFill>
+          </a:ln>
+        </p:spPr>
+        <p:style>
+          <a:lnRef idx="2">
+            <a:schemeClr val="accent1">
+              <a:shade val="50000"/>
+            </a:schemeClr>
+          </a:lnRef>
+          <a:fillRef idx="1">
+            <a:schemeClr val="accent1"/>
+          </a:fillRef>
+          <a:effectRef idx="0">
+            <a:schemeClr val="accent1"/>
+          </a:effectRef>
+          <a:fontRef idx="minor">
+            <a:schemeClr val="lt1"/>
+          </a:fontRef>
+        </p:style>
+        <p:txBody>
+          <a:bodyPr rtlCol="0" anchor="ctr"/>
+          <a:lstStyle/>
+          <a:p>
+            <a:pPr algn="ctr"/>
+            <a:endParaRPr lang="en-US"/>
+          </a:p>
+        </p:txBody>
+      </p:sp>
+      <p:pic>
+        <p:nvPicPr>
+          <p:cNvPr id="18" name="Picture 17"/>
+          <p:cNvPicPr>
+            <a:picLocks noChangeAspect="1"/>
+          </p:cNvPicPr>
+          <p:nvPr/>
+        </p:nvPicPr>
+        <p:blipFill rotWithShape="1">
+          <a:blip r:embed="rId2">
+            <a:clrChange>
+              <a:clrFrom>
+                <a:srgbClr val="5B6E6C"/>
+              </a:clrFrom>
+              <a:clrTo>
+                <a:srgbClr val="5B6E6C">
+                  <a:alpha val="0"/>
+                </a:srgbClr>
+              </a:clrTo>
+            </a:clrChange>
+          </a:blip>
+          <a:srcRect l="10922" t="31295" r="80532" b="49358"/>
+          <a:stretch/>
+        </p:blipFill>
+        <p:spPr>
+          <a:xfrm>
+            <a:off x="4072270" y="2642191"/>
+            <a:ext cx="2498651" cy="2498650"/>
+          </a:xfrm>
+          <a:prstGeom prst="ellipse">
+            <a:avLst/>
+          </a:prstGeom>
+          <a:ln w="28575">
+            <a:solidFill>
+              <a:schemeClr val="tx2"/>
+            </a:solidFill>
+          </a:ln>
+        </p:spPr>
+      </p:pic>
+      <p:cxnSp>
+        <p:nvCxnSpPr>
+          <p:cNvPr id="19" name="Straight Connector 18"/>
+          <p:cNvCxnSpPr>
+            <a:stCxn id="12" idx="0"/>
+          </p:cNvCxnSpPr>
+          <p:nvPr/>
+        </p:nvCxnSpPr>
+        <p:spPr>
+          <a:xfrm flipV="1">
+            <a:off x="1879300" y="2642191"/>
+            <a:ext cx="3203063" cy="47846"/>
+          </a:xfrm>
+          <a:prstGeom prst="line">
+            <a:avLst/>
+          </a:prstGeom>
+          <a:ln w="28575">
+            <a:solidFill>
+              <a:schemeClr val="tx2"/>
+            </a:solidFill>
+          </a:ln>
+        </p:spPr>
+        <p:style>
+          <a:lnRef idx="1">
+            <a:schemeClr val="accent1"/>
+          </a:lnRef>
+          <a:fillRef idx="0">
+            <a:schemeClr val="accent1"/>
+          </a:fillRef>
+          <a:effectRef idx="0">
+            <a:schemeClr val="accent1"/>
+          </a:effectRef>
+          <a:fontRef idx="minor">
+            <a:schemeClr val="tx1"/>
+          </a:fontRef>
+        </p:style>
+      </p:cxnSp>
+      <p:cxnSp>
+        <p:nvCxnSpPr>
+          <p:cNvPr id="22" name="Straight Connector 21"/>
+          <p:cNvCxnSpPr>
+            <a:endCxn id="12" idx="3"/>
+          </p:cNvCxnSpPr>
+          <p:nvPr/>
+        </p:nvCxnSpPr>
+        <p:spPr>
+          <a:xfrm flipH="1" flipV="1">
+            <a:off x="1698859" y="3125660"/>
+            <a:ext cx="3040871" cy="1890013"/>
+          </a:xfrm>
+          <a:prstGeom prst="line">
+            <a:avLst/>
+          </a:prstGeom>
+          <a:ln w="28575">
+            <a:solidFill>
+              <a:schemeClr val="tx2"/>
+            </a:solidFill>
+          </a:ln>
+        </p:spPr>
+        <p:style>
+          <a:lnRef idx="1">
+            <a:schemeClr val="accent1"/>
+          </a:lnRef>
+          <a:fillRef idx="0">
+            <a:schemeClr val="accent1"/>
+          </a:fillRef>
+          <a:effectRef idx="0">
+            <a:schemeClr val="accent1"/>
+          </a:effectRef>
+          <a:fontRef idx="minor">
+            <a:schemeClr val="tx1"/>
+          </a:fontRef>
+        </p:style>
+      </p:cxnSp>
     </p:spTree>
     <p:extLst>
       <p:ext uri="{BB962C8B-B14F-4D97-AF65-F5344CB8AC3E}">

</xml_diff>

<commit_message>
Updated paper, added new version, updated ppt’s, updated figures
</commit_message>
<xml_diff>
--- a/Paper/Metadata/Navstack.pptx
+++ b/Paper/Metadata/Navstack.pptx
@@ -7,12 +7,14 @@
   <p:sldIdLst>
     <p:sldId id="262" r:id="rId2"/>
     <p:sldId id="264" r:id="rId3"/>
-    <p:sldId id="263" r:id="rId4"/>
-    <p:sldId id="265" r:id="rId5"/>
-    <p:sldId id="266" r:id="rId6"/>
-    <p:sldId id="268" r:id="rId7"/>
-    <p:sldId id="269" r:id="rId8"/>
-    <p:sldId id="267" r:id="rId9"/>
+    <p:sldId id="271" r:id="rId4"/>
+    <p:sldId id="263" r:id="rId5"/>
+    <p:sldId id="265" r:id="rId6"/>
+    <p:sldId id="270" r:id="rId7"/>
+    <p:sldId id="266" r:id="rId8"/>
+    <p:sldId id="268" r:id="rId9"/>
+    <p:sldId id="269" r:id="rId10"/>
+    <p:sldId id="267" r:id="rId11"/>
   </p:sldIdLst>
   <p:sldSz cx="12192000" cy="6858000"/>
   <p:notesSz cx="6858000" cy="9144000"/>
@@ -250,7 +252,7 @@
           <a:p>
             <a:fld id="{B338B4EC-3F41-2042-BB26-6E887D15D32B}" type="datetimeFigureOut">
               <a:rPr lang="en-US" smtClean="0"/>
-              <a:t>5/24/17</a:t>
+              <a:t>5/27/17</a:t>
             </a:fld>
             <a:endParaRPr lang="en-US"/>
           </a:p>
@@ -420,7 +422,7 @@
           <a:p>
             <a:fld id="{B338B4EC-3F41-2042-BB26-6E887D15D32B}" type="datetimeFigureOut">
               <a:rPr lang="en-US" smtClean="0"/>
-              <a:t>5/24/17</a:t>
+              <a:t>5/27/17</a:t>
             </a:fld>
             <a:endParaRPr lang="en-US"/>
           </a:p>
@@ -600,7 +602,7 @@
           <a:p>
             <a:fld id="{B338B4EC-3F41-2042-BB26-6E887D15D32B}" type="datetimeFigureOut">
               <a:rPr lang="en-US" smtClean="0"/>
-              <a:t>5/24/17</a:t>
+              <a:t>5/27/17</a:t>
             </a:fld>
             <a:endParaRPr lang="en-US"/>
           </a:p>
@@ -770,7 +772,7 @@
           <a:p>
             <a:fld id="{B338B4EC-3F41-2042-BB26-6E887D15D32B}" type="datetimeFigureOut">
               <a:rPr lang="en-US" smtClean="0"/>
-              <a:t>5/24/17</a:t>
+              <a:t>5/27/17</a:t>
             </a:fld>
             <a:endParaRPr lang="en-US"/>
           </a:p>
@@ -1016,7 +1018,7 @@
           <a:p>
             <a:fld id="{B338B4EC-3F41-2042-BB26-6E887D15D32B}" type="datetimeFigureOut">
               <a:rPr lang="en-US" smtClean="0"/>
-              <a:t>5/24/17</a:t>
+              <a:t>5/27/17</a:t>
             </a:fld>
             <a:endParaRPr lang="en-US"/>
           </a:p>
@@ -1248,7 +1250,7 @@
           <a:p>
             <a:fld id="{B338B4EC-3F41-2042-BB26-6E887D15D32B}" type="datetimeFigureOut">
               <a:rPr lang="en-US" smtClean="0"/>
-              <a:t>5/24/17</a:t>
+              <a:t>5/27/17</a:t>
             </a:fld>
             <a:endParaRPr lang="en-US"/>
           </a:p>
@@ -1615,7 +1617,7 @@
           <a:p>
             <a:fld id="{B338B4EC-3F41-2042-BB26-6E887D15D32B}" type="datetimeFigureOut">
               <a:rPr lang="en-US" smtClean="0"/>
-              <a:t>5/24/17</a:t>
+              <a:t>5/27/17</a:t>
             </a:fld>
             <a:endParaRPr lang="en-US"/>
           </a:p>
@@ -1733,7 +1735,7 @@
           <a:p>
             <a:fld id="{B338B4EC-3F41-2042-BB26-6E887D15D32B}" type="datetimeFigureOut">
               <a:rPr lang="en-US" smtClean="0"/>
-              <a:t>5/24/17</a:t>
+              <a:t>5/27/17</a:t>
             </a:fld>
             <a:endParaRPr lang="en-US"/>
           </a:p>
@@ -1828,7 +1830,7 @@
           <a:p>
             <a:fld id="{B338B4EC-3F41-2042-BB26-6E887D15D32B}" type="datetimeFigureOut">
               <a:rPr lang="en-US" smtClean="0"/>
-              <a:t>5/24/17</a:t>
+              <a:t>5/27/17</a:t>
             </a:fld>
             <a:endParaRPr lang="en-US"/>
           </a:p>
@@ -2105,7 +2107,7 @@
           <a:p>
             <a:fld id="{B338B4EC-3F41-2042-BB26-6E887D15D32B}" type="datetimeFigureOut">
               <a:rPr lang="en-US" smtClean="0"/>
-              <a:t>5/24/17</a:t>
+              <a:t>5/27/17</a:t>
             </a:fld>
             <a:endParaRPr lang="en-US"/>
           </a:p>
@@ -2358,7 +2360,7 @@
           <a:p>
             <a:fld id="{B338B4EC-3F41-2042-BB26-6E887D15D32B}" type="datetimeFigureOut">
               <a:rPr lang="en-US" smtClean="0"/>
-              <a:t>5/24/17</a:t>
+              <a:t>5/27/17</a:t>
             </a:fld>
             <a:endParaRPr lang="en-US"/>
           </a:p>
@@ -2571,7 +2573,7 @@
           <a:p>
             <a:fld id="{B338B4EC-3F41-2042-BB26-6E887D15D32B}" type="datetimeFigureOut">
               <a:rPr lang="en-US" smtClean="0"/>
-              <a:t>5/24/17</a:t>
+              <a:t>5/27/17</a:t>
             </a:fld>
             <a:endParaRPr lang="en-US"/>
           </a:p>
@@ -3692,6 +3694,413 @@
 </p:sld>
 </file>
 
+<file path=ppt/slides/slide10.xml><?xml version="1.0" encoding="utf-8"?>
+<p:sld xmlns:a="http://schemas.openxmlformats.org/drawingml/2006/main" xmlns:r="http://schemas.openxmlformats.org/officeDocument/2006/relationships" xmlns:p="http://schemas.openxmlformats.org/presentationml/2006/main">
+  <p:cSld>
+    <p:spTree>
+      <p:nvGrpSpPr>
+        <p:cNvPr id="1" name=""/>
+        <p:cNvGrpSpPr/>
+        <p:nvPr/>
+      </p:nvGrpSpPr>
+      <p:grpSpPr>
+        <a:xfrm>
+          <a:off x="0" y="0"/>
+          <a:ext cx="0" cy="0"/>
+          <a:chOff x="0" y="0"/>
+          <a:chExt cx="0" cy="0"/>
+        </a:xfrm>
+      </p:grpSpPr>
+      <p:sp>
+        <p:nvSpPr>
+          <p:cNvPr id="23" name="Rectangle 22" hidden="1"/>
+          <p:cNvSpPr/>
+          <p:nvPr/>
+        </p:nvSpPr>
+        <p:spPr>
+          <a:xfrm>
+            <a:off x="4361126" y="2808514"/>
+            <a:ext cx="3839445" cy="616857"/>
+          </a:xfrm>
+          <a:prstGeom prst="rect">
+            <a:avLst/>
+          </a:prstGeom>
+          <a:solidFill>
+            <a:schemeClr val="tx1"/>
+          </a:solidFill>
+        </p:spPr>
+        <p:style>
+          <a:lnRef idx="2">
+            <a:schemeClr val="accent1">
+              <a:shade val="50000"/>
+            </a:schemeClr>
+          </a:lnRef>
+          <a:fillRef idx="1">
+            <a:schemeClr val="accent1"/>
+          </a:fillRef>
+          <a:effectRef idx="0">
+            <a:schemeClr val="accent1"/>
+          </a:effectRef>
+          <a:fontRef idx="minor">
+            <a:schemeClr val="lt1"/>
+          </a:fontRef>
+        </p:style>
+        <p:txBody>
+          <a:bodyPr rtlCol="0" anchor="ctr"/>
+          <a:lstStyle/>
+          <a:p>
+            <a:pPr algn="ctr"/>
+            <a:endParaRPr lang="en-US"/>
+          </a:p>
+        </p:txBody>
+      </p:sp>
+      <p:sp>
+        <p:nvSpPr>
+          <p:cNvPr id="5" name="Rectangle 4" hidden="1"/>
+          <p:cNvSpPr/>
+          <p:nvPr/>
+        </p:nvSpPr>
+        <p:spPr>
+          <a:xfrm>
+            <a:off x="3185885" y="2808514"/>
+            <a:ext cx="1618343" cy="1879600"/>
+          </a:xfrm>
+          <a:prstGeom prst="rect">
+            <a:avLst/>
+          </a:prstGeom>
+          <a:solidFill>
+            <a:schemeClr val="tx1"/>
+          </a:solidFill>
+        </p:spPr>
+        <p:style>
+          <a:lnRef idx="2">
+            <a:schemeClr val="accent1">
+              <a:shade val="50000"/>
+            </a:schemeClr>
+          </a:lnRef>
+          <a:fillRef idx="1">
+            <a:schemeClr val="accent1"/>
+          </a:fillRef>
+          <a:effectRef idx="0">
+            <a:schemeClr val="accent1"/>
+          </a:effectRef>
+          <a:fontRef idx="minor">
+            <a:schemeClr val="lt1"/>
+          </a:fontRef>
+        </p:style>
+        <p:txBody>
+          <a:bodyPr rtlCol="0" anchor="ctr"/>
+          <a:lstStyle/>
+          <a:p>
+            <a:pPr algn="ctr"/>
+            <a:endParaRPr lang="en-US"/>
+          </a:p>
+        </p:txBody>
+      </p:sp>
+      <p:pic>
+        <p:nvPicPr>
+          <p:cNvPr id="2" name="Picture 1"/>
+          <p:cNvPicPr>
+            <a:picLocks noChangeAspect="1"/>
+          </p:cNvPicPr>
+          <p:nvPr/>
+        </p:nvPicPr>
+        <p:blipFill rotWithShape="1">
+          <a:blip r:embed="rId2">
+            <a:clrChange>
+              <a:clrFrom>
+                <a:srgbClr val="C0C0C0"/>
+              </a:clrFrom>
+              <a:clrTo>
+                <a:srgbClr val="C0C0C0">
+                  <a:alpha val="0"/>
+                </a:srgbClr>
+              </a:clrTo>
+            </a:clrChange>
+            <a:extLst>
+              <a:ext uri="{BEBA8EAE-BF5A-486C-A8C5-ECC9F3942E4B}">
+                <a14:imgProps xmlns:a14="http://schemas.microsoft.com/office/drawing/2010/main">
+                  <a14:imgLayer r:embed="rId3">
+                    <a14:imgEffect>
+                      <a14:backgroundRemoval t="19143" b="85810" l="36399" r="78869">
+                        <a14:foregroundMark x1="65119" y1="58286" x2="66488" y2="61286"/>
+                        <a14:foregroundMark x1="58393" y1="46619" x2="58899" y2="48143"/>
+                        <a14:foregroundMark x1="54464" y1="46476" x2="56548" y2="49476"/>
+                        <a14:foregroundMark x1="57589" y1="52095" x2="64464" y2="63238"/>
+                        <a14:backgroundMark x1="41548" y1="36571" x2="43363" y2="40190"/>
+                      </a14:backgroundRemoval>
+                    </a14:imgEffect>
+                  </a14:imgLayer>
+                </a14:imgProps>
+              </a:ext>
+              <a:ext uri="{28A0092B-C50C-407E-A947-70E740481C1C}">
+                <a14:useLocalDpi xmlns:a14="http://schemas.microsoft.com/office/drawing/2010/main" val="0"/>
+              </a:ext>
+            </a:extLst>
+          </a:blip>
+          <a:srcRect l="31472" t="20253" r="19044" b="6845"/>
+          <a:stretch/>
+        </p:blipFill>
+        <p:spPr>
+          <a:xfrm rot="18744695">
+            <a:off x="2867065" y="1002822"/>
+            <a:ext cx="5429840" cy="4999596"/>
+          </a:xfrm>
+          <a:prstGeom prst="rect">
+            <a:avLst/>
+          </a:prstGeom>
+        </p:spPr>
+      </p:pic>
+      <p:sp>
+        <p:nvSpPr>
+          <p:cNvPr id="3" name="Rectangle 2"/>
+          <p:cNvSpPr/>
+          <p:nvPr/>
+        </p:nvSpPr>
+        <p:spPr>
+          <a:xfrm>
+            <a:off x="3148553" y="-329937"/>
+            <a:ext cx="5743341" cy="3073136"/>
+          </a:xfrm>
+          <a:prstGeom prst="rect">
+            <a:avLst/>
+          </a:prstGeom>
+          <a:solidFill>
+            <a:schemeClr val="bg1"/>
+          </a:solidFill>
+          <a:ln>
+            <a:noFill/>
+          </a:ln>
+        </p:spPr>
+        <p:style>
+          <a:lnRef idx="2">
+            <a:schemeClr val="accent1">
+              <a:shade val="50000"/>
+            </a:schemeClr>
+          </a:lnRef>
+          <a:fillRef idx="1">
+            <a:schemeClr val="accent1"/>
+          </a:fillRef>
+          <a:effectRef idx="0">
+            <a:schemeClr val="accent1"/>
+          </a:effectRef>
+          <a:fontRef idx="minor">
+            <a:schemeClr val="lt1"/>
+          </a:fontRef>
+        </p:style>
+        <p:txBody>
+          <a:bodyPr rtlCol="0" anchor="ctr"/>
+          <a:lstStyle/>
+          <a:p>
+            <a:pPr algn="ctr"/>
+            <a:endParaRPr lang="en-US"/>
+          </a:p>
+        </p:txBody>
+      </p:sp>
+      <p:sp>
+        <p:nvSpPr>
+          <p:cNvPr id="19" name="Rectangle 18"/>
+          <p:cNvSpPr/>
+          <p:nvPr/>
+        </p:nvSpPr>
+        <p:spPr>
+          <a:xfrm>
+            <a:off x="2509101" y="4985975"/>
+            <a:ext cx="5743341" cy="2811561"/>
+          </a:xfrm>
+          <a:prstGeom prst="rect">
+            <a:avLst/>
+          </a:prstGeom>
+          <a:solidFill>
+            <a:schemeClr val="bg1"/>
+          </a:solidFill>
+          <a:ln>
+            <a:noFill/>
+          </a:ln>
+        </p:spPr>
+        <p:style>
+          <a:lnRef idx="2">
+            <a:schemeClr val="accent1">
+              <a:shade val="50000"/>
+            </a:schemeClr>
+          </a:lnRef>
+          <a:fillRef idx="1">
+            <a:schemeClr val="accent1"/>
+          </a:fillRef>
+          <a:effectRef idx="0">
+            <a:schemeClr val="accent1"/>
+          </a:effectRef>
+          <a:fontRef idx="minor">
+            <a:schemeClr val="lt1"/>
+          </a:fontRef>
+        </p:style>
+        <p:txBody>
+          <a:bodyPr rtlCol="0" anchor="ctr"/>
+          <a:lstStyle/>
+          <a:p>
+            <a:pPr algn="ctr"/>
+            <a:endParaRPr lang="en-US"/>
+          </a:p>
+        </p:txBody>
+      </p:sp>
+      <p:sp>
+        <p:nvSpPr>
+          <p:cNvPr id="20" name="Rectangle 19"/>
+          <p:cNvSpPr/>
+          <p:nvPr/>
+        </p:nvSpPr>
+        <p:spPr>
+          <a:xfrm>
+            <a:off x="-2594789" y="2243579"/>
+            <a:ext cx="5780674" cy="3187829"/>
+          </a:xfrm>
+          <a:prstGeom prst="rect">
+            <a:avLst/>
+          </a:prstGeom>
+          <a:solidFill>
+            <a:schemeClr val="bg1"/>
+          </a:solidFill>
+          <a:ln>
+            <a:noFill/>
+          </a:ln>
+        </p:spPr>
+        <p:style>
+          <a:lnRef idx="2">
+            <a:schemeClr val="accent1">
+              <a:shade val="50000"/>
+            </a:schemeClr>
+          </a:lnRef>
+          <a:fillRef idx="1">
+            <a:schemeClr val="accent1"/>
+          </a:fillRef>
+          <a:effectRef idx="0">
+            <a:schemeClr val="accent1"/>
+          </a:effectRef>
+          <a:fontRef idx="minor">
+            <a:schemeClr val="lt1"/>
+          </a:fontRef>
+        </p:style>
+        <p:txBody>
+          <a:bodyPr rtlCol="0" anchor="ctr"/>
+          <a:lstStyle/>
+          <a:p>
+            <a:pPr algn="ctr"/>
+            <a:endParaRPr lang="en-US"/>
+          </a:p>
+        </p:txBody>
+      </p:sp>
+      <p:sp>
+        <p:nvSpPr>
+          <p:cNvPr id="22" name="Rectangle 21"/>
+          <p:cNvSpPr/>
+          <p:nvPr/>
+        </p:nvSpPr>
+        <p:spPr>
+          <a:xfrm>
+            <a:off x="8618512" y="2363753"/>
+            <a:ext cx="2103556" cy="3187829"/>
+          </a:xfrm>
+          <a:prstGeom prst="rect">
+            <a:avLst/>
+          </a:prstGeom>
+          <a:solidFill>
+            <a:schemeClr val="bg1"/>
+          </a:solidFill>
+          <a:ln>
+            <a:noFill/>
+          </a:ln>
+        </p:spPr>
+        <p:style>
+          <a:lnRef idx="2">
+            <a:schemeClr val="accent1">
+              <a:shade val="50000"/>
+            </a:schemeClr>
+          </a:lnRef>
+          <a:fillRef idx="1">
+            <a:schemeClr val="accent1"/>
+          </a:fillRef>
+          <a:effectRef idx="0">
+            <a:schemeClr val="accent1"/>
+          </a:effectRef>
+          <a:fontRef idx="minor">
+            <a:schemeClr val="lt1"/>
+          </a:fontRef>
+        </p:style>
+        <p:txBody>
+          <a:bodyPr rtlCol="0" anchor="ctr"/>
+          <a:lstStyle/>
+          <a:p>
+            <a:pPr algn="ctr"/>
+            <a:endParaRPr lang="en-US"/>
+          </a:p>
+        </p:txBody>
+      </p:sp>
+      <p:sp>
+        <p:nvSpPr>
+          <p:cNvPr id="4" name="Rectangle 3"/>
+          <p:cNvSpPr/>
+          <p:nvPr/>
+        </p:nvSpPr>
+        <p:spPr>
+          <a:xfrm>
+            <a:off x="3026229" y="2532743"/>
+            <a:ext cx="602342" cy="732971"/>
+          </a:xfrm>
+          <a:prstGeom prst="rect">
+            <a:avLst/>
+          </a:prstGeom>
+          <a:solidFill>
+            <a:schemeClr val="bg1"/>
+          </a:solidFill>
+          <a:ln>
+            <a:noFill/>
+          </a:ln>
+        </p:spPr>
+        <p:style>
+          <a:lnRef idx="2">
+            <a:schemeClr val="accent1">
+              <a:shade val="50000"/>
+            </a:schemeClr>
+          </a:lnRef>
+          <a:fillRef idx="1">
+            <a:schemeClr val="accent1"/>
+          </a:fillRef>
+          <a:effectRef idx="0">
+            <a:schemeClr val="accent1"/>
+          </a:effectRef>
+          <a:fontRef idx="minor">
+            <a:schemeClr val="lt1"/>
+          </a:fontRef>
+        </p:style>
+        <p:txBody>
+          <a:bodyPr rtlCol="0" anchor="ctr"/>
+          <a:lstStyle/>
+          <a:p>
+            <a:pPr algn="ctr"/>
+            <a:endParaRPr lang="en-US"/>
+          </a:p>
+        </p:txBody>
+      </p:sp>
+    </p:spTree>
+    <p:extLst>
+      <p:ext uri="{BB962C8B-B14F-4D97-AF65-F5344CB8AC3E}">
+        <p14:creationId xmlns:p14="http://schemas.microsoft.com/office/powerpoint/2010/main" val="300054500"/>
+      </p:ext>
+    </p:extLst>
+  </p:cSld>
+  <p:clrMapOvr>
+    <a:masterClrMapping/>
+  </p:clrMapOvr>
+  <p:timing>
+    <p:tnLst>
+      <p:par>
+        <p:cTn id="1" dur="indefinite" restart="never" nodeType="tmRoot"/>
+      </p:par>
+    </p:tnLst>
+  </p:timing>
+</p:sld>
+</file>
+
 <file path=ppt/slides/slide2.xml><?xml version="1.0" encoding="utf-8"?>
 <p:sld xmlns:a="http://schemas.openxmlformats.org/drawingml/2006/main" xmlns:r="http://schemas.openxmlformats.org/officeDocument/2006/relationships" xmlns:p="http://schemas.openxmlformats.org/presentationml/2006/main">
   <p:cSld>
@@ -5083,6 +5492,1169 @@
 </file>
 
 <file path=ppt/slides/slide3.xml><?xml version="1.0" encoding="utf-8"?>
+<p:sld xmlns:a="http://schemas.openxmlformats.org/drawingml/2006/main" xmlns:r="http://schemas.openxmlformats.org/officeDocument/2006/relationships" xmlns:p="http://schemas.openxmlformats.org/presentationml/2006/main">
+  <p:cSld>
+    <p:spTree>
+      <p:nvGrpSpPr>
+        <p:cNvPr id="1" name=""/>
+        <p:cNvGrpSpPr/>
+        <p:nvPr/>
+      </p:nvGrpSpPr>
+      <p:grpSpPr>
+        <a:xfrm>
+          <a:off x="0" y="0"/>
+          <a:ext cx="0" cy="0"/>
+          <a:chOff x="0" y="0"/>
+          <a:chExt cx="0" cy="0"/>
+        </a:xfrm>
+      </p:grpSpPr>
+      <p:grpSp>
+        <p:nvGrpSpPr>
+          <p:cNvPr id="157" name="Group 156"/>
+          <p:cNvGrpSpPr/>
+          <p:nvPr/>
+        </p:nvGrpSpPr>
+        <p:grpSpPr>
+          <a:xfrm>
+            <a:off x="720988" y="996406"/>
+            <a:ext cx="10214597" cy="2466785"/>
+            <a:chOff x="731874" y="974634"/>
+            <a:chExt cx="10214597" cy="2466785"/>
+          </a:xfrm>
+        </p:grpSpPr>
+        <p:sp>
+          <p:nvSpPr>
+            <p:cNvPr id="5" name="Rectangle 4"/>
+            <p:cNvSpPr/>
+            <p:nvPr/>
+          </p:nvSpPr>
+          <p:spPr>
+            <a:xfrm>
+              <a:off x="3340862" y="974634"/>
+              <a:ext cx="2189887" cy="518653"/>
+            </a:xfrm>
+            <a:prstGeom prst="rect">
+              <a:avLst/>
+            </a:prstGeom>
+            <a:solidFill>
+              <a:schemeClr val="bg1"/>
+            </a:solidFill>
+            <a:ln>
+              <a:solidFill>
+                <a:schemeClr val="tx1"/>
+              </a:solidFill>
+            </a:ln>
+          </p:spPr>
+          <p:style>
+            <a:lnRef idx="2">
+              <a:schemeClr val="accent1">
+                <a:shade val="50000"/>
+              </a:schemeClr>
+            </a:lnRef>
+            <a:fillRef idx="1">
+              <a:schemeClr val="accent1"/>
+            </a:fillRef>
+            <a:effectRef idx="0">
+              <a:schemeClr val="accent1"/>
+            </a:effectRef>
+            <a:fontRef idx="minor">
+              <a:schemeClr val="lt1"/>
+            </a:fontRef>
+          </p:style>
+          <p:txBody>
+            <a:bodyPr rtlCol="0" anchor="ctr"/>
+            <a:lstStyle/>
+            <a:p>
+              <a:pPr algn="ctr"/>
+              <a:r>
+                <a:rPr lang="en-US" sz="2400" smtClean="0">
+                  <a:solidFill>
+                    <a:sysClr val="windowText" lastClr="000000"/>
+                  </a:solidFill>
+                  <a:latin typeface="Baskerville" charset="0"/>
+                  <a:ea typeface="Baskerville" charset="0"/>
+                  <a:cs typeface="Baskerville" charset="0"/>
+                </a:rPr>
+                <a:t>Map server</a:t>
+              </a:r>
+              <a:endParaRPr lang="en-US" sz="2400" dirty="0">
+                <a:solidFill>
+                  <a:sysClr val="windowText" lastClr="000000"/>
+                </a:solidFill>
+                <a:latin typeface="Baskerville" charset="0"/>
+                <a:ea typeface="Baskerville" charset="0"/>
+                <a:cs typeface="Baskerville" charset="0"/>
+              </a:endParaRPr>
+            </a:p>
+          </p:txBody>
+        </p:sp>
+        <p:sp>
+          <p:nvSpPr>
+            <p:cNvPr id="6" name="Rectangle 5"/>
+            <p:cNvSpPr/>
+            <p:nvPr/>
+          </p:nvSpPr>
+          <p:spPr>
+            <a:xfrm>
+              <a:off x="3340862" y="1819037"/>
+              <a:ext cx="2189887" cy="518653"/>
+            </a:xfrm>
+            <a:prstGeom prst="rect">
+              <a:avLst/>
+            </a:prstGeom>
+            <a:solidFill>
+              <a:schemeClr val="bg1"/>
+            </a:solidFill>
+            <a:ln>
+              <a:solidFill>
+                <a:schemeClr val="tx1"/>
+              </a:solidFill>
+            </a:ln>
+          </p:spPr>
+          <p:style>
+            <a:lnRef idx="2">
+              <a:schemeClr val="accent1">
+                <a:shade val="50000"/>
+              </a:schemeClr>
+            </a:lnRef>
+            <a:fillRef idx="1">
+              <a:schemeClr val="accent1"/>
+            </a:fillRef>
+            <a:effectRef idx="0">
+              <a:schemeClr val="accent1"/>
+            </a:effectRef>
+            <a:fontRef idx="minor">
+              <a:schemeClr val="lt1"/>
+            </a:fontRef>
+          </p:style>
+          <p:txBody>
+            <a:bodyPr rtlCol="0" anchor="ctr"/>
+            <a:lstStyle/>
+            <a:p>
+              <a:pPr algn="ctr"/>
+              <a:r>
+                <a:rPr lang="en-US" dirty="0" smtClean="0">
+                  <a:solidFill>
+                    <a:sysClr val="windowText" lastClr="000000"/>
+                  </a:solidFill>
+                  <a:latin typeface="Baskerville" charset="0"/>
+                  <a:ea typeface="Baskerville" charset="0"/>
+                  <a:cs typeface="Baskerville" charset="0"/>
+                </a:rPr>
+                <a:t>Adaptive Monte</a:t>
+              </a:r>
+              <a:br>
+                <a:rPr lang="en-US" dirty="0" smtClean="0">
+                  <a:solidFill>
+                    <a:sysClr val="windowText" lastClr="000000"/>
+                  </a:solidFill>
+                  <a:latin typeface="Baskerville" charset="0"/>
+                  <a:ea typeface="Baskerville" charset="0"/>
+                  <a:cs typeface="Baskerville" charset="0"/>
+                </a:rPr>
+              </a:br>
+              <a:r>
+                <a:rPr lang="en-US" dirty="0" smtClean="0">
+                  <a:solidFill>
+                    <a:sysClr val="windowText" lastClr="000000"/>
+                  </a:solidFill>
+                  <a:latin typeface="Baskerville" charset="0"/>
+                  <a:ea typeface="Baskerville" charset="0"/>
+                  <a:cs typeface="Baskerville" charset="0"/>
+                </a:rPr>
+                <a:t>Carlo </a:t>
+              </a:r>
+              <a:r>
+                <a:rPr lang="en-US" dirty="0" err="1" smtClean="0">
+                  <a:solidFill>
+                    <a:sysClr val="windowText" lastClr="000000"/>
+                  </a:solidFill>
+                  <a:latin typeface="Baskerville" charset="0"/>
+                  <a:ea typeface="Baskerville" charset="0"/>
+                  <a:cs typeface="Baskerville" charset="0"/>
+                </a:rPr>
+                <a:t>Localisation</a:t>
+              </a:r>
+              <a:endParaRPr lang="en-US" dirty="0">
+                <a:solidFill>
+                  <a:sysClr val="windowText" lastClr="000000"/>
+                </a:solidFill>
+                <a:latin typeface="Baskerville" charset="0"/>
+                <a:ea typeface="Baskerville" charset="0"/>
+                <a:cs typeface="Baskerville" charset="0"/>
+              </a:endParaRPr>
+            </a:p>
+          </p:txBody>
+        </p:sp>
+        <p:sp>
+          <p:nvSpPr>
+            <p:cNvPr id="7" name="Rectangle 6"/>
+            <p:cNvSpPr/>
+            <p:nvPr/>
+          </p:nvSpPr>
+          <p:spPr>
+            <a:xfrm>
+              <a:off x="731874" y="2922765"/>
+              <a:ext cx="2189888" cy="518653"/>
+            </a:xfrm>
+            <a:prstGeom prst="rect">
+              <a:avLst/>
+            </a:prstGeom>
+            <a:solidFill>
+              <a:schemeClr val="bg1"/>
+            </a:solidFill>
+            <a:ln>
+              <a:solidFill>
+                <a:schemeClr val="tx1"/>
+              </a:solidFill>
+            </a:ln>
+          </p:spPr>
+          <p:style>
+            <a:lnRef idx="2">
+              <a:schemeClr val="accent1">
+                <a:shade val="50000"/>
+              </a:schemeClr>
+            </a:lnRef>
+            <a:fillRef idx="1">
+              <a:schemeClr val="accent1"/>
+            </a:fillRef>
+            <a:effectRef idx="0">
+              <a:schemeClr val="accent1"/>
+            </a:effectRef>
+            <a:fontRef idx="minor">
+              <a:schemeClr val="lt1"/>
+            </a:fontRef>
+          </p:style>
+          <p:txBody>
+            <a:bodyPr lIns="36000" rIns="36000" rtlCol="0" anchor="ctr"/>
+            <a:lstStyle/>
+            <a:p>
+              <a:pPr algn="ctr"/>
+              <a:r>
+                <a:rPr lang="en-US" sz="2400" dirty="0" smtClean="0">
+                  <a:solidFill>
+                    <a:sysClr val="windowText" lastClr="000000"/>
+                  </a:solidFill>
+                  <a:latin typeface="Baskerville" charset="0"/>
+                  <a:ea typeface="Baskerville" charset="0"/>
+                  <a:cs typeface="Baskerville" charset="0"/>
+                </a:rPr>
+                <a:t>LiDAR-sensor</a:t>
+              </a:r>
+              <a:endParaRPr lang="en-US" sz="2400" dirty="0">
+                <a:solidFill>
+                  <a:sysClr val="windowText" lastClr="000000"/>
+                </a:solidFill>
+                <a:latin typeface="Baskerville" charset="0"/>
+                <a:ea typeface="Baskerville" charset="0"/>
+                <a:cs typeface="Baskerville" charset="0"/>
+              </a:endParaRPr>
+            </a:p>
+          </p:txBody>
+        </p:sp>
+        <p:sp>
+          <p:nvSpPr>
+            <p:cNvPr id="8" name="Rectangle 7"/>
+            <p:cNvSpPr/>
+            <p:nvPr/>
+          </p:nvSpPr>
+          <p:spPr>
+            <a:xfrm>
+              <a:off x="731874" y="1819036"/>
+              <a:ext cx="2189887" cy="518653"/>
+            </a:xfrm>
+            <a:prstGeom prst="rect">
+              <a:avLst/>
+            </a:prstGeom>
+            <a:solidFill>
+              <a:schemeClr val="bg1"/>
+            </a:solidFill>
+            <a:ln>
+              <a:solidFill>
+                <a:schemeClr val="tx1"/>
+              </a:solidFill>
+            </a:ln>
+          </p:spPr>
+          <p:style>
+            <a:lnRef idx="2">
+              <a:schemeClr val="accent1">
+                <a:shade val="50000"/>
+              </a:schemeClr>
+            </a:lnRef>
+            <a:fillRef idx="1">
+              <a:schemeClr val="accent1"/>
+            </a:fillRef>
+            <a:effectRef idx="0">
+              <a:schemeClr val="accent1"/>
+            </a:effectRef>
+            <a:fontRef idx="minor">
+              <a:schemeClr val="lt1"/>
+            </a:fontRef>
+          </p:style>
+          <p:txBody>
+            <a:bodyPr lIns="36000" rIns="36000" rtlCol="0" anchor="ctr"/>
+            <a:lstStyle/>
+            <a:p>
+              <a:pPr algn="ctr"/>
+              <a:r>
+                <a:rPr lang="en-US" sz="2400" dirty="0" smtClean="0">
+                  <a:solidFill>
+                    <a:sysClr val="windowText" lastClr="000000"/>
+                  </a:solidFill>
+                  <a:latin typeface="Baskerville" charset="0"/>
+                  <a:ea typeface="Baskerville" charset="0"/>
+                  <a:cs typeface="Baskerville" charset="0"/>
+                </a:rPr>
+                <a:t>Transformations</a:t>
+              </a:r>
+              <a:endParaRPr lang="en-US" sz="2400" dirty="0">
+                <a:solidFill>
+                  <a:sysClr val="windowText" lastClr="000000"/>
+                </a:solidFill>
+                <a:latin typeface="Baskerville" charset="0"/>
+                <a:ea typeface="Baskerville" charset="0"/>
+                <a:cs typeface="Baskerville" charset="0"/>
+              </a:endParaRPr>
+            </a:p>
+          </p:txBody>
+        </p:sp>
+        <p:sp>
+          <p:nvSpPr>
+            <p:cNvPr id="19" name="Rectangle 18"/>
+            <p:cNvSpPr/>
+            <p:nvPr/>
+          </p:nvSpPr>
+          <p:spPr>
+            <a:xfrm>
+              <a:off x="8804471" y="1797521"/>
+              <a:ext cx="2142000" cy="709050"/>
+            </a:xfrm>
+            <a:prstGeom prst="rect">
+              <a:avLst/>
+            </a:prstGeom>
+            <a:solidFill>
+              <a:schemeClr val="bg1"/>
+            </a:solidFill>
+            <a:ln>
+              <a:solidFill>
+                <a:schemeClr val="tx1"/>
+              </a:solidFill>
+            </a:ln>
+          </p:spPr>
+          <p:style>
+            <a:lnRef idx="2">
+              <a:schemeClr val="accent1">
+                <a:shade val="50000"/>
+              </a:schemeClr>
+            </a:lnRef>
+            <a:fillRef idx="1">
+              <a:schemeClr val="accent1"/>
+            </a:fillRef>
+            <a:effectRef idx="0">
+              <a:schemeClr val="accent1"/>
+            </a:effectRef>
+            <a:fontRef idx="minor">
+              <a:schemeClr val="lt1"/>
+            </a:fontRef>
+          </p:style>
+          <p:txBody>
+            <a:bodyPr rtlCol="0" anchor="ctr"/>
+            <a:lstStyle/>
+            <a:p>
+              <a:pPr algn="ctr"/>
+              <a:r>
+                <a:rPr lang="en-US" sz="2000" dirty="0" smtClean="0">
+                  <a:solidFill>
+                    <a:sysClr val="windowText" lastClr="000000"/>
+                  </a:solidFill>
+                  <a:latin typeface="Baskerville" charset="0"/>
+                  <a:ea typeface="Baskerville" charset="0"/>
+                  <a:cs typeface="Baskerville" charset="0"/>
+                </a:rPr>
+                <a:t>Commands translator</a:t>
+              </a:r>
+              <a:endParaRPr lang="en-US" sz="2000" dirty="0">
+                <a:solidFill>
+                  <a:sysClr val="windowText" lastClr="000000"/>
+                </a:solidFill>
+                <a:latin typeface="Baskerville" charset="0"/>
+                <a:ea typeface="Baskerville" charset="0"/>
+                <a:cs typeface="Baskerville" charset="0"/>
+              </a:endParaRPr>
+            </a:p>
+          </p:txBody>
+        </p:sp>
+        <p:sp>
+          <p:nvSpPr>
+            <p:cNvPr id="22" name="Rectangle 21"/>
+            <p:cNvSpPr/>
+            <p:nvPr/>
+          </p:nvSpPr>
+          <p:spPr>
+            <a:xfrm>
+              <a:off x="3340862" y="2922766"/>
+              <a:ext cx="2189887" cy="518653"/>
+            </a:xfrm>
+            <a:prstGeom prst="rect">
+              <a:avLst/>
+            </a:prstGeom>
+            <a:solidFill>
+              <a:schemeClr val="bg1"/>
+            </a:solidFill>
+            <a:ln>
+              <a:solidFill>
+                <a:schemeClr val="tx1"/>
+              </a:solidFill>
+            </a:ln>
+          </p:spPr>
+          <p:style>
+            <a:lnRef idx="2">
+              <a:schemeClr val="accent1">
+                <a:shade val="50000"/>
+              </a:schemeClr>
+            </a:lnRef>
+            <a:fillRef idx="1">
+              <a:schemeClr val="accent1"/>
+            </a:fillRef>
+            <a:effectRef idx="0">
+              <a:schemeClr val="accent1"/>
+            </a:effectRef>
+            <a:fontRef idx="minor">
+              <a:schemeClr val="lt1"/>
+            </a:fontRef>
+          </p:style>
+          <p:txBody>
+            <a:bodyPr rtlCol="0" anchor="ctr"/>
+            <a:lstStyle/>
+            <a:p>
+              <a:pPr algn="ctr"/>
+              <a:r>
+                <a:rPr lang="en-US" sz="2400" dirty="0" err="1" smtClean="0">
+                  <a:solidFill>
+                    <a:sysClr val="windowText" lastClr="000000"/>
+                  </a:solidFill>
+                  <a:latin typeface="Baskerville" charset="0"/>
+                  <a:ea typeface="Baskerville" charset="0"/>
+                  <a:cs typeface="Baskerville" charset="0"/>
+                </a:rPr>
+                <a:t>Hectormapping</a:t>
+              </a:r>
+              <a:endParaRPr lang="en-US" sz="2400" dirty="0">
+                <a:solidFill>
+                  <a:sysClr val="windowText" lastClr="000000"/>
+                </a:solidFill>
+                <a:latin typeface="Baskerville" charset="0"/>
+                <a:ea typeface="Baskerville" charset="0"/>
+                <a:cs typeface="Baskerville" charset="0"/>
+              </a:endParaRPr>
+            </a:p>
+          </p:txBody>
+        </p:sp>
+        <p:cxnSp>
+          <p:nvCxnSpPr>
+            <p:cNvPr id="12" name="Straight Arrow Connector 11"/>
+            <p:cNvCxnSpPr>
+              <a:stCxn id="5" idx="2"/>
+              <a:endCxn id="6" idx="0"/>
+            </p:cNvCxnSpPr>
+            <p:nvPr/>
+          </p:nvCxnSpPr>
+          <p:spPr>
+            <a:xfrm>
+              <a:off x="4435806" y="1493287"/>
+              <a:ext cx="0" cy="325750"/>
+            </a:xfrm>
+            <a:prstGeom prst="straightConnector1">
+              <a:avLst/>
+            </a:prstGeom>
+            <a:ln>
+              <a:solidFill>
+                <a:schemeClr val="tx1"/>
+              </a:solidFill>
+              <a:tailEnd type="triangle"/>
+            </a:ln>
+          </p:spPr>
+          <p:style>
+            <a:lnRef idx="1">
+              <a:schemeClr val="accent1"/>
+            </a:lnRef>
+            <a:fillRef idx="0">
+              <a:schemeClr val="accent1"/>
+            </a:fillRef>
+            <a:effectRef idx="0">
+              <a:schemeClr val="accent1"/>
+            </a:effectRef>
+            <a:fontRef idx="minor">
+              <a:schemeClr val="tx1"/>
+            </a:fontRef>
+          </p:style>
+        </p:cxnSp>
+        <p:cxnSp>
+          <p:nvCxnSpPr>
+            <p:cNvPr id="14" name="Straight Arrow Connector 13"/>
+            <p:cNvCxnSpPr>
+              <a:stCxn id="8" idx="3"/>
+              <a:endCxn id="6" idx="1"/>
+            </p:cNvCxnSpPr>
+            <p:nvPr/>
+          </p:nvCxnSpPr>
+          <p:spPr>
+            <a:xfrm>
+              <a:off x="2921761" y="2078363"/>
+              <a:ext cx="419101" cy="1"/>
+            </a:xfrm>
+            <a:prstGeom prst="straightConnector1">
+              <a:avLst/>
+            </a:prstGeom>
+            <a:ln>
+              <a:solidFill>
+                <a:schemeClr val="tx1"/>
+              </a:solidFill>
+              <a:tailEnd type="triangle"/>
+            </a:ln>
+          </p:spPr>
+          <p:style>
+            <a:lnRef idx="1">
+              <a:schemeClr val="accent1"/>
+            </a:lnRef>
+            <a:fillRef idx="0">
+              <a:schemeClr val="accent1"/>
+            </a:fillRef>
+            <a:effectRef idx="0">
+              <a:schemeClr val="accent1"/>
+            </a:effectRef>
+            <a:fontRef idx="minor">
+              <a:schemeClr val="tx1"/>
+            </a:fontRef>
+          </p:style>
+        </p:cxnSp>
+        <p:cxnSp>
+          <p:nvCxnSpPr>
+            <p:cNvPr id="30" name="Straight Arrow Connector 29"/>
+            <p:cNvCxnSpPr>
+              <a:stCxn id="7" idx="3"/>
+              <a:endCxn id="22" idx="1"/>
+            </p:cNvCxnSpPr>
+            <p:nvPr/>
+          </p:nvCxnSpPr>
+          <p:spPr>
+            <a:xfrm>
+              <a:off x="2921762" y="3182092"/>
+              <a:ext cx="419100" cy="1"/>
+            </a:xfrm>
+            <a:prstGeom prst="straightConnector1">
+              <a:avLst/>
+            </a:prstGeom>
+            <a:ln>
+              <a:solidFill>
+                <a:schemeClr val="tx1"/>
+              </a:solidFill>
+              <a:tailEnd type="triangle"/>
+            </a:ln>
+          </p:spPr>
+          <p:style>
+            <a:lnRef idx="1">
+              <a:schemeClr val="accent1"/>
+            </a:lnRef>
+            <a:fillRef idx="0">
+              <a:schemeClr val="accent1"/>
+            </a:fillRef>
+            <a:effectRef idx="0">
+              <a:schemeClr val="accent1"/>
+            </a:effectRef>
+            <a:fontRef idx="minor">
+              <a:schemeClr val="tx1"/>
+            </a:fontRef>
+          </p:style>
+        </p:cxnSp>
+        <p:cxnSp>
+          <p:nvCxnSpPr>
+            <p:cNvPr id="106" name="Straight Connector 105"/>
+            <p:cNvCxnSpPr/>
+            <p:nvPr/>
+          </p:nvCxnSpPr>
+          <p:spPr>
+            <a:xfrm>
+              <a:off x="3191891" y="2217297"/>
+              <a:ext cx="0" cy="964794"/>
+            </a:xfrm>
+            <a:prstGeom prst="line">
+              <a:avLst/>
+            </a:prstGeom>
+            <a:ln>
+              <a:solidFill>
+                <a:schemeClr val="tx1"/>
+              </a:solidFill>
+              <a:headEnd type="none"/>
+              <a:tailEnd type="oval"/>
+            </a:ln>
+          </p:spPr>
+          <p:style>
+            <a:lnRef idx="1">
+              <a:schemeClr val="accent1"/>
+            </a:lnRef>
+            <a:fillRef idx="0">
+              <a:schemeClr val="accent1"/>
+            </a:fillRef>
+            <a:effectRef idx="0">
+              <a:schemeClr val="accent1"/>
+            </a:effectRef>
+            <a:fontRef idx="minor">
+              <a:schemeClr val="tx1"/>
+            </a:fontRef>
+          </p:style>
+        </p:cxnSp>
+        <p:cxnSp>
+          <p:nvCxnSpPr>
+            <p:cNvPr id="108" name="Straight Arrow Connector 107"/>
+            <p:cNvCxnSpPr/>
+            <p:nvPr/>
+          </p:nvCxnSpPr>
+          <p:spPr>
+            <a:xfrm>
+              <a:off x="3191891" y="2217297"/>
+              <a:ext cx="148971" cy="0"/>
+            </a:xfrm>
+            <a:prstGeom prst="straightConnector1">
+              <a:avLst/>
+            </a:prstGeom>
+            <a:ln>
+              <a:solidFill>
+                <a:schemeClr val="tx1"/>
+              </a:solidFill>
+              <a:tailEnd type="triangle"/>
+            </a:ln>
+          </p:spPr>
+          <p:style>
+            <a:lnRef idx="1">
+              <a:schemeClr val="accent1"/>
+            </a:lnRef>
+            <a:fillRef idx="0">
+              <a:schemeClr val="accent1"/>
+            </a:fillRef>
+            <a:effectRef idx="0">
+              <a:schemeClr val="accent1"/>
+            </a:effectRef>
+            <a:fontRef idx="minor">
+              <a:schemeClr val="tx1"/>
+            </a:fontRef>
+          </p:style>
+        </p:cxnSp>
+        <p:cxnSp>
+          <p:nvCxnSpPr>
+            <p:cNvPr id="111" name="Straight Connector 110"/>
+            <p:cNvCxnSpPr/>
+            <p:nvPr/>
+          </p:nvCxnSpPr>
+          <p:spPr>
+            <a:xfrm flipV="1">
+              <a:off x="3050377" y="2078363"/>
+              <a:ext cx="0" cy="971324"/>
+            </a:xfrm>
+            <a:prstGeom prst="line">
+              <a:avLst/>
+            </a:prstGeom>
+            <a:ln>
+              <a:solidFill>
+                <a:schemeClr val="tx1"/>
+              </a:solidFill>
+              <a:headEnd type="none"/>
+              <a:tailEnd type="oval"/>
+            </a:ln>
+          </p:spPr>
+          <p:style>
+            <a:lnRef idx="1">
+              <a:schemeClr val="accent1"/>
+            </a:lnRef>
+            <a:fillRef idx="0">
+              <a:schemeClr val="accent1"/>
+            </a:fillRef>
+            <a:effectRef idx="0">
+              <a:schemeClr val="accent1"/>
+            </a:effectRef>
+            <a:fontRef idx="minor">
+              <a:schemeClr val="tx1"/>
+            </a:fontRef>
+          </p:style>
+        </p:cxnSp>
+        <p:cxnSp>
+          <p:nvCxnSpPr>
+            <p:cNvPr id="112" name="Straight Arrow Connector 111"/>
+            <p:cNvCxnSpPr/>
+            <p:nvPr/>
+          </p:nvCxnSpPr>
+          <p:spPr>
+            <a:xfrm>
+              <a:off x="3050377" y="3049687"/>
+              <a:ext cx="290485" cy="0"/>
+            </a:xfrm>
+            <a:prstGeom prst="straightConnector1">
+              <a:avLst/>
+            </a:prstGeom>
+            <a:ln>
+              <a:solidFill>
+                <a:schemeClr val="tx1"/>
+              </a:solidFill>
+              <a:tailEnd type="triangle"/>
+            </a:ln>
+          </p:spPr>
+          <p:style>
+            <a:lnRef idx="1">
+              <a:schemeClr val="accent1"/>
+            </a:lnRef>
+            <a:fillRef idx="0">
+              <a:schemeClr val="accent1"/>
+            </a:fillRef>
+            <a:effectRef idx="0">
+              <a:schemeClr val="accent1"/>
+            </a:effectRef>
+            <a:fontRef idx="minor">
+              <a:schemeClr val="tx1"/>
+            </a:fontRef>
+          </p:style>
+        </p:cxnSp>
+        <p:cxnSp>
+          <p:nvCxnSpPr>
+            <p:cNvPr id="116" name="Straight Connector 115"/>
+            <p:cNvCxnSpPr/>
+            <p:nvPr/>
+          </p:nvCxnSpPr>
+          <p:spPr>
+            <a:xfrm flipH="1">
+              <a:off x="3050377" y="2506571"/>
+              <a:ext cx="2867199" cy="0"/>
+            </a:xfrm>
+            <a:prstGeom prst="line">
+              <a:avLst/>
+            </a:prstGeom>
+            <a:ln>
+              <a:solidFill>
+                <a:schemeClr val="tx1"/>
+              </a:solidFill>
+              <a:headEnd type="triangle"/>
+              <a:tailEnd type="oval"/>
+            </a:ln>
+          </p:spPr>
+          <p:style>
+            <a:lnRef idx="1">
+              <a:schemeClr val="accent1"/>
+            </a:lnRef>
+            <a:fillRef idx="0">
+              <a:schemeClr val="accent1"/>
+            </a:fillRef>
+            <a:effectRef idx="0">
+              <a:schemeClr val="accent1"/>
+            </a:effectRef>
+            <a:fontRef idx="minor">
+              <a:schemeClr val="tx1"/>
+            </a:fontRef>
+          </p:style>
+        </p:cxnSp>
+        <p:cxnSp>
+          <p:nvCxnSpPr>
+            <p:cNvPr id="120" name="Straight Connector 119"/>
+            <p:cNvCxnSpPr/>
+            <p:nvPr/>
+          </p:nvCxnSpPr>
+          <p:spPr>
+            <a:xfrm flipH="1">
+              <a:off x="3191891" y="2731968"/>
+              <a:ext cx="2725684" cy="0"/>
+            </a:xfrm>
+            <a:prstGeom prst="line">
+              <a:avLst/>
+            </a:prstGeom>
+            <a:ln>
+              <a:solidFill>
+                <a:schemeClr val="tx1"/>
+              </a:solidFill>
+              <a:headEnd type="triangle"/>
+              <a:tailEnd type="oval"/>
+            </a:ln>
+          </p:spPr>
+          <p:style>
+            <a:lnRef idx="1">
+              <a:schemeClr val="accent1"/>
+            </a:lnRef>
+            <a:fillRef idx="0">
+              <a:schemeClr val="accent1"/>
+            </a:fillRef>
+            <a:effectRef idx="0">
+              <a:schemeClr val="accent1"/>
+            </a:effectRef>
+            <a:fontRef idx="minor">
+              <a:schemeClr val="tx1"/>
+            </a:fontRef>
+          </p:style>
+        </p:cxnSp>
+        <p:cxnSp>
+          <p:nvCxnSpPr>
+            <p:cNvPr id="127" name="Straight Arrow Connector 126"/>
+            <p:cNvCxnSpPr/>
+            <p:nvPr/>
+          </p:nvCxnSpPr>
+          <p:spPr>
+            <a:xfrm>
+              <a:off x="8385371" y="2065151"/>
+              <a:ext cx="419100" cy="0"/>
+            </a:xfrm>
+            <a:prstGeom prst="straightConnector1">
+              <a:avLst/>
+            </a:prstGeom>
+            <a:ln>
+              <a:solidFill>
+                <a:schemeClr val="tx1"/>
+              </a:solidFill>
+              <a:tailEnd type="triangle"/>
+            </a:ln>
+          </p:spPr>
+          <p:style>
+            <a:lnRef idx="1">
+              <a:schemeClr val="accent1"/>
+            </a:lnRef>
+            <a:fillRef idx="0">
+              <a:schemeClr val="accent1"/>
+            </a:fillRef>
+            <a:effectRef idx="0">
+              <a:schemeClr val="accent1"/>
+            </a:effectRef>
+            <a:fontRef idx="minor">
+              <a:schemeClr val="tx1"/>
+            </a:fontRef>
+          </p:style>
+        </p:cxnSp>
+        <p:sp>
+          <p:nvSpPr>
+            <p:cNvPr id="21" name="Rectangle 20"/>
+            <p:cNvSpPr/>
+            <p:nvPr/>
+          </p:nvSpPr>
+          <p:spPr>
+            <a:xfrm>
+              <a:off x="5949849" y="1819036"/>
+              <a:ext cx="2435522" cy="1622382"/>
+            </a:xfrm>
+            <a:prstGeom prst="rect">
+              <a:avLst/>
+            </a:prstGeom>
+            <a:solidFill>
+              <a:schemeClr val="bg1">
+                <a:lumMod val="65000"/>
+              </a:schemeClr>
+            </a:solidFill>
+            <a:ln w="57150">
+              <a:solidFill>
+                <a:schemeClr val="bg1">
+                  <a:lumMod val="65000"/>
+                </a:schemeClr>
+              </a:solidFill>
+            </a:ln>
+          </p:spPr>
+          <p:style>
+            <a:lnRef idx="2">
+              <a:schemeClr val="accent1">
+                <a:shade val="50000"/>
+              </a:schemeClr>
+            </a:lnRef>
+            <a:fillRef idx="1">
+              <a:schemeClr val="accent1"/>
+            </a:fillRef>
+            <a:effectRef idx="0">
+              <a:schemeClr val="accent1"/>
+            </a:effectRef>
+            <a:fontRef idx="minor">
+              <a:schemeClr val="lt1"/>
+            </a:fontRef>
+          </p:style>
+          <p:txBody>
+            <a:bodyPr rtlCol="0" anchor="ctr"/>
+            <a:lstStyle/>
+            <a:p>
+              <a:pPr algn="ctr"/>
+              <a:r>
+                <a:rPr lang="en-US" sz="2800" dirty="0" err="1" smtClean="0">
+                  <a:latin typeface="Baskerville" charset="0"/>
+                  <a:ea typeface="Baskerville" charset="0"/>
+                  <a:cs typeface="Baskerville" charset="0"/>
+                </a:rPr>
+                <a:t>move_base</a:t>
+              </a:r>
+              <a:endParaRPr lang="en-US" sz="2800" dirty="0">
+                <a:latin typeface="Baskerville" charset="0"/>
+                <a:ea typeface="Baskerville" charset="0"/>
+                <a:cs typeface="Baskerville" charset="0"/>
+              </a:endParaRPr>
+            </a:p>
+          </p:txBody>
+        </p:sp>
+        <p:cxnSp>
+          <p:nvCxnSpPr>
+            <p:cNvPr id="130" name="Straight Connector 129"/>
+            <p:cNvCxnSpPr/>
+            <p:nvPr/>
+          </p:nvCxnSpPr>
+          <p:spPr>
+            <a:xfrm flipH="1">
+              <a:off x="4435807" y="1623888"/>
+              <a:ext cx="1782369" cy="0"/>
+            </a:xfrm>
+            <a:prstGeom prst="line">
+              <a:avLst/>
+            </a:prstGeom>
+            <a:ln>
+              <a:solidFill>
+                <a:schemeClr val="tx1"/>
+              </a:solidFill>
+              <a:headEnd type="none"/>
+              <a:tailEnd type="oval"/>
+            </a:ln>
+          </p:spPr>
+          <p:style>
+            <a:lnRef idx="1">
+              <a:schemeClr val="accent1"/>
+            </a:lnRef>
+            <a:fillRef idx="0">
+              <a:schemeClr val="accent1"/>
+            </a:fillRef>
+            <a:effectRef idx="0">
+              <a:schemeClr val="accent1"/>
+            </a:effectRef>
+            <a:fontRef idx="minor">
+              <a:schemeClr val="tx1"/>
+            </a:fontRef>
+          </p:style>
+        </p:cxnSp>
+        <p:cxnSp>
+          <p:nvCxnSpPr>
+            <p:cNvPr id="132" name="Straight Connector 131"/>
+            <p:cNvCxnSpPr/>
+            <p:nvPr/>
+          </p:nvCxnSpPr>
+          <p:spPr>
+            <a:xfrm>
+              <a:off x="6222490" y="1623888"/>
+              <a:ext cx="0" cy="173632"/>
+            </a:xfrm>
+            <a:prstGeom prst="line">
+              <a:avLst/>
+            </a:prstGeom>
+            <a:ln>
+              <a:solidFill>
+                <a:schemeClr val="tx1"/>
+              </a:solidFill>
+              <a:headEnd type="none"/>
+              <a:tailEnd type="triangle"/>
+            </a:ln>
+          </p:spPr>
+          <p:style>
+            <a:lnRef idx="1">
+              <a:schemeClr val="accent1"/>
+            </a:lnRef>
+            <a:fillRef idx="0">
+              <a:schemeClr val="accent1"/>
+            </a:fillRef>
+            <a:effectRef idx="0">
+              <a:schemeClr val="accent1"/>
+            </a:effectRef>
+            <a:fontRef idx="minor">
+              <a:schemeClr val="tx1"/>
+            </a:fontRef>
+          </p:style>
+        </p:cxnSp>
+        <p:cxnSp>
+          <p:nvCxnSpPr>
+            <p:cNvPr id="139" name="Straight Arrow Connector 138"/>
+            <p:cNvCxnSpPr>
+              <a:stCxn id="6" idx="3"/>
+            </p:cNvCxnSpPr>
+            <p:nvPr/>
+          </p:nvCxnSpPr>
+          <p:spPr>
+            <a:xfrm flipV="1">
+              <a:off x="5530749" y="2078362"/>
+              <a:ext cx="403802" cy="2"/>
+            </a:xfrm>
+            <a:prstGeom prst="straightConnector1">
+              <a:avLst/>
+            </a:prstGeom>
+            <a:ln>
+              <a:solidFill>
+                <a:schemeClr val="tx1"/>
+              </a:solidFill>
+              <a:tailEnd type="triangle"/>
+            </a:ln>
+          </p:spPr>
+          <p:style>
+            <a:lnRef idx="1">
+              <a:schemeClr val="accent1"/>
+            </a:lnRef>
+            <a:fillRef idx="0">
+              <a:schemeClr val="accent1"/>
+            </a:fillRef>
+            <a:effectRef idx="0">
+              <a:schemeClr val="accent1"/>
+            </a:effectRef>
+            <a:fontRef idx="minor">
+              <a:schemeClr val="tx1"/>
+            </a:fontRef>
+          </p:style>
+        </p:cxnSp>
+        <p:cxnSp>
+          <p:nvCxnSpPr>
+            <p:cNvPr id="142" name="Straight Arrow Connector 141"/>
+            <p:cNvCxnSpPr/>
+            <p:nvPr/>
+          </p:nvCxnSpPr>
+          <p:spPr>
+            <a:xfrm flipV="1">
+              <a:off x="5530749" y="3182091"/>
+              <a:ext cx="403802" cy="2"/>
+            </a:xfrm>
+            <a:prstGeom prst="straightConnector1">
+              <a:avLst/>
+            </a:prstGeom>
+            <a:ln>
+              <a:solidFill>
+                <a:schemeClr val="tx1"/>
+              </a:solidFill>
+              <a:tailEnd type="triangle"/>
+            </a:ln>
+          </p:spPr>
+          <p:style>
+            <a:lnRef idx="1">
+              <a:schemeClr val="accent1"/>
+            </a:lnRef>
+            <a:fillRef idx="0">
+              <a:schemeClr val="accent1"/>
+            </a:fillRef>
+            <a:effectRef idx="0">
+              <a:schemeClr val="accent1"/>
+            </a:effectRef>
+            <a:fontRef idx="minor">
+              <a:schemeClr val="tx1"/>
+            </a:fontRef>
+          </p:style>
+        </p:cxnSp>
+        <p:sp>
+          <p:nvSpPr>
+            <p:cNvPr id="150" name="Rectangle 149"/>
+            <p:cNvSpPr/>
+            <p:nvPr/>
+          </p:nvSpPr>
+          <p:spPr>
+            <a:xfrm>
+              <a:off x="8804471" y="2731969"/>
+              <a:ext cx="2142000" cy="709450"/>
+            </a:xfrm>
+            <a:prstGeom prst="rect">
+              <a:avLst/>
+            </a:prstGeom>
+            <a:solidFill>
+              <a:schemeClr val="bg1"/>
+            </a:solidFill>
+            <a:ln>
+              <a:solidFill>
+                <a:schemeClr val="tx1"/>
+              </a:solidFill>
+            </a:ln>
+          </p:spPr>
+          <p:style>
+            <a:lnRef idx="2">
+              <a:schemeClr val="accent1">
+                <a:shade val="50000"/>
+              </a:schemeClr>
+            </a:lnRef>
+            <a:fillRef idx="1">
+              <a:schemeClr val="accent1"/>
+            </a:fillRef>
+            <a:effectRef idx="0">
+              <a:schemeClr val="accent1"/>
+            </a:effectRef>
+            <a:fontRef idx="minor">
+              <a:schemeClr val="lt1"/>
+            </a:fontRef>
+          </p:style>
+          <p:txBody>
+            <a:bodyPr rtlCol="0" anchor="ctr"/>
+            <a:lstStyle/>
+            <a:p>
+              <a:pPr algn="ctr"/>
+              <a:r>
+                <a:rPr lang="en-US" sz="2000" dirty="0" smtClean="0">
+                  <a:solidFill>
+                    <a:sysClr val="windowText" lastClr="000000"/>
+                  </a:solidFill>
+                  <a:latin typeface="Baskerville" charset="0"/>
+                  <a:ea typeface="Baskerville" charset="0"/>
+                  <a:cs typeface="Baskerville" charset="0"/>
+                </a:rPr>
+                <a:t>ESC + Steering servo</a:t>
+              </a:r>
+              <a:endParaRPr lang="en-US" sz="2000" dirty="0">
+                <a:solidFill>
+                  <a:sysClr val="windowText" lastClr="000000"/>
+                </a:solidFill>
+                <a:latin typeface="Baskerville" charset="0"/>
+                <a:ea typeface="Baskerville" charset="0"/>
+                <a:cs typeface="Baskerville" charset="0"/>
+              </a:endParaRPr>
+            </a:p>
+          </p:txBody>
+        </p:sp>
+        <p:cxnSp>
+          <p:nvCxnSpPr>
+            <p:cNvPr id="154" name="Straight Arrow Connector 153"/>
+            <p:cNvCxnSpPr>
+              <a:stCxn id="19" idx="2"/>
+              <a:endCxn id="150" idx="0"/>
+            </p:cNvCxnSpPr>
+            <p:nvPr/>
+          </p:nvCxnSpPr>
+          <p:spPr>
+            <a:xfrm>
+              <a:off x="9875471" y="2506571"/>
+              <a:ext cx="0" cy="225398"/>
+            </a:xfrm>
+            <a:prstGeom prst="straightConnector1">
+              <a:avLst/>
+            </a:prstGeom>
+            <a:ln>
+              <a:solidFill>
+                <a:schemeClr val="tx1"/>
+              </a:solidFill>
+              <a:tailEnd type="triangle"/>
+            </a:ln>
+          </p:spPr>
+          <p:style>
+            <a:lnRef idx="1">
+              <a:schemeClr val="accent1"/>
+            </a:lnRef>
+            <a:fillRef idx="0">
+              <a:schemeClr val="accent1"/>
+            </a:fillRef>
+            <a:effectRef idx="0">
+              <a:schemeClr val="accent1"/>
+            </a:effectRef>
+            <a:fontRef idx="minor">
+              <a:schemeClr val="tx1"/>
+            </a:fontRef>
+          </p:style>
+        </p:cxnSp>
+      </p:grpSp>
+    </p:spTree>
+    <p:extLst>
+      <p:ext uri="{BB962C8B-B14F-4D97-AF65-F5344CB8AC3E}">
+        <p14:creationId xmlns:p14="http://schemas.microsoft.com/office/powerpoint/2010/main" val="552281926"/>
+      </p:ext>
+    </p:extLst>
+  </p:cSld>
+  <p:clrMapOvr>
+    <a:masterClrMapping/>
+  </p:clrMapOvr>
+</p:sld>
+</file>
+
+<file path=ppt/slides/slide4.xml><?xml version="1.0" encoding="utf-8"?>
 <p:sld xmlns:a="http://schemas.openxmlformats.org/drawingml/2006/main" xmlns:r="http://schemas.openxmlformats.org/officeDocument/2006/relationships" xmlns:p="http://schemas.openxmlformats.org/presentationml/2006/main">
   <p:cSld>
     <p:spTree>
@@ -5905,7 +7477,7 @@
 </p:sld>
 </file>
 
-<file path=ppt/slides/slide4.xml><?xml version="1.0" encoding="utf-8"?>
+<file path=ppt/slides/slide5.xml><?xml version="1.0" encoding="utf-8"?>
 <p:sld xmlns:a="http://schemas.openxmlformats.org/drawingml/2006/main" xmlns:r="http://schemas.openxmlformats.org/officeDocument/2006/relationships" xmlns:p="http://schemas.openxmlformats.org/presentationml/2006/main">
   <p:cSld>
     <p:spTree>
@@ -5930,7 +7502,7 @@
         </p:nvGrpSpPr>
         <p:grpSpPr>
           <a:xfrm>
-            <a:off x="2603615" y="536156"/>
+            <a:off x="729659" y="179948"/>
             <a:ext cx="1449882" cy="5897301"/>
             <a:chOff x="4421529" y="960698"/>
             <a:chExt cx="1449882" cy="5897301"/>
@@ -6824,7 +8396,1349 @@
 </p:sld>
 </file>
 
-<file path=ppt/slides/slide5.xml><?xml version="1.0" encoding="utf-8"?>
+<file path=ppt/slides/slide6.xml><?xml version="1.0" encoding="utf-8"?>
+<p:sld xmlns:a="http://schemas.openxmlformats.org/drawingml/2006/main" xmlns:r="http://schemas.openxmlformats.org/officeDocument/2006/relationships" xmlns:p="http://schemas.openxmlformats.org/presentationml/2006/main">
+  <p:cSld>
+    <p:spTree>
+      <p:nvGrpSpPr>
+        <p:cNvPr id="1" name=""/>
+        <p:cNvGrpSpPr/>
+        <p:nvPr/>
+      </p:nvGrpSpPr>
+      <p:grpSpPr>
+        <a:xfrm>
+          <a:off x="0" y="0"/>
+          <a:ext cx="0" cy="0"/>
+          <a:chOff x="0" y="0"/>
+          <a:chExt cx="0" cy="0"/>
+        </a:xfrm>
+      </p:grpSpPr>
+      <p:grpSp>
+        <p:nvGrpSpPr>
+          <p:cNvPr id="40" name="Group 39"/>
+          <p:cNvGrpSpPr/>
+          <p:nvPr/>
+        </p:nvGrpSpPr>
+        <p:grpSpPr>
+          <a:xfrm>
+            <a:off x="0" y="176687"/>
+            <a:ext cx="4889067" cy="3754453"/>
+            <a:chOff x="6114707" y="534756"/>
+            <a:chExt cx="3184632" cy="2355621"/>
+          </a:xfrm>
+        </p:grpSpPr>
+        <p:sp>
+          <p:nvSpPr>
+            <p:cNvPr id="7" name="Oval 6"/>
+            <p:cNvSpPr/>
+            <p:nvPr/>
+          </p:nvSpPr>
+          <p:spPr>
+            <a:xfrm>
+              <a:off x="6131815" y="534756"/>
+              <a:ext cx="1060479" cy="500169"/>
+            </a:xfrm>
+            <a:prstGeom prst="ellipse">
+              <a:avLst/>
+            </a:prstGeom>
+            <a:solidFill>
+              <a:schemeClr val="bg1"/>
+            </a:solidFill>
+            <a:ln>
+              <a:solidFill>
+                <a:schemeClr val="tx1"/>
+              </a:solidFill>
+            </a:ln>
+          </p:spPr>
+          <p:style>
+            <a:lnRef idx="2">
+              <a:schemeClr val="accent1">
+                <a:shade val="50000"/>
+              </a:schemeClr>
+            </a:lnRef>
+            <a:fillRef idx="1">
+              <a:schemeClr val="accent1"/>
+            </a:fillRef>
+            <a:effectRef idx="0">
+              <a:schemeClr val="accent1"/>
+            </a:effectRef>
+            <a:fontRef idx="minor">
+              <a:schemeClr val="lt1"/>
+            </a:fontRef>
+          </p:style>
+          <p:txBody>
+            <a:bodyPr rtlCol="0" anchor="ctr"/>
+            <a:lstStyle/>
+            <a:p>
+              <a:pPr algn="ctr"/>
+              <a:r>
+                <a:rPr lang="en-US" dirty="0" smtClean="0">
+                  <a:solidFill>
+                    <a:schemeClr val="tx1"/>
+                  </a:solidFill>
+                  <a:latin typeface="Baskerville" charset="0"/>
+                  <a:ea typeface="Baskerville" charset="0"/>
+                  <a:cs typeface="Baskerville" charset="0"/>
+                </a:rPr>
+                <a:t>laser</a:t>
+              </a:r>
+              <a:endParaRPr lang="en-US" dirty="0">
+                <a:solidFill>
+                  <a:schemeClr val="tx1"/>
+                </a:solidFill>
+                <a:latin typeface="Baskerville" charset="0"/>
+                <a:ea typeface="Baskerville" charset="0"/>
+                <a:cs typeface="Baskerville" charset="0"/>
+              </a:endParaRPr>
+            </a:p>
+          </p:txBody>
+        </p:sp>
+        <p:sp>
+          <p:nvSpPr>
+            <p:cNvPr id="29" name="Oval 28"/>
+            <p:cNvSpPr/>
+            <p:nvPr/>
+          </p:nvSpPr>
+          <p:spPr>
+            <a:xfrm>
+              <a:off x="6131816" y="1404257"/>
+              <a:ext cx="1060478" cy="500169"/>
+            </a:xfrm>
+            <a:prstGeom prst="ellipse">
+              <a:avLst/>
+            </a:prstGeom>
+            <a:solidFill>
+              <a:schemeClr val="bg1"/>
+            </a:solidFill>
+            <a:ln>
+              <a:solidFill>
+                <a:schemeClr val="tx1"/>
+              </a:solidFill>
+            </a:ln>
+          </p:spPr>
+          <p:style>
+            <a:lnRef idx="2">
+              <a:schemeClr val="accent1">
+                <a:shade val="50000"/>
+              </a:schemeClr>
+            </a:lnRef>
+            <a:fillRef idx="1">
+              <a:schemeClr val="accent1"/>
+            </a:fillRef>
+            <a:effectRef idx="0">
+              <a:schemeClr val="accent1"/>
+            </a:effectRef>
+            <a:fontRef idx="minor">
+              <a:schemeClr val="lt1"/>
+            </a:fontRef>
+          </p:style>
+          <p:txBody>
+            <a:bodyPr rtlCol="0" anchor="ctr"/>
+            <a:lstStyle/>
+            <a:p>
+              <a:pPr algn="ctr"/>
+              <a:r>
+                <a:rPr lang="en-US" dirty="0" err="1" smtClean="0">
+                  <a:solidFill>
+                    <a:schemeClr val="tx1"/>
+                  </a:solidFill>
+                  <a:latin typeface="Baskerville" charset="0"/>
+                  <a:ea typeface="Baskerville" charset="0"/>
+                  <a:cs typeface="Baskerville" charset="0"/>
+                </a:rPr>
+                <a:t>base_link</a:t>
+              </a:r>
+              <a:endParaRPr lang="en-US" dirty="0">
+                <a:solidFill>
+                  <a:schemeClr val="tx1"/>
+                </a:solidFill>
+                <a:latin typeface="Baskerville" charset="0"/>
+                <a:ea typeface="Baskerville" charset="0"/>
+                <a:cs typeface="Baskerville" charset="0"/>
+              </a:endParaRPr>
+            </a:p>
+          </p:txBody>
+        </p:sp>
+        <p:sp>
+          <p:nvSpPr>
+            <p:cNvPr id="30" name="Oval 29"/>
+            <p:cNvSpPr/>
+            <p:nvPr/>
+          </p:nvSpPr>
+          <p:spPr>
+            <a:xfrm>
+              <a:off x="6114707" y="2272359"/>
+              <a:ext cx="1092777" cy="500169"/>
+            </a:xfrm>
+            <a:prstGeom prst="ellipse">
+              <a:avLst/>
+            </a:prstGeom>
+            <a:solidFill>
+              <a:schemeClr val="bg1"/>
+            </a:solidFill>
+            <a:ln>
+              <a:solidFill>
+                <a:schemeClr val="tx1"/>
+              </a:solidFill>
+            </a:ln>
+          </p:spPr>
+          <p:style>
+            <a:lnRef idx="2">
+              <a:schemeClr val="accent1">
+                <a:shade val="50000"/>
+              </a:schemeClr>
+            </a:lnRef>
+            <a:fillRef idx="1">
+              <a:schemeClr val="accent1"/>
+            </a:fillRef>
+            <a:effectRef idx="0">
+              <a:schemeClr val="accent1"/>
+            </a:effectRef>
+            <a:fontRef idx="minor">
+              <a:schemeClr val="lt1"/>
+            </a:fontRef>
+          </p:style>
+          <p:txBody>
+            <a:bodyPr lIns="0" rIns="0" rtlCol="0" anchor="ctr"/>
+            <a:lstStyle/>
+            <a:p>
+              <a:pPr algn="ctr"/>
+              <a:r>
+                <a:rPr lang="en-US" dirty="0" err="1" smtClean="0">
+                  <a:solidFill>
+                    <a:schemeClr val="tx1"/>
+                  </a:solidFill>
+                  <a:latin typeface="Baskerville" charset="0"/>
+                  <a:ea typeface="Baskerville" charset="0"/>
+                  <a:cs typeface="Baskerville" charset="0"/>
+                </a:rPr>
+                <a:t>base_frame</a:t>
+              </a:r>
+              <a:endParaRPr lang="en-US" dirty="0">
+                <a:solidFill>
+                  <a:schemeClr val="tx1"/>
+                </a:solidFill>
+                <a:latin typeface="Baskerville" charset="0"/>
+                <a:ea typeface="Baskerville" charset="0"/>
+                <a:cs typeface="Baskerville" charset="0"/>
+              </a:endParaRPr>
+            </a:p>
+          </p:txBody>
+        </p:sp>
+        <p:sp>
+          <p:nvSpPr>
+            <p:cNvPr id="32" name="Oval 31"/>
+            <p:cNvSpPr/>
+            <p:nvPr/>
+          </p:nvSpPr>
+          <p:spPr>
+            <a:xfrm>
+              <a:off x="8235731" y="2272359"/>
+              <a:ext cx="1043652" cy="500169"/>
+            </a:xfrm>
+            <a:prstGeom prst="ellipse">
+              <a:avLst/>
+            </a:prstGeom>
+            <a:solidFill>
+              <a:schemeClr val="bg1"/>
+            </a:solidFill>
+            <a:ln>
+              <a:solidFill>
+                <a:schemeClr val="tx1"/>
+              </a:solidFill>
+            </a:ln>
+          </p:spPr>
+          <p:style>
+            <a:lnRef idx="2">
+              <a:schemeClr val="accent1">
+                <a:shade val="50000"/>
+              </a:schemeClr>
+            </a:lnRef>
+            <a:fillRef idx="1">
+              <a:schemeClr val="accent1"/>
+            </a:fillRef>
+            <a:effectRef idx="0">
+              <a:schemeClr val="accent1"/>
+            </a:effectRef>
+            <a:fontRef idx="minor">
+              <a:schemeClr val="lt1"/>
+            </a:fontRef>
+          </p:style>
+          <p:txBody>
+            <a:bodyPr lIns="0" rIns="0" rtlCol="0" anchor="ctr"/>
+            <a:lstStyle/>
+            <a:p>
+              <a:pPr algn="ctr"/>
+              <a:r>
+                <a:rPr lang="en-US" dirty="0" err="1" smtClean="0">
+                  <a:solidFill>
+                    <a:schemeClr val="tx1"/>
+                  </a:solidFill>
+                  <a:latin typeface="Baskerville" charset="0"/>
+                  <a:ea typeface="Baskerville" charset="0"/>
+                  <a:cs typeface="Baskerville" charset="0"/>
+                </a:rPr>
+                <a:t>odom</a:t>
+              </a:r>
+              <a:endParaRPr lang="en-US" dirty="0">
+                <a:solidFill>
+                  <a:schemeClr val="tx1"/>
+                </a:solidFill>
+                <a:latin typeface="Baskerville" charset="0"/>
+                <a:ea typeface="Baskerville" charset="0"/>
+                <a:cs typeface="Baskerville" charset="0"/>
+              </a:endParaRPr>
+            </a:p>
+          </p:txBody>
+        </p:sp>
+        <p:sp>
+          <p:nvSpPr>
+            <p:cNvPr id="34" name="Oval 33"/>
+            <p:cNvSpPr/>
+            <p:nvPr/>
+          </p:nvSpPr>
+          <p:spPr>
+            <a:xfrm>
+              <a:off x="8215774" y="1404257"/>
+              <a:ext cx="1083565" cy="500169"/>
+            </a:xfrm>
+            <a:prstGeom prst="ellipse">
+              <a:avLst/>
+            </a:prstGeom>
+            <a:solidFill>
+              <a:schemeClr val="bg1"/>
+            </a:solidFill>
+            <a:ln>
+              <a:solidFill>
+                <a:schemeClr val="tx1"/>
+              </a:solidFill>
+            </a:ln>
+          </p:spPr>
+          <p:style>
+            <a:lnRef idx="2">
+              <a:schemeClr val="accent1">
+                <a:shade val="50000"/>
+              </a:schemeClr>
+            </a:lnRef>
+            <a:fillRef idx="1">
+              <a:schemeClr val="accent1"/>
+            </a:fillRef>
+            <a:effectRef idx="0">
+              <a:schemeClr val="accent1"/>
+            </a:effectRef>
+            <a:fontRef idx="minor">
+              <a:schemeClr val="lt1"/>
+            </a:fontRef>
+          </p:style>
+          <p:txBody>
+            <a:bodyPr lIns="0" rIns="0" rtlCol="0" anchor="ctr"/>
+            <a:lstStyle/>
+            <a:p>
+              <a:pPr algn="ctr"/>
+              <a:r>
+                <a:rPr lang="en-US" dirty="0" smtClean="0">
+                  <a:solidFill>
+                    <a:schemeClr val="tx1"/>
+                  </a:solidFill>
+                  <a:latin typeface="Baskerville" charset="0"/>
+                  <a:ea typeface="Baskerville" charset="0"/>
+                  <a:cs typeface="Baskerville" charset="0"/>
+                </a:rPr>
+                <a:t>map</a:t>
+              </a:r>
+              <a:endParaRPr lang="en-US" dirty="0">
+                <a:solidFill>
+                  <a:schemeClr val="tx1"/>
+                </a:solidFill>
+                <a:latin typeface="Baskerville" charset="0"/>
+                <a:ea typeface="Baskerville" charset="0"/>
+                <a:cs typeface="Baskerville" charset="0"/>
+              </a:endParaRPr>
+            </a:p>
+          </p:txBody>
+        </p:sp>
+        <p:cxnSp>
+          <p:nvCxnSpPr>
+            <p:cNvPr id="10" name="Straight Arrow Connector 9"/>
+            <p:cNvCxnSpPr>
+              <a:stCxn id="7" idx="4"/>
+              <a:endCxn id="29" idx="0"/>
+            </p:cNvCxnSpPr>
+            <p:nvPr/>
+          </p:nvCxnSpPr>
+          <p:spPr>
+            <a:xfrm>
+              <a:off x="6662054" y="1034925"/>
+              <a:ext cx="1" cy="369332"/>
+            </a:xfrm>
+            <a:prstGeom prst="straightConnector1">
+              <a:avLst/>
+            </a:prstGeom>
+            <a:ln>
+              <a:solidFill>
+                <a:schemeClr val="tx1"/>
+              </a:solidFill>
+              <a:tailEnd type="triangle"/>
+            </a:ln>
+          </p:spPr>
+          <p:style>
+            <a:lnRef idx="1">
+              <a:schemeClr val="accent1"/>
+            </a:lnRef>
+            <a:fillRef idx="0">
+              <a:schemeClr val="accent1"/>
+            </a:fillRef>
+            <a:effectRef idx="0">
+              <a:schemeClr val="accent1"/>
+            </a:effectRef>
+            <a:fontRef idx="minor">
+              <a:schemeClr val="tx1"/>
+            </a:fontRef>
+          </p:style>
+        </p:cxnSp>
+        <p:cxnSp>
+          <p:nvCxnSpPr>
+            <p:cNvPr id="14" name="Straight Arrow Connector 13"/>
+            <p:cNvCxnSpPr>
+              <a:stCxn id="29" idx="4"/>
+              <a:endCxn id="30" idx="0"/>
+            </p:cNvCxnSpPr>
+            <p:nvPr/>
+          </p:nvCxnSpPr>
+          <p:spPr>
+            <a:xfrm flipH="1">
+              <a:off x="6661095" y="1904426"/>
+              <a:ext cx="960" cy="367933"/>
+            </a:xfrm>
+            <a:prstGeom prst="straightConnector1">
+              <a:avLst/>
+            </a:prstGeom>
+            <a:ln>
+              <a:solidFill>
+                <a:schemeClr val="tx1"/>
+              </a:solidFill>
+              <a:tailEnd type="triangle"/>
+            </a:ln>
+          </p:spPr>
+          <p:style>
+            <a:lnRef idx="1">
+              <a:schemeClr val="accent1"/>
+            </a:lnRef>
+            <a:fillRef idx="0">
+              <a:schemeClr val="accent1"/>
+            </a:fillRef>
+            <a:effectRef idx="0">
+              <a:schemeClr val="accent1"/>
+            </a:effectRef>
+            <a:fontRef idx="minor">
+              <a:schemeClr val="tx1"/>
+            </a:fontRef>
+          </p:style>
+        </p:cxnSp>
+        <p:cxnSp>
+          <p:nvCxnSpPr>
+            <p:cNvPr id="16" name="Straight Arrow Connector 15"/>
+            <p:cNvCxnSpPr>
+              <a:stCxn id="30" idx="6"/>
+              <a:endCxn id="32" idx="2"/>
+            </p:cNvCxnSpPr>
+            <p:nvPr/>
+          </p:nvCxnSpPr>
+          <p:spPr>
+            <a:xfrm>
+              <a:off x="7207484" y="2522444"/>
+              <a:ext cx="1028247" cy="0"/>
+            </a:xfrm>
+            <a:prstGeom prst="straightConnector1">
+              <a:avLst/>
+            </a:prstGeom>
+            <a:ln>
+              <a:solidFill>
+                <a:schemeClr val="tx1"/>
+              </a:solidFill>
+              <a:tailEnd type="triangle"/>
+            </a:ln>
+          </p:spPr>
+          <p:style>
+            <a:lnRef idx="1">
+              <a:schemeClr val="accent1"/>
+            </a:lnRef>
+            <a:fillRef idx="0">
+              <a:schemeClr val="accent1"/>
+            </a:fillRef>
+            <a:effectRef idx="0">
+              <a:schemeClr val="accent1"/>
+            </a:effectRef>
+            <a:fontRef idx="minor">
+              <a:schemeClr val="tx1"/>
+            </a:fontRef>
+          </p:style>
+        </p:cxnSp>
+        <p:cxnSp>
+          <p:nvCxnSpPr>
+            <p:cNvPr id="18" name="Straight Arrow Connector 17"/>
+            <p:cNvCxnSpPr>
+              <a:stCxn id="32" idx="0"/>
+              <a:endCxn id="34" idx="4"/>
+            </p:cNvCxnSpPr>
+            <p:nvPr/>
+          </p:nvCxnSpPr>
+          <p:spPr>
+            <a:xfrm flipH="1" flipV="1">
+              <a:off x="8757556" y="1904426"/>
+              <a:ext cx="1" cy="367933"/>
+            </a:xfrm>
+            <a:prstGeom prst="straightConnector1">
+              <a:avLst/>
+            </a:prstGeom>
+            <a:ln>
+              <a:solidFill>
+                <a:schemeClr val="tx1"/>
+              </a:solidFill>
+              <a:tailEnd type="triangle"/>
+            </a:ln>
+          </p:spPr>
+          <p:style>
+            <a:lnRef idx="1">
+              <a:schemeClr val="accent1"/>
+            </a:lnRef>
+            <a:fillRef idx="0">
+              <a:schemeClr val="accent1"/>
+            </a:fillRef>
+            <a:effectRef idx="0">
+              <a:schemeClr val="accent1"/>
+            </a:effectRef>
+            <a:fontRef idx="minor">
+              <a:schemeClr val="tx1"/>
+            </a:fontRef>
+          </p:style>
+        </p:cxnSp>
+        <p:sp>
+          <p:nvSpPr>
+            <p:cNvPr id="39" name="TextBox 38"/>
+            <p:cNvSpPr txBox="1"/>
+            <p:nvPr/>
+          </p:nvSpPr>
+          <p:spPr>
+            <a:xfrm>
+              <a:off x="6662056" y="1098945"/>
+              <a:ext cx="298480" cy="369332"/>
+            </a:xfrm>
+            <a:prstGeom prst="rect">
+              <a:avLst/>
+            </a:prstGeom>
+            <a:noFill/>
+          </p:spPr>
+          <p:txBody>
+            <a:bodyPr wrap="none" rtlCol="0">
+              <a:spAutoFit/>
+            </a:bodyPr>
+            <a:lstStyle/>
+            <a:p>
+              <a:r>
+                <a:rPr lang="en-US" i="1" dirty="0" err="1" smtClean="0">
+                  <a:latin typeface="Baskerville" charset="0"/>
+                  <a:ea typeface="Baskerville" charset="0"/>
+                  <a:cs typeface="Baskerville" charset="0"/>
+                </a:rPr>
+                <a:t>tf</a:t>
+              </a:r>
+              <a:endParaRPr lang="en-US" i="1" dirty="0">
+                <a:latin typeface="Baskerville" charset="0"/>
+                <a:ea typeface="Baskerville" charset="0"/>
+                <a:cs typeface="Baskerville" charset="0"/>
+              </a:endParaRPr>
+            </a:p>
+          </p:txBody>
+        </p:sp>
+        <p:sp>
+          <p:nvSpPr>
+            <p:cNvPr id="43" name="TextBox 42"/>
+            <p:cNvSpPr txBox="1"/>
+            <p:nvPr/>
+          </p:nvSpPr>
+          <p:spPr>
+            <a:xfrm>
+              <a:off x="6662056" y="1968446"/>
+              <a:ext cx="298480" cy="369332"/>
+            </a:xfrm>
+            <a:prstGeom prst="rect">
+              <a:avLst/>
+            </a:prstGeom>
+            <a:noFill/>
+          </p:spPr>
+          <p:txBody>
+            <a:bodyPr wrap="none" rtlCol="0">
+              <a:spAutoFit/>
+            </a:bodyPr>
+            <a:lstStyle/>
+            <a:p>
+              <a:r>
+                <a:rPr lang="en-US" i="1" dirty="0" err="1" smtClean="0">
+                  <a:latin typeface="Baskerville" charset="0"/>
+                  <a:ea typeface="Baskerville" charset="0"/>
+                  <a:cs typeface="Baskerville" charset="0"/>
+                </a:rPr>
+                <a:t>tf</a:t>
+              </a:r>
+              <a:endParaRPr lang="en-US" i="1" dirty="0">
+                <a:latin typeface="Baskerville" charset="0"/>
+                <a:ea typeface="Baskerville" charset="0"/>
+                <a:cs typeface="Baskerville" charset="0"/>
+              </a:endParaRPr>
+            </a:p>
+          </p:txBody>
+        </p:sp>
+        <p:sp>
+          <p:nvSpPr>
+            <p:cNvPr id="45" name="TextBox 44"/>
+            <p:cNvSpPr txBox="1"/>
+            <p:nvPr/>
+          </p:nvSpPr>
+          <p:spPr>
+            <a:xfrm>
+              <a:off x="7352954" y="2521045"/>
+              <a:ext cx="1160895" cy="369332"/>
+            </a:xfrm>
+            <a:prstGeom prst="rect">
+              <a:avLst/>
+            </a:prstGeom>
+            <a:noFill/>
+          </p:spPr>
+          <p:txBody>
+            <a:bodyPr wrap="none" rtlCol="0">
+              <a:spAutoFit/>
+            </a:bodyPr>
+            <a:lstStyle/>
+            <a:p>
+              <a:r>
+                <a:rPr lang="en-US" i="1" dirty="0" err="1" smtClean="0">
+                  <a:latin typeface="Baskerville" charset="0"/>
+                  <a:ea typeface="Baskerville" charset="0"/>
+                  <a:cs typeface="Baskerville" charset="0"/>
+                </a:rPr>
+                <a:t>hector_odom</a:t>
+              </a:r>
+              <a:endParaRPr lang="en-US" i="1" dirty="0">
+                <a:latin typeface="Baskerville" charset="0"/>
+                <a:ea typeface="Baskerville" charset="0"/>
+                <a:cs typeface="Baskerville" charset="0"/>
+              </a:endParaRPr>
+            </a:p>
+          </p:txBody>
+        </p:sp>
+        <p:sp>
+          <p:nvSpPr>
+            <p:cNvPr id="47" name="TextBox 46"/>
+            <p:cNvSpPr txBox="1"/>
+            <p:nvPr/>
+          </p:nvSpPr>
+          <p:spPr>
+            <a:xfrm>
+              <a:off x="8186055" y="1968446"/>
+              <a:ext cx="550087" cy="369332"/>
+            </a:xfrm>
+            <a:prstGeom prst="rect">
+              <a:avLst/>
+            </a:prstGeom>
+            <a:noFill/>
+          </p:spPr>
+          <p:txBody>
+            <a:bodyPr wrap="none" rtlCol="0">
+              <a:spAutoFit/>
+            </a:bodyPr>
+            <a:lstStyle/>
+            <a:p>
+              <a:pPr algn="r"/>
+              <a:r>
+                <a:rPr lang="en-US" i="1" smtClean="0">
+                  <a:latin typeface="Baskerville" charset="0"/>
+                  <a:ea typeface="Baskerville" charset="0"/>
+                  <a:cs typeface="Baskerville" charset="0"/>
+                </a:rPr>
+                <a:t>amcl</a:t>
+              </a:r>
+              <a:endParaRPr lang="en-US" i="1" dirty="0">
+                <a:latin typeface="Baskerville" charset="0"/>
+                <a:ea typeface="Baskerville" charset="0"/>
+                <a:cs typeface="Baskerville" charset="0"/>
+              </a:endParaRPr>
+            </a:p>
+          </p:txBody>
+        </p:sp>
+      </p:grpSp>
+      <p:grpSp>
+        <p:nvGrpSpPr>
+          <p:cNvPr id="28" name="Group 27"/>
+          <p:cNvGrpSpPr/>
+          <p:nvPr/>
+        </p:nvGrpSpPr>
+        <p:grpSpPr>
+          <a:xfrm>
+            <a:off x="5576711" y="568266"/>
+            <a:ext cx="4639733" cy="1693311"/>
+            <a:chOff x="5576711" y="568266"/>
+            <a:chExt cx="4639733" cy="1693311"/>
+          </a:xfrm>
+        </p:grpSpPr>
+        <p:sp>
+          <p:nvSpPr>
+            <p:cNvPr id="2" name="Oval 1"/>
+            <p:cNvSpPr/>
+            <p:nvPr/>
+          </p:nvSpPr>
+          <p:spPr>
+            <a:xfrm>
+              <a:off x="5576711" y="575278"/>
+              <a:ext cx="1332089" cy="643922"/>
+            </a:xfrm>
+            <a:prstGeom prst="ellipse">
+              <a:avLst/>
+            </a:prstGeom>
+            <a:solidFill>
+              <a:schemeClr val="bg1"/>
+            </a:solidFill>
+            <a:ln>
+              <a:solidFill>
+                <a:schemeClr val="tx1"/>
+              </a:solidFill>
+            </a:ln>
+          </p:spPr>
+          <p:style>
+            <a:lnRef idx="2">
+              <a:schemeClr val="accent1">
+                <a:shade val="50000"/>
+              </a:schemeClr>
+            </a:lnRef>
+            <a:fillRef idx="1">
+              <a:schemeClr val="accent1"/>
+            </a:fillRef>
+            <a:effectRef idx="0">
+              <a:schemeClr val="accent1"/>
+            </a:effectRef>
+            <a:fontRef idx="minor">
+              <a:schemeClr val="lt1"/>
+            </a:fontRef>
+          </p:style>
+          <p:txBody>
+            <a:bodyPr lIns="0" rIns="0" rtlCol="0" anchor="ctr" anchorCtr="0"/>
+            <a:lstStyle/>
+            <a:p>
+              <a:pPr algn="ctr"/>
+              <a:r>
+                <a:rPr lang="en-US" sz="1600" dirty="0" smtClean="0">
+                  <a:solidFill>
+                    <a:sysClr val="windowText" lastClr="000000"/>
+                  </a:solidFill>
+                  <a:latin typeface="Baskerville" charset="0"/>
+                  <a:ea typeface="Baskerville" charset="0"/>
+                  <a:cs typeface="Baskerville" charset="0"/>
+                </a:rPr>
+                <a:t>laser</a:t>
+              </a:r>
+              <a:endParaRPr lang="en-US" sz="1600" dirty="0">
+                <a:solidFill>
+                  <a:sysClr val="windowText" lastClr="000000"/>
+                </a:solidFill>
+                <a:latin typeface="Baskerville" charset="0"/>
+                <a:ea typeface="Baskerville" charset="0"/>
+                <a:cs typeface="Baskerville" charset="0"/>
+              </a:endParaRPr>
+            </a:p>
+          </p:txBody>
+        </p:sp>
+        <p:sp>
+          <p:nvSpPr>
+            <p:cNvPr id="24" name="Oval 23"/>
+            <p:cNvSpPr/>
+            <p:nvPr/>
+          </p:nvSpPr>
+          <p:spPr>
+            <a:xfrm>
+              <a:off x="7230533" y="575278"/>
+              <a:ext cx="1332089" cy="643922"/>
+            </a:xfrm>
+            <a:prstGeom prst="ellipse">
+              <a:avLst/>
+            </a:prstGeom>
+            <a:solidFill>
+              <a:schemeClr val="bg1"/>
+            </a:solidFill>
+            <a:ln>
+              <a:solidFill>
+                <a:schemeClr val="tx1"/>
+              </a:solidFill>
+            </a:ln>
+          </p:spPr>
+          <p:style>
+            <a:lnRef idx="2">
+              <a:schemeClr val="accent1">
+                <a:shade val="50000"/>
+              </a:schemeClr>
+            </a:lnRef>
+            <a:fillRef idx="1">
+              <a:schemeClr val="accent1"/>
+            </a:fillRef>
+            <a:effectRef idx="0">
+              <a:schemeClr val="accent1"/>
+            </a:effectRef>
+            <a:fontRef idx="minor">
+              <a:schemeClr val="lt1"/>
+            </a:fontRef>
+          </p:style>
+          <p:txBody>
+            <a:bodyPr lIns="0" rIns="0" rtlCol="0" anchor="ctr" anchorCtr="0"/>
+            <a:lstStyle/>
+            <a:p>
+              <a:pPr algn="ctr"/>
+              <a:r>
+                <a:rPr lang="en-US" sz="1600" dirty="0" err="1" smtClean="0">
+                  <a:solidFill>
+                    <a:sysClr val="windowText" lastClr="000000"/>
+                  </a:solidFill>
+                  <a:latin typeface="Baskerville" charset="0"/>
+                  <a:ea typeface="Baskerville" charset="0"/>
+                  <a:cs typeface="Baskerville" charset="0"/>
+                </a:rPr>
+                <a:t>base_link</a:t>
+              </a:r>
+              <a:endParaRPr lang="en-US" sz="1600" dirty="0">
+                <a:solidFill>
+                  <a:sysClr val="windowText" lastClr="000000"/>
+                </a:solidFill>
+                <a:latin typeface="Baskerville" charset="0"/>
+                <a:ea typeface="Baskerville" charset="0"/>
+                <a:cs typeface="Baskerville" charset="0"/>
+              </a:endParaRPr>
+            </a:p>
+          </p:txBody>
+        </p:sp>
+        <p:sp>
+          <p:nvSpPr>
+            <p:cNvPr id="25" name="Oval 24"/>
+            <p:cNvSpPr/>
+            <p:nvPr/>
+          </p:nvSpPr>
+          <p:spPr>
+            <a:xfrm>
+              <a:off x="8884355" y="568266"/>
+              <a:ext cx="1332089" cy="643922"/>
+            </a:xfrm>
+            <a:prstGeom prst="ellipse">
+              <a:avLst/>
+            </a:prstGeom>
+            <a:solidFill>
+              <a:schemeClr val="bg1"/>
+            </a:solidFill>
+            <a:ln>
+              <a:solidFill>
+                <a:schemeClr val="tx1"/>
+              </a:solidFill>
+            </a:ln>
+          </p:spPr>
+          <p:style>
+            <a:lnRef idx="2">
+              <a:schemeClr val="accent1">
+                <a:shade val="50000"/>
+              </a:schemeClr>
+            </a:lnRef>
+            <a:fillRef idx="1">
+              <a:schemeClr val="accent1"/>
+            </a:fillRef>
+            <a:effectRef idx="0">
+              <a:schemeClr val="accent1"/>
+            </a:effectRef>
+            <a:fontRef idx="minor">
+              <a:schemeClr val="lt1"/>
+            </a:fontRef>
+          </p:style>
+          <p:txBody>
+            <a:bodyPr lIns="0" rIns="0" rtlCol="0" anchor="ctr" anchorCtr="0"/>
+            <a:lstStyle/>
+            <a:p>
+              <a:pPr algn="ctr"/>
+              <a:r>
+                <a:rPr lang="en-US" sz="1600" dirty="0" err="1" smtClean="0">
+                  <a:solidFill>
+                    <a:sysClr val="windowText" lastClr="000000"/>
+                  </a:solidFill>
+                  <a:latin typeface="Baskerville" charset="0"/>
+                  <a:ea typeface="Baskerville" charset="0"/>
+                  <a:cs typeface="Baskerville" charset="0"/>
+                </a:rPr>
+                <a:t>base_frame</a:t>
+              </a:r>
+              <a:endParaRPr lang="en-US" sz="1600" dirty="0">
+                <a:solidFill>
+                  <a:sysClr val="windowText" lastClr="000000"/>
+                </a:solidFill>
+                <a:latin typeface="Baskerville" charset="0"/>
+                <a:ea typeface="Baskerville" charset="0"/>
+                <a:cs typeface="Baskerville" charset="0"/>
+              </a:endParaRPr>
+            </a:p>
+          </p:txBody>
+        </p:sp>
+        <p:sp>
+          <p:nvSpPr>
+            <p:cNvPr id="26" name="Oval 25"/>
+            <p:cNvSpPr/>
+            <p:nvPr/>
+          </p:nvSpPr>
+          <p:spPr>
+            <a:xfrm>
+              <a:off x="8884355" y="1532494"/>
+              <a:ext cx="1332089" cy="643922"/>
+            </a:xfrm>
+            <a:prstGeom prst="ellipse">
+              <a:avLst/>
+            </a:prstGeom>
+            <a:solidFill>
+              <a:schemeClr val="bg1"/>
+            </a:solidFill>
+            <a:ln>
+              <a:solidFill>
+                <a:schemeClr val="tx1"/>
+              </a:solidFill>
+            </a:ln>
+          </p:spPr>
+          <p:style>
+            <a:lnRef idx="2">
+              <a:schemeClr val="accent1">
+                <a:shade val="50000"/>
+              </a:schemeClr>
+            </a:lnRef>
+            <a:fillRef idx="1">
+              <a:schemeClr val="accent1"/>
+            </a:fillRef>
+            <a:effectRef idx="0">
+              <a:schemeClr val="accent1"/>
+            </a:effectRef>
+            <a:fontRef idx="minor">
+              <a:schemeClr val="lt1"/>
+            </a:fontRef>
+          </p:style>
+          <p:txBody>
+            <a:bodyPr lIns="0" rIns="0" rtlCol="0" anchor="ctr" anchorCtr="0"/>
+            <a:lstStyle/>
+            <a:p>
+              <a:pPr algn="ctr"/>
+              <a:r>
+                <a:rPr lang="en-US" sz="1600" dirty="0" err="1" smtClean="0">
+                  <a:solidFill>
+                    <a:sysClr val="windowText" lastClr="000000"/>
+                  </a:solidFill>
+                  <a:latin typeface="Baskerville" charset="0"/>
+                  <a:ea typeface="Baskerville" charset="0"/>
+                  <a:cs typeface="Baskerville" charset="0"/>
+                </a:rPr>
+                <a:t>odom</a:t>
+              </a:r>
+              <a:endParaRPr lang="en-US" sz="1600" dirty="0">
+                <a:solidFill>
+                  <a:sysClr val="windowText" lastClr="000000"/>
+                </a:solidFill>
+                <a:latin typeface="Baskerville" charset="0"/>
+                <a:ea typeface="Baskerville" charset="0"/>
+                <a:cs typeface="Baskerville" charset="0"/>
+              </a:endParaRPr>
+            </a:p>
+          </p:txBody>
+        </p:sp>
+        <p:sp>
+          <p:nvSpPr>
+            <p:cNvPr id="27" name="Oval 26"/>
+            <p:cNvSpPr/>
+            <p:nvPr/>
+          </p:nvSpPr>
+          <p:spPr>
+            <a:xfrm>
+              <a:off x="7230533" y="1532494"/>
+              <a:ext cx="1332089" cy="643922"/>
+            </a:xfrm>
+            <a:prstGeom prst="ellipse">
+              <a:avLst/>
+            </a:prstGeom>
+            <a:solidFill>
+              <a:schemeClr val="bg1"/>
+            </a:solidFill>
+            <a:ln>
+              <a:solidFill>
+                <a:schemeClr val="tx1"/>
+              </a:solidFill>
+            </a:ln>
+          </p:spPr>
+          <p:style>
+            <a:lnRef idx="2">
+              <a:schemeClr val="accent1">
+                <a:shade val="50000"/>
+              </a:schemeClr>
+            </a:lnRef>
+            <a:fillRef idx="1">
+              <a:schemeClr val="accent1"/>
+            </a:fillRef>
+            <a:effectRef idx="0">
+              <a:schemeClr val="accent1"/>
+            </a:effectRef>
+            <a:fontRef idx="minor">
+              <a:schemeClr val="lt1"/>
+            </a:fontRef>
+          </p:style>
+          <p:txBody>
+            <a:bodyPr lIns="0" rIns="0" rtlCol="0" anchor="ctr" anchorCtr="0"/>
+            <a:lstStyle/>
+            <a:p>
+              <a:pPr algn="ctr"/>
+              <a:r>
+                <a:rPr lang="en-US" sz="1600" dirty="0" smtClean="0">
+                  <a:solidFill>
+                    <a:sysClr val="windowText" lastClr="000000"/>
+                  </a:solidFill>
+                  <a:latin typeface="Baskerville" charset="0"/>
+                  <a:ea typeface="Baskerville" charset="0"/>
+                  <a:cs typeface="Baskerville" charset="0"/>
+                </a:rPr>
+                <a:t>map</a:t>
+              </a:r>
+              <a:endParaRPr lang="en-US" sz="1600" dirty="0">
+                <a:solidFill>
+                  <a:sysClr val="windowText" lastClr="000000"/>
+                </a:solidFill>
+                <a:latin typeface="Baskerville" charset="0"/>
+                <a:ea typeface="Baskerville" charset="0"/>
+                <a:cs typeface="Baskerville" charset="0"/>
+              </a:endParaRPr>
+            </a:p>
+          </p:txBody>
+        </p:sp>
+        <p:cxnSp>
+          <p:nvCxnSpPr>
+            <p:cNvPr id="8" name="Straight Arrow Connector 7"/>
+            <p:cNvCxnSpPr>
+              <a:stCxn id="2" idx="6"/>
+              <a:endCxn id="24" idx="2"/>
+            </p:cNvCxnSpPr>
+            <p:nvPr/>
+          </p:nvCxnSpPr>
+          <p:spPr>
+            <a:xfrm>
+              <a:off x="6908800" y="897239"/>
+              <a:ext cx="321733" cy="0"/>
+            </a:xfrm>
+            <a:prstGeom prst="straightConnector1">
+              <a:avLst/>
+            </a:prstGeom>
+            <a:ln>
+              <a:solidFill>
+                <a:schemeClr val="tx1"/>
+              </a:solidFill>
+              <a:tailEnd type="triangle"/>
+            </a:ln>
+          </p:spPr>
+          <p:style>
+            <a:lnRef idx="1">
+              <a:schemeClr val="accent1"/>
+            </a:lnRef>
+            <a:fillRef idx="0">
+              <a:schemeClr val="accent1"/>
+            </a:fillRef>
+            <a:effectRef idx="0">
+              <a:schemeClr val="accent1"/>
+            </a:effectRef>
+            <a:fontRef idx="minor">
+              <a:schemeClr val="tx1"/>
+            </a:fontRef>
+          </p:style>
+        </p:cxnSp>
+        <p:cxnSp>
+          <p:nvCxnSpPr>
+            <p:cNvPr id="11" name="Straight Arrow Connector 10"/>
+            <p:cNvCxnSpPr>
+              <a:stCxn id="24" idx="6"/>
+              <a:endCxn id="25" idx="2"/>
+            </p:cNvCxnSpPr>
+            <p:nvPr/>
+          </p:nvCxnSpPr>
+          <p:spPr>
+            <a:xfrm flipV="1">
+              <a:off x="8562622" y="890227"/>
+              <a:ext cx="321733" cy="7012"/>
+            </a:xfrm>
+            <a:prstGeom prst="straightConnector1">
+              <a:avLst/>
+            </a:prstGeom>
+            <a:ln>
+              <a:solidFill>
+                <a:schemeClr val="tx1"/>
+              </a:solidFill>
+              <a:tailEnd type="triangle"/>
+            </a:ln>
+          </p:spPr>
+          <p:style>
+            <a:lnRef idx="1">
+              <a:schemeClr val="accent1"/>
+            </a:lnRef>
+            <a:fillRef idx="0">
+              <a:schemeClr val="accent1"/>
+            </a:fillRef>
+            <a:effectRef idx="0">
+              <a:schemeClr val="accent1"/>
+            </a:effectRef>
+            <a:fontRef idx="minor">
+              <a:schemeClr val="tx1"/>
+            </a:fontRef>
+          </p:style>
+        </p:cxnSp>
+        <p:cxnSp>
+          <p:nvCxnSpPr>
+            <p:cNvPr id="13" name="Straight Arrow Connector 12"/>
+            <p:cNvCxnSpPr>
+              <a:stCxn id="25" idx="4"/>
+              <a:endCxn id="26" idx="0"/>
+            </p:cNvCxnSpPr>
+            <p:nvPr/>
+          </p:nvCxnSpPr>
+          <p:spPr>
+            <a:xfrm>
+              <a:off x="9550400" y="1212188"/>
+              <a:ext cx="0" cy="320306"/>
+            </a:xfrm>
+            <a:prstGeom prst="straightConnector1">
+              <a:avLst/>
+            </a:prstGeom>
+            <a:ln>
+              <a:solidFill>
+                <a:schemeClr val="tx1"/>
+              </a:solidFill>
+              <a:tailEnd type="triangle"/>
+            </a:ln>
+          </p:spPr>
+          <p:style>
+            <a:lnRef idx="1">
+              <a:schemeClr val="accent1"/>
+            </a:lnRef>
+            <a:fillRef idx="0">
+              <a:schemeClr val="accent1"/>
+            </a:fillRef>
+            <a:effectRef idx="0">
+              <a:schemeClr val="accent1"/>
+            </a:effectRef>
+            <a:fontRef idx="minor">
+              <a:schemeClr val="tx1"/>
+            </a:fontRef>
+          </p:style>
+        </p:cxnSp>
+        <p:cxnSp>
+          <p:nvCxnSpPr>
+            <p:cNvPr id="17" name="Straight Arrow Connector 16"/>
+            <p:cNvCxnSpPr>
+              <a:stCxn id="26" idx="2"/>
+              <a:endCxn id="27" idx="6"/>
+            </p:cNvCxnSpPr>
+            <p:nvPr/>
+          </p:nvCxnSpPr>
+          <p:spPr>
+            <a:xfrm flipH="1">
+              <a:off x="8562622" y="1854455"/>
+              <a:ext cx="321733" cy="0"/>
+            </a:xfrm>
+            <a:prstGeom prst="straightConnector1">
+              <a:avLst/>
+            </a:prstGeom>
+            <a:ln>
+              <a:solidFill>
+                <a:schemeClr val="tx1"/>
+              </a:solidFill>
+              <a:tailEnd type="triangle"/>
+            </a:ln>
+          </p:spPr>
+          <p:style>
+            <a:lnRef idx="1">
+              <a:schemeClr val="accent1"/>
+            </a:lnRef>
+            <a:fillRef idx="0">
+              <a:schemeClr val="accent1"/>
+            </a:fillRef>
+            <a:effectRef idx="0">
+              <a:schemeClr val="accent1"/>
+            </a:effectRef>
+            <a:fontRef idx="minor">
+              <a:schemeClr val="tx1"/>
+            </a:fontRef>
+          </p:style>
+        </p:cxnSp>
+        <p:sp>
+          <p:nvSpPr>
+            <p:cNvPr id="19" name="TextBox 18"/>
+            <p:cNvSpPr txBox="1"/>
+            <p:nvPr/>
+          </p:nvSpPr>
+          <p:spPr>
+            <a:xfrm>
+              <a:off x="6921167" y="890227"/>
+              <a:ext cx="304892" cy="400110"/>
+            </a:xfrm>
+            <a:prstGeom prst="rect">
+              <a:avLst/>
+            </a:prstGeom>
+            <a:noFill/>
+          </p:spPr>
+          <p:txBody>
+            <a:bodyPr wrap="none" rtlCol="0">
+              <a:spAutoFit/>
+            </a:bodyPr>
+            <a:lstStyle/>
+            <a:p>
+              <a:pPr algn="ctr"/>
+              <a:r>
+                <a:rPr lang="en-US" sz="2000" dirty="0">
+                  <a:latin typeface="Baskerville" charset="0"/>
+                  <a:ea typeface="Baskerville" charset="0"/>
+                  <a:cs typeface="Baskerville" charset="0"/>
+                </a:rPr>
+                <a:t>a</a:t>
+              </a:r>
+              <a:endParaRPr lang="en-US" sz="2000" dirty="0" smtClean="0">
+                <a:latin typeface="Baskerville" charset="0"/>
+                <a:ea typeface="Baskerville" charset="0"/>
+                <a:cs typeface="Baskerville" charset="0"/>
+              </a:endParaRPr>
+            </a:p>
+          </p:txBody>
+        </p:sp>
+        <p:sp>
+          <p:nvSpPr>
+            <p:cNvPr id="36" name="TextBox 35"/>
+            <p:cNvSpPr txBox="1"/>
+            <p:nvPr/>
+          </p:nvSpPr>
+          <p:spPr>
+            <a:xfrm>
+              <a:off x="8558148" y="890227"/>
+              <a:ext cx="317716" cy="400110"/>
+            </a:xfrm>
+            <a:prstGeom prst="rect">
+              <a:avLst/>
+            </a:prstGeom>
+            <a:noFill/>
+          </p:spPr>
+          <p:txBody>
+            <a:bodyPr wrap="none" rtlCol="0">
+              <a:spAutoFit/>
+            </a:bodyPr>
+            <a:lstStyle/>
+            <a:p>
+              <a:pPr algn="ctr"/>
+              <a:r>
+                <a:rPr lang="en-US" sz="2000" dirty="0" smtClean="0">
+                  <a:latin typeface="Baskerville" charset="0"/>
+                  <a:ea typeface="Baskerville" charset="0"/>
+                  <a:cs typeface="Baskerville" charset="0"/>
+                </a:rPr>
+                <a:t>b</a:t>
+              </a:r>
+              <a:endParaRPr lang="en-US" sz="2000" dirty="0">
+                <a:latin typeface="Baskerville" charset="0"/>
+                <a:ea typeface="Baskerville" charset="0"/>
+                <a:cs typeface="Baskerville" charset="0"/>
+              </a:endParaRPr>
+            </a:p>
+          </p:txBody>
+        </p:sp>
+        <p:sp>
+          <p:nvSpPr>
+            <p:cNvPr id="37" name="TextBox 36"/>
+            <p:cNvSpPr txBox="1"/>
+            <p:nvPr/>
+          </p:nvSpPr>
+          <p:spPr>
+            <a:xfrm>
+              <a:off x="9577705" y="1132384"/>
+              <a:ext cx="293670" cy="400110"/>
+            </a:xfrm>
+            <a:prstGeom prst="rect">
+              <a:avLst/>
+            </a:prstGeom>
+            <a:noFill/>
+          </p:spPr>
+          <p:txBody>
+            <a:bodyPr wrap="none" rtlCol="0">
+              <a:spAutoFit/>
+            </a:bodyPr>
+            <a:lstStyle/>
+            <a:p>
+              <a:r>
+                <a:rPr lang="en-US" sz="2000" dirty="0" smtClean="0">
+                  <a:latin typeface="Baskerville" charset="0"/>
+                  <a:ea typeface="Baskerville" charset="0"/>
+                  <a:cs typeface="Baskerville" charset="0"/>
+                </a:rPr>
+                <a:t>c</a:t>
+              </a:r>
+              <a:endParaRPr lang="en-US" sz="1400" dirty="0">
+                <a:latin typeface="Baskerville" charset="0"/>
+                <a:ea typeface="Baskerville" charset="0"/>
+                <a:cs typeface="Baskerville" charset="0"/>
+              </a:endParaRPr>
+            </a:p>
+          </p:txBody>
+        </p:sp>
+        <p:sp>
+          <p:nvSpPr>
+            <p:cNvPr id="41" name="TextBox 40"/>
+            <p:cNvSpPr txBox="1"/>
+            <p:nvPr/>
+          </p:nvSpPr>
+          <p:spPr>
+            <a:xfrm>
+              <a:off x="8566638" y="1861467"/>
+              <a:ext cx="317716" cy="400110"/>
+            </a:xfrm>
+            <a:prstGeom prst="rect">
+              <a:avLst/>
+            </a:prstGeom>
+            <a:noFill/>
+          </p:spPr>
+          <p:txBody>
+            <a:bodyPr wrap="none" rtlCol="0">
+              <a:spAutoFit/>
+            </a:bodyPr>
+            <a:lstStyle/>
+            <a:p>
+              <a:pPr algn="ctr"/>
+              <a:r>
+                <a:rPr lang="en-US" sz="2000" dirty="0" smtClean="0">
+                  <a:latin typeface="Baskerville" charset="0"/>
+                  <a:ea typeface="Baskerville" charset="0"/>
+                  <a:cs typeface="Baskerville" charset="0"/>
+                </a:rPr>
+                <a:t>d</a:t>
+              </a:r>
+            </a:p>
+          </p:txBody>
+        </p:sp>
+      </p:grpSp>
+    </p:spTree>
+    <p:extLst>
+      <p:ext uri="{BB962C8B-B14F-4D97-AF65-F5344CB8AC3E}">
+        <p14:creationId xmlns:p14="http://schemas.microsoft.com/office/powerpoint/2010/main" val="2013086638"/>
+      </p:ext>
+    </p:extLst>
+  </p:cSld>
+  <p:clrMapOvr>
+    <a:masterClrMapping/>
+  </p:clrMapOvr>
+  <p:timing>
+    <p:tnLst>
+      <p:par>
+        <p:cTn id="1" dur="indefinite" restart="never" nodeType="tmRoot"/>
+      </p:par>
+    </p:tnLst>
+  </p:timing>
+</p:sld>
+</file>
+
+<file path=ppt/slides/slide7.xml><?xml version="1.0" encoding="utf-8"?>
 <p:sld xmlns:a="http://schemas.openxmlformats.org/drawingml/2006/main" xmlns:r="http://schemas.openxmlformats.org/officeDocument/2006/relationships" xmlns:p="http://schemas.openxmlformats.org/presentationml/2006/main">
   <p:cSld>
     <p:spTree>
@@ -7313,7 +10227,7 @@
 </p:sld>
 </file>
 
-<file path=ppt/slides/slide6.xml><?xml version="1.0" encoding="utf-8"?>
+<file path=ppt/slides/slide8.xml><?xml version="1.0" encoding="utf-8"?>
 <p:sld xmlns:a="http://schemas.openxmlformats.org/drawingml/2006/main" xmlns:r="http://schemas.openxmlformats.org/officeDocument/2006/relationships" xmlns:p="http://schemas.openxmlformats.org/presentationml/2006/main">
   <p:cSld>
     <p:spTree>
@@ -7649,7 +10563,7 @@
 </p:sld>
 </file>
 
-<file path=ppt/slides/slide7.xml><?xml version="1.0" encoding="utf-8"?>
+<file path=ppt/slides/slide9.xml><?xml version="1.0" encoding="utf-8"?>
 <p:sld xmlns:a="http://schemas.openxmlformats.org/drawingml/2006/main" xmlns:r="http://schemas.openxmlformats.org/officeDocument/2006/relationships" xmlns:p="http://schemas.openxmlformats.org/presentationml/2006/main">
   <p:cSld>
     <p:spTree>
@@ -7668,7 +10582,7 @@
       </p:grpSpPr>
       <p:grpSp>
         <p:nvGrpSpPr>
-          <p:cNvPr id="11" name="Group 10"/>
+          <p:cNvPr id="33" name="Group 32"/>
           <p:cNvGrpSpPr/>
           <p:nvPr/>
         </p:nvGrpSpPr>
@@ -7680,60 +10594,167 @@
             <a:chExt cx="12298326" cy="5385531"/>
           </a:xfrm>
         </p:grpSpPr>
-        <p:pic>
-          <p:nvPicPr>
-            <p:cNvPr id="3" name="Picture 2"/>
-            <p:cNvPicPr>
-              <a:picLocks noChangeAspect="1"/>
-            </p:cNvPicPr>
-            <p:nvPr/>
-          </p:nvPicPr>
-          <p:blipFill>
-            <a:blip r:embed="rId2">
-              <a:clrChange>
-                <a:clrFrom>
-                  <a:srgbClr val="5B6E6C"/>
-                </a:clrFrom>
-                <a:clrTo>
-                  <a:srgbClr val="5B6E6C">
-                    <a:alpha val="0"/>
-                  </a:srgbClr>
-                </a:clrTo>
-              </a:clrChange>
-            </a:blip>
-            <a:stretch>
-              <a:fillRect/>
-            </a:stretch>
-          </p:blipFill>
-          <p:spPr>
+        <p:grpSp>
+          <p:nvGrpSpPr>
+            <p:cNvPr id="11" name="Group 10"/>
+            <p:cNvGrpSpPr/>
+            <p:nvPr/>
+          </p:nvGrpSpPr>
+          <p:grpSpPr>
             <a:xfrm>
-              <a:off x="0" y="736234"/>
-              <a:ext cx="12192000" cy="5385531"/>
-            </a:xfrm>
-            <a:prstGeom prst="rect">
-              <a:avLst/>
-            </a:prstGeom>
-          </p:spPr>
-        </p:pic>
+              <a:off x="-106326" y="736234"/>
+              <a:ext cx="12298326" cy="5385531"/>
+              <a:chOff x="-106326" y="736234"/>
+              <a:chExt cx="12298326" cy="5385531"/>
+            </a:xfrm>
+          </p:grpSpPr>
+          <p:pic>
+            <p:nvPicPr>
+              <p:cNvPr id="3" name="Picture 2"/>
+              <p:cNvPicPr>
+                <a:picLocks noChangeAspect="1"/>
+              </p:cNvPicPr>
+              <p:nvPr/>
+            </p:nvPicPr>
+            <p:blipFill>
+              <a:blip r:embed="rId2">
+                <a:clrChange>
+                  <a:clrFrom>
+                    <a:srgbClr val="5B6E6C"/>
+                  </a:clrFrom>
+                  <a:clrTo>
+                    <a:srgbClr val="5B6E6C">
+                      <a:alpha val="0"/>
+                    </a:srgbClr>
+                  </a:clrTo>
+                </a:clrChange>
+              </a:blip>
+              <a:stretch>
+                <a:fillRect/>
+              </a:stretch>
+            </p:blipFill>
+            <p:spPr>
+              <a:xfrm>
+                <a:off x="0" y="736234"/>
+                <a:ext cx="12192000" cy="5385531"/>
+              </a:xfrm>
+              <a:prstGeom prst="rect">
+                <a:avLst/>
+              </a:prstGeom>
+            </p:spPr>
+          </p:pic>
+          <p:sp>
+            <p:nvSpPr>
+              <p:cNvPr id="6" name="Rectangle 5"/>
+              <p:cNvSpPr/>
+              <p:nvPr/>
+            </p:nvSpPr>
+            <p:spPr>
+              <a:xfrm>
+                <a:off x="0" y="2094614"/>
+                <a:ext cx="579474" cy="1796902"/>
+              </a:xfrm>
+              <a:prstGeom prst="rect">
+                <a:avLst/>
+              </a:prstGeom>
+              <a:solidFill>
+                <a:schemeClr val="bg1"/>
+              </a:solidFill>
+              <a:ln>
+                <a:noFill/>
+              </a:ln>
+            </p:spPr>
+            <p:style>
+              <a:lnRef idx="2">
+                <a:schemeClr val="accent1">
+                  <a:shade val="50000"/>
+                </a:schemeClr>
+              </a:lnRef>
+              <a:fillRef idx="1">
+                <a:schemeClr val="accent1"/>
+              </a:fillRef>
+              <a:effectRef idx="0">
+                <a:schemeClr val="accent1"/>
+              </a:effectRef>
+              <a:fontRef idx="minor">
+                <a:schemeClr val="lt1"/>
+              </a:fontRef>
+            </p:style>
+            <p:txBody>
+              <a:bodyPr rtlCol="0" anchor="ctr"/>
+              <a:lstStyle/>
+              <a:p>
+                <a:pPr algn="ctr"/>
+                <a:endParaRPr lang="en-US"/>
+              </a:p>
+            </p:txBody>
+          </p:sp>
+          <p:sp>
+            <p:nvSpPr>
+              <p:cNvPr id="10" name="Manual Input 9"/>
+              <p:cNvSpPr/>
+              <p:nvPr/>
+            </p:nvSpPr>
+            <p:spPr>
+              <a:xfrm rot="5400000">
+                <a:off x="-195410" y="825318"/>
+                <a:ext cx="1985702" cy="1807534"/>
+              </a:xfrm>
+              <a:prstGeom prst="flowChartManualInput">
+                <a:avLst/>
+              </a:prstGeom>
+              <a:solidFill>
+                <a:schemeClr val="bg1"/>
+              </a:solidFill>
+              <a:ln>
+                <a:noFill/>
+              </a:ln>
+            </p:spPr>
+            <p:style>
+              <a:lnRef idx="2">
+                <a:schemeClr val="accent1">
+                  <a:shade val="50000"/>
+                </a:schemeClr>
+              </a:lnRef>
+              <a:fillRef idx="1">
+                <a:schemeClr val="accent1"/>
+              </a:fillRef>
+              <a:effectRef idx="0">
+                <a:schemeClr val="accent1"/>
+              </a:effectRef>
+              <a:fontRef idx="minor">
+                <a:schemeClr val="lt1"/>
+              </a:fontRef>
+            </p:style>
+            <p:txBody>
+              <a:bodyPr rtlCol="0" anchor="ctr"/>
+              <a:lstStyle/>
+              <a:p>
+                <a:pPr algn="ctr"/>
+                <a:endParaRPr lang="en-US"/>
+              </a:p>
+            </p:txBody>
+          </p:sp>
+        </p:grpSp>
         <p:sp>
           <p:nvSpPr>
-            <p:cNvPr id="6" name="Rectangle 5"/>
+            <p:cNvPr id="12" name="Oval 11"/>
             <p:cNvSpPr/>
             <p:nvPr/>
           </p:nvSpPr>
           <p:spPr>
             <a:xfrm>
-              <a:off x="0" y="2094614"/>
-              <a:ext cx="579474" cy="1796902"/>
-            </a:xfrm>
-            <a:prstGeom prst="rect">
+              <a:off x="1624118" y="2690037"/>
+              <a:ext cx="510364" cy="510364"/>
+            </a:xfrm>
+            <a:prstGeom prst="ellipse">
               <a:avLst/>
             </a:prstGeom>
-            <a:solidFill>
-              <a:schemeClr val="bg1"/>
-            </a:solidFill>
-            <a:ln>
-              <a:noFill/>
+            <a:noFill/>
+            <a:ln w="28575">
+              <a:solidFill>
+                <a:schemeClr val="tx2"/>
+              </a:solidFill>
             </a:ln>
           </p:spPr>
           <p:style>
@@ -7761,623 +10782,198 @@
             </a:p>
           </p:txBody>
         </p:sp>
-        <p:sp>
-          <p:nvSpPr>
-            <p:cNvPr id="10" name="Manual Input 9"/>
-            <p:cNvSpPr/>
-            <p:nvPr/>
-          </p:nvSpPr>
+        <p:pic>
+          <p:nvPicPr>
+            <p:cNvPr id="18" name="Picture 17"/>
+            <p:cNvPicPr>
+              <a:picLocks noChangeAspect="1"/>
+            </p:cNvPicPr>
+            <p:nvPr/>
+          </p:nvPicPr>
+          <p:blipFill rotWithShape="1">
+            <a:blip r:embed="rId2">
+              <a:clrChange>
+                <a:clrFrom>
+                  <a:srgbClr val="5B6E6C"/>
+                </a:clrFrom>
+                <a:clrTo>
+                  <a:srgbClr val="5B6E6C">
+                    <a:alpha val="0"/>
+                  </a:srgbClr>
+                </a:clrTo>
+              </a:clrChange>
+            </a:blip>
+            <a:srcRect l="10922" t="31295" r="80532" b="49358"/>
+            <a:stretch/>
+          </p:blipFill>
           <p:spPr>
-            <a:xfrm rot="5400000">
-              <a:off x="-195410" y="825318"/>
-              <a:ext cx="1985702" cy="1807534"/>
-            </a:xfrm>
-            <a:prstGeom prst="flowChartManualInput">
+            <a:xfrm>
+              <a:off x="4072270" y="2642191"/>
+              <a:ext cx="2498651" cy="2498650"/>
+            </a:xfrm>
+            <a:prstGeom prst="ellipse">
               <a:avLst/>
             </a:prstGeom>
-            <a:solidFill>
-              <a:schemeClr val="bg1"/>
-            </a:solidFill>
-            <a:ln>
-              <a:noFill/>
+            <a:ln w="28575">
+              <a:solidFill>
+                <a:schemeClr val="tx2"/>
+              </a:solidFill>
+            </a:ln>
+          </p:spPr>
+        </p:pic>
+        <p:cxnSp>
+          <p:nvCxnSpPr>
+            <p:cNvPr id="19" name="Straight Connector 18"/>
+            <p:cNvCxnSpPr/>
+            <p:nvPr/>
+          </p:nvCxnSpPr>
+          <p:spPr>
+            <a:xfrm flipV="1">
+              <a:off x="1879300" y="2627293"/>
+              <a:ext cx="3465772" cy="62744"/>
+            </a:xfrm>
+            <a:prstGeom prst="line">
+              <a:avLst/>
+            </a:prstGeom>
+            <a:ln w="28575">
+              <a:solidFill>
+                <a:schemeClr val="tx2"/>
+              </a:solidFill>
             </a:ln>
           </p:spPr>
           <p:style>
-            <a:lnRef idx="2">
-              <a:schemeClr val="accent1">
-                <a:shade val="50000"/>
-              </a:schemeClr>
+            <a:lnRef idx="1">
+              <a:schemeClr val="accent1"/>
             </a:lnRef>
-            <a:fillRef idx="1">
+            <a:fillRef idx="0">
               <a:schemeClr val="accent1"/>
             </a:fillRef>
             <a:effectRef idx="0">
               <a:schemeClr val="accent1"/>
             </a:effectRef>
             <a:fontRef idx="minor">
-              <a:schemeClr val="lt1"/>
+              <a:schemeClr val="tx1"/>
             </a:fontRef>
           </p:style>
-          <p:txBody>
-            <a:bodyPr rtlCol="0" anchor="ctr"/>
-            <a:lstStyle/>
-            <a:p>
-              <a:pPr algn="ctr"/>
-              <a:endParaRPr lang="en-US"/>
-            </a:p>
-          </p:txBody>
-        </p:sp>
+        </p:cxnSp>
+        <p:cxnSp>
+          <p:nvCxnSpPr>
+            <p:cNvPr id="22" name="Straight Connector 21"/>
+            <p:cNvCxnSpPr>
+              <a:endCxn id="12" idx="3"/>
+            </p:cNvCxnSpPr>
+            <p:nvPr/>
+          </p:nvCxnSpPr>
+          <p:spPr>
+            <a:xfrm flipH="1" flipV="1">
+              <a:off x="1698859" y="3125660"/>
+              <a:ext cx="3040872" cy="1890014"/>
+            </a:xfrm>
+            <a:prstGeom prst="line">
+              <a:avLst/>
+            </a:prstGeom>
+            <a:ln w="28575">
+              <a:solidFill>
+                <a:schemeClr val="tx2"/>
+              </a:solidFill>
+            </a:ln>
+          </p:spPr>
+          <p:style>
+            <a:lnRef idx="1">
+              <a:schemeClr val="accent1"/>
+            </a:lnRef>
+            <a:fillRef idx="0">
+              <a:schemeClr val="accent1"/>
+            </a:fillRef>
+            <a:effectRef idx="0">
+              <a:schemeClr val="accent1"/>
+            </a:effectRef>
+            <a:fontRef idx="minor">
+              <a:schemeClr val="tx1"/>
+            </a:fontRef>
+          </p:style>
+        </p:cxnSp>
       </p:grpSp>
       <p:sp>
         <p:nvSpPr>
-          <p:cNvPr id="12" name="Oval 11"/>
-          <p:cNvSpPr/>
+          <p:cNvPr id="34" name="TextBox 33"/>
+          <p:cNvSpPr txBox="1"/>
           <p:nvPr/>
         </p:nvSpPr>
         <p:spPr>
           <a:xfrm>
-            <a:off x="1624118" y="2690037"/>
-            <a:ext cx="510364" cy="510364"/>
+            <a:off x="5986222" y="3537573"/>
+            <a:ext cx="452368" cy="707886"/>
           </a:xfrm>
-          <a:prstGeom prst="ellipse">
+          <a:prstGeom prst="rect">
             <a:avLst/>
           </a:prstGeom>
           <a:noFill/>
-          <a:ln w="28575">
-            <a:solidFill>
-              <a:schemeClr val="tx2"/>
-            </a:solidFill>
-          </a:ln>
         </p:spPr>
-        <p:style>
-          <a:lnRef idx="2">
-            <a:schemeClr val="accent1">
-              <a:shade val="50000"/>
-            </a:schemeClr>
-          </a:lnRef>
-          <a:fillRef idx="1">
-            <a:schemeClr val="accent1"/>
-          </a:fillRef>
-          <a:effectRef idx="0">
-            <a:schemeClr val="accent1"/>
-          </a:effectRef>
-          <a:fontRef idx="minor">
-            <a:schemeClr val="lt1"/>
-          </a:fontRef>
-        </p:style>
         <p:txBody>
-          <a:bodyPr rtlCol="0" anchor="ctr"/>
+          <a:bodyPr wrap="none" rtlCol="0">
+            <a:spAutoFit/>
+          </a:bodyPr>
           <a:lstStyle/>
           <a:p>
-            <a:pPr algn="ctr"/>
-            <a:endParaRPr lang="en-US"/>
+            <a:r>
+              <a:rPr lang="en-US" sz="4000" dirty="0" smtClean="0">
+                <a:latin typeface="Baskerville" charset="0"/>
+                <a:ea typeface="Baskerville" charset="0"/>
+                <a:cs typeface="Baskerville" charset="0"/>
+              </a:rPr>
+              <a:t>b</a:t>
+            </a:r>
+            <a:endParaRPr lang="en-US" dirty="0">
+              <a:latin typeface="Baskerville" charset="0"/>
+              <a:ea typeface="Baskerville" charset="0"/>
+              <a:cs typeface="Baskerville" charset="0"/>
+            </a:endParaRPr>
           </a:p>
         </p:txBody>
       </p:sp>
-      <p:pic>
-        <p:nvPicPr>
-          <p:cNvPr id="18" name="Picture 17"/>
-          <p:cNvPicPr>
-            <a:picLocks noChangeAspect="1"/>
-          </p:cNvPicPr>
-          <p:nvPr/>
-        </p:nvPicPr>
-        <p:blipFill rotWithShape="1">
-          <a:blip r:embed="rId2">
-            <a:clrChange>
-              <a:clrFrom>
-                <a:srgbClr val="5B6E6C"/>
-              </a:clrFrom>
-              <a:clrTo>
-                <a:srgbClr val="5B6E6C">
-                  <a:alpha val="0"/>
-                </a:srgbClr>
-              </a:clrTo>
-            </a:clrChange>
-          </a:blip>
-          <a:srcRect l="10922" t="31295" r="80532" b="49358"/>
-          <a:stretch/>
-        </p:blipFill>
-        <p:spPr>
-          <a:xfrm>
-            <a:off x="4072270" y="2642191"/>
-            <a:ext cx="2498651" cy="2498650"/>
-          </a:xfrm>
-          <a:prstGeom prst="ellipse">
-            <a:avLst/>
-          </a:prstGeom>
-          <a:ln w="28575">
-            <a:solidFill>
-              <a:schemeClr val="tx2"/>
-            </a:solidFill>
-          </a:ln>
-        </p:spPr>
-      </p:pic>
-      <p:cxnSp>
-        <p:nvCxnSpPr>
-          <p:cNvPr id="19" name="Straight Connector 18"/>
-          <p:cNvCxnSpPr>
-            <a:stCxn id="12" idx="0"/>
-          </p:cNvCxnSpPr>
-          <p:nvPr/>
-        </p:nvCxnSpPr>
-        <p:spPr>
-          <a:xfrm flipV="1">
-            <a:off x="1879300" y="2642191"/>
-            <a:ext cx="3203063" cy="47846"/>
-          </a:xfrm>
-          <a:prstGeom prst="line">
-            <a:avLst/>
-          </a:prstGeom>
-          <a:ln w="28575">
-            <a:solidFill>
-              <a:schemeClr val="tx2"/>
-            </a:solidFill>
-          </a:ln>
-        </p:spPr>
-        <p:style>
-          <a:lnRef idx="1">
-            <a:schemeClr val="accent1"/>
-          </a:lnRef>
-          <a:fillRef idx="0">
-            <a:schemeClr val="accent1"/>
-          </a:fillRef>
-          <a:effectRef idx="0">
-            <a:schemeClr val="accent1"/>
-          </a:effectRef>
-          <a:fontRef idx="minor">
-            <a:schemeClr val="tx1"/>
-          </a:fontRef>
-        </p:style>
-      </p:cxnSp>
-      <p:cxnSp>
-        <p:nvCxnSpPr>
-          <p:cNvPr id="22" name="Straight Connector 21"/>
-          <p:cNvCxnSpPr>
-            <a:endCxn id="12" idx="3"/>
-          </p:cNvCxnSpPr>
-          <p:nvPr/>
-        </p:nvCxnSpPr>
-        <p:spPr>
-          <a:xfrm flipH="1" flipV="1">
-            <a:off x="1698859" y="3125660"/>
-            <a:ext cx="3040871" cy="1890013"/>
-          </a:xfrm>
-          <a:prstGeom prst="line">
-            <a:avLst/>
-          </a:prstGeom>
-          <a:ln w="28575">
-            <a:solidFill>
-              <a:schemeClr val="tx2"/>
-            </a:solidFill>
-          </a:ln>
-        </p:spPr>
-        <p:style>
-          <a:lnRef idx="1">
-            <a:schemeClr val="accent1"/>
-          </a:lnRef>
-          <a:fillRef idx="0">
-            <a:schemeClr val="accent1"/>
-          </a:fillRef>
-          <a:effectRef idx="0">
-            <a:schemeClr val="accent1"/>
-          </a:effectRef>
-          <a:fontRef idx="minor">
-            <a:schemeClr val="tx1"/>
-          </a:fontRef>
-        </p:style>
-      </p:cxnSp>
-    </p:spTree>
-    <p:extLst>
-      <p:ext uri="{BB962C8B-B14F-4D97-AF65-F5344CB8AC3E}">
-        <p14:creationId xmlns:p14="http://schemas.microsoft.com/office/powerpoint/2010/main" val="1993496320"/>
-      </p:ext>
-    </p:extLst>
-  </p:cSld>
-  <p:clrMapOvr>
-    <a:masterClrMapping/>
-  </p:clrMapOvr>
-  <p:timing>
-    <p:tnLst>
-      <p:par>
-        <p:cTn id="1" dur="indefinite" restart="never" nodeType="tmRoot"/>
-      </p:par>
-    </p:tnLst>
-  </p:timing>
-</p:sld>
-</file>
-
-<file path=ppt/slides/slide8.xml><?xml version="1.0" encoding="utf-8"?>
-<p:sld xmlns:a="http://schemas.openxmlformats.org/drawingml/2006/main" xmlns:r="http://schemas.openxmlformats.org/officeDocument/2006/relationships" xmlns:p="http://schemas.openxmlformats.org/presentationml/2006/main">
-  <p:cSld>
-    <p:spTree>
-      <p:nvGrpSpPr>
-        <p:cNvPr id="1" name=""/>
-        <p:cNvGrpSpPr/>
-        <p:nvPr/>
-      </p:nvGrpSpPr>
-      <p:grpSpPr>
-        <a:xfrm>
-          <a:off x="0" y="0"/>
-          <a:ext cx="0" cy="0"/>
-          <a:chOff x="0" y="0"/>
-          <a:chExt cx="0" cy="0"/>
-        </a:xfrm>
-      </p:grpSpPr>
       <p:sp>
         <p:nvSpPr>
-          <p:cNvPr id="23" name="Rectangle 22" hidden="1"/>
-          <p:cNvSpPr/>
+          <p:cNvPr id="35" name="TextBox 34"/>
+          <p:cNvSpPr txBox="1"/>
           <p:nvPr/>
         </p:nvSpPr>
         <p:spPr>
           <a:xfrm>
-            <a:off x="4361126" y="2808514"/>
-            <a:ext cx="3839445" cy="616857"/>
+            <a:off x="702613" y="2816637"/>
+            <a:ext cx="473206" cy="830997"/>
           </a:xfrm>
           <a:prstGeom prst="rect">
             <a:avLst/>
           </a:prstGeom>
-          <a:solidFill>
-            <a:schemeClr val="tx1"/>
-          </a:solidFill>
+          <a:noFill/>
         </p:spPr>
-        <p:style>
-          <a:lnRef idx="2">
-            <a:schemeClr val="accent1">
-              <a:shade val="50000"/>
-            </a:schemeClr>
-          </a:lnRef>
-          <a:fillRef idx="1">
-            <a:schemeClr val="accent1"/>
-          </a:fillRef>
-          <a:effectRef idx="0">
-            <a:schemeClr val="accent1"/>
-          </a:effectRef>
-          <a:fontRef idx="minor">
-            <a:schemeClr val="lt1"/>
-          </a:fontRef>
-        </p:style>
         <p:txBody>
-          <a:bodyPr rtlCol="0" anchor="ctr"/>
+          <a:bodyPr wrap="none" rtlCol="0">
+            <a:spAutoFit/>
+          </a:bodyPr>
           <a:lstStyle/>
           <a:p>
-            <a:pPr algn="ctr"/>
-            <a:endParaRPr lang="en-US"/>
-          </a:p>
-        </p:txBody>
-      </p:sp>
-      <p:sp>
-        <p:nvSpPr>
-          <p:cNvPr id="5" name="Rectangle 4" hidden="1"/>
-          <p:cNvSpPr/>
-          <p:nvPr/>
-        </p:nvSpPr>
-        <p:spPr>
-          <a:xfrm>
-            <a:off x="3185885" y="2808514"/>
-            <a:ext cx="1618343" cy="1879600"/>
-          </a:xfrm>
-          <a:prstGeom prst="rect">
-            <a:avLst/>
-          </a:prstGeom>
-          <a:solidFill>
-            <a:schemeClr val="tx1"/>
-          </a:solidFill>
-        </p:spPr>
-        <p:style>
-          <a:lnRef idx="2">
-            <a:schemeClr val="accent1">
-              <a:shade val="50000"/>
-            </a:schemeClr>
-          </a:lnRef>
-          <a:fillRef idx="1">
-            <a:schemeClr val="accent1"/>
-          </a:fillRef>
-          <a:effectRef idx="0">
-            <a:schemeClr val="accent1"/>
-          </a:effectRef>
-          <a:fontRef idx="minor">
-            <a:schemeClr val="lt1"/>
-          </a:fontRef>
-        </p:style>
-        <p:txBody>
-          <a:bodyPr rtlCol="0" anchor="ctr"/>
-          <a:lstStyle/>
-          <a:p>
-            <a:pPr algn="ctr"/>
-            <a:endParaRPr lang="en-US"/>
-          </a:p>
-        </p:txBody>
-      </p:sp>
-      <p:pic>
-        <p:nvPicPr>
-          <p:cNvPr id="2" name="Picture 1"/>
-          <p:cNvPicPr>
-            <a:picLocks noChangeAspect="1"/>
-          </p:cNvPicPr>
-          <p:nvPr/>
-        </p:nvPicPr>
-        <p:blipFill rotWithShape="1">
-          <a:blip r:embed="rId2">
-            <a:clrChange>
-              <a:clrFrom>
-                <a:srgbClr val="C0C0C0"/>
-              </a:clrFrom>
-              <a:clrTo>
-                <a:srgbClr val="C0C0C0">
-                  <a:alpha val="0"/>
-                </a:srgbClr>
-              </a:clrTo>
-            </a:clrChange>
-            <a:extLst>
-              <a:ext uri="{BEBA8EAE-BF5A-486C-A8C5-ECC9F3942E4B}">
-                <a14:imgProps xmlns:a14="http://schemas.microsoft.com/office/drawing/2010/main">
-                  <a14:imgLayer r:embed="rId3">
-                    <a14:imgEffect>
-                      <a14:backgroundRemoval t="19143" b="85810" l="36399" r="78869">
-                        <a14:foregroundMark x1="65119" y1="58286" x2="66488" y2="61286"/>
-                        <a14:foregroundMark x1="58393" y1="46619" x2="58899" y2="48143"/>
-                        <a14:foregroundMark x1="54464" y1="46476" x2="56548" y2="49476"/>
-                        <a14:foregroundMark x1="57589" y1="52095" x2="64464" y2="63238"/>
-                        <a14:backgroundMark x1="41548" y1="36571" x2="43363" y2="40190"/>
-                      </a14:backgroundRemoval>
-                    </a14:imgEffect>
-                  </a14:imgLayer>
-                </a14:imgProps>
-              </a:ext>
-              <a:ext uri="{28A0092B-C50C-407E-A947-70E740481C1C}">
-                <a14:useLocalDpi xmlns:a14="http://schemas.microsoft.com/office/drawing/2010/main" val="0"/>
-              </a:ext>
-            </a:extLst>
-          </a:blip>
-          <a:srcRect l="31472" t="20253" r="19044" b="6845"/>
-          <a:stretch/>
-        </p:blipFill>
-        <p:spPr>
-          <a:xfrm rot="18744695">
-            <a:off x="2867065" y="1002822"/>
-            <a:ext cx="5429840" cy="4999596"/>
-          </a:xfrm>
-          <a:prstGeom prst="rect">
-            <a:avLst/>
-          </a:prstGeom>
-        </p:spPr>
-      </p:pic>
-      <p:sp>
-        <p:nvSpPr>
-          <p:cNvPr id="3" name="Rectangle 2"/>
-          <p:cNvSpPr/>
-          <p:nvPr/>
-        </p:nvSpPr>
-        <p:spPr>
-          <a:xfrm>
-            <a:off x="3148553" y="-329937"/>
-            <a:ext cx="5743341" cy="3073136"/>
-          </a:xfrm>
-          <a:prstGeom prst="rect">
-            <a:avLst/>
-          </a:prstGeom>
-          <a:solidFill>
-            <a:schemeClr val="bg1"/>
-          </a:solidFill>
-          <a:ln>
-            <a:noFill/>
-          </a:ln>
-        </p:spPr>
-        <p:style>
-          <a:lnRef idx="2">
-            <a:schemeClr val="accent1">
-              <a:shade val="50000"/>
-            </a:schemeClr>
-          </a:lnRef>
-          <a:fillRef idx="1">
-            <a:schemeClr val="accent1"/>
-          </a:fillRef>
-          <a:effectRef idx="0">
-            <a:schemeClr val="accent1"/>
-          </a:effectRef>
-          <a:fontRef idx="minor">
-            <a:schemeClr val="lt1"/>
-          </a:fontRef>
-        </p:style>
-        <p:txBody>
-          <a:bodyPr rtlCol="0" anchor="ctr"/>
-          <a:lstStyle/>
-          <a:p>
-            <a:pPr algn="ctr"/>
-            <a:endParaRPr lang="en-US"/>
-          </a:p>
-        </p:txBody>
-      </p:sp>
-      <p:sp>
-        <p:nvSpPr>
-          <p:cNvPr id="19" name="Rectangle 18"/>
-          <p:cNvSpPr/>
-          <p:nvPr/>
-        </p:nvSpPr>
-        <p:spPr>
-          <a:xfrm>
-            <a:off x="2509101" y="4985975"/>
-            <a:ext cx="5743341" cy="2811561"/>
-          </a:xfrm>
-          <a:prstGeom prst="rect">
-            <a:avLst/>
-          </a:prstGeom>
-          <a:solidFill>
-            <a:schemeClr val="bg1"/>
-          </a:solidFill>
-          <a:ln>
-            <a:noFill/>
-          </a:ln>
-        </p:spPr>
-        <p:style>
-          <a:lnRef idx="2">
-            <a:schemeClr val="accent1">
-              <a:shade val="50000"/>
-            </a:schemeClr>
-          </a:lnRef>
-          <a:fillRef idx="1">
-            <a:schemeClr val="accent1"/>
-          </a:fillRef>
-          <a:effectRef idx="0">
-            <a:schemeClr val="accent1"/>
-          </a:effectRef>
-          <a:fontRef idx="minor">
-            <a:schemeClr val="lt1"/>
-          </a:fontRef>
-        </p:style>
-        <p:txBody>
-          <a:bodyPr rtlCol="0" anchor="ctr"/>
-          <a:lstStyle/>
-          <a:p>
-            <a:pPr algn="ctr"/>
-            <a:endParaRPr lang="en-US"/>
-          </a:p>
-        </p:txBody>
-      </p:sp>
-      <p:sp>
-        <p:nvSpPr>
-          <p:cNvPr id="20" name="Rectangle 19"/>
-          <p:cNvSpPr/>
-          <p:nvPr/>
-        </p:nvSpPr>
-        <p:spPr>
-          <a:xfrm>
-            <a:off x="-2594789" y="2243579"/>
-            <a:ext cx="5780674" cy="3187829"/>
-          </a:xfrm>
-          <a:prstGeom prst="rect">
-            <a:avLst/>
-          </a:prstGeom>
-          <a:solidFill>
-            <a:schemeClr val="bg1"/>
-          </a:solidFill>
-          <a:ln>
-            <a:noFill/>
-          </a:ln>
-        </p:spPr>
-        <p:style>
-          <a:lnRef idx="2">
-            <a:schemeClr val="accent1">
-              <a:shade val="50000"/>
-            </a:schemeClr>
-          </a:lnRef>
-          <a:fillRef idx="1">
-            <a:schemeClr val="accent1"/>
-          </a:fillRef>
-          <a:effectRef idx="0">
-            <a:schemeClr val="accent1"/>
-          </a:effectRef>
-          <a:fontRef idx="minor">
-            <a:schemeClr val="lt1"/>
-          </a:fontRef>
-        </p:style>
-        <p:txBody>
-          <a:bodyPr rtlCol="0" anchor="ctr"/>
-          <a:lstStyle/>
-          <a:p>
-            <a:pPr algn="ctr"/>
-            <a:endParaRPr lang="en-US"/>
-          </a:p>
-        </p:txBody>
-      </p:sp>
-      <p:sp>
-        <p:nvSpPr>
-          <p:cNvPr id="22" name="Rectangle 21"/>
-          <p:cNvSpPr/>
-          <p:nvPr/>
-        </p:nvSpPr>
-        <p:spPr>
-          <a:xfrm>
-            <a:off x="8618512" y="2363753"/>
-            <a:ext cx="2103556" cy="3187829"/>
-          </a:xfrm>
-          <a:prstGeom prst="rect">
-            <a:avLst/>
-          </a:prstGeom>
-          <a:solidFill>
-            <a:schemeClr val="bg1"/>
-          </a:solidFill>
-          <a:ln>
-            <a:noFill/>
-          </a:ln>
-        </p:spPr>
-        <p:style>
-          <a:lnRef idx="2">
-            <a:schemeClr val="accent1">
-              <a:shade val="50000"/>
-            </a:schemeClr>
-          </a:lnRef>
-          <a:fillRef idx="1">
-            <a:schemeClr val="accent1"/>
-          </a:fillRef>
-          <a:effectRef idx="0">
-            <a:schemeClr val="accent1"/>
-          </a:effectRef>
-          <a:fontRef idx="minor">
-            <a:schemeClr val="lt1"/>
-          </a:fontRef>
-        </p:style>
-        <p:txBody>
-          <a:bodyPr rtlCol="0" anchor="ctr"/>
-          <a:lstStyle/>
-          <a:p>
-            <a:pPr algn="ctr"/>
-            <a:endParaRPr lang="en-US"/>
-          </a:p>
-        </p:txBody>
-      </p:sp>
-      <p:sp>
-        <p:nvSpPr>
-          <p:cNvPr id="4" name="Rectangle 3"/>
-          <p:cNvSpPr/>
-          <p:nvPr/>
-        </p:nvSpPr>
-        <p:spPr>
-          <a:xfrm>
-            <a:off x="3026229" y="2532743"/>
-            <a:ext cx="602342" cy="732971"/>
-          </a:xfrm>
-          <a:prstGeom prst="rect">
-            <a:avLst/>
-          </a:prstGeom>
-          <a:solidFill>
-            <a:schemeClr val="bg1"/>
-          </a:solidFill>
-          <a:ln>
-            <a:noFill/>
-          </a:ln>
-        </p:spPr>
-        <p:style>
-          <a:lnRef idx="2">
-            <a:schemeClr val="accent1">
-              <a:shade val="50000"/>
-            </a:schemeClr>
-          </a:lnRef>
-          <a:fillRef idx="1">
-            <a:schemeClr val="accent1"/>
-          </a:fillRef>
-          <a:effectRef idx="0">
-            <a:schemeClr val="accent1"/>
-          </a:effectRef>
-          <a:fontRef idx="minor">
-            <a:schemeClr val="lt1"/>
-          </a:fontRef>
-        </p:style>
-        <p:txBody>
-          <a:bodyPr rtlCol="0" anchor="ctr"/>
-          <a:lstStyle/>
-          <a:p>
-            <a:pPr algn="ctr"/>
-            <a:endParaRPr lang="en-US"/>
+            <a:r>
+              <a:rPr lang="en-US" sz="4800" dirty="0">
+                <a:latin typeface="Baskerville" charset="0"/>
+                <a:ea typeface="Baskerville" charset="0"/>
+                <a:cs typeface="Baskerville" charset="0"/>
+              </a:rPr>
+              <a:t>a</a:t>
+            </a:r>
+            <a:endParaRPr lang="en-US" dirty="0">
+              <a:latin typeface="Baskerville" charset="0"/>
+              <a:ea typeface="Baskerville" charset="0"/>
+              <a:cs typeface="Baskerville" charset="0"/>
+            </a:endParaRPr>
           </a:p>
         </p:txBody>
       </p:sp>
     </p:spTree>
     <p:extLst>
       <p:ext uri="{BB962C8B-B14F-4D97-AF65-F5344CB8AC3E}">
-        <p14:creationId xmlns:p14="http://schemas.microsoft.com/office/powerpoint/2010/main" val="300054500"/>
+        <p14:creationId xmlns:p14="http://schemas.microsoft.com/office/powerpoint/2010/main" val="1993496320"/>
       </p:ext>
     </p:extLst>
   </p:cSld>

</xml_diff>